<commit_message>
about halfway through model vs subjects
</commit_message>
<xml_diff>
--- a/PPG/reports/PPG progress report 2017_09_26.pptx
+++ b/PPG/reports/PPG progress report 2017_09_26.pptx
@@ -4565,7 +4565,7 @@
         <p:spPr>
           <a:xfrm>
             <a:off x="0" y="-158222"/>
-            <a:ext cx="11756571" cy="5201424"/>
+            <a:ext cx="12192000" cy="5693866"/>
           </a:xfrm>
           <a:prstGeom prst="rect">
             <a:avLst/>
@@ -4650,8 +4650,21 @@
                 <a:ea typeface="Arial" charset="0"/>
                 <a:cs typeface="Arial" charset="0"/>
               </a:rPr>
-              <a:t>We estimated these as fixed effects from the first investments made by subjects playing the game for the first time. We used data from several datasets, amounting to a total of 267 subjects, 130 player as prey and 137 playing as predator*.</a:t>
-            </a:r>
+              <a:t>We estimated these as fixed effects from the first investments made by subjects playing the game for the first time. We used data from several datasets, amounting to a total of 267 subjects, 130 player as prey and 137 playing as predator</a:t>
+            </a:r>
+            <a:r>
+              <a:rPr lang="en-US" sz="1600" dirty="0" smtClean="0">
+                <a:latin typeface="Arial" charset="0"/>
+                <a:ea typeface="Arial" charset="0"/>
+                <a:cs typeface="Arial" charset="0"/>
+              </a:rPr>
+              <a:t>*. Importantly, we constrained the parameters using a Laplace procedure, allowing us to stay away from the bounds of the parameter space.</a:t>
+            </a:r>
+            <a:endParaRPr lang="en-US" sz="1600" dirty="0">
+              <a:latin typeface="Arial" charset="0"/>
+              <a:ea typeface="Arial" charset="0"/>
+              <a:cs typeface="Arial" charset="0"/>
+            </a:endParaRPr>
           </a:p>
           <a:p>
             <a:pPr>
@@ -4735,8 +4748,8 @@
         </p:nvSpPr>
         <p:spPr>
           <a:xfrm>
-            <a:off x="8355693" y="6068291"/>
-            <a:ext cx="3966150" cy="1015663"/>
+            <a:off x="0" y="5987374"/>
+            <a:ext cx="11875324" cy="1508105"/>
           </a:xfrm>
           <a:prstGeom prst="rect">
             <a:avLst/>
@@ -4744,7 +4757,7 @@
           <a:noFill/>
         </p:spPr>
         <p:txBody>
-          <a:bodyPr wrap="none" rtlCol="0">
+          <a:bodyPr wrap="square" rtlCol="0">
             <a:spAutoFit/>
           </a:bodyPr>
           <a:lstStyle/>
@@ -4755,12 +4768,20 @@
               </a:lnSpc>
             </a:pPr>
             <a:r>
+              <a:rPr lang="en-US" sz="1600" dirty="0" smtClean="0">
+                <a:latin typeface="Arial" charset="0"/>
+                <a:ea typeface="Arial" charset="0"/>
+                <a:cs typeface="Arial" charset="0"/>
+              </a:rPr>
+              <a:t>*</a:t>
+            </a:r>
+            <a:r>
               <a:rPr lang="en-US" sz="1200" dirty="0" smtClean="0">
                 <a:latin typeface="Arial" charset="0"/>
                 <a:ea typeface="Arial" charset="0"/>
                 <a:cs typeface="Arial" charset="0"/>
               </a:rPr>
-              <a:t>*  </a:t>
+              <a:t>  </a:t>
             </a:r>
             <a:r>
               <a:rPr lang="en-US" sz="1200" dirty="0">
@@ -4887,14 +4908,102 @@
                 <a:ea typeface="Arial" charset="0"/>
                 <a:cs typeface="Arial" charset="0"/>
               </a:rPr>
-              <a:t>) + 15 (OT) </a:t>
-            </a:r>
+              <a:t>) + 15 (OT</a:t>
+            </a:r>
+            <a:r>
+              <a:rPr lang="en-US" sz="1200" dirty="0" smtClean="0">
+                <a:latin typeface="Arial" charset="0"/>
+                <a:ea typeface="Arial" charset="0"/>
+                <a:cs typeface="Arial" charset="0"/>
+              </a:rPr>
+              <a:t>)         the parameters and accompanying plots were produced by PPG/empirical_priors_mg_predprey_2017_10_03.m </a:t>
+            </a:r>
+          </a:p>
+          <a:p>
+            <a:pPr>
+              <a:lnSpc>
+                <a:spcPct val="200000"/>
+              </a:lnSpc>
+            </a:pPr>
+            <a:r>
+              <a:rPr lang="en-US" sz="1200" dirty="0" smtClean="0">
+                <a:latin typeface="Arial" charset="0"/>
+                <a:ea typeface="Arial" charset="0"/>
+                <a:cs typeface="Arial" charset="0"/>
+              </a:rPr>
+              <a:t> </a:t>
+            </a:r>
+            <a:endParaRPr lang="en-US" sz="1200" dirty="0">
+              <a:latin typeface="Arial" charset="0"/>
+              <a:ea typeface="Arial" charset="0"/>
+              <a:cs typeface="Arial" charset="0"/>
+            </a:endParaRPr>
           </a:p>
           <a:p>
             <a:endParaRPr lang="en-US" sz="1200" dirty="0"/>
           </a:p>
         </p:txBody>
       </p:sp>
+      <p:pic>
+        <p:nvPicPr>
+          <p:cNvPr id="5" name="Picture 4"/>
+          <p:cNvPicPr>
+            <a:picLocks noChangeAspect="1"/>
+          </p:cNvPicPr>
+          <p:nvPr/>
+        </p:nvPicPr>
+        <p:blipFill>
+          <a:blip r:embed="rId2">
+            <a:extLst>
+              <a:ext uri="{28A0092B-C50C-407E-A947-70E740481C1C}">
+                <a14:useLocalDpi xmlns:a14="http://schemas.microsoft.com/office/drawing/2010/main" val="0"/>
+              </a:ext>
+            </a:extLst>
+          </a:blip>
+          <a:stretch>
+            <a:fillRect/>
+          </a:stretch>
+        </p:blipFill>
+        <p:spPr>
+          <a:xfrm>
+            <a:off x="762000" y="2386940"/>
+            <a:ext cx="5027221" cy="3770416"/>
+          </a:xfrm>
+          <a:prstGeom prst="rect">
+            <a:avLst/>
+          </a:prstGeom>
+        </p:spPr>
+      </p:pic>
+      <p:pic>
+        <p:nvPicPr>
+          <p:cNvPr id="6" name="Picture 5"/>
+          <p:cNvPicPr>
+            <a:picLocks noChangeAspect="1"/>
+          </p:cNvPicPr>
+          <p:nvPr/>
+        </p:nvPicPr>
+        <p:blipFill>
+          <a:blip r:embed="rId3">
+            <a:extLst>
+              <a:ext uri="{28A0092B-C50C-407E-A947-70E740481C1C}">
+                <a14:useLocalDpi xmlns:a14="http://schemas.microsoft.com/office/drawing/2010/main" val="0"/>
+              </a:ext>
+            </a:extLst>
+          </a:blip>
+          <a:stretch>
+            <a:fillRect/>
+          </a:stretch>
+        </p:blipFill>
+        <p:spPr>
+          <a:xfrm>
+            <a:off x="6096000" y="2386940"/>
+            <a:ext cx="5027221" cy="3770416"/>
+          </a:xfrm>
+          <a:prstGeom prst="rect">
+            <a:avLst/>
+          </a:prstGeom>
+        </p:spPr>
+      </p:pic>
     </p:spTree>
     <p:extLst>
       <p:ext uri="{BB962C8B-B14F-4D97-AF65-F5344CB8AC3E}">
@@ -5297,6 +5406,36 @@
               <a:t>Top row represents unconstrained parameter estimation, bottom row represents Laplace constrained. Columns 1 and 2 represent parameters for case 1, columns 3-5 represent parameters from case 2.  </a:t>
             </a:r>
             <a:endParaRPr lang="en-US" sz="1600" dirty="0"/>
+          </a:p>
+        </p:txBody>
+      </p:sp>
+      <p:sp>
+        <p:nvSpPr>
+          <p:cNvPr id="13" name="TextBox 12"/>
+          <p:cNvSpPr txBox="1"/>
+          <p:nvPr/>
+        </p:nvSpPr>
+        <p:spPr>
+          <a:xfrm rot="16200000">
+            <a:off x="10131340" y="3669475"/>
+            <a:ext cx="3844322" cy="276999"/>
+          </a:xfrm>
+          <a:prstGeom prst="rect">
+            <a:avLst/>
+          </a:prstGeom>
+          <a:noFill/>
+        </p:spPr>
+        <p:txBody>
+          <a:bodyPr wrap="none" rtlCol="0">
+            <a:spAutoFit/>
+          </a:bodyPr>
+          <a:lstStyle/>
+          <a:p>
+            <a:r>
+              <a:rPr lang="en-US" sz="1200" dirty="0" smtClean="0"/>
+              <a:t>from PPG/test_recovery_models_MG_2017_09_21.m</a:t>
+            </a:r>
+            <a:endParaRPr lang="en-US" sz="1200" dirty="0"/>
           </a:p>
         </p:txBody>
       </p:sp>
@@ -5930,7 +6069,7 @@
         </p:nvSpPr>
         <p:spPr>
           <a:xfrm>
-            <a:off x="217712" y="4866428"/>
+            <a:off x="217712" y="4854553"/>
             <a:ext cx="11281558" cy="1569660"/>
           </a:xfrm>
           <a:prstGeom prst="rect">

</xml_diff>

<commit_message>
after making stupid cell array with like 25 columns
</commit_message>
<xml_diff>
--- a/PPG/reports/PPG progress report 2017_09_26.pptx
+++ b/PPG/reports/PPG progress report 2017_09_26.pptx
@@ -16,8 +16,8 @@
     <p:sldId id="266" r:id="rId7"/>
     <p:sldId id="267" r:id="rId8"/>
     <p:sldId id="269" r:id="rId9"/>
-    <p:sldId id="270" r:id="rId10"/>
-    <p:sldId id="278" r:id="rId11"/>
+    <p:sldId id="291" r:id="rId10"/>
+    <p:sldId id="270" r:id="rId11"/>
     <p:sldId id="289" r:id="rId12"/>
     <p:sldId id="279" r:id="rId13"/>
     <p:sldId id="268" r:id="rId14"/>
@@ -3949,8 +3949,8 @@
         </p:nvSpPr>
         <p:spPr>
           <a:xfrm>
-            <a:off x="0" y="91160"/>
-            <a:ext cx="11756571" cy="5432769"/>
+            <a:off x="0" y="91159"/>
+            <a:ext cx="11946577" cy="6001643"/>
           </a:xfrm>
           <a:prstGeom prst="rect">
             <a:avLst/>
@@ -3968,7 +3968,242 @@
               </a:lnSpc>
             </a:pPr>
             <a:r>
-              <a:rPr lang="en-US" sz="1600" dirty="0" smtClean="0">
+              <a:rPr lang="en-US" sz="1600" dirty="0" err="1" smtClean="0">
+                <a:latin typeface="Arial" charset="0"/>
+                <a:ea typeface="Arial" charset="0"/>
+                <a:cs typeface="Arial" charset="0"/>
+              </a:rPr>
+              <a:t>δ</a:t>
+            </a:r>
+            <a:r>
+              <a:rPr lang="en-US" sz="1600" b="1" i="1" baseline="-25000" dirty="0" err="1" smtClean="0">
+                <a:latin typeface="Arial" charset="0"/>
+                <a:ea typeface="Arial" charset="0"/>
+                <a:cs typeface="Arial" charset="0"/>
+              </a:rPr>
+              <a:t>Rt</a:t>
+            </a:r>
+            <a:r>
+              <a:rPr lang="en-US" sz="1600" b="1" i="1" baseline="-25000" dirty="0" smtClean="0">
+                <a:latin typeface="Arial" charset="0"/>
+                <a:ea typeface="Arial" charset="0"/>
+                <a:cs typeface="Arial" charset="0"/>
+              </a:rPr>
+              <a:t> </a:t>
+            </a:r>
+            <a:r>
+              <a:rPr lang="en-US" sz="1600" dirty="0" smtClean="0">
+                <a:latin typeface="Arial" charset="0"/>
+                <a:ea typeface="Arial" charset="0"/>
+                <a:cs typeface="Arial" charset="0"/>
+              </a:rPr>
+              <a:t> is then used by </a:t>
+            </a:r>
+            <a:r>
+              <a:rPr lang="en-US" sz="1600" b="1" i="1" dirty="0" smtClean="0">
+                <a:latin typeface="Arial" charset="0"/>
+                <a:ea typeface="Arial" charset="0"/>
+                <a:cs typeface="Arial" charset="0"/>
+              </a:rPr>
+              <a:t>P </a:t>
+            </a:r>
+            <a:r>
+              <a:rPr lang="en-US" sz="1600" dirty="0" smtClean="0">
+                <a:latin typeface="Arial" charset="0"/>
+                <a:ea typeface="Arial" charset="0"/>
+                <a:cs typeface="Arial" charset="0"/>
+              </a:rPr>
+              <a:t>to update </a:t>
+            </a:r>
+            <a:r>
+              <a:rPr lang="en-US" sz="1600" dirty="0" err="1" smtClean="0">
+                <a:latin typeface="Arial" charset="0"/>
+                <a:ea typeface="Arial" charset="0"/>
+                <a:cs typeface="Arial" charset="0"/>
+              </a:rPr>
+              <a:t>ϑ</a:t>
+            </a:r>
+            <a:r>
+              <a:rPr lang="en-US" sz="1600" dirty="0" smtClean="0">
+                <a:latin typeface="Arial" charset="0"/>
+                <a:ea typeface="Arial" charset="0"/>
+                <a:cs typeface="Arial" charset="0"/>
+              </a:rPr>
+              <a:t> in the same way </a:t>
+            </a:r>
+            <a:r>
+              <a:rPr lang="en-US" sz="1600" dirty="0" err="1" smtClean="0">
+                <a:latin typeface="Arial" charset="0"/>
+                <a:ea typeface="Arial" charset="0"/>
+                <a:cs typeface="Arial" charset="0"/>
+              </a:rPr>
+              <a:t>δ</a:t>
+            </a:r>
+            <a:r>
+              <a:rPr lang="en-US" sz="1600" b="1" i="1" baseline="-25000" dirty="0" err="1" smtClean="0">
+                <a:latin typeface="Arial" charset="0"/>
+                <a:ea typeface="Arial" charset="0"/>
+                <a:cs typeface="Arial" charset="0"/>
+              </a:rPr>
+              <a:t>Ct</a:t>
+            </a:r>
+            <a:r>
+              <a:rPr lang="en-US" sz="1600" b="1" i="1" baseline="-25000" dirty="0" smtClean="0">
+                <a:latin typeface="Arial" charset="0"/>
+                <a:ea typeface="Arial" charset="0"/>
+                <a:cs typeface="Arial" charset="0"/>
+              </a:rPr>
+              <a:t> </a:t>
+            </a:r>
+            <a:r>
+              <a:rPr lang="en-US" sz="1600" dirty="0" smtClean="0">
+                <a:latin typeface="Arial" charset="0"/>
+                <a:ea typeface="Arial" charset="0"/>
+                <a:cs typeface="Arial" charset="0"/>
+              </a:rPr>
+              <a:t>was used in cases 1 and 2:</a:t>
+            </a:r>
+          </a:p>
+          <a:p>
+            <a:pPr>
+              <a:lnSpc>
+                <a:spcPct val="200000"/>
+              </a:lnSpc>
+            </a:pPr>
+            <a:endParaRPr lang="en-US" sz="1600" b="1" i="1" dirty="0">
+              <a:latin typeface="Arial" charset="0"/>
+              <a:ea typeface="Arial" charset="0"/>
+              <a:cs typeface="Arial" charset="0"/>
+            </a:endParaRPr>
+          </a:p>
+          <a:p>
+            <a:pPr>
+              <a:lnSpc>
+                <a:spcPct val="200000"/>
+              </a:lnSpc>
+            </a:pPr>
+            <a:r>
+              <a:rPr lang="en-US" sz="1600" i="1" dirty="0">
+                <a:latin typeface="Arial" charset="0"/>
+                <a:ea typeface="Arial" charset="0"/>
+                <a:cs typeface="Arial" charset="0"/>
+              </a:rPr>
+              <a:t>𝛃</a:t>
+            </a:r>
+            <a:r>
+              <a:rPr lang="en-US" sz="1600" b="1" i="1" baseline="-25000" dirty="0">
+                <a:latin typeface="Arial" charset="0"/>
+                <a:ea typeface="Arial" charset="0"/>
+                <a:cs typeface="Arial" charset="0"/>
+              </a:rPr>
+              <a:t>R0,t</a:t>
+            </a:r>
+            <a:r>
+              <a:rPr lang="en-US" sz="1600" b="1" baseline="-25000" dirty="0">
+                <a:latin typeface="Arial" charset="0"/>
+                <a:ea typeface="Arial" charset="0"/>
+                <a:cs typeface="Arial" charset="0"/>
+              </a:rPr>
+              <a:t>+1</a:t>
+            </a:r>
+            <a:r>
+              <a:rPr lang="en-US" sz="1600" dirty="0">
+                <a:latin typeface="Arial" charset="0"/>
+                <a:ea typeface="Arial" charset="0"/>
+                <a:cs typeface="Arial" charset="0"/>
+              </a:rPr>
+              <a:t>=</a:t>
+            </a:r>
+            <a:r>
+              <a:rPr lang="en-US" sz="1600" i="1" dirty="0">
+                <a:latin typeface="Arial" charset="0"/>
+                <a:ea typeface="Arial" charset="0"/>
+                <a:cs typeface="Arial" charset="0"/>
+              </a:rPr>
+              <a:t>𝛃</a:t>
+            </a:r>
+            <a:r>
+              <a:rPr lang="en-US" sz="1600" b="1" i="1" baseline="-25000" dirty="0">
+                <a:latin typeface="Arial" charset="0"/>
+                <a:ea typeface="Arial" charset="0"/>
+                <a:cs typeface="Arial" charset="0"/>
+              </a:rPr>
+              <a:t>R0,t</a:t>
+            </a:r>
+            <a:r>
+              <a:rPr lang="en-US" sz="1600" dirty="0">
+                <a:latin typeface="Arial" charset="0"/>
+                <a:ea typeface="Arial" charset="0"/>
+                <a:cs typeface="Arial" charset="0"/>
+              </a:rPr>
+              <a:t>+α× </a:t>
+            </a:r>
+            <a:r>
+              <a:rPr lang="en-US" sz="1600" dirty="0" err="1" smtClean="0">
+                <a:latin typeface="Arial" charset="0"/>
+                <a:ea typeface="Arial" charset="0"/>
+                <a:cs typeface="Arial" charset="0"/>
+              </a:rPr>
+              <a:t>δ</a:t>
+            </a:r>
+            <a:r>
+              <a:rPr lang="en-US" sz="1600" b="1" i="1" baseline="-25000" dirty="0" err="1" smtClean="0">
+                <a:latin typeface="Arial" charset="0"/>
+                <a:ea typeface="Arial" charset="0"/>
+                <a:cs typeface="Arial" charset="0"/>
+              </a:rPr>
+              <a:t>Rt</a:t>
+            </a:r>
+            <a:r>
+              <a:rPr lang="en-US" sz="1600" dirty="0" smtClean="0">
+                <a:latin typeface="Arial" charset="0"/>
+                <a:ea typeface="Arial" charset="0"/>
+                <a:cs typeface="Arial" charset="0"/>
+              </a:rPr>
+              <a:t> </a:t>
+            </a:r>
+            <a:r>
+              <a:rPr lang="en-US" sz="1600" dirty="0">
+                <a:latin typeface="Arial" charset="0"/>
+                <a:ea typeface="Arial" charset="0"/>
+                <a:cs typeface="Arial" charset="0"/>
+              </a:rPr>
+              <a:t>		</a:t>
+            </a:r>
+            <a:r>
+              <a:rPr lang="en-US" sz="1600" dirty="0" smtClean="0">
+                <a:latin typeface="Arial" charset="0"/>
+                <a:ea typeface="Arial" charset="0"/>
+                <a:cs typeface="Arial" charset="0"/>
+              </a:rPr>
+              <a:t>(9)</a:t>
+            </a:r>
+            <a:endParaRPr lang="en-US" sz="1600" dirty="0">
+              <a:latin typeface="Arial" charset="0"/>
+              <a:ea typeface="Arial" charset="0"/>
+              <a:cs typeface="Arial" charset="0"/>
+            </a:endParaRPr>
+          </a:p>
+          <a:p>
+            <a:pPr>
+              <a:lnSpc>
+                <a:spcPct val="200000"/>
+              </a:lnSpc>
+            </a:pPr>
+            <a:endParaRPr lang="en-US" sz="1600" dirty="0">
+              <a:latin typeface="Arial" charset="0"/>
+              <a:ea typeface="Arial" charset="0"/>
+              <a:cs typeface="Arial" charset="0"/>
+            </a:endParaRPr>
+          </a:p>
+          <a:p>
+            <a:pPr>
+              <a:lnSpc>
+                <a:spcPct val="200000"/>
+              </a:lnSpc>
+            </a:pPr>
+            <a:r>
+              <a:rPr lang="en-US" sz="1600" dirty="0">
                 <a:latin typeface="Arial" charset="0"/>
                 <a:ea typeface="Arial" charset="0"/>
                 <a:cs typeface="Arial" charset="0"/>
@@ -4037,23 +4272,7 @@
                 <a:ea typeface="Arial" charset="0"/>
                 <a:cs typeface="Arial" charset="0"/>
               </a:rPr>
-              <a:t>using the </a:t>
-            </a:r>
-            <a:r>
-              <a:rPr lang="en-US" sz="1600" dirty="0" smtClean="0">
-                <a:latin typeface="Arial" charset="0"/>
-                <a:ea typeface="Arial" charset="0"/>
-                <a:cs typeface="Arial" charset="0"/>
-              </a:rPr>
-              <a:t>reward prediction </a:t>
-            </a:r>
-            <a:r>
-              <a:rPr lang="en-US" sz="1600" dirty="0">
-                <a:latin typeface="Arial" charset="0"/>
-                <a:ea typeface="Arial" charset="0"/>
-                <a:cs typeface="Arial" charset="0"/>
-              </a:rPr>
-              <a:t>error</a:t>
+              <a:t>using the reward prediction error</a:t>
             </a:r>
             <a:r>
               <a:rPr lang="en-US" sz="1600" baseline="-25000" dirty="0">
@@ -4064,7 +4283,7 @@
               <a:t> </a:t>
             </a:r>
             <a:r>
-              <a:rPr lang="en-US" sz="1600" dirty="0" err="1" smtClean="0">
+              <a:rPr lang="en-US" sz="1600" dirty="0" err="1">
                 <a:latin typeface="Arial" charset="0"/>
                 <a:ea typeface="Arial" charset="0"/>
                 <a:cs typeface="Arial" charset="0"/>
@@ -4072,7 +4291,7 @@
               <a:t>δ</a:t>
             </a:r>
             <a:r>
-              <a:rPr lang="en-US" sz="1600" b="1" i="1" baseline="-25000" dirty="0" err="1" smtClean="0">
+              <a:rPr lang="en-US" sz="1600" b="1" i="1" baseline="-25000" dirty="0" err="1">
                 <a:latin typeface="Arial" charset="0"/>
                 <a:ea typeface="Arial" charset="0"/>
                 <a:cs typeface="Arial" charset="0"/>
@@ -4080,7 +4299,7 @@
               <a:t>Rt</a:t>
             </a:r>
             <a:r>
-              <a:rPr lang="en-US" sz="1600" baseline="-25000" dirty="0" smtClean="0">
+              <a:rPr lang="en-US" sz="1600" baseline="-25000" dirty="0">
                 <a:latin typeface="Arial" charset="0"/>
                 <a:ea typeface="Arial" charset="0"/>
                 <a:cs typeface="Arial" charset="0"/>
@@ -4127,7 +4346,308 @@
               </a:rPr>
               <a:t> for a negative prediction errors:</a:t>
             </a:r>
-            <a:endParaRPr lang="en-US" sz="1600" dirty="0" smtClean="0">
+          </a:p>
+          <a:p>
+            <a:pPr>
+              <a:lnSpc>
+                <a:spcPct val="200000"/>
+              </a:lnSpc>
+            </a:pPr>
+            <a:endParaRPr lang="en-US" sz="1600" dirty="0">
+              <a:latin typeface="Arial" charset="0"/>
+              <a:ea typeface="Arial" charset="0"/>
+              <a:cs typeface="Arial" charset="0"/>
+            </a:endParaRPr>
+          </a:p>
+          <a:p>
+            <a:pPr>
+              <a:lnSpc>
+                <a:spcPct val="200000"/>
+              </a:lnSpc>
+            </a:pPr>
+            <a:r>
+              <a:rPr lang="en-US" sz="1600" dirty="0">
+                <a:latin typeface="Arial" charset="0"/>
+                <a:ea typeface="Arial" charset="0"/>
+                <a:cs typeface="Arial" charset="0"/>
+              </a:rPr>
+              <a:t>𝛽</a:t>
+            </a:r>
+            <a:r>
+              <a:rPr lang="en-US" sz="1600" i="1" baseline="-25000" dirty="0">
+                <a:latin typeface="Arial" charset="0"/>
+                <a:ea typeface="Arial" charset="0"/>
+                <a:cs typeface="Arial" charset="0"/>
+              </a:rPr>
+              <a:t>R0,t</a:t>
+            </a:r>
+            <a:r>
+              <a:rPr lang="en-US" sz="1600" baseline="-25000" dirty="0">
+                <a:latin typeface="Arial" charset="0"/>
+                <a:ea typeface="Arial" charset="0"/>
+                <a:cs typeface="Arial" charset="0"/>
+              </a:rPr>
+              <a:t>+1</a:t>
+            </a:r>
+            <a:r>
+              <a:rPr lang="en-US" sz="1600" dirty="0">
+                <a:latin typeface="Arial" charset="0"/>
+                <a:ea typeface="Arial" charset="0"/>
+                <a:cs typeface="Arial" charset="0"/>
+              </a:rPr>
+              <a:t>=𝛽</a:t>
+            </a:r>
+            <a:r>
+              <a:rPr lang="en-US" sz="1600" i="1" baseline="-25000" dirty="0">
+                <a:latin typeface="Arial" charset="0"/>
+                <a:ea typeface="Arial" charset="0"/>
+                <a:cs typeface="Arial" charset="0"/>
+              </a:rPr>
+              <a:t>R0,t</a:t>
+            </a:r>
+            <a:r>
+              <a:rPr lang="en-US" sz="1600" dirty="0">
+                <a:latin typeface="Arial" charset="0"/>
+                <a:ea typeface="Arial" charset="0"/>
+                <a:cs typeface="Arial" charset="0"/>
+              </a:rPr>
+              <a:t>+α</a:t>
+            </a:r>
+            <a:r>
+              <a:rPr lang="en-US" sz="1600" baseline="30000" dirty="0">
+                <a:latin typeface="Arial" charset="0"/>
+                <a:ea typeface="Arial" charset="0"/>
+                <a:cs typeface="Arial" charset="0"/>
+              </a:rPr>
+              <a:t>+</a:t>
+            </a:r>
+            <a:r>
+              <a:rPr lang="en-US" sz="1600" dirty="0">
+                <a:latin typeface="Arial" charset="0"/>
+                <a:ea typeface="Arial" charset="0"/>
+                <a:cs typeface="Arial" charset="0"/>
+              </a:rPr>
+              <a:t>× </a:t>
+            </a:r>
+            <a:r>
+              <a:rPr lang="en-US" sz="1600" dirty="0" err="1">
+                <a:latin typeface="Arial" charset="0"/>
+                <a:ea typeface="Arial" charset="0"/>
+                <a:cs typeface="Arial" charset="0"/>
+              </a:rPr>
+              <a:t>δ</a:t>
+            </a:r>
+            <a:r>
+              <a:rPr lang="en-US" sz="1600" b="1" i="1" baseline="-25000" dirty="0" err="1">
+                <a:latin typeface="Arial" charset="0"/>
+                <a:ea typeface="Arial" charset="0"/>
+                <a:cs typeface="Arial" charset="0"/>
+              </a:rPr>
+              <a:t>Rt</a:t>
+            </a:r>
+            <a:r>
+              <a:rPr lang="en-US" sz="1600" baseline="-25000" dirty="0">
+                <a:latin typeface="Arial" charset="0"/>
+                <a:ea typeface="Arial" charset="0"/>
+                <a:cs typeface="Arial" charset="0"/>
+              </a:rPr>
+              <a:t> </a:t>
+            </a:r>
+            <a:r>
+              <a:rPr lang="en-US" sz="1600" dirty="0">
+                <a:latin typeface="Arial" charset="0"/>
+                <a:ea typeface="Arial" charset="0"/>
+                <a:cs typeface="Arial" charset="0"/>
+              </a:rPr>
+              <a:t> 	if </a:t>
+            </a:r>
+            <a:r>
+              <a:rPr lang="en-US" sz="1600" dirty="0" err="1">
+                <a:latin typeface="Arial" charset="0"/>
+                <a:ea typeface="Arial" charset="0"/>
+                <a:cs typeface="Arial" charset="0"/>
+              </a:rPr>
+              <a:t>δ</a:t>
+            </a:r>
+            <a:r>
+              <a:rPr lang="en-US" sz="1600" b="1" i="1" baseline="-25000" dirty="0" err="1">
+                <a:latin typeface="Arial" charset="0"/>
+                <a:ea typeface="Arial" charset="0"/>
+                <a:cs typeface="Arial" charset="0"/>
+              </a:rPr>
+              <a:t>Ct</a:t>
+            </a:r>
+            <a:r>
+              <a:rPr lang="en-US" sz="1600" baseline="-25000" dirty="0">
+                <a:latin typeface="Arial" charset="0"/>
+                <a:ea typeface="Arial" charset="0"/>
+                <a:cs typeface="Arial" charset="0"/>
+              </a:rPr>
+              <a:t> </a:t>
+            </a:r>
+            <a:r>
+              <a:rPr lang="en-US" sz="1600" dirty="0">
+                <a:latin typeface="Arial" charset="0"/>
+                <a:ea typeface="Arial" charset="0"/>
+                <a:cs typeface="Arial" charset="0"/>
+              </a:rPr>
+              <a:t>&gt; 0		(10)</a:t>
+            </a:r>
+          </a:p>
+          <a:p>
+            <a:pPr>
+              <a:lnSpc>
+                <a:spcPct val="200000"/>
+              </a:lnSpc>
+            </a:pPr>
+            <a:r>
+              <a:rPr lang="en-US" sz="1600" dirty="0">
+                <a:latin typeface="Arial" charset="0"/>
+                <a:ea typeface="Arial" charset="0"/>
+                <a:cs typeface="Arial" charset="0"/>
+              </a:rPr>
+              <a:t>𝛽</a:t>
+            </a:r>
+            <a:r>
+              <a:rPr lang="en-US" sz="1600" i="1" baseline="-25000" dirty="0">
+                <a:latin typeface="Arial" charset="0"/>
+                <a:ea typeface="Arial" charset="0"/>
+                <a:cs typeface="Arial" charset="0"/>
+              </a:rPr>
+              <a:t>R0,t</a:t>
+            </a:r>
+            <a:r>
+              <a:rPr lang="en-US" sz="1600" baseline="-25000" dirty="0">
+                <a:latin typeface="Arial" charset="0"/>
+                <a:ea typeface="Arial" charset="0"/>
+                <a:cs typeface="Arial" charset="0"/>
+              </a:rPr>
+              <a:t>+1</a:t>
+            </a:r>
+            <a:r>
+              <a:rPr lang="en-US" sz="1600" dirty="0">
+                <a:latin typeface="Arial" charset="0"/>
+                <a:ea typeface="Arial" charset="0"/>
+                <a:cs typeface="Arial" charset="0"/>
+              </a:rPr>
+              <a:t>=𝛽</a:t>
+            </a:r>
+            <a:r>
+              <a:rPr lang="en-US" sz="1600" i="1" baseline="-25000" dirty="0">
+                <a:latin typeface="Arial" charset="0"/>
+                <a:ea typeface="Arial" charset="0"/>
+                <a:cs typeface="Arial" charset="0"/>
+              </a:rPr>
+              <a:t>R0,t</a:t>
+            </a:r>
+            <a:r>
+              <a:rPr lang="en-US" sz="1600" dirty="0">
+                <a:latin typeface="Arial" charset="0"/>
+                <a:ea typeface="Arial" charset="0"/>
+                <a:cs typeface="Arial" charset="0"/>
+              </a:rPr>
+              <a:t>+α</a:t>
+            </a:r>
+            <a:r>
+              <a:rPr lang="en-US" sz="1600" baseline="30000" dirty="0">
+                <a:latin typeface="Arial" charset="0"/>
+                <a:ea typeface="Arial" charset="0"/>
+                <a:cs typeface="Arial" charset="0"/>
+              </a:rPr>
+              <a:t>-</a:t>
+            </a:r>
+            <a:r>
+              <a:rPr lang="en-US" sz="1600" dirty="0">
+                <a:latin typeface="Arial" charset="0"/>
+                <a:ea typeface="Arial" charset="0"/>
+                <a:cs typeface="Arial" charset="0"/>
+              </a:rPr>
+              <a:t>× </a:t>
+            </a:r>
+            <a:r>
+              <a:rPr lang="en-US" sz="1600" dirty="0" err="1">
+                <a:latin typeface="Arial" charset="0"/>
+                <a:ea typeface="Arial" charset="0"/>
+                <a:cs typeface="Arial" charset="0"/>
+              </a:rPr>
+              <a:t>δ</a:t>
+            </a:r>
+            <a:r>
+              <a:rPr lang="en-US" sz="1600" b="1" i="1" baseline="-25000" dirty="0" err="1">
+                <a:latin typeface="Arial" charset="0"/>
+                <a:ea typeface="Arial" charset="0"/>
+                <a:cs typeface="Arial" charset="0"/>
+              </a:rPr>
+              <a:t>Rt</a:t>
+            </a:r>
+            <a:r>
+              <a:rPr lang="en-US" sz="1600" baseline="-25000" dirty="0">
+                <a:latin typeface="Arial" charset="0"/>
+                <a:ea typeface="Arial" charset="0"/>
+                <a:cs typeface="Arial" charset="0"/>
+              </a:rPr>
+              <a:t> </a:t>
+            </a:r>
+            <a:r>
+              <a:rPr lang="en-US" sz="1600" dirty="0">
+                <a:latin typeface="Arial" charset="0"/>
+                <a:ea typeface="Arial" charset="0"/>
+                <a:cs typeface="Arial" charset="0"/>
+              </a:rPr>
+              <a:t> 		if </a:t>
+            </a:r>
+            <a:r>
+              <a:rPr lang="en-US" sz="1600" dirty="0" err="1">
+                <a:latin typeface="Arial" charset="0"/>
+                <a:ea typeface="Arial" charset="0"/>
+                <a:cs typeface="Arial" charset="0"/>
+              </a:rPr>
+              <a:t>δ</a:t>
+            </a:r>
+            <a:r>
+              <a:rPr lang="en-US" sz="1600" b="1" i="1" baseline="-25000" dirty="0" err="1">
+                <a:latin typeface="Arial" charset="0"/>
+                <a:ea typeface="Arial" charset="0"/>
+                <a:cs typeface="Arial" charset="0"/>
+              </a:rPr>
+              <a:t>Ct</a:t>
+            </a:r>
+            <a:r>
+              <a:rPr lang="en-US" sz="1600" baseline="-25000" dirty="0">
+                <a:latin typeface="Arial" charset="0"/>
+                <a:ea typeface="Arial" charset="0"/>
+                <a:cs typeface="Arial" charset="0"/>
+              </a:rPr>
+              <a:t> </a:t>
+            </a:r>
+            <a:r>
+              <a:rPr lang="en-US" sz="1600" dirty="0">
+                <a:latin typeface="Arial" charset="0"/>
+                <a:ea typeface="Arial" charset="0"/>
+                <a:cs typeface="Arial" charset="0"/>
+              </a:rPr>
+              <a:t>&lt; 0</a:t>
+            </a:r>
+          </a:p>
+          <a:p>
+            <a:pPr>
+              <a:lnSpc>
+                <a:spcPct val="200000"/>
+              </a:lnSpc>
+            </a:pPr>
+            <a:endParaRPr lang="en-US" sz="1600" dirty="0">
+              <a:latin typeface="Arial" charset="0"/>
+              <a:ea typeface="Arial" charset="0"/>
+              <a:cs typeface="Arial" charset="0"/>
+            </a:endParaRPr>
+          </a:p>
+          <a:p>
+            <a:pPr>
+              <a:lnSpc>
+                <a:spcPct val="200000"/>
+              </a:lnSpc>
+            </a:pPr>
+            <a:endParaRPr lang="en-US" sz="1600" dirty="0">
               <a:latin typeface="Arial" charset="0"/>
               <a:ea typeface="Arial" charset="0"/>
               <a:cs typeface="Arial" charset="0"/>
@@ -4145,391 +4665,12 @@
               <a:cs typeface="Arial" charset="0"/>
             </a:endParaRPr>
           </a:p>
-          <a:p>
-            <a:pPr>
-              <a:lnSpc>
-                <a:spcPct val="200000"/>
-              </a:lnSpc>
-            </a:pPr>
-            <a:r>
-              <a:rPr lang="en-US" sz="1600" dirty="0">
-                <a:latin typeface="Arial" charset="0"/>
-                <a:ea typeface="Arial" charset="0"/>
-                <a:cs typeface="Arial" charset="0"/>
-              </a:rPr>
-              <a:t>𝛽</a:t>
-            </a:r>
-            <a:r>
-              <a:rPr lang="en-US" sz="1600" i="1" baseline="-25000" dirty="0">
-                <a:latin typeface="Arial" charset="0"/>
-                <a:ea typeface="Arial" charset="0"/>
-                <a:cs typeface="Arial" charset="0"/>
-              </a:rPr>
-              <a:t>R0,t</a:t>
-            </a:r>
-            <a:r>
-              <a:rPr lang="en-US" sz="1600" baseline="-25000" dirty="0">
-                <a:latin typeface="Arial" charset="0"/>
-                <a:ea typeface="Arial" charset="0"/>
-                <a:cs typeface="Arial" charset="0"/>
-              </a:rPr>
-              <a:t>+1</a:t>
-            </a:r>
-            <a:r>
-              <a:rPr lang="en-US" sz="1600" dirty="0">
-                <a:latin typeface="Arial" charset="0"/>
-                <a:ea typeface="Arial" charset="0"/>
-                <a:cs typeface="Arial" charset="0"/>
-              </a:rPr>
-              <a:t>=𝛽</a:t>
-            </a:r>
-            <a:r>
-              <a:rPr lang="en-US" sz="1600" i="1" baseline="-25000" dirty="0">
-                <a:latin typeface="Arial" charset="0"/>
-                <a:ea typeface="Arial" charset="0"/>
-                <a:cs typeface="Arial" charset="0"/>
-              </a:rPr>
-              <a:t>R0,t</a:t>
-            </a:r>
-            <a:r>
-              <a:rPr lang="en-US" sz="1600" dirty="0">
-                <a:latin typeface="Arial" charset="0"/>
-                <a:ea typeface="Arial" charset="0"/>
-                <a:cs typeface="Arial" charset="0"/>
-              </a:rPr>
-              <a:t>+α</a:t>
-            </a:r>
-            <a:r>
-              <a:rPr lang="en-US" sz="1600" baseline="30000" dirty="0">
-                <a:latin typeface="Arial" charset="0"/>
-                <a:ea typeface="Arial" charset="0"/>
-                <a:cs typeface="Arial" charset="0"/>
-              </a:rPr>
-              <a:t>+</a:t>
-            </a:r>
-            <a:r>
-              <a:rPr lang="en-US" sz="1600" dirty="0">
-                <a:latin typeface="Arial" charset="0"/>
-                <a:ea typeface="Arial" charset="0"/>
-                <a:cs typeface="Arial" charset="0"/>
-              </a:rPr>
-              <a:t>× </a:t>
-            </a:r>
-            <a:r>
-              <a:rPr lang="en-US" sz="1600" dirty="0" err="1" smtClean="0">
-                <a:latin typeface="Arial" charset="0"/>
-                <a:ea typeface="Arial" charset="0"/>
-                <a:cs typeface="Arial" charset="0"/>
-              </a:rPr>
-              <a:t>δ</a:t>
-            </a:r>
-            <a:r>
-              <a:rPr lang="en-US" sz="1600" b="1" i="1" baseline="-25000" dirty="0" err="1" smtClean="0">
-                <a:latin typeface="Arial" charset="0"/>
-                <a:ea typeface="Arial" charset="0"/>
-                <a:cs typeface="Arial" charset="0"/>
-              </a:rPr>
-              <a:t>Rt</a:t>
-            </a:r>
-            <a:r>
-              <a:rPr lang="en-US" sz="1600" baseline="-25000" dirty="0" smtClean="0">
-                <a:latin typeface="Arial" charset="0"/>
-                <a:ea typeface="Arial" charset="0"/>
-                <a:cs typeface="Arial" charset="0"/>
-              </a:rPr>
-              <a:t> </a:t>
-            </a:r>
-            <a:r>
-              <a:rPr lang="en-US" sz="1600" dirty="0" smtClean="0">
-                <a:latin typeface="Arial" charset="0"/>
-                <a:ea typeface="Arial" charset="0"/>
-                <a:cs typeface="Arial" charset="0"/>
-              </a:rPr>
-              <a:t> </a:t>
-            </a:r>
-            <a:r>
-              <a:rPr lang="en-US" sz="1600" dirty="0">
-                <a:latin typeface="Arial" charset="0"/>
-                <a:ea typeface="Arial" charset="0"/>
-                <a:cs typeface="Arial" charset="0"/>
-              </a:rPr>
-              <a:t>	if </a:t>
-            </a:r>
-            <a:r>
-              <a:rPr lang="en-US" sz="1600" dirty="0" err="1">
-                <a:latin typeface="Arial" charset="0"/>
-                <a:ea typeface="Arial" charset="0"/>
-                <a:cs typeface="Arial" charset="0"/>
-              </a:rPr>
-              <a:t>δ</a:t>
-            </a:r>
-            <a:r>
-              <a:rPr lang="en-US" sz="1600" b="1" i="1" baseline="-25000" dirty="0" err="1">
-                <a:latin typeface="Arial" charset="0"/>
-                <a:ea typeface="Arial" charset="0"/>
-                <a:cs typeface="Arial" charset="0"/>
-              </a:rPr>
-              <a:t>Ct</a:t>
-            </a:r>
-            <a:r>
-              <a:rPr lang="en-US" sz="1600" baseline="-25000" dirty="0">
-                <a:latin typeface="Arial" charset="0"/>
-                <a:ea typeface="Arial" charset="0"/>
-                <a:cs typeface="Arial" charset="0"/>
-              </a:rPr>
-              <a:t> </a:t>
-            </a:r>
-            <a:r>
-              <a:rPr lang="en-US" sz="1600" dirty="0">
-                <a:latin typeface="Arial" charset="0"/>
-                <a:ea typeface="Arial" charset="0"/>
-                <a:cs typeface="Arial" charset="0"/>
-              </a:rPr>
-              <a:t>&gt; 0	</a:t>
-            </a:r>
-            <a:r>
-              <a:rPr lang="en-US" sz="1600" dirty="0" smtClean="0">
-                <a:latin typeface="Arial" charset="0"/>
-                <a:ea typeface="Arial" charset="0"/>
-                <a:cs typeface="Arial" charset="0"/>
-              </a:rPr>
-              <a:t>	(10)</a:t>
-            </a:r>
-            <a:endParaRPr lang="en-US" sz="1600" dirty="0">
-              <a:latin typeface="Arial" charset="0"/>
-              <a:ea typeface="Arial" charset="0"/>
-              <a:cs typeface="Arial" charset="0"/>
-            </a:endParaRPr>
-          </a:p>
-          <a:p>
-            <a:pPr>
-              <a:lnSpc>
-                <a:spcPct val="200000"/>
-              </a:lnSpc>
-            </a:pPr>
-            <a:r>
-              <a:rPr lang="en-US" sz="1600" dirty="0">
-                <a:latin typeface="Arial" charset="0"/>
-                <a:ea typeface="Arial" charset="0"/>
-                <a:cs typeface="Arial" charset="0"/>
-              </a:rPr>
-              <a:t>𝛽</a:t>
-            </a:r>
-            <a:r>
-              <a:rPr lang="en-US" sz="1600" i="1" baseline="-25000" dirty="0">
-                <a:latin typeface="Arial" charset="0"/>
-                <a:ea typeface="Arial" charset="0"/>
-                <a:cs typeface="Arial" charset="0"/>
-              </a:rPr>
-              <a:t>R0,t</a:t>
-            </a:r>
-            <a:r>
-              <a:rPr lang="en-US" sz="1600" baseline="-25000" dirty="0">
-                <a:latin typeface="Arial" charset="0"/>
-                <a:ea typeface="Arial" charset="0"/>
-                <a:cs typeface="Arial" charset="0"/>
-              </a:rPr>
-              <a:t>+1</a:t>
-            </a:r>
-            <a:r>
-              <a:rPr lang="en-US" sz="1600" dirty="0">
-                <a:latin typeface="Arial" charset="0"/>
-                <a:ea typeface="Arial" charset="0"/>
-                <a:cs typeface="Arial" charset="0"/>
-              </a:rPr>
-              <a:t>=𝛽</a:t>
-            </a:r>
-            <a:r>
-              <a:rPr lang="en-US" sz="1600" i="1" baseline="-25000" dirty="0">
-                <a:latin typeface="Arial" charset="0"/>
-                <a:ea typeface="Arial" charset="0"/>
-                <a:cs typeface="Arial" charset="0"/>
-              </a:rPr>
-              <a:t>R0,t</a:t>
-            </a:r>
-            <a:r>
-              <a:rPr lang="en-US" sz="1600" dirty="0">
-                <a:latin typeface="Arial" charset="0"/>
-                <a:ea typeface="Arial" charset="0"/>
-                <a:cs typeface="Arial" charset="0"/>
-              </a:rPr>
-              <a:t>+α</a:t>
-            </a:r>
-            <a:r>
-              <a:rPr lang="en-US" sz="1600" baseline="30000" dirty="0">
-                <a:latin typeface="Arial" charset="0"/>
-                <a:ea typeface="Arial" charset="0"/>
-                <a:cs typeface="Arial" charset="0"/>
-              </a:rPr>
-              <a:t>-</a:t>
-            </a:r>
-            <a:r>
-              <a:rPr lang="en-US" sz="1600" dirty="0">
-                <a:latin typeface="Arial" charset="0"/>
-                <a:ea typeface="Arial" charset="0"/>
-                <a:cs typeface="Arial" charset="0"/>
-              </a:rPr>
-              <a:t>× </a:t>
-            </a:r>
-            <a:r>
-              <a:rPr lang="en-US" sz="1600" dirty="0" err="1" smtClean="0">
-                <a:latin typeface="Arial" charset="0"/>
-                <a:ea typeface="Arial" charset="0"/>
-                <a:cs typeface="Arial" charset="0"/>
-              </a:rPr>
-              <a:t>δ</a:t>
-            </a:r>
-            <a:r>
-              <a:rPr lang="en-US" sz="1600" b="1" i="1" baseline="-25000" dirty="0" err="1" smtClean="0">
-                <a:latin typeface="Arial" charset="0"/>
-                <a:ea typeface="Arial" charset="0"/>
-                <a:cs typeface="Arial" charset="0"/>
-              </a:rPr>
-              <a:t>Rt</a:t>
-            </a:r>
-            <a:r>
-              <a:rPr lang="en-US" sz="1600" baseline="-25000" dirty="0" smtClean="0">
-                <a:latin typeface="Arial" charset="0"/>
-                <a:ea typeface="Arial" charset="0"/>
-                <a:cs typeface="Arial" charset="0"/>
-              </a:rPr>
-              <a:t> </a:t>
-            </a:r>
-            <a:r>
-              <a:rPr lang="en-US" sz="1600" dirty="0" smtClean="0">
-                <a:latin typeface="Arial" charset="0"/>
-                <a:ea typeface="Arial" charset="0"/>
-                <a:cs typeface="Arial" charset="0"/>
-              </a:rPr>
-              <a:t> </a:t>
-            </a:r>
-            <a:r>
-              <a:rPr lang="en-US" sz="1600" dirty="0">
-                <a:latin typeface="Arial" charset="0"/>
-                <a:ea typeface="Arial" charset="0"/>
-                <a:cs typeface="Arial" charset="0"/>
-              </a:rPr>
-              <a:t>		if </a:t>
-            </a:r>
-            <a:r>
-              <a:rPr lang="en-US" sz="1600" dirty="0" err="1">
-                <a:latin typeface="Arial" charset="0"/>
-                <a:ea typeface="Arial" charset="0"/>
-                <a:cs typeface="Arial" charset="0"/>
-              </a:rPr>
-              <a:t>δ</a:t>
-            </a:r>
-            <a:r>
-              <a:rPr lang="en-US" sz="1600" b="1" i="1" baseline="-25000" dirty="0" err="1">
-                <a:latin typeface="Arial" charset="0"/>
-                <a:ea typeface="Arial" charset="0"/>
-                <a:cs typeface="Arial" charset="0"/>
-              </a:rPr>
-              <a:t>Ct</a:t>
-            </a:r>
-            <a:r>
-              <a:rPr lang="en-US" sz="1600" baseline="-25000" dirty="0">
-                <a:latin typeface="Arial" charset="0"/>
-                <a:ea typeface="Arial" charset="0"/>
-                <a:cs typeface="Arial" charset="0"/>
-              </a:rPr>
-              <a:t> </a:t>
-            </a:r>
-            <a:r>
-              <a:rPr lang="en-US" sz="1600" dirty="0">
-                <a:latin typeface="Arial" charset="0"/>
-                <a:ea typeface="Arial" charset="0"/>
-                <a:cs typeface="Arial" charset="0"/>
-              </a:rPr>
-              <a:t>&lt; </a:t>
-            </a:r>
-            <a:r>
-              <a:rPr lang="en-US" sz="1600" dirty="0" smtClean="0">
-                <a:latin typeface="Arial" charset="0"/>
-                <a:ea typeface="Arial" charset="0"/>
-                <a:cs typeface="Arial" charset="0"/>
-              </a:rPr>
-              <a:t>0</a:t>
-            </a:r>
-          </a:p>
-          <a:p>
-            <a:pPr>
-              <a:lnSpc>
-                <a:spcPct val="200000"/>
-              </a:lnSpc>
-            </a:pPr>
-            <a:endParaRPr lang="en-US" sz="1600" dirty="0">
-              <a:latin typeface="Arial" charset="0"/>
-              <a:ea typeface="Arial" charset="0"/>
-              <a:cs typeface="Arial" charset="0"/>
-            </a:endParaRPr>
-          </a:p>
-          <a:p>
-            <a:pPr>
-              <a:lnSpc>
-                <a:spcPct val="200000"/>
-              </a:lnSpc>
-            </a:pPr>
-            <a:endParaRPr lang="en-US" sz="1600" dirty="0">
-              <a:latin typeface="Arial" charset="0"/>
-              <a:ea typeface="Arial" charset="0"/>
-              <a:cs typeface="Arial" charset="0"/>
-            </a:endParaRPr>
-          </a:p>
-          <a:p>
-            <a:pPr>
-              <a:lnSpc>
-                <a:spcPct val="200000"/>
-              </a:lnSpc>
-            </a:pPr>
-            <a:endParaRPr lang="en-US" sz="1600" dirty="0">
-              <a:latin typeface="Arial" charset="0"/>
-              <a:ea typeface="Arial" charset="0"/>
-              <a:cs typeface="Arial" charset="0"/>
-            </a:endParaRPr>
-          </a:p>
-          <a:p>
-            <a:pPr>
-              <a:lnSpc>
-                <a:spcPct val="200000"/>
-              </a:lnSpc>
-            </a:pPr>
-            <a:endParaRPr lang="en-US" sz="1600" b="1" i="1" dirty="0" smtClean="0">
-              <a:latin typeface="Arial" charset="0"/>
-              <a:ea typeface="Arial" charset="0"/>
-              <a:cs typeface="Arial" charset="0"/>
-            </a:endParaRPr>
-          </a:p>
-          <a:p>
-            <a:pPr>
-              <a:lnSpc>
-                <a:spcPct val="200000"/>
-              </a:lnSpc>
-            </a:pPr>
-            <a:endParaRPr lang="en-US" sz="1600" dirty="0">
-              <a:latin typeface="Arial" charset="0"/>
-              <a:ea typeface="Arial" charset="0"/>
-              <a:cs typeface="Arial" charset="0"/>
-            </a:endParaRPr>
-          </a:p>
-          <a:p>
-            <a:pPr>
-              <a:lnSpc>
-                <a:spcPct val="200000"/>
-              </a:lnSpc>
-            </a:pPr>
-            <a:endParaRPr lang="en-US" sz="1600" dirty="0" smtClean="0">
-              <a:latin typeface="Arial" charset="0"/>
-              <a:ea typeface="Arial" charset="0"/>
-              <a:cs typeface="Arial" charset="0"/>
-            </a:endParaRPr>
-          </a:p>
         </p:txBody>
       </p:sp>
     </p:spTree>
     <p:extLst>
       <p:ext uri="{BB962C8B-B14F-4D97-AF65-F5344CB8AC3E}">
-        <p14:creationId xmlns:p14="http://schemas.microsoft.com/office/powerpoint/2010/main" val="137261512"/>
+        <p14:creationId xmlns:p14="http://schemas.microsoft.com/office/powerpoint/2010/main" val="743489126"/>
       </p:ext>
     </p:extLst>
   </p:cSld>
@@ -13483,7 +13624,7 @@
         <p:spPr>
           <a:xfrm>
             <a:off x="0" y="91159"/>
-            <a:ext cx="11720945" cy="7478970"/>
+            <a:ext cx="11720945" cy="6001643"/>
           </a:xfrm>
           <a:prstGeom prst="rect">
             <a:avLst/>
@@ -13632,12 +13773,220 @@
               <a:t>𝛃</a:t>
             </a:r>
             <a:r>
+              <a:rPr lang="en-US" sz="1600" b="1" baseline="-25000" dirty="0" smtClean="0">
+                <a:latin typeface="Arial" charset="0"/>
+                <a:ea typeface="Arial" charset="0"/>
+                <a:cs typeface="Arial" charset="0"/>
+              </a:rPr>
+              <a:t>R0</a:t>
+            </a:r>
+            <a:r>
+              <a:rPr lang="en-US" sz="1600" i="1" dirty="0" smtClean="0">
+                <a:latin typeface="Arial" charset="0"/>
+                <a:ea typeface="Arial" charset="0"/>
+                <a:cs typeface="Arial" charset="0"/>
+              </a:rPr>
+              <a:t> </a:t>
+            </a:r>
+            <a:r>
+              <a:rPr lang="en-US" sz="1600" dirty="0" smtClean="0">
+                <a:latin typeface="Arial" charset="0"/>
+                <a:ea typeface="Arial" charset="0"/>
+                <a:cs typeface="Arial" charset="0"/>
+              </a:rPr>
+              <a:t>at time </a:t>
+            </a:r>
+            <a:r>
+              <a:rPr lang="en-US" sz="1600" i="1" dirty="0" smtClean="0">
+                <a:latin typeface="Arial" charset="0"/>
+                <a:ea typeface="Arial" charset="0"/>
+                <a:cs typeface="Arial" charset="0"/>
+              </a:rPr>
+              <a:t>t </a:t>
+            </a:r>
+            <a:r>
+              <a:rPr lang="en-US" sz="1600" dirty="0" smtClean="0">
+                <a:latin typeface="Arial" charset="0"/>
+                <a:ea typeface="Arial" charset="0"/>
+                <a:cs typeface="Arial" charset="0"/>
+              </a:rPr>
+              <a:t>using the choice prediction error </a:t>
+            </a:r>
+            <a:r>
+              <a:rPr lang="en-US" sz="1600" dirty="0" err="1" smtClean="0">
+                <a:latin typeface="Arial" charset="0"/>
+                <a:ea typeface="Arial" charset="0"/>
+                <a:cs typeface="Arial" charset="0"/>
+              </a:rPr>
+              <a:t>δ</a:t>
+            </a:r>
+            <a:r>
+              <a:rPr lang="en-US" sz="1600" b="1" i="1" baseline="-25000" dirty="0" err="1" smtClean="0">
+                <a:latin typeface="Arial" charset="0"/>
+                <a:ea typeface="Arial" charset="0"/>
+                <a:cs typeface="Arial" charset="0"/>
+              </a:rPr>
+              <a:t>Ct</a:t>
+            </a:r>
+            <a:r>
+              <a:rPr lang="en-US" sz="1600" baseline="-25000" dirty="0" smtClean="0">
+                <a:latin typeface="Arial" charset="0"/>
+                <a:ea typeface="Arial" charset="0"/>
+                <a:cs typeface="Arial" charset="0"/>
+              </a:rPr>
+              <a:t> </a:t>
+            </a:r>
+            <a:r>
+              <a:rPr lang="en-US" sz="1600" dirty="0" smtClean="0">
+                <a:latin typeface="Arial" charset="0"/>
+                <a:ea typeface="Arial" charset="0"/>
+                <a:cs typeface="Arial" charset="0"/>
+              </a:rPr>
+              <a:t>and a single learning rate α. Specifically, if </a:t>
+            </a:r>
+            <a:r>
+              <a:rPr lang="en-US" sz="1600" dirty="0" err="1">
+                <a:latin typeface="Arial" charset="0"/>
+                <a:ea typeface="Arial" charset="0"/>
+                <a:cs typeface="Arial" charset="0"/>
+              </a:rPr>
+              <a:t>δ</a:t>
+            </a:r>
+            <a:r>
+              <a:rPr lang="en-US" sz="1600" b="1" i="1" baseline="-25000" dirty="0" err="1">
+                <a:latin typeface="Arial" charset="0"/>
+                <a:ea typeface="Arial" charset="0"/>
+                <a:cs typeface="Arial" charset="0"/>
+              </a:rPr>
+              <a:t>Ct</a:t>
+            </a:r>
+            <a:r>
+              <a:rPr lang="en-US" sz="1600" b="1" i="1" baseline="-25000" dirty="0">
+                <a:latin typeface="Arial" charset="0"/>
+                <a:ea typeface="Arial" charset="0"/>
+                <a:cs typeface="Arial" charset="0"/>
+              </a:rPr>
+              <a:t> </a:t>
+            </a:r>
+            <a:r>
+              <a:rPr lang="en-US" sz="1600" b="1" i="1" baseline="-25000" dirty="0" smtClean="0">
+                <a:latin typeface="Arial" charset="0"/>
+                <a:ea typeface="Arial" charset="0"/>
+                <a:cs typeface="Arial" charset="0"/>
+              </a:rPr>
+              <a:t> </a:t>
+            </a:r>
+            <a:r>
+              <a:rPr lang="en-US" sz="1600" dirty="0" smtClean="0">
+                <a:latin typeface="Arial" charset="0"/>
+                <a:ea typeface="Arial" charset="0"/>
+                <a:cs typeface="Arial" charset="0"/>
+              </a:rPr>
+              <a:t>is positive you increase </a:t>
+            </a:r>
+            <a:r>
+              <a:rPr lang="en-US" sz="1600" i="1" dirty="0" smtClean="0">
+                <a:latin typeface="Arial" charset="0"/>
+                <a:ea typeface="Arial" charset="0"/>
+                <a:cs typeface="Arial" charset="0"/>
+              </a:rPr>
+              <a:t>𝛃</a:t>
+            </a:r>
+            <a:r>
+              <a:rPr lang="en-US" sz="1600" b="1" baseline="-25000" dirty="0">
+                <a:latin typeface="Arial" charset="0"/>
+                <a:ea typeface="Arial" charset="0"/>
+                <a:cs typeface="Arial" charset="0"/>
+              </a:rPr>
+              <a:t>R0</a:t>
+            </a:r>
+            <a:r>
               <a:rPr lang="en-US" sz="1600" i="1" baseline="-25000" dirty="0" smtClean="0">
                 <a:latin typeface="Arial" charset="0"/>
                 <a:ea typeface="Arial" charset="0"/>
                 <a:cs typeface="Arial" charset="0"/>
               </a:rPr>
-              <a:t>0</a:t>
+              <a:t>  </a:t>
+            </a:r>
+            <a:r>
+              <a:rPr lang="en-US" sz="1600" dirty="0" smtClean="0">
+                <a:latin typeface="Arial" charset="0"/>
+                <a:ea typeface="Arial" charset="0"/>
+                <a:cs typeface="Arial" charset="0"/>
+              </a:rPr>
+              <a:t>(meaning </a:t>
+            </a:r>
+            <a:r>
+              <a:rPr lang="en-US" sz="1600" b="1" i="1" dirty="0" smtClean="0">
+                <a:latin typeface="Arial" charset="0"/>
+                <a:ea typeface="Arial" charset="0"/>
+                <a:cs typeface="Arial" charset="0"/>
+              </a:rPr>
+              <a:t>P </a:t>
+            </a:r>
+            <a:r>
+              <a:rPr lang="en-US" sz="1600" dirty="0" smtClean="0">
+                <a:latin typeface="Arial" charset="0"/>
+                <a:ea typeface="Arial" charset="0"/>
+                <a:cs typeface="Arial" charset="0"/>
+              </a:rPr>
+              <a:t>lowers the investment value necessary for victory), and if </a:t>
+            </a:r>
+            <a:r>
+              <a:rPr lang="en-US" sz="1600" dirty="0" err="1">
+                <a:latin typeface="Arial" charset="0"/>
+                <a:ea typeface="Arial" charset="0"/>
+                <a:cs typeface="Arial" charset="0"/>
+              </a:rPr>
+              <a:t>δ</a:t>
+            </a:r>
+            <a:r>
+              <a:rPr lang="en-US" sz="1600" b="1" i="1" baseline="-25000" dirty="0" err="1">
+                <a:latin typeface="Arial" charset="0"/>
+                <a:ea typeface="Arial" charset="0"/>
+                <a:cs typeface="Arial" charset="0"/>
+              </a:rPr>
+              <a:t>Ct</a:t>
+            </a:r>
+            <a:r>
+              <a:rPr lang="en-US" sz="1600" b="1" i="1" baseline="-25000" dirty="0">
+                <a:latin typeface="Arial" charset="0"/>
+                <a:ea typeface="Arial" charset="0"/>
+                <a:cs typeface="Arial" charset="0"/>
+              </a:rPr>
+              <a:t> </a:t>
+            </a:r>
+            <a:r>
+              <a:rPr lang="en-US" sz="1600" b="1" i="1" baseline="-25000" dirty="0" smtClean="0">
+                <a:latin typeface="Arial" charset="0"/>
+                <a:ea typeface="Arial" charset="0"/>
+                <a:cs typeface="Arial" charset="0"/>
+              </a:rPr>
+              <a:t> </a:t>
+            </a:r>
+            <a:r>
+              <a:rPr lang="en-US" sz="1600" dirty="0" smtClean="0">
+                <a:latin typeface="Arial" charset="0"/>
+                <a:ea typeface="Arial" charset="0"/>
+                <a:cs typeface="Arial" charset="0"/>
+              </a:rPr>
+              <a:t>is negative </a:t>
+            </a:r>
+            <a:r>
+              <a:rPr lang="en-US" sz="1600" b="1" i="1" dirty="0" smtClean="0">
+                <a:latin typeface="Arial" charset="0"/>
+                <a:ea typeface="Arial" charset="0"/>
+                <a:cs typeface="Arial" charset="0"/>
+              </a:rPr>
+              <a:t>P </a:t>
+            </a:r>
+            <a:r>
+              <a:rPr lang="en-US" sz="1600" dirty="0" smtClean="0">
+                <a:latin typeface="Arial" charset="0"/>
+                <a:ea typeface="Arial" charset="0"/>
+                <a:cs typeface="Arial" charset="0"/>
+              </a:rPr>
+              <a:t>decreases </a:t>
             </a:r>
             <a:r>
               <a:rPr lang="en-US" sz="1600" i="1" dirty="0" smtClean="0">
@@ -13645,6 +13994,22 @@
                 <a:ea typeface="Arial" charset="0"/>
                 <a:cs typeface="Arial" charset="0"/>
               </a:rPr>
+              <a:t>𝛃</a:t>
+            </a:r>
+            <a:r>
+              <a:rPr lang="en-US" sz="1600" b="1" baseline="-25000" dirty="0">
+                <a:latin typeface="Arial" charset="0"/>
+                <a:ea typeface="Arial" charset="0"/>
+                <a:cs typeface="Arial" charset="0"/>
+              </a:rPr>
+              <a:t>R0 </a:t>
+            </a:r>
+            <a:r>
+              <a:rPr lang="en-US" sz="1600" b="1" baseline="-25000" dirty="0" smtClean="0">
+                <a:latin typeface="Arial" charset="0"/>
+                <a:ea typeface="Arial" charset="0"/>
+                <a:cs typeface="Arial" charset="0"/>
+              </a:rPr>
               <a:t> </a:t>
             </a:r>
             <a:r>
@@ -13653,55 +14018,39 @@
                 <a:ea typeface="Arial" charset="0"/>
                 <a:cs typeface="Arial" charset="0"/>
               </a:rPr>
-              <a:t>at time </a:t>
-            </a:r>
-            <a:r>
-              <a:rPr lang="en-US" sz="1600" i="1" dirty="0" smtClean="0">
-                <a:latin typeface="Arial" charset="0"/>
-                <a:ea typeface="Arial" charset="0"/>
-                <a:cs typeface="Arial" charset="0"/>
-              </a:rPr>
-              <a:t>t </a:t>
-            </a:r>
-            <a:r>
-              <a:rPr lang="en-US" sz="1600" dirty="0" smtClean="0">
-                <a:latin typeface="Arial" charset="0"/>
-                <a:ea typeface="Arial" charset="0"/>
-                <a:cs typeface="Arial" charset="0"/>
-              </a:rPr>
-              <a:t>using the choice prediction error </a:t>
-            </a:r>
-            <a:r>
-              <a:rPr lang="en-US" sz="1600" dirty="0" err="1" smtClean="0">
-                <a:latin typeface="Arial" charset="0"/>
-                <a:ea typeface="Arial" charset="0"/>
-                <a:cs typeface="Arial" charset="0"/>
-              </a:rPr>
-              <a:t>δ</a:t>
-            </a:r>
-            <a:r>
-              <a:rPr lang="en-US" sz="1600" b="1" i="1" baseline="-25000" dirty="0" err="1" smtClean="0">
-                <a:latin typeface="Arial" charset="0"/>
-                <a:ea typeface="Arial" charset="0"/>
-                <a:cs typeface="Arial" charset="0"/>
-              </a:rPr>
-              <a:t>Ct</a:t>
-            </a:r>
-            <a:r>
-              <a:rPr lang="en-US" sz="1600" baseline="-25000" dirty="0" smtClean="0">
-                <a:latin typeface="Arial" charset="0"/>
-                <a:ea typeface="Arial" charset="0"/>
-                <a:cs typeface="Arial" charset="0"/>
-              </a:rPr>
-              <a:t> </a:t>
-            </a:r>
-            <a:r>
-              <a:rPr lang="en-US" sz="1600" dirty="0" smtClean="0">
-                <a:latin typeface="Arial" charset="0"/>
-                <a:ea typeface="Arial" charset="0"/>
-                <a:cs typeface="Arial" charset="0"/>
-              </a:rPr>
-              <a:t>and a single learning rate α:</a:t>
+              <a:t>(meaning </a:t>
+            </a:r>
+            <a:r>
+              <a:rPr lang="en-US" sz="1600" b="1" i="1" dirty="0" smtClean="0">
+                <a:latin typeface="Arial" charset="0"/>
+                <a:ea typeface="Arial" charset="0"/>
+                <a:cs typeface="Arial" charset="0"/>
+              </a:rPr>
+              <a:t>P</a:t>
+            </a:r>
+            <a:r>
+              <a:rPr lang="en-US" sz="1600" dirty="0" smtClean="0">
+                <a:latin typeface="Arial" charset="0"/>
+                <a:ea typeface="Arial" charset="0"/>
+                <a:cs typeface="Arial" charset="0"/>
+              </a:rPr>
+              <a:t> raises the investment value necessary for victory </a:t>
+            </a:r>
+            <a:r>
+              <a:rPr lang="mr-IN" sz="1600" dirty="0" smtClean="0">
+                <a:latin typeface="Arial" charset="0"/>
+                <a:ea typeface="Arial" charset="0"/>
+                <a:cs typeface="Arial" charset="0"/>
+              </a:rPr>
+              <a:t>–</a:t>
+            </a:r>
+            <a:r>
+              <a:rPr lang="en-US" sz="1600" dirty="0" smtClean="0">
+                <a:latin typeface="Arial" charset="0"/>
+                <a:ea typeface="Arial" charset="0"/>
+                <a:cs typeface="Arial" charset="0"/>
+              </a:rPr>
+              <a:t> recall that increasing the intercept shifts the entire logit function to the right and hence lowers the expected probability of success for each investment):</a:t>
             </a:r>
           </a:p>
           <a:p>
@@ -13809,520 +14158,6 @@
                 <a:cs typeface="Arial" charset="0"/>
               </a:rPr>
               <a:t> 		(5)</a:t>
-            </a:r>
-          </a:p>
-          <a:p>
-            <a:pPr>
-              <a:lnSpc>
-                <a:spcPct val="200000"/>
-              </a:lnSpc>
-            </a:pPr>
-            <a:endParaRPr lang="en-US" sz="1600" dirty="0">
-              <a:latin typeface="Arial" charset="0"/>
-              <a:ea typeface="Arial" charset="0"/>
-              <a:cs typeface="Arial" charset="0"/>
-            </a:endParaRPr>
-          </a:p>
-          <a:p>
-            <a:pPr>
-              <a:lnSpc>
-                <a:spcPct val="200000"/>
-              </a:lnSpc>
-            </a:pPr>
-            <a:r>
-              <a:rPr lang="en-US" sz="1600" dirty="0" smtClean="0">
-                <a:latin typeface="Arial" charset="0"/>
-                <a:ea typeface="Arial" charset="0"/>
-                <a:cs typeface="Arial" charset="0"/>
-              </a:rPr>
-              <a:t>Case 2: </a:t>
-            </a:r>
-            <a:r>
-              <a:rPr lang="en-US" sz="1600" b="1" i="1" dirty="0">
-                <a:latin typeface="Arial" charset="0"/>
-                <a:ea typeface="Arial" charset="0"/>
-                <a:cs typeface="Arial" charset="0"/>
-              </a:rPr>
-              <a:t>P</a:t>
-            </a:r>
-            <a:r>
-              <a:rPr lang="en-US" sz="1600" dirty="0">
-                <a:latin typeface="Arial" charset="0"/>
-                <a:ea typeface="Arial" charset="0"/>
-                <a:cs typeface="Arial" charset="0"/>
-              </a:rPr>
-              <a:t> updates his/her </a:t>
-            </a:r>
-            <a:r>
-              <a:rPr lang="en-US" sz="1600" i="1" dirty="0" smtClean="0">
-                <a:latin typeface="Arial" charset="0"/>
-                <a:ea typeface="Arial" charset="0"/>
-                <a:cs typeface="Arial" charset="0"/>
-              </a:rPr>
-              <a:t>𝛃</a:t>
-            </a:r>
-            <a:r>
-              <a:rPr lang="en-US" sz="1600" b="1" i="1" baseline="-25000" dirty="0" smtClean="0">
-                <a:latin typeface="Arial" charset="0"/>
-                <a:ea typeface="Arial" charset="0"/>
-                <a:cs typeface="Arial" charset="0"/>
-              </a:rPr>
-              <a:t>R0</a:t>
-            </a:r>
-            <a:r>
-              <a:rPr lang="en-US" sz="1600" i="1" dirty="0" smtClean="0">
-                <a:latin typeface="Arial" charset="0"/>
-                <a:ea typeface="Arial" charset="0"/>
-                <a:cs typeface="Arial" charset="0"/>
-              </a:rPr>
-              <a:t> </a:t>
-            </a:r>
-            <a:r>
-              <a:rPr lang="en-US" sz="1600" dirty="0">
-                <a:latin typeface="Arial" charset="0"/>
-                <a:ea typeface="Arial" charset="0"/>
-                <a:cs typeface="Arial" charset="0"/>
-              </a:rPr>
-              <a:t>at time </a:t>
-            </a:r>
-            <a:r>
-              <a:rPr lang="en-US" sz="1600" i="1" dirty="0">
-                <a:latin typeface="Arial" charset="0"/>
-                <a:ea typeface="Arial" charset="0"/>
-                <a:cs typeface="Arial" charset="0"/>
-              </a:rPr>
-              <a:t>t </a:t>
-            </a:r>
-            <a:r>
-              <a:rPr lang="en-US" sz="1600" dirty="0">
-                <a:latin typeface="Arial" charset="0"/>
-                <a:ea typeface="Arial" charset="0"/>
-                <a:cs typeface="Arial" charset="0"/>
-              </a:rPr>
-              <a:t>using the choice prediction </a:t>
-            </a:r>
-            <a:r>
-              <a:rPr lang="en-US" sz="1600" dirty="0" smtClean="0">
-                <a:latin typeface="Arial" charset="0"/>
-                <a:ea typeface="Arial" charset="0"/>
-                <a:cs typeface="Arial" charset="0"/>
-              </a:rPr>
-              <a:t>error</a:t>
-            </a:r>
-            <a:r>
-              <a:rPr lang="en-US" sz="1600" baseline="-25000" dirty="0">
-                <a:latin typeface="Arial" charset="0"/>
-                <a:ea typeface="Arial" charset="0"/>
-                <a:cs typeface="Arial" charset="0"/>
-              </a:rPr>
-              <a:t> </a:t>
-            </a:r>
-            <a:r>
-              <a:rPr lang="en-US" sz="1600" dirty="0" err="1" smtClean="0">
-                <a:latin typeface="Arial" charset="0"/>
-                <a:ea typeface="Arial" charset="0"/>
-                <a:cs typeface="Arial" charset="0"/>
-              </a:rPr>
-              <a:t>δ</a:t>
-            </a:r>
-            <a:r>
-              <a:rPr lang="en-US" sz="1600" b="1" i="1" baseline="-25000" dirty="0" err="1" smtClean="0">
-                <a:latin typeface="Arial" charset="0"/>
-                <a:ea typeface="Arial" charset="0"/>
-                <a:cs typeface="Arial" charset="0"/>
-              </a:rPr>
-              <a:t>Ct</a:t>
-            </a:r>
-            <a:r>
-              <a:rPr lang="en-US" sz="1600" baseline="-25000" dirty="0" smtClean="0">
-                <a:latin typeface="Arial" charset="0"/>
-                <a:ea typeface="Arial" charset="0"/>
-                <a:cs typeface="Arial" charset="0"/>
-              </a:rPr>
-              <a:t> </a:t>
-            </a:r>
-            <a:r>
-              <a:rPr lang="en-US" sz="1600" dirty="0" smtClean="0">
-                <a:latin typeface="Arial" charset="0"/>
-                <a:ea typeface="Arial" charset="0"/>
-                <a:cs typeface="Arial" charset="0"/>
-              </a:rPr>
-              <a:t>and two learning rates: α</a:t>
-            </a:r>
-            <a:r>
-              <a:rPr lang="en-US" sz="1600" baseline="30000" dirty="0" smtClean="0">
-                <a:latin typeface="Arial" charset="0"/>
-                <a:ea typeface="Arial" charset="0"/>
-                <a:cs typeface="Arial" charset="0"/>
-              </a:rPr>
-              <a:t>+</a:t>
-            </a:r>
-            <a:r>
-              <a:rPr lang="en-US" sz="1600" dirty="0" smtClean="0">
-                <a:latin typeface="Arial" charset="0"/>
-                <a:ea typeface="Arial" charset="0"/>
-                <a:cs typeface="Arial" charset="0"/>
-              </a:rPr>
-              <a:t> for positive prediction errors, and α</a:t>
-            </a:r>
-            <a:r>
-              <a:rPr lang="en-US" sz="1600" baseline="30000" dirty="0" smtClean="0">
-                <a:latin typeface="Arial" charset="0"/>
-                <a:ea typeface="Arial" charset="0"/>
-                <a:cs typeface="Arial" charset="0"/>
-              </a:rPr>
-              <a:t>-</a:t>
-            </a:r>
-            <a:r>
-              <a:rPr lang="en-US" sz="1600" dirty="0" smtClean="0">
-                <a:latin typeface="Arial" charset="0"/>
-                <a:ea typeface="Arial" charset="0"/>
-                <a:cs typeface="Arial" charset="0"/>
-              </a:rPr>
-              <a:t> for a negative prediction errors:</a:t>
-            </a:r>
-          </a:p>
-          <a:p>
-            <a:pPr>
-              <a:lnSpc>
-                <a:spcPct val="200000"/>
-              </a:lnSpc>
-            </a:pPr>
-            <a:endParaRPr lang="en-US" sz="1600" dirty="0">
-              <a:latin typeface="Arial" charset="0"/>
-              <a:ea typeface="Arial" charset="0"/>
-              <a:cs typeface="Arial" charset="0"/>
-            </a:endParaRPr>
-          </a:p>
-          <a:p>
-            <a:pPr>
-              <a:lnSpc>
-                <a:spcPct val="200000"/>
-              </a:lnSpc>
-            </a:pPr>
-            <a:r>
-              <a:rPr lang="en-US" sz="1600" b="1" dirty="0">
-                <a:latin typeface="Arial" charset="0"/>
-                <a:ea typeface="Arial" charset="0"/>
-                <a:cs typeface="Arial" charset="0"/>
-              </a:rPr>
-              <a:t>𝛽</a:t>
-            </a:r>
-            <a:r>
-              <a:rPr lang="en-US" sz="1600" b="1" i="1" baseline="-25000" dirty="0">
-                <a:latin typeface="Arial" charset="0"/>
-                <a:ea typeface="Arial" charset="0"/>
-                <a:cs typeface="Arial" charset="0"/>
-              </a:rPr>
-              <a:t>R0,t</a:t>
-            </a:r>
-            <a:r>
-              <a:rPr lang="en-US" sz="1600" b="1" baseline="-25000" dirty="0">
-                <a:latin typeface="Arial" charset="0"/>
-                <a:ea typeface="Arial" charset="0"/>
-                <a:cs typeface="Arial" charset="0"/>
-              </a:rPr>
-              <a:t>+1</a:t>
-            </a:r>
-            <a:r>
-              <a:rPr lang="en-US" sz="1600" b="1" dirty="0">
-                <a:latin typeface="Arial" charset="0"/>
-                <a:ea typeface="Arial" charset="0"/>
-                <a:cs typeface="Arial" charset="0"/>
-              </a:rPr>
-              <a:t>=𝛽</a:t>
-            </a:r>
-            <a:r>
-              <a:rPr lang="en-US" sz="1600" b="1" i="1" baseline="-25000" dirty="0" smtClean="0">
-                <a:latin typeface="Arial" charset="0"/>
-                <a:ea typeface="Arial" charset="0"/>
-                <a:cs typeface="Arial" charset="0"/>
-              </a:rPr>
-              <a:t>R0,t</a:t>
-            </a:r>
-            <a:r>
-              <a:rPr lang="en-US" sz="1600" dirty="0" smtClean="0">
-                <a:latin typeface="Arial" charset="0"/>
-                <a:ea typeface="Arial" charset="0"/>
-                <a:cs typeface="Arial" charset="0"/>
-              </a:rPr>
-              <a:t>+α</a:t>
-            </a:r>
-            <a:r>
-              <a:rPr lang="en-US" sz="1600" baseline="30000" dirty="0" smtClean="0">
-                <a:latin typeface="Arial" charset="0"/>
-                <a:ea typeface="Arial" charset="0"/>
-                <a:cs typeface="Arial" charset="0"/>
-              </a:rPr>
-              <a:t>+</a:t>
-            </a:r>
-            <a:r>
-              <a:rPr lang="en-US" sz="1600" dirty="0" smtClean="0">
-                <a:latin typeface="Arial" charset="0"/>
-                <a:ea typeface="Arial" charset="0"/>
-                <a:cs typeface="Arial" charset="0"/>
-              </a:rPr>
-              <a:t>×</a:t>
-            </a:r>
-            <a:r>
-              <a:rPr lang="en-US" sz="1600" dirty="0">
-                <a:latin typeface="Arial" charset="0"/>
-                <a:ea typeface="Arial" charset="0"/>
-                <a:cs typeface="Arial" charset="0"/>
-              </a:rPr>
-              <a:t> </a:t>
-            </a:r>
-            <a:r>
-              <a:rPr lang="en-US" sz="1600" dirty="0" err="1">
-                <a:latin typeface="Arial" charset="0"/>
-                <a:ea typeface="Arial" charset="0"/>
-                <a:cs typeface="Arial" charset="0"/>
-              </a:rPr>
-              <a:t>δ</a:t>
-            </a:r>
-            <a:r>
-              <a:rPr lang="en-US" sz="1600" b="1" i="1" baseline="-25000" dirty="0" err="1">
-                <a:latin typeface="Arial" charset="0"/>
-                <a:ea typeface="Arial" charset="0"/>
-                <a:cs typeface="Arial" charset="0"/>
-              </a:rPr>
-              <a:t>Ct</a:t>
-            </a:r>
-            <a:r>
-              <a:rPr lang="en-US" sz="1600" baseline="-25000" dirty="0" smtClean="0">
-                <a:latin typeface="Arial" charset="0"/>
-                <a:ea typeface="Arial" charset="0"/>
-                <a:cs typeface="Arial" charset="0"/>
-              </a:rPr>
-              <a:t> </a:t>
-            </a:r>
-            <a:r>
-              <a:rPr lang="en-US" sz="1600" dirty="0" smtClean="0">
-                <a:latin typeface="Arial" charset="0"/>
-                <a:ea typeface="Arial" charset="0"/>
-                <a:cs typeface="Arial" charset="0"/>
-              </a:rPr>
-              <a:t> </a:t>
-            </a:r>
-            <a:r>
-              <a:rPr lang="en-US" sz="1600" dirty="0">
-                <a:latin typeface="Arial" charset="0"/>
-                <a:ea typeface="Arial" charset="0"/>
-                <a:cs typeface="Arial" charset="0"/>
-              </a:rPr>
-              <a:t>	</a:t>
-            </a:r>
-            <a:r>
-              <a:rPr lang="en-US" sz="1600" dirty="0" smtClean="0">
-                <a:latin typeface="Arial" charset="0"/>
-                <a:ea typeface="Arial" charset="0"/>
-                <a:cs typeface="Arial" charset="0"/>
-              </a:rPr>
-              <a:t>if </a:t>
-            </a:r>
-            <a:r>
-              <a:rPr lang="en-US" sz="1600" dirty="0" err="1">
-                <a:latin typeface="Arial" charset="0"/>
-                <a:ea typeface="Arial" charset="0"/>
-                <a:cs typeface="Arial" charset="0"/>
-              </a:rPr>
-              <a:t>δ</a:t>
-            </a:r>
-            <a:r>
-              <a:rPr lang="en-US" sz="1600" b="1" i="1" baseline="-25000" dirty="0" err="1">
-                <a:latin typeface="Arial" charset="0"/>
-                <a:ea typeface="Arial" charset="0"/>
-                <a:cs typeface="Arial" charset="0"/>
-              </a:rPr>
-              <a:t>Ct</a:t>
-            </a:r>
-            <a:r>
-              <a:rPr lang="en-US" sz="1600" baseline="-25000" dirty="0" smtClean="0">
-                <a:latin typeface="Arial" charset="0"/>
-                <a:ea typeface="Arial" charset="0"/>
-                <a:cs typeface="Arial" charset="0"/>
-              </a:rPr>
-              <a:t> </a:t>
-            </a:r>
-            <a:r>
-              <a:rPr lang="en-US" sz="1600" dirty="0" smtClean="0">
-                <a:latin typeface="Arial" charset="0"/>
-                <a:ea typeface="Arial" charset="0"/>
-                <a:cs typeface="Arial" charset="0"/>
-              </a:rPr>
-              <a:t>&gt; 0</a:t>
-            </a:r>
-            <a:r>
-              <a:rPr lang="en-US" sz="1600" dirty="0">
-                <a:latin typeface="Arial" charset="0"/>
-                <a:ea typeface="Arial" charset="0"/>
-                <a:cs typeface="Arial" charset="0"/>
-              </a:rPr>
-              <a:t>		</a:t>
-            </a:r>
-            <a:r>
-              <a:rPr lang="en-US" sz="1600" dirty="0" smtClean="0">
-                <a:latin typeface="Arial" charset="0"/>
-                <a:ea typeface="Arial" charset="0"/>
-                <a:cs typeface="Arial" charset="0"/>
-              </a:rPr>
-              <a:t>(6)</a:t>
-            </a:r>
-            <a:endParaRPr lang="en-US" sz="1600" dirty="0">
-              <a:latin typeface="Arial" charset="0"/>
-              <a:ea typeface="Arial" charset="0"/>
-              <a:cs typeface="Arial" charset="0"/>
-            </a:endParaRPr>
-          </a:p>
-          <a:p>
-            <a:pPr>
-              <a:lnSpc>
-                <a:spcPct val="200000"/>
-              </a:lnSpc>
-            </a:pPr>
-            <a:r>
-              <a:rPr lang="en-US" sz="1600" b="1" dirty="0">
-                <a:latin typeface="Arial" charset="0"/>
-                <a:ea typeface="Arial" charset="0"/>
-                <a:cs typeface="Arial" charset="0"/>
-              </a:rPr>
-              <a:t>𝛽</a:t>
-            </a:r>
-            <a:r>
-              <a:rPr lang="en-US" sz="1600" b="1" i="1" baseline="-25000" dirty="0">
-                <a:latin typeface="Arial" charset="0"/>
-                <a:ea typeface="Arial" charset="0"/>
-                <a:cs typeface="Arial" charset="0"/>
-              </a:rPr>
-              <a:t>R0,t</a:t>
-            </a:r>
-            <a:r>
-              <a:rPr lang="en-US" sz="1600" b="1" baseline="-25000" dirty="0">
-                <a:latin typeface="Arial" charset="0"/>
-                <a:ea typeface="Arial" charset="0"/>
-                <a:cs typeface="Arial" charset="0"/>
-              </a:rPr>
-              <a:t>+1</a:t>
-            </a:r>
-            <a:r>
-              <a:rPr lang="en-US" sz="1600" b="1" dirty="0">
-                <a:latin typeface="Arial" charset="0"/>
-                <a:ea typeface="Arial" charset="0"/>
-                <a:cs typeface="Arial" charset="0"/>
-              </a:rPr>
-              <a:t>=𝛽</a:t>
-            </a:r>
-            <a:r>
-              <a:rPr lang="en-US" sz="1600" b="1" i="1" baseline="-25000" dirty="0" smtClean="0">
-                <a:latin typeface="Arial" charset="0"/>
-                <a:ea typeface="Arial" charset="0"/>
-                <a:cs typeface="Arial" charset="0"/>
-              </a:rPr>
-              <a:t>R0,t</a:t>
-            </a:r>
-            <a:r>
-              <a:rPr lang="en-US" sz="1600" dirty="0" smtClean="0">
-                <a:latin typeface="Arial" charset="0"/>
-                <a:ea typeface="Arial" charset="0"/>
-                <a:cs typeface="Arial" charset="0"/>
-              </a:rPr>
-              <a:t>+α</a:t>
-            </a:r>
-            <a:r>
-              <a:rPr lang="en-US" sz="1600" baseline="30000" dirty="0" smtClean="0">
-                <a:latin typeface="Arial" charset="0"/>
-                <a:ea typeface="Arial" charset="0"/>
-                <a:cs typeface="Arial" charset="0"/>
-              </a:rPr>
-              <a:t>-</a:t>
-            </a:r>
-            <a:r>
-              <a:rPr lang="en-US" sz="1600" dirty="0" smtClean="0">
-                <a:latin typeface="Arial" charset="0"/>
-                <a:ea typeface="Arial" charset="0"/>
-                <a:cs typeface="Arial" charset="0"/>
-              </a:rPr>
-              <a:t>×</a:t>
-            </a:r>
-            <a:r>
-              <a:rPr lang="en-US" sz="1600" dirty="0">
-                <a:latin typeface="Arial" charset="0"/>
-                <a:ea typeface="Arial" charset="0"/>
-                <a:cs typeface="Arial" charset="0"/>
-              </a:rPr>
-              <a:t> </a:t>
-            </a:r>
-            <a:r>
-              <a:rPr lang="en-US" sz="1600" dirty="0" err="1">
-                <a:latin typeface="Arial" charset="0"/>
-                <a:ea typeface="Arial" charset="0"/>
-                <a:cs typeface="Arial" charset="0"/>
-              </a:rPr>
-              <a:t>δ</a:t>
-            </a:r>
-            <a:r>
-              <a:rPr lang="en-US" sz="1600" b="1" i="1" baseline="-25000" dirty="0" err="1">
-                <a:latin typeface="Arial" charset="0"/>
-                <a:ea typeface="Arial" charset="0"/>
-                <a:cs typeface="Arial" charset="0"/>
-              </a:rPr>
-              <a:t>Ct</a:t>
-            </a:r>
-            <a:r>
-              <a:rPr lang="en-US" sz="1600" baseline="-25000" dirty="0" smtClean="0">
-                <a:latin typeface="Arial" charset="0"/>
-                <a:ea typeface="Arial" charset="0"/>
-                <a:cs typeface="Arial" charset="0"/>
-              </a:rPr>
-              <a:t> </a:t>
-            </a:r>
-            <a:r>
-              <a:rPr lang="en-US" sz="1600" dirty="0" smtClean="0">
-                <a:latin typeface="Arial" charset="0"/>
-                <a:ea typeface="Arial" charset="0"/>
-                <a:cs typeface="Arial" charset="0"/>
-              </a:rPr>
-              <a:t> 	if </a:t>
-            </a:r>
-            <a:r>
-              <a:rPr lang="en-US" sz="1600" dirty="0" err="1">
-                <a:latin typeface="Arial" charset="0"/>
-                <a:ea typeface="Arial" charset="0"/>
-                <a:cs typeface="Arial" charset="0"/>
-              </a:rPr>
-              <a:t>δ</a:t>
-            </a:r>
-            <a:r>
-              <a:rPr lang="en-US" sz="1600" b="1" i="1" baseline="-25000" dirty="0" err="1">
-                <a:latin typeface="Arial" charset="0"/>
-                <a:ea typeface="Arial" charset="0"/>
-                <a:cs typeface="Arial" charset="0"/>
-              </a:rPr>
-              <a:t>Ct</a:t>
-            </a:r>
-            <a:r>
-              <a:rPr lang="en-US" sz="1600" baseline="-25000" dirty="0" smtClean="0">
-                <a:latin typeface="Arial" charset="0"/>
-                <a:ea typeface="Arial" charset="0"/>
-                <a:cs typeface="Arial" charset="0"/>
-              </a:rPr>
-              <a:t> </a:t>
-            </a:r>
-            <a:r>
-              <a:rPr lang="en-US" sz="1600" dirty="0" smtClean="0">
-                <a:latin typeface="Arial" charset="0"/>
-                <a:ea typeface="Arial" charset="0"/>
-                <a:cs typeface="Arial" charset="0"/>
-              </a:rPr>
-              <a:t>&lt; </a:t>
-            </a:r>
-            <a:r>
-              <a:rPr lang="en-US" sz="1600" dirty="0">
-                <a:latin typeface="Arial" charset="0"/>
-                <a:ea typeface="Arial" charset="0"/>
-                <a:cs typeface="Arial" charset="0"/>
-              </a:rPr>
-              <a:t>0</a:t>
             </a:r>
           </a:p>
           <a:p>
@@ -14390,7 +14225,7 @@
         <p:spPr>
           <a:xfrm>
             <a:off x="0" y="91159"/>
-            <a:ext cx="11946577" cy="6494085"/>
+            <a:ext cx="11720945" cy="6494085"/>
           </a:xfrm>
           <a:prstGeom prst="rect">
             <a:avLst/>
@@ -14409,6 +14244,520 @@
             </a:pPr>
             <a:r>
               <a:rPr lang="en-US" sz="1600" dirty="0" smtClean="0">
+                <a:latin typeface="Arial" charset="0"/>
+                <a:ea typeface="Arial" charset="0"/>
+                <a:cs typeface="Arial" charset="0"/>
+              </a:rPr>
+              <a:t>Case 2: </a:t>
+            </a:r>
+            <a:r>
+              <a:rPr lang="en-US" sz="1600" b="1" i="1" dirty="0">
+                <a:latin typeface="Arial" charset="0"/>
+                <a:ea typeface="Arial" charset="0"/>
+                <a:cs typeface="Arial" charset="0"/>
+              </a:rPr>
+              <a:t>P</a:t>
+            </a:r>
+            <a:r>
+              <a:rPr lang="en-US" sz="1600" dirty="0">
+                <a:latin typeface="Arial" charset="0"/>
+                <a:ea typeface="Arial" charset="0"/>
+                <a:cs typeface="Arial" charset="0"/>
+              </a:rPr>
+              <a:t> updates his/her </a:t>
+            </a:r>
+            <a:r>
+              <a:rPr lang="en-US" sz="1600" i="1" dirty="0" smtClean="0">
+                <a:latin typeface="Arial" charset="0"/>
+                <a:ea typeface="Arial" charset="0"/>
+                <a:cs typeface="Arial" charset="0"/>
+              </a:rPr>
+              <a:t>𝛃</a:t>
+            </a:r>
+            <a:r>
+              <a:rPr lang="en-US" sz="1600" b="1" i="1" baseline="-25000" dirty="0" smtClean="0">
+                <a:latin typeface="Arial" charset="0"/>
+                <a:ea typeface="Arial" charset="0"/>
+                <a:cs typeface="Arial" charset="0"/>
+              </a:rPr>
+              <a:t>R0</a:t>
+            </a:r>
+            <a:r>
+              <a:rPr lang="en-US" sz="1600" i="1" dirty="0" smtClean="0">
+                <a:latin typeface="Arial" charset="0"/>
+                <a:ea typeface="Arial" charset="0"/>
+                <a:cs typeface="Arial" charset="0"/>
+              </a:rPr>
+              <a:t> </a:t>
+            </a:r>
+            <a:r>
+              <a:rPr lang="en-US" sz="1600" dirty="0">
+                <a:latin typeface="Arial" charset="0"/>
+                <a:ea typeface="Arial" charset="0"/>
+                <a:cs typeface="Arial" charset="0"/>
+              </a:rPr>
+              <a:t>at time </a:t>
+            </a:r>
+            <a:r>
+              <a:rPr lang="en-US" sz="1600" i="1" dirty="0">
+                <a:latin typeface="Arial" charset="0"/>
+                <a:ea typeface="Arial" charset="0"/>
+                <a:cs typeface="Arial" charset="0"/>
+              </a:rPr>
+              <a:t>t </a:t>
+            </a:r>
+            <a:r>
+              <a:rPr lang="en-US" sz="1600" dirty="0">
+                <a:latin typeface="Arial" charset="0"/>
+                <a:ea typeface="Arial" charset="0"/>
+                <a:cs typeface="Arial" charset="0"/>
+              </a:rPr>
+              <a:t>using the choice prediction </a:t>
+            </a:r>
+            <a:r>
+              <a:rPr lang="en-US" sz="1600" dirty="0" smtClean="0">
+                <a:latin typeface="Arial" charset="0"/>
+                <a:ea typeface="Arial" charset="0"/>
+                <a:cs typeface="Arial" charset="0"/>
+              </a:rPr>
+              <a:t>error</a:t>
+            </a:r>
+            <a:r>
+              <a:rPr lang="en-US" sz="1600" baseline="-25000" dirty="0">
+                <a:latin typeface="Arial" charset="0"/>
+                <a:ea typeface="Arial" charset="0"/>
+                <a:cs typeface="Arial" charset="0"/>
+              </a:rPr>
+              <a:t> </a:t>
+            </a:r>
+            <a:r>
+              <a:rPr lang="en-US" sz="1600" dirty="0" err="1" smtClean="0">
+                <a:latin typeface="Arial" charset="0"/>
+                <a:ea typeface="Arial" charset="0"/>
+                <a:cs typeface="Arial" charset="0"/>
+              </a:rPr>
+              <a:t>δ</a:t>
+            </a:r>
+            <a:r>
+              <a:rPr lang="en-US" sz="1600" b="1" i="1" baseline="-25000" dirty="0" err="1" smtClean="0">
+                <a:latin typeface="Arial" charset="0"/>
+                <a:ea typeface="Arial" charset="0"/>
+                <a:cs typeface="Arial" charset="0"/>
+              </a:rPr>
+              <a:t>Ct</a:t>
+            </a:r>
+            <a:r>
+              <a:rPr lang="en-US" sz="1600" baseline="-25000" dirty="0" smtClean="0">
+                <a:latin typeface="Arial" charset="0"/>
+                <a:ea typeface="Arial" charset="0"/>
+                <a:cs typeface="Arial" charset="0"/>
+              </a:rPr>
+              <a:t> </a:t>
+            </a:r>
+            <a:r>
+              <a:rPr lang="en-US" sz="1600" dirty="0" smtClean="0">
+                <a:latin typeface="Arial" charset="0"/>
+                <a:ea typeface="Arial" charset="0"/>
+                <a:cs typeface="Arial" charset="0"/>
+              </a:rPr>
+              <a:t>and two learning rates: α</a:t>
+            </a:r>
+            <a:r>
+              <a:rPr lang="en-US" sz="1600" baseline="30000" dirty="0" smtClean="0">
+                <a:latin typeface="Arial" charset="0"/>
+                <a:ea typeface="Arial" charset="0"/>
+                <a:cs typeface="Arial" charset="0"/>
+              </a:rPr>
+              <a:t>+</a:t>
+            </a:r>
+            <a:r>
+              <a:rPr lang="en-US" sz="1600" dirty="0" smtClean="0">
+                <a:latin typeface="Arial" charset="0"/>
+                <a:ea typeface="Arial" charset="0"/>
+                <a:cs typeface="Arial" charset="0"/>
+              </a:rPr>
+              <a:t> for positive prediction errors, and α</a:t>
+            </a:r>
+            <a:r>
+              <a:rPr lang="en-US" sz="1600" baseline="30000" dirty="0" smtClean="0">
+                <a:latin typeface="Arial" charset="0"/>
+                <a:ea typeface="Arial" charset="0"/>
+                <a:cs typeface="Arial" charset="0"/>
+              </a:rPr>
+              <a:t>-</a:t>
+            </a:r>
+            <a:r>
+              <a:rPr lang="en-US" sz="1600" dirty="0" smtClean="0">
+                <a:latin typeface="Arial" charset="0"/>
+                <a:ea typeface="Arial" charset="0"/>
+                <a:cs typeface="Arial" charset="0"/>
+              </a:rPr>
+              <a:t> for a negative prediction errors:</a:t>
+            </a:r>
+          </a:p>
+          <a:p>
+            <a:pPr>
+              <a:lnSpc>
+                <a:spcPct val="200000"/>
+              </a:lnSpc>
+            </a:pPr>
+            <a:endParaRPr lang="en-US" sz="1600" dirty="0">
+              <a:latin typeface="Arial" charset="0"/>
+              <a:ea typeface="Arial" charset="0"/>
+              <a:cs typeface="Arial" charset="0"/>
+            </a:endParaRPr>
+          </a:p>
+          <a:p>
+            <a:pPr>
+              <a:lnSpc>
+                <a:spcPct val="200000"/>
+              </a:lnSpc>
+            </a:pPr>
+            <a:r>
+              <a:rPr lang="en-US" sz="1600" b="1" dirty="0">
+                <a:latin typeface="Arial" charset="0"/>
+                <a:ea typeface="Arial" charset="0"/>
+                <a:cs typeface="Arial" charset="0"/>
+              </a:rPr>
+              <a:t>𝛽</a:t>
+            </a:r>
+            <a:r>
+              <a:rPr lang="en-US" sz="1600" b="1" i="1" baseline="-25000" dirty="0">
+                <a:latin typeface="Arial" charset="0"/>
+                <a:ea typeface="Arial" charset="0"/>
+                <a:cs typeface="Arial" charset="0"/>
+              </a:rPr>
+              <a:t>R0,t</a:t>
+            </a:r>
+            <a:r>
+              <a:rPr lang="en-US" sz="1600" b="1" baseline="-25000" dirty="0">
+                <a:latin typeface="Arial" charset="0"/>
+                <a:ea typeface="Arial" charset="0"/>
+                <a:cs typeface="Arial" charset="0"/>
+              </a:rPr>
+              <a:t>+1</a:t>
+            </a:r>
+            <a:r>
+              <a:rPr lang="en-US" sz="1600" b="1" dirty="0">
+                <a:latin typeface="Arial" charset="0"/>
+                <a:ea typeface="Arial" charset="0"/>
+                <a:cs typeface="Arial" charset="0"/>
+              </a:rPr>
+              <a:t>=𝛽</a:t>
+            </a:r>
+            <a:r>
+              <a:rPr lang="en-US" sz="1600" b="1" i="1" baseline="-25000" dirty="0" smtClean="0">
+                <a:latin typeface="Arial" charset="0"/>
+                <a:ea typeface="Arial" charset="0"/>
+                <a:cs typeface="Arial" charset="0"/>
+              </a:rPr>
+              <a:t>R0,t</a:t>
+            </a:r>
+            <a:r>
+              <a:rPr lang="en-US" sz="1600" dirty="0" smtClean="0">
+                <a:latin typeface="Arial" charset="0"/>
+                <a:ea typeface="Arial" charset="0"/>
+                <a:cs typeface="Arial" charset="0"/>
+              </a:rPr>
+              <a:t>+α</a:t>
+            </a:r>
+            <a:r>
+              <a:rPr lang="en-US" sz="1600" baseline="30000" dirty="0" smtClean="0">
+                <a:latin typeface="Arial" charset="0"/>
+                <a:ea typeface="Arial" charset="0"/>
+                <a:cs typeface="Arial" charset="0"/>
+              </a:rPr>
+              <a:t>+</a:t>
+            </a:r>
+            <a:r>
+              <a:rPr lang="en-US" sz="1600" dirty="0" smtClean="0">
+                <a:latin typeface="Arial" charset="0"/>
+                <a:ea typeface="Arial" charset="0"/>
+                <a:cs typeface="Arial" charset="0"/>
+              </a:rPr>
+              <a:t>×</a:t>
+            </a:r>
+            <a:r>
+              <a:rPr lang="en-US" sz="1600" dirty="0">
+                <a:latin typeface="Arial" charset="0"/>
+                <a:ea typeface="Arial" charset="0"/>
+                <a:cs typeface="Arial" charset="0"/>
+              </a:rPr>
+              <a:t> </a:t>
+            </a:r>
+            <a:r>
+              <a:rPr lang="en-US" sz="1600" dirty="0" err="1">
+                <a:latin typeface="Arial" charset="0"/>
+                <a:ea typeface="Arial" charset="0"/>
+                <a:cs typeface="Arial" charset="0"/>
+              </a:rPr>
+              <a:t>δ</a:t>
+            </a:r>
+            <a:r>
+              <a:rPr lang="en-US" sz="1600" b="1" i="1" baseline="-25000" dirty="0" err="1">
+                <a:latin typeface="Arial" charset="0"/>
+                <a:ea typeface="Arial" charset="0"/>
+                <a:cs typeface="Arial" charset="0"/>
+              </a:rPr>
+              <a:t>Ct</a:t>
+            </a:r>
+            <a:r>
+              <a:rPr lang="en-US" sz="1600" baseline="-25000" dirty="0" smtClean="0">
+                <a:latin typeface="Arial" charset="0"/>
+                <a:ea typeface="Arial" charset="0"/>
+                <a:cs typeface="Arial" charset="0"/>
+              </a:rPr>
+              <a:t> </a:t>
+            </a:r>
+            <a:r>
+              <a:rPr lang="en-US" sz="1600" dirty="0" smtClean="0">
+                <a:latin typeface="Arial" charset="0"/>
+                <a:ea typeface="Arial" charset="0"/>
+                <a:cs typeface="Arial" charset="0"/>
+              </a:rPr>
+              <a:t> </a:t>
+            </a:r>
+            <a:r>
+              <a:rPr lang="en-US" sz="1600" dirty="0">
+                <a:latin typeface="Arial" charset="0"/>
+                <a:ea typeface="Arial" charset="0"/>
+                <a:cs typeface="Arial" charset="0"/>
+              </a:rPr>
+              <a:t>	</a:t>
+            </a:r>
+            <a:r>
+              <a:rPr lang="en-US" sz="1600" dirty="0" smtClean="0">
+                <a:latin typeface="Arial" charset="0"/>
+                <a:ea typeface="Arial" charset="0"/>
+                <a:cs typeface="Arial" charset="0"/>
+              </a:rPr>
+              <a:t>if </a:t>
+            </a:r>
+            <a:r>
+              <a:rPr lang="en-US" sz="1600" dirty="0" err="1">
+                <a:latin typeface="Arial" charset="0"/>
+                <a:ea typeface="Arial" charset="0"/>
+                <a:cs typeface="Arial" charset="0"/>
+              </a:rPr>
+              <a:t>δ</a:t>
+            </a:r>
+            <a:r>
+              <a:rPr lang="en-US" sz="1600" b="1" i="1" baseline="-25000" dirty="0" err="1">
+                <a:latin typeface="Arial" charset="0"/>
+                <a:ea typeface="Arial" charset="0"/>
+                <a:cs typeface="Arial" charset="0"/>
+              </a:rPr>
+              <a:t>Ct</a:t>
+            </a:r>
+            <a:r>
+              <a:rPr lang="en-US" sz="1600" baseline="-25000" dirty="0" smtClean="0">
+                <a:latin typeface="Arial" charset="0"/>
+                <a:ea typeface="Arial" charset="0"/>
+                <a:cs typeface="Arial" charset="0"/>
+              </a:rPr>
+              <a:t> </a:t>
+            </a:r>
+            <a:r>
+              <a:rPr lang="en-US" sz="1600" dirty="0" smtClean="0">
+                <a:latin typeface="Arial" charset="0"/>
+                <a:ea typeface="Arial" charset="0"/>
+                <a:cs typeface="Arial" charset="0"/>
+              </a:rPr>
+              <a:t>&gt; 0</a:t>
+            </a:r>
+            <a:r>
+              <a:rPr lang="en-US" sz="1600" dirty="0">
+                <a:latin typeface="Arial" charset="0"/>
+                <a:ea typeface="Arial" charset="0"/>
+                <a:cs typeface="Arial" charset="0"/>
+              </a:rPr>
+              <a:t>		</a:t>
+            </a:r>
+            <a:r>
+              <a:rPr lang="en-US" sz="1600" dirty="0" smtClean="0">
+                <a:latin typeface="Arial" charset="0"/>
+                <a:ea typeface="Arial" charset="0"/>
+                <a:cs typeface="Arial" charset="0"/>
+              </a:rPr>
+              <a:t>(6)</a:t>
+            </a:r>
+            <a:endParaRPr lang="en-US" sz="1600" dirty="0">
+              <a:latin typeface="Arial" charset="0"/>
+              <a:ea typeface="Arial" charset="0"/>
+              <a:cs typeface="Arial" charset="0"/>
+            </a:endParaRPr>
+          </a:p>
+          <a:p>
+            <a:pPr>
+              <a:lnSpc>
+                <a:spcPct val="200000"/>
+              </a:lnSpc>
+            </a:pPr>
+            <a:r>
+              <a:rPr lang="en-US" sz="1600" b="1" dirty="0">
+                <a:latin typeface="Arial" charset="0"/>
+                <a:ea typeface="Arial" charset="0"/>
+                <a:cs typeface="Arial" charset="0"/>
+              </a:rPr>
+              <a:t>𝛽</a:t>
+            </a:r>
+            <a:r>
+              <a:rPr lang="en-US" sz="1600" b="1" i="1" baseline="-25000" dirty="0">
+                <a:latin typeface="Arial" charset="0"/>
+                <a:ea typeface="Arial" charset="0"/>
+                <a:cs typeface="Arial" charset="0"/>
+              </a:rPr>
+              <a:t>R0,t</a:t>
+            </a:r>
+            <a:r>
+              <a:rPr lang="en-US" sz="1600" b="1" baseline="-25000" dirty="0">
+                <a:latin typeface="Arial" charset="0"/>
+                <a:ea typeface="Arial" charset="0"/>
+                <a:cs typeface="Arial" charset="0"/>
+              </a:rPr>
+              <a:t>+1</a:t>
+            </a:r>
+            <a:r>
+              <a:rPr lang="en-US" sz="1600" b="1" dirty="0">
+                <a:latin typeface="Arial" charset="0"/>
+                <a:ea typeface="Arial" charset="0"/>
+                <a:cs typeface="Arial" charset="0"/>
+              </a:rPr>
+              <a:t>=𝛽</a:t>
+            </a:r>
+            <a:r>
+              <a:rPr lang="en-US" sz="1600" b="1" i="1" baseline="-25000" dirty="0" smtClean="0">
+                <a:latin typeface="Arial" charset="0"/>
+                <a:ea typeface="Arial" charset="0"/>
+                <a:cs typeface="Arial" charset="0"/>
+              </a:rPr>
+              <a:t>R0,t</a:t>
+            </a:r>
+            <a:r>
+              <a:rPr lang="en-US" sz="1600" dirty="0" smtClean="0">
+                <a:latin typeface="Arial" charset="0"/>
+                <a:ea typeface="Arial" charset="0"/>
+                <a:cs typeface="Arial" charset="0"/>
+              </a:rPr>
+              <a:t>+α</a:t>
+            </a:r>
+            <a:r>
+              <a:rPr lang="en-US" sz="1600" baseline="30000" dirty="0" smtClean="0">
+                <a:latin typeface="Arial" charset="0"/>
+                <a:ea typeface="Arial" charset="0"/>
+                <a:cs typeface="Arial" charset="0"/>
+              </a:rPr>
+              <a:t>-</a:t>
+            </a:r>
+            <a:r>
+              <a:rPr lang="en-US" sz="1600" dirty="0" smtClean="0">
+                <a:latin typeface="Arial" charset="0"/>
+                <a:ea typeface="Arial" charset="0"/>
+                <a:cs typeface="Arial" charset="0"/>
+              </a:rPr>
+              <a:t>×</a:t>
+            </a:r>
+            <a:r>
+              <a:rPr lang="en-US" sz="1600" dirty="0">
+                <a:latin typeface="Arial" charset="0"/>
+                <a:ea typeface="Arial" charset="0"/>
+                <a:cs typeface="Arial" charset="0"/>
+              </a:rPr>
+              <a:t> </a:t>
+            </a:r>
+            <a:r>
+              <a:rPr lang="en-US" sz="1600" dirty="0" err="1">
+                <a:latin typeface="Arial" charset="0"/>
+                <a:ea typeface="Arial" charset="0"/>
+                <a:cs typeface="Arial" charset="0"/>
+              </a:rPr>
+              <a:t>δ</a:t>
+            </a:r>
+            <a:r>
+              <a:rPr lang="en-US" sz="1600" b="1" i="1" baseline="-25000" dirty="0" err="1">
+                <a:latin typeface="Arial" charset="0"/>
+                <a:ea typeface="Arial" charset="0"/>
+                <a:cs typeface="Arial" charset="0"/>
+              </a:rPr>
+              <a:t>Ct</a:t>
+            </a:r>
+            <a:r>
+              <a:rPr lang="en-US" sz="1600" baseline="-25000" dirty="0" smtClean="0">
+                <a:latin typeface="Arial" charset="0"/>
+                <a:ea typeface="Arial" charset="0"/>
+                <a:cs typeface="Arial" charset="0"/>
+              </a:rPr>
+              <a:t> </a:t>
+            </a:r>
+            <a:r>
+              <a:rPr lang="en-US" sz="1600" dirty="0" smtClean="0">
+                <a:latin typeface="Arial" charset="0"/>
+                <a:ea typeface="Arial" charset="0"/>
+                <a:cs typeface="Arial" charset="0"/>
+              </a:rPr>
+              <a:t> 	if </a:t>
+            </a:r>
+            <a:r>
+              <a:rPr lang="en-US" sz="1600" dirty="0" err="1">
+                <a:latin typeface="Arial" charset="0"/>
+                <a:ea typeface="Arial" charset="0"/>
+                <a:cs typeface="Arial" charset="0"/>
+              </a:rPr>
+              <a:t>δ</a:t>
+            </a:r>
+            <a:r>
+              <a:rPr lang="en-US" sz="1600" b="1" i="1" baseline="-25000" dirty="0" err="1">
+                <a:latin typeface="Arial" charset="0"/>
+                <a:ea typeface="Arial" charset="0"/>
+                <a:cs typeface="Arial" charset="0"/>
+              </a:rPr>
+              <a:t>Ct</a:t>
+            </a:r>
+            <a:r>
+              <a:rPr lang="en-US" sz="1600" baseline="-25000" dirty="0" smtClean="0">
+                <a:latin typeface="Arial" charset="0"/>
+                <a:ea typeface="Arial" charset="0"/>
+                <a:cs typeface="Arial" charset="0"/>
+              </a:rPr>
+              <a:t> </a:t>
+            </a:r>
+            <a:r>
+              <a:rPr lang="en-US" sz="1600" dirty="0" smtClean="0">
+                <a:latin typeface="Arial" charset="0"/>
+                <a:ea typeface="Arial" charset="0"/>
+                <a:cs typeface="Arial" charset="0"/>
+              </a:rPr>
+              <a:t>&lt; </a:t>
+            </a:r>
+            <a:r>
+              <a:rPr lang="en-US" sz="1600" dirty="0">
+                <a:latin typeface="Arial" charset="0"/>
+                <a:ea typeface="Arial" charset="0"/>
+                <a:cs typeface="Arial" charset="0"/>
+              </a:rPr>
+              <a:t>0</a:t>
+            </a:r>
+          </a:p>
+          <a:p>
+            <a:pPr>
+              <a:lnSpc>
+                <a:spcPct val="200000"/>
+              </a:lnSpc>
+            </a:pPr>
+            <a:endParaRPr lang="en-US" sz="1600" dirty="0">
+              <a:latin typeface="Arial" charset="0"/>
+              <a:ea typeface="Arial" charset="0"/>
+              <a:cs typeface="Arial" charset="0"/>
+            </a:endParaRPr>
+          </a:p>
+          <a:p>
+            <a:pPr>
+              <a:lnSpc>
+                <a:spcPct val="200000"/>
+              </a:lnSpc>
+            </a:pPr>
+            <a:r>
+              <a:rPr lang="en-US" sz="1600" dirty="0">
                 <a:latin typeface="Times New Roman" charset="0"/>
                 <a:ea typeface="Calibri" charset="0"/>
                 <a:cs typeface="Times New Roman" charset="0"/>
@@ -14416,7 +14765,7 @@
               <a:t>Case 3:</a:t>
             </a:r>
             <a:r>
-              <a:rPr lang="en-US" sz="1600" dirty="0" smtClean="0">
+              <a:rPr lang="en-US" sz="1600" dirty="0">
                 <a:latin typeface="Arial" charset="0"/>
                 <a:ea typeface="Arial" charset="0"/>
                 <a:cs typeface="Arial" charset="0"/>
@@ -14424,7 +14773,7 @@
               <a:t> </a:t>
             </a:r>
             <a:r>
-              <a:rPr lang="en-US" sz="1600" b="1" i="1" dirty="0" smtClean="0">
+              <a:rPr lang="en-US" sz="1600" b="1" i="1" dirty="0">
                 <a:latin typeface="Arial" charset="0"/>
                 <a:ea typeface="Arial" charset="0"/>
                 <a:cs typeface="Arial" charset="0"/>
@@ -14432,7 +14781,7 @@
               <a:t>P</a:t>
             </a:r>
             <a:r>
-              <a:rPr lang="en-US" sz="1600" dirty="0" smtClean="0">
+              <a:rPr lang="en-US" sz="1600" dirty="0">
                 <a:latin typeface="Arial" charset="0"/>
                 <a:ea typeface="Arial" charset="0"/>
                 <a:cs typeface="Arial" charset="0"/>
@@ -14440,7 +14789,7 @@
               <a:t> updates his/her </a:t>
             </a:r>
             <a:r>
-              <a:rPr lang="en-US" sz="1600" b="1" i="1" dirty="0" smtClean="0">
+              <a:rPr lang="en-US" sz="1600" b="1" i="1" dirty="0">
                 <a:latin typeface="Arial" charset="0"/>
                 <a:ea typeface="Arial" charset="0"/>
                 <a:cs typeface="Arial" charset="0"/>
@@ -14448,7 +14797,7 @@
               <a:t>𝛃</a:t>
             </a:r>
             <a:r>
-              <a:rPr lang="en-US" sz="1600" b="1" i="1" baseline="-25000" dirty="0" smtClean="0">
+              <a:rPr lang="en-US" sz="1600" b="1" i="1" baseline="-25000" dirty="0">
                 <a:latin typeface="Arial" charset="0"/>
                 <a:ea typeface="Arial" charset="0"/>
                 <a:cs typeface="Arial" charset="0"/>
@@ -14456,7 +14805,7 @@
               <a:t>R0</a:t>
             </a:r>
             <a:r>
-              <a:rPr lang="en-US" sz="1600" i="1" dirty="0" smtClean="0">
+              <a:rPr lang="en-US" sz="1600" i="1" dirty="0">
                 <a:latin typeface="Arial" charset="0"/>
                 <a:ea typeface="Arial" charset="0"/>
                 <a:cs typeface="Arial" charset="0"/>
@@ -14464,7 +14813,7 @@
               <a:t> </a:t>
             </a:r>
             <a:r>
-              <a:rPr lang="en-US" sz="1600" dirty="0" smtClean="0">
+              <a:rPr lang="en-US" sz="1600" dirty="0">
                 <a:latin typeface="Arial" charset="0"/>
                 <a:ea typeface="Arial" charset="0"/>
                 <a:cs typeface="Arial" charset="0"/>
@@ -14472,7 +14821,7 @@
               <a:t>at time </a:t>
             </a:r>
             <a:r>
-              <a:rPr lang="en-US" sz="1600" i="1" dirty="0" smtClean="0">
+              <a:rPr lang="en-US" sz="1600" i="1" dirty="0">
                 <a:latin typeface="Arial" charset="0"/>
                 <a:ea typeface="Arial" charset="0"/>
                 <a:cs typeface="Arial" charset="0"/>
@@ -14480,7 +14829,7 @@
               <a:t>t </a:t>
             </a:r>
             <a:r>
-              <a:rPr lang="en-US" sz="1600" dirty="0" smtClean="0">
+              <a:rPr lang="en-US" sz="1600" dirty="0">
                 <a:latin typeface="Arial" charset="0"/>
                 <a:ea typeface="Arial" charset="0"/>
                 <a:cs typeface="Arial" charset="0"/>
@@ -14488,7 +14837,7 @@
               <a:t>using the </a:t>
             </a:r>
             <a:r>
-              <a:rPr lang="en-US" sz="1600" i="1" dirty="0" smtClean="0">
+              <a:rPr lang="en-US" sz="1600" i="1" dirty="0">
                 <a:latin typeface="Arial" charset="0"/>
                 <a:ea typeface="Arial" charset="0"/>
                 <a:cs typeface="Arial" charset="0"/>
@@ -14496,7 +14845,7 @@
               <a:t>reward</a:t>
             </a:r>
             <a:r>
-              <a:rPr lang="en-US" sz="1600" dirty="0" smtClean="0">
+              <a:rPr lang="en-US" sz="1600" dirty="0">
                 <a:latin typeface="Arial" charset="0"/>
                 <a:ea typeface="Arial" charset="0"/>
                 <a:cs typeface="Arial" charset="0"/>
@@ -14504,7 +14853,7 @@
               <a:t> prediction error </a:t>
             </a:r>
             <a:r>
-              <a:rPr lang="en-US" sz="1600" dirty="0" err="1" smtClean="0">
+              <a:rPr lang="en-US" sz="1600" dirty="0" err="1">
                 <a:latin typeface="Arial" charset="0"/>
                 <a:ea typeface="Arial" charset="0"/>
                 <a:cs typeface="Arial" charset="0"/>
@@ -14512,7 +14861,7 @@
               <a:t>δ</a:t>
             </a:r>
             <a:r>
-              <a:rPr lang="en-US" sz="1600" b="1" i="1" baseline="-25000" dirty="0" err="1" smtClean="0">
+              <a:rPr lang="en-US" sz="1600" b="1" i="1" baseline="-25000" dirty="0" err="1">
                 <a:latin typeface="Arial" charset="0"/>
                 <a:ea typeface="Arial" charset="0"/>
                 <a:cs typeface="Arial" charset="0"/>
@@ -14520,7 +14869,7 @@
               <a:t>R</a:t>
             </a:r>
             <a:r>
-              <a:rPr lang="en-US" sz="1600" b="1" i="1" baseline="-25000" dirty="0" smtClean="0">
+              <a:rPr lang="en-US" sz="1600" b="1" i="1" baseline="-25000" dirty="0">
                 <a:latin typeface="Arial" charset="0"/>
                 <a:ea typeface="Arial" charset="0"/>
                 <a:cs typeface="Arial" charset="0"/>
@@ -14528,7 +14877,7 @@
               <a:t>  </a:t>
             </a:r>
             <a:r>
-              <a:rPr lang="en-US" sz="1600" dirty="0" smtClean="0">
+              <a:rPr lang="en-US" sz="1600" dirty="0">
                 <a:latin typeface="Arial" charset="0"/>
                 <a:ea typeface="Arial" charset="0"/>
                 <a:cs typeface="Arial" charset="0"/>
@@ -14536,7 +14885,7 @@
               <a:t>and a single learning rate α. The calculation of </a:t>
             </a:r>
             <a:r>
-              <a:rPr lang="en-US" sz="1600" dirty="0" err="1" smtClean="0">
+              <a:rPr lang="en-US" sz="1600" dirty="0" err="1">
                 <a:latin typeface="Arial" charset="0"/>
                 <a:ea typeface="Arial" charset="0"/>
                 <a:cs typeface="Arial" charset="0"/>
@@ -14544,7 +14893,7 @@
               <a:t>δ</a:t>
             </a:r>
             <a:r>
-              <a:rPr lang="en-US" sz="1600" b="1" i="1" baseline="-25000" dirty="0" err="1" smtClean="0">
+              <a:rPr lang="en-US" sz="1600" b="1" i="1" baseline="-25000" dirty="0" err="1">
                 <a:latin typeface="Arial" charset="0"/>
                 <a:ea typeface="Arial" charset="0"/>
                 <a:cs typeface="Arial" charset="0"/>
@@ -14552,28 +14901,230 @@
               <a:t>R</a:t>
             </a:r>
             <a:r>
-              <a:rPr lang="en-US" sz="1600" dirty="0" smtClean="0">
-                <a:latin typeface="Arial" charset="0"/>
-                <a:ea typeface="Arial" charset="0"/>
-                <a:cs typeface="Arial" charset="0"/>
-              </a:rPr>
-              <a:t> is accomplished by subtracting the actual reward from the expected reward and is equivalent to the following expressions (see </a:t>
-            </a:r>
-            <a:r>
-              <a:rPr lang="en-US" sz="1600" dirty="0">
-                <a:latin typeface="Arial" charset="0"/>
-                <a:ea typeface="Arial" charset="0"/>
-                <a:cs typeface="Arial" charset="0"/>
-              </a:rPr>
-              <a:t>supplementary slides for full derivations of these </a:t>
-            </a:r>
-            <a:r>
-              <a:rPr lang="en-US" sz="1600" dirty="0" smtClean="0">
-                <a:latin typeface="Arial" charset="0"/>
-                <a:ea typeface="Arial" charset="0"/>
-                <a:cs typeface="Arial" charset="0"/>
-              </a:rPr>
-              <a:t>equations):</a:t>
+              <a:rPr lang="en-US" sz="1600" dirty="0">
+                <a:latin typeface="Arial" charset="0"/>
+                <a:ea typeface="Arial" charset="0"/>
+                <a:cs typeface="Arial" charset="0"/>
+              </a:rPr>
+              <a:t> is accomplished by subtracting the actual reward from the expected reward and is equivalent to the following expressions (see supplementary slides for full derivations of these equations):</a:t>
+            </a:r>
+          </a:p>
+          <a:p>
+            <a:pPr>
+              <a:lnSpc>
+                <a:spcPct val="200000"/>
+              </a:lnSpc>
+            </a:pPr>
+            <a:endParaRPr lang="en-US" sz="1600" dirty="0">
+              <a:latin typeface="Arial" charset="0"/>
+              <a:ea typeface="Arial" charset="0"/>
+              <a:cs typeface="Arial" charset="0"/>
+            </a:endParaRPr>
+          </a:p>
+          <a:p>
+            <a:pPr>
+              <a:lnSpc>
+                <a:spcPct val="200000"/>
+              </a:lnSpc>
+            </a:pPr>
+            <a:r>
+              <a:rPr lang="en-US" sz="1600" dirty="0" err="1">
+                <a:latin typeface="Arial" charset="0"/>
+                <a:ea typeface="Arial" charset="0"/>
+                <a:cs typeface="Arial" charset="0"/>
+              </a:rPr>
+              <a:t>δ</a:t>
+            </a:r>
+            <a:r>
+              <a:rPr lang="en-US" sz="1600" b="1" i="1" baseline="-25000" dirty="0" err="1">
+                <a:latin typeface="Arial" charset="0"/>
+                <a:ea typeface="Arial" charset="0"/>
+                <a:cs typeface="Arial" charset="0"/>
+              </a:rPr>
+              <a:t>Rt</a:t>
+            </a:r>
+            <a:r>
+              <a:rPr lang="en-US" sz="1600" baseline="-25000" dirty="0">
+                <a:latin typeface="Arial" charset="0"/>
+                <a:ea typeface="Arial" charset="0"/>
+                <a:cs typeface="Arial" charset="0"/>
+              </a:rPr>
+              <a:t> </a:t>
+            </a:r>
+            <a:r>
+              <a:rPr lang="en-US" sz="1600" dirty="0">
+                <a:latin typeface="Arial" charset="0"/>
+                <a:ea typeface="Arial" charset="0"/>
+                <a:cs typeface="Arial" charset="0"/>
+              </a:rPr>
+              <a:t>= </a:t>
+            </a:r>
+            <a:r>
+              <a:rPr lang="en-US" sz="1600" dirty="0" err="1">
+                <a:latin typeface="Arial" charset="0"/>
+                <a:ea typeface="Arial" charset="0"/>
+                <a:cs typeface="Arial" charset="0"/>
+              </a:rPr>
+              <a:t>δ</a:t>
+            </a:r>
+            <a:r>
+              <a:rPr lang="en-US" sz="1600" b="1" i="1" baseline="-25000" dirty="0" err="1">
+                <a:latin typeface="Arial" charset="0"/>
+                <a:ea typeface="Arial" charset="0"/>
+                <a:cs typeface="Arial" charset="0"/>
+              </a:rPr>
+              <a:t>Ct</a:t>
+            </a:r>
+            <a:r>
+              <a:rPr lang="en-US" sz="1600" dirty="0">
+                <a:latin typeface="Arial" charset="0"/>
+                <a:ea typeface="Arial" charset="0"/>
+                <a:cs typeface="Arial" charset="0"/>
+              </a:rPr>
+              <a:t> × (𝑬</a:t>
+            </a:r>
+            <a:r>
+              <a:rPr lang="en-US" sz="1600" baseline="-25000" dirty="0">
+                <a:latin typeface="Arial" charset="0"/>
+                <a:ea typeface="Arial" charset="0"/>
+                <a:cs typeface="Arial" charset="0"/>
+              </a:rPr>
+              <a:t>𝒕</a:t>
+            </a:r>
+            <a:r>
+              <a:rPr lang="en-US" sz="1600" dirty="0">
+                <a:latin typeface="Arial" charset="0"/>
+                <a:ea typeface="Arial" charset="0"/>
+                <a:cs typeface="Arial" charset="0"/>
+              </a:rPr>
+              <a:t>−𝑨</a:t>
+            </a:r>
+            <a:r>
+              <a:rPr lang="en-US" sz="1600" baseline="-25000" dirty="0">
+                <a:latin typeface="Arial" charset="0"/>
+                <a:ea typeface="Arial" charset="0"/>
+                <a:cs typeface="Arial" charset="0"/>
+              </a:rPr>
+              <a:t>𝒕</a:t>
+            </a:r>
+            <a:r>
+              <a:rPr lang="en-US" sz="1600" dirty="0">
+                <a:latin typeface="Arial" charset="0"/>
+                <a:ea typeface="Arial" charset="0"/>
+                <a:cs typeface="Arial" charset="0"/>
+              </a:rPr>
+              <a:t>)			if subject is prey 		(7)</a:t>
+            </a:r>
+          </a:p>
+          <a:p>
+            <a:pPr>
+              <a:lnSpc>
+                <a:spcPct val="200000"/>
+              </a:lnSpc>
+            </a:pPr>
+            <a:r>
+              <a:rPr lang="en-US" sz="1600" dirty="0" err="1">
+                <a:latin typeface="Arial" charset="0"/>
+                <a:ea typeface="Arial" charset="0"/>
+                <a:cs typeface="Arial" charset="0"/>
+              </a:rPr>
+              <a:t>δ</a:t>
+            </a:r>
+            <a:r>
+              <a:rPr lang="en-US" sz="1600" b="1" i="1" baseline="-25000" dirty="0" err="1">
+                <a:latin typeface="Arial" charset="0"/>
+                <a:ea typeface="Arial" charset="0"/>
+                <a:cs typeface="Arial" charset="0"/>
+              </a:rPr>
+              <a:t>Rt</a:t>
+            </a:r>
+            <a:r>
+              <a:rPr lang="en-US" sz="1600" baseline="-25000" dirty="0">
+                <a:latin typeface="Arial" charset="0"/>
+                <a:ea typeface="Arial" charset="0"/>
+                <a:cs typeface="Arial" charset="0"/>
+              </a:rPr>
+              <a:t> </a:t>
+            </a:r>
+            <a:r>
+              <a:rPr lang="en-US" sz="1600" dirty="0">
+                <a:latin typeface="Arial" charset="0"/>
+                <a:ea typeface="Arial" charset="0"/>
+                <a:cs typeface="Arial" charset="0"/>
+              </a:rPr>
+              <a:t>= </a:t>
+            </a:r>
+            <a:r>
+              <a:rPr lang="en-US" sz="1600" dirty="0" err="1">
+                <a:latin typeface="Arial" charset="0"/>
+                <a:ea typeface="Arial" charset="0"/>
+                <a:cs typeface="Arial" charset="0"/>
+              </a:rPr>
+              <a:t>δ</a:t>
+            </a:r>
+            <a:r>
+              <a:rPr lang="en-US" sz="1600" b="1" i="1" baseline="-25000" dirty="0" err="1">
+                <a:latin typeface="Arial" charset="0"/>
+                <a:ea typeface="Arial" charset="0"/>
+                <a:cs typeface="Arial" charset="0"/>
+              </a:rPr>
+              <a:t>Ct</a:t>
+            </a:r>
+            <a:r>
+              <a:rPr lang="en-US" sz="1600" baseline="-25000" dirty="0">
+                <a:latin typeface="Arial" charset="0"/>
+                <a:ea typeface="Arial" charset="0"/>
+                <a:cs typeface="Arial" charset="0"/>
+              </a:rPr>
+              <a:t> </a:t>
+            </a:r>
+            <a:r>
+              <a:rPr lang="en-US" sz="1600" dirty="0">
+                <a:latin typeface="Arial" charset="0"/>
+                <a:ea typeface="Arial" charset="0"/>
+                <a:cs typeface="Arial" charset="0"/>
+              </a:rPr>
+              <a:t>× (</a:t>
+            </a:r>
+            <a:r>
+              <a:rPr lang="en-US" sz="1600" b="1" i="1" dirty="0">
+                <a:latin typeface="Arial" charset="0"/>
+                <a:ea typeface="Arial" charset="0"/>
+                <a:cs typeface="Arial" charset="0"/>
+              </a:rPr>
+              <a:t>I</a:t>
+            </a:r>
+            <a:r>
+              <a:rPr lang="en-US" sz="1600" b="1" i="1" baseline="-25000" dirty="0">
+                <a:latin typeface="Arial" charset="0"/>
+                <a:ea typeface="Arial" charset="0"/>
+                <a:cs typeface="Arial" charset="0"/>
+              </a:rPr>
+              <a:t>t </a:t>
+            </a:r>
+            <a:r>
+              <a:rPr lang="en-US" sz="1600" dirty="0">
+                <a:latin typeface="Arial" charset="0"/>
+                <a:ea typeface="Arial" charset="0"/>
+                <a:cs typeface="Arial" charset="0"/>
+              </a:rPr>
+              <a:t>−𝑨</a:t>
+            </a:r>
+            <a:r>
+              <a:rPr lang="en-US" sz="1600" baseline="-25000" dirty="0">
+                <a:latin typeface="Arial" charset="0"/>
+                <a:ea typeface="Arial" charset="0"/>
+                <a:cs typeface="Arial" charset="0"/>
+              </a:rPr>
+              <a:t>𝒕</a:t>
+            </a:r>
+            <a:r>
+              <a:rPr lang="en-US" sz="1600" dirty="0">
+                <a:latin typeface="Arial" charset="0"/>
+                <a:ea typeface="Arial" charset="0"/>
+                <a:cs typeface="Arial" charset="0"/>
+              </a:rPr>
+              <a:t>) 		 	if subject is predator 	(8)</a:t>
             </a:r>
           </a:p>
           <a:p>
@@ -14588,497 +15139,12 @@
               <a:cs typeface="Arial" charset="0"/>
             </a:endParaRPr>
           </a:p>
-          <a:p>
-            <a:pPr>
-              <a:lnSpc>
-                <a:spcPct val="200000"/>
-              </a:lnSpc>
-            </a:pPr>
-            <a:r>
-              <a:rPr lang="en-US" sz="1600" dirty="0" err="1">
-                <a:latin typeface="Arial" charset="0"/>
-                <a:ea typeface="Arial" charset="0"/>
-                <a:cs typeface="Arial" charset="0"/>
-              </a:rPr>
-              <a:t>δ</a:t>
-            </a:r>
-            <a:r>
-              <a:rPr lang="en-US" sz="1600" b="1" i="1" baseline="-25000" dirty="0" err="1">
-                <a:latin typeface="Arial" charset="0"/>
-                <a:ea typeface="Arial" charset="0"/>
-                <a:cs typeface="Arial" charset="0"/>
-              </a:rPr>
-              <a:t>Rt</a:t>
-            </a:r>
-            <a:r>
-              <a:rPr lang="en-US" sz="1600" baseline="-25000" dirty="0">
-                <a:latin typeface="Arial" charset="0"/>
-                <a:ea typeface="Arial" charset="0"/>
-                <a:cs typeface="Arial" charset="0"/>
-              </a:rPr>
-              <a:t> </a:t>
-            </a:r>
-            <a:r>
-              <a:rPr lang="en-US" sz="1600" dirty="0">
-                <a:latin typeface="Arial" charset="0"/>
-                <a:ea typeface="Arial" charset="0"/>
-                <a:cs typeface="Arial" charset="0"/>
-              </a:rPr>
-              <a:t>= </a:t>
-            </a:r>
-            <a:r>
-              <a:rPr lang="en-US" sz="1600" dirty="0" err="1">
-                <a:latin typeface="Arial" charset="0"/>
-                <a:ea typeface="Arial" charset="0"/>
-                <a:cs typeface="Arial" charset="0"/>
-              </a:rPr>
-              <a:t>δ</a:t>
-            </a:r>
-            <a:r>
-              <a:rPr lang="en-US" sz="1600" b="1" i="1" baseline="-25000" dirty="0" err="1">
-                <a:latin typeface="Arial" charset="0"/>
-                <a:ea typeface="Arial" charset="0"/>
-                <a:cs typeface="Arial" charset="0"/>
-              </a:rPr>
-              <a:t>Ct</a:t>
-            </a:r>
-            <a:r>
-              <a:rPr lang="en-US" sz="1600" dirty="0">
-                <a:latin typeface="Arial" charset="0"/>
-                <a:ea typeface="Arial" charset="0"/>
-                <a:cs typeface="Arial" charset="0"/>
-              </a:rPr>
-              <a:t> × (𝑬</a:t>
-            </a:r>
-            <a:r>
-              <a:rPr lang="en-US" sz="1600" baseline="-25000" dirty="0">
-                <a:latin typeface="Arial" charset="0"/>
-                <a:ea typeface="Arial" charset="0"/>
-                <a:cs typeface="Arial" charset="0"/>
-              </a:rPr>
-              <a:t>𝒕</a:t>
-            </a:r>
-            <a:r>
-              <a:rPr lang="en-US" sz="1600" dirty="0">
-                <a:latin typeface="Arial" charset="0"/>
-                <a:ea typeface="Arial" charset="0"/>
-                <a:cs typeface="Arial" charset="0"/>
-              </a:rPr>
-              <a:t>−𝑨</a:t>
-            </a:r>
-            <a:r>
-              <a:rPr lang="en-US" sz="1600" baseline="-25000" dirty="0">
-                <a:latin typeface="Arial" charset="0"/>
-                <a:ea typeface="Arial" charset="0"/>
-                <a:cs typeface="Arial" charset="0"/>
-              </a:rPr>
-              <a:t>𝒕</a:t>
-            </a:r>
-            <a:r>
-              <a:rPr lang="en-US" sz="1600" dirty="0">
-                <a:latin typeface="Arial" charset="0"/>
-                <a:ea typeface="Arial" charset="0"/>
-                <a:cs typeface="Arial" charset="0"/>
-              </a:rPr>
-              <a:t>)			if subject is prey 		(7)</a:t>
-            </a:r>
-          </a:p>
-          <a:p>
-            <a:pPr>
-              <a:lnSpc>
-                <a:spcPct val="200000"/>
-              </a:lnSpc>
-            </a:pPr>
-            <a:r>
-              <a:rPr lang="en-US" sz="1600" dirty="0" err="1">
-                <a:latin typeface="Arial" charset="0"/>
-                <a:ea typeface="Arial" charset="0"/>
-                <a:cs typeface="Arial" charset="0"/>
-              </a:rPr>
-              <a:t>δ</a:t>
-            </a:r>
-            <a:r>
-              <a:rPr lang="en-US" sz="1600" b="1" i="1" baseline="-25000" dirty="0" err="1">
-                <a:latin typeface="Arial" charset="0"/>
-                <a:ea typeface="Arial" charset="0"/>
-                <a:cs typeface="Arial" charset="0"/>
-              </a:rPr>
-              <a:t>Rt</a:t>
-            </a:r>
-            <a:r>
-              <a:rPr lang="en-US" sz="1600" baseline="-25000" dirty="0">
-                <a:latin typeface="Arial" charset="0"/>
-                <a:ea typeface="Arial" charset="0"/>
-                <a:cs typeface="Arial" charset="0"/>
-              </a:rPr>
-              <a:t> </a:t>
-            </a:r>
-            <a:r>
-              <a:rPr lang="en-US" sz="1600" dirty="0">
-                <a:latin typeface="Arial" charset="0"/>
-                <a:ea typeface="Arial" charset="0"/>
-                <a:cs typeface="Arial" charset="0"/>
-              </a:rPr>
-              <a:t>= </a:t>
-            </a:r>
-            <a:r>
-              <a:rPr lang="en-US" sz="1600" dirty="0" err="1">
-                <a:latin typeface="Arial" charset="0"/>
-                <a:ea typeface="Arial" charset="0"/>
-                <a:cs typeface="Arial" charset="0"/>
-              </a:rPr>
-              <a:t>δ</a:t>
-            </a:r>
-            <a:r>
-              <a:rPr lang="en-US" sz="1600" b="1" i="1" baseline="-25000" dirty="0" err="1">
-                <a:latin typeface="Arial" charset="0"/>
-                <a:ea typeface="Arial" charset="0"/>
-                <a:cs typeface="Arial" charset="0"/>
-              </a:rPr>
-              <a:t>Ct</a:t>
-            </a:r>
-            <a:r>
-              <a:rPr lang="en-US" sz="1600" baseline="-25000" dirty="0">
-                <a:latin typeface="Arial" charset="0"/>
-                <a:ea typeface="Arial" charset="0"/>
-                <a:cs typeface="Arial" charset="0"/>
-              </a:rPr>
-              <a:t> </a:t>
-            </a:r>
-            <a:r>
-              <a:rPr lang="en-US" sz="1600" dirty="0">
-                <a:latin typeface="Arial" charset="0"/>
-                <a:ea typeface="Arial" charset="0"/>
-                <a:cs typeface="Arial" charset="0"/>
-              </a:rPr>
-              <a:t>× (</a:t>
-            </a:r>
-            <a:r>
-              <a:rPr lang="en-US" sz="1600" b="1" i="1" dirty="0">
-                <a:latin typeface="Arial" charset="0"/>
-                <a:ea typeface="Arial" charset="0"/>
-                <a:cs typeface="Arial" charset="0"/>
-              </a:rPr>
-              <a:t>I</a:t>
-            </a:r>
-            <a:r>
-              <a:rPr lang="en-US" sz="1600" b="1" i="1" baseline="-25000" dirty="0">
-                <a:latin typeface="Arial" charset="0"/>
-                <a:ea typeface="Arial" charset="0"/>
-                <a:cs typeface="Arial" charset="0"/>
-              </a:rPr>
-              <a:t>t </a:t>
-            </a:r>
-            <a:r>
-              <a:rPr lang="en-US" sz="1600" dirty="0">
-                <a:latin typeface="Arial" charset="0"/>
-                <a:ea typeface="Arial" charset="0"/>
-                <a:cs typeface="Arial" charset="0"/>
-              </a:rPr>
-              <a:t>−𝑨</a:t>
-            </a:r>
-            <a:r>
-              <a:rPr lang="en-US" sz="1600" baseline="-25000" dirty="0">
-                <a:latin typeface="Arial" charset="0"/>
-                <a:ea typeface="Arial" charset="0"/>
-                <a:cs typeface="Arial" charset="0"/>
-              </a:rPr>
-              <a:t>𝒕</a:t>
-            </a:r>
-            <a:r>
-              <a:rPr lang="en-US" sz="1600" dirty="0">
-                <a:latin typeface="Arial" charset="0"/>
-                <a:ea typeface="Arial" charset="0"/>
-                <a:cs typeface="Arial" charset="0"/>
-              </a:rPr>
-              <a:t>) 		 	if subject is predator 	(8)</a:t>
-            </a:r>
-          </a:p>
-          <a:p>
-            <a:pPr>
-              <a:lnSpc>
-                <a:spcPct val="200000"/>
-              </a:lnSpc>
-            </a:pPr>
-            <a:endParaRPr lang="en-US" sz="1600" b="1" i="1" dirty="0" smtClean="0">
-              <a:latin typeface="Arial" charset="0"/>
-              <a:ea typeface="Arial" charset="0"/>
-              <a:cs typeface="Arial" charset="0"/>
-            </a:endParaRPr>
-          </a:p>
-          <a:p>
-            <a:pPr>
-              <a:lnSpc>
-                <a:spcPct val="200000"/>
-              </a:lnSpc>
-            </a:pPr>
-            <a:r>
-              <a:rPr lang="en-US" sz="1600" dirty="0" err="1" smtClean="0">
-                <a:latin typeface="Arial" charset="0"/>
-                <a:ea typeface="Arial" charset="0"/>
-                <a:cs typeface="Arial" charset="0"/>
-              </a:rPr>
-              <a:t>δ</a:t>
-            </a:r>
-            <a:r>
-              <a:rPr lang="en-US" sz="1600" b="1" i="1" baseline="-25000" dirty="0" err="1" smtClean="0">
-                <a:latin typeface="Arial" charset="0"/>
-                <a:ea typeface="Arial" charset="0"/>
-                <a:cs typeface="Arial" charset="0"/>
-              </a:rPr>
-              <a:t>Rt</a:t>
-            </a:r>
-            <a:r>
-              <a:rPr lang="en-US" sz="1600" b="1" i="1" baseline="-25000" dirty="0" smtClean="0">
-                <a:latin typeface="Arial" charset="0"/>
-                <a:ea typeface="Arial" charset="0"/>
-                <a:cs typeface="Arial" charset="0"/>
-              </a:rPr>
-              <a:t> </a:t>
-            </a:r>
-            <a:r>
-              <a:rPr lang="en-US" sz="1600" dirty="0">
-                <a:latin typeface="Arial" charset="0"/>
-                <a:ea typeface="Arial" charset="0"/>
-                <a:cs typeface="Arial" charset="0"/>
-              </a:rPr>
-              <a:t> </a:t>
-            </a:r>
-            <a:r>
-              <a:rPr lang="en-US" sz="1600" dirty="0" smtClean="0">
-                <a:latin typeface="Arial" charset="0"/>
-                <a:ea typeface="Arial" charset="0"/>
-                <a:cs typeface="Arial" charset="0"/>
-              </a:rPr>
-              <a:t>is then used by </a:t>
-            </a:r>
-            <a:r>
-              <a:rPr lang="en-US" sz="1600" b="1" i="1" dirty="0" smtClean="0">
-                <a:latin typeface="Arial" charset="0"/>
-                <a:ea typeface="Arial" charset="0"/>
-                <a:cs typeface="Arial" charset="0"/>
-              </a:rPr>
-              <a:t>P </a:t>
-            </a:r>
-            <a:r>
-              <a:rPr lang="en-US" sz="1600" dirty="0" smtClean="0">
-                <a:latin typeface="Arial" charset="0"/>
-                <a:ea typeface="Arial" charset="0"/>
-                <a:cs typeface="Arial" charset="0"/>
-              </a:rPr>
-              <a:t>to update </a:t>
-            </a:r>
-            <a:r>
-              <a:rPr lang="en-US" sz="1600" dirty="0" err="1" smtClean="0">
-                <a:latin typeface="Arial" charset="0"/>
-                <a:ea typeface="Arial" charset="0"/>
-                <a:cs typeface="Arial" charset="0"/>
-              </a:rPr>
-              <a:t>ϑ</a:t>
-            </a:r>
-            <a:r>
-              <a:rPr lang="en-US" sz="1600" dirty="0" smtClean="0">
-                <a:latin typeface="Arial" charset="0"/>
-                <a:ea typeface="Arial" charset="0"/>
-                <a:cs typeface="Arial" charset="0"/>
-              </a:rPr>
-              <a:t> in the same way </a:t>
-            </a:r>
-            <a:r>
-              <a:rPr lang="en-US" sz="1600" dirty="0" err="1" smtClean="0">
-                <a:latin typeface="Arial" charset="0"/>
-                <a:ea typeface="Arial" charset="0"/>
-                <a:cs typeface="Arial" charset="0"/>
-              </a:rPr>
-              <a:t>δ</a:t>
-            </a:r>
-            <a:r>
-              <a:rPr lang="en-US" sz="1600" b="1" i="1" baseline="-25000" dirty="0" err="1" smtClean="0">
-                <a:latin typeface="Arial" charset="0"/>
-                <a:ea typeface="Arial" charset="0"/>
-                <a:cs typeface="Arial" charset="0"/>
-              </a:rPr>
-              <a:t>Ct</a:t>
-            </a:r>
-            <a:r>
-              <a:rPr lang="en-US" sz="1600" b="1" i="1" baseline="-25000" dirty="0" smtClean="0">
-                <a:latin typeface="Arial" charset="0"/>
-                <a:ea typeface="Arial" charset="0"/>
-                <a:cs typeface="Arial" charset="0"/>
-              </a:rPr>
-              <a:t> </a:t>
-            </a:r>
-            <a:r>
-              <a:rPr lang="en-US" sz="1600" dirty="0" smtClean="0">
-                <a:latin typeface="Arial" charset="0"/>
-                <a:ea typeface="Arial" charset="0"/>
-                <a:cs typeface="Arial" charset="0"/>
-              </a:rPr>
-              <a:t>was used in cases 1 and 2:</a:t>
-            </a:r>
-          </a:p>
-          <a:p>
-            <a:pPr>
-              <a:lnSpc>
-                <a:spcPct val="200000"/>
-              </a:lnSpc>
-            </a:pPr>
-            <a:endParaRPr lang="en-US" sz="1600" b="1" i="1" dirty="0">
-              <a:latin typeface="Arial" charset="0"/>
-              <a:ea typeface="Arial" charset="0"/>
-              <a:cs typeface="Arial" charset="0"/>
-            </a:endParaRPr>
-          </a:p>
-          <a:p>
-            <a:pPr>
-              <a:lnSpc>
-                <a:spcPct val="200000"/>
-              </a:lnSpc>
-            </a:pPr>
-            <a:r>
-              <a:rPr lang="en-US" sz="1600" i="1" dirty="0">
-                <a:latin typeface="Arial" charset="0"/>
-                <a:ea typeface="Arial" charset="0"/>
-                <a:cs typeface="Arial" charset="0"/>
-              </a:rPr>
-              <a:t>𝛃</a:t>
-            </a:r>
-            <a:r>
-              <a:rPr lang="en-US" sz="1600" b="1" i="1" baseline="-25000" dirty="0">
-                <a:latin typeface="Arial" charset="0"/>
-                <a:ea typeface="Arial" charset="0"/>
-                <a:cs typeface="Arial" charset="0"/>
-              </a:rPr>
-              <a:t>R0,t</a:t>
-            </a:r>
-            <a:r>
-              <a:rPr lang="en-US" sz="1600" b="1" baseline="-25000" dirty="0">
-                <a:latin typeface="Arial" charset="0"/>
-                <a:ea typeface="Arial" charset="0"/>
-                <a:cs typeface="Arial" charset="0"/>
-              </a:rPr>
-              <a:t>+1</a:t>
-            </a:r>
-            <a:r>
-              <a:rPr lang="en-US" sz="1600" dirty="0">
-                <a:latin typeface="Arial" charset="0"/>
-                <a:ea typeface="Arial" charset="0"/>
-                <a:cs typeface="Arial" charset="0"/>
-              </a:rPr>
-              <a:t>=</a:t>
-            </a:r>
-            <a:r>
-              <a:rPr lang="en-US" sz="1600" i="1" dirty="0">
-                <a:latin typeface="Arial" charset="0"/>
-                <a:ea typeface="Arial" charset="0"/>
-                <a:cs typeface="Arial" charset="0"/>
-              </a:rPr>
-              <a:t>𝛃</a:t>
-            </a:r>
-            <a:r>
-              <a:rPr lang="en-US" sz="1600" b="1" i="1" baseline="-25000" dirty="0">
-                <a:latin typeface="Arial" charset="0"/>
-                <a:ea typeface="Arial" charset="0"/>
-                <a:cs typeface="Arial" charset="0"/>
-              </a:rPr>
-              <a:t>R0,t</a:t>
-            </a:r>
-            <a:r>
-              <a:rPr lang="en-US" sz="1600" dirty="0">
-                <a:latin typeface="Arial" charset="0"/>
-                <a:ea typeface="Arial" charset="0"/>
-                <a:cs typeface="Arial" charset="0"/>
-              </a:rPr>
-              <a:t>+α× </a:t>
-            </a:r>
-            <a:r>
-              <a:rPr lang="en-US" sz="1600" dirty="0" err="1" smtClean="0">
-                <a:latin typeface="Arial" charset="0"/>
-                <a:ea typeface="Arial" charset="0"/>
-                <a:cs typeface="Arial" charset="0"/>
-              </a:rPr>
-              <a:t>δ</a:t>
-            </a:r>
-            <a:r>
-              <a:rPr lang="en-US" sz="1600" b="1" i="1" baseline="-25000" dirty="0" err="1" smtClean="0">
-                <a:latin typeface="Arial" charset="0"/>
-                <a:ea typeface="Arial" charset="0"/>
-                <a:cs typeface="Arial" charset="0"/>
-              </a:rPr>
-              <a:t>Rt</a:t>
-            </a:r>
-            <a:r>
-              <a:rPr lang="en-US" sz="1600" dirty="0" smtClean="0">
-                <a:latin typeface="Arial" charset="0"/>
-                <a:ea typeface="Arial" charset="0"/>
-                <a:cs typeface="Arial" charset="0"/>
-              </a:rPr>
-              <a:t> </a:t>
-            </a:r>
-            <a:r>
-              <a:rPr lang="en-US" sz="1600" dirty="0">
-                <a:latin typeface="Arial" charset="0"/>
-                <a:ea typeface="Arial" charset="0"/>
-                <a:cs typeface="Arial" charset="0"/>
-              </a:rPr>
-              <a:t>		</a:t>
-            </a:r>
-            <a:r>
-              <a:rPr lang="en-US" sz="1600" dirty="0" smtClean="0">
-                <a:latin typeface="Arial" charset="0"/>
-                <a:ea typeface="Arial" charset="0"/>
-                <a:cs typeface="Arial" charset="0"/>
-              </a:rPr>
-              <a:t>(9)</a:t>
-            </a:r>
-            <a:endParaRPr lang="en-US" sz="1600" dirty="0">
-              <a:latin typeface="Arial" charset="0"/>
-              <a:ea typeface="Arial" charset="0"/>
-              <a:cs typeface="Arial" charset="0"/>
-            </a:endParaRPr>
-          </a:p>
-          <a:p>
-            <a:pPr>
-              <a:lnSpc>
-                <a:spcPct val="200000"/>
-              </a:lnSpc>
-            </a:pPr>
-            <a:endParaRPr lang="en-US" sz="1600" b="1" i="1" dirty="0" smtClean="0">
-              <a:latin typeface="Arial" charset="0"/>
-              <a:ea typeface="Arial" charset="0"/>
-              <a:cs typeface="Arial" charset="0"/>
-            </a:endParaRPr>
-          </a:p>
-          <a:p>
-            <a:pPr>
-              <a:lnSpc>
-                <a:spcPct val="200000"/>
-              </a:lnSpc>
-            </a:pPr>
-            <a:endParaRPr lang="en-US" sz="1600" dirty="0">
-              <a:latin typeface="Arial" charset="0"/>
-              <a:ea typeface="Arial" charset="0"/>
-              <a:cs typeface="Arial" charset="0"/>
-            </a:endParaRPr>
-          </a:p>
-          <a:p>
-            <a:pPr>
-              <a:lnSpc>
-                <a:spcPct val="200000"/>
-              </a:lnSpc>
-            </a:pPr>
-            <a:endParaRPr lang="en-US" sz="1600" dirty="0" smtClean="0">
-              <a:latin typeface="Arial" charset="0"/>
-              <a:ea typeface="Arial" charset="0"/>
-              <a:cs typeface="Arial" charset="0"/>
-            </a:endParaRPr>
-          </a:p>
         </p:txBody>
       </p:sp>
     </p:spTree>
     <p:extLst>
       <p:ext uri="{BB962C8B-B14F-4D97-AF65-F5344CB8AC3E}">
-        <p14:creationId xmlns:p14="http://schemas.microsoft.com/office/powerpoint/2010/main" val="743489126"/>
+        <p14:creationId xmlns:p14="http://schemas.microsoft.com/office/powerpoint/2010/main" val="464727562"/>
       </p:ext>
     </p:extLst>
   </p:cSld>

</xml_diff>

<commit_message>
after I've succesfully fit everything and shifted to R
</commit_message>
<xml_diff>
--- a/PPG/reports/PPG progress report 2017_09_26.pptx
+++ b/PPG/reports/PPG progress report 2017_09_26.pptx
@@ -5,7 +5,7 @@
     <p:sldMasterId id="2147483648" r:id="rId1"/>
   </p:sldMasterIdLst>
   <p:notesMasterIdLst>
-    <p:notesMasterId r:id="rId25"/>
+    <p:notesMasterId r:id="rId34"/>
   </p:notesMasterIdLst>
   <p:sldIdLst>
     <p:sldId id="256" r:id="rId2"/>
@@ -26,11 +26,20 @@
     <p:sldId id="285" r:id="rId17"/>
     <p:sldId id="287" r:id="rId18"/>
     <p:sldId id="290" r:id="rId19"/>
-    <p:sldId id="286" r:id="rId20"/>
-    <p:sldId id="274" r:id="rId21"/>
-    <p:sldId id="275" r:id="rId22"/>
-    <p:sldId id="276" r:id="rId23"/>
-    <p:sldId id="288" r:id="rId24"/>
+    <p:sldId id="292" r:id="rId20"/>
+    <p:sldId id="294" r:id="rId21"/>
+    <p:sldId id="295" r:id="rId22"/>
+    <p:sldId id="298" r:id="rId23"/>
+    <p:sldId id="297" r:id="rId24"/>
+    <p:sldId id="300" r:id="rId25"/>
+    <p:sldId id="299" r:id="rId26"/>
+    <p:sldId id="293" r:id="rId27"/>
+    <p:sldId id="301" r:id="rId28"/>
+    <p:sldId id="286" r:id="rId29"/>
+    <p:sldId id="274" r:id="rId30"/>
+    <p:sldId id="275" r:id="rId31"/>
+    <p:sldId id="276" r:id="rId32"/>
+    <p:sldId id="288" r:id="rId33"/>
   </p:sldIdLst>
   <p:sldSz cx="12192000" cy="6858000"/>
   <p:notesSz cx="6858000" cy="9144000"/>
@@ -219,7 +228,7 @@
           <a:p>
             <a:fld id="{93497C26-5219-954A-A522-4F368E7A7ADA}" type="datetimeFigureOut">
               <a:rPr lang="en-US" smtClean="0"/>
-              <a:t>9/26/17</a:t>
+              <a:t>10/10/17</a:t>
             </a:fld>
             <a:endParaRPr lang="en-US"/>
           </a:p>
@@ -720,7 +729,7 @@
           <a:p>
             <a:fld id="{A2BA52DA-B0BC-A24E-B717-007855D4CE0B}" type="slidenum">
               <a:rPr lang="en-US" smtClean="0"/>
-              <a:t>21</a:t>
+              <a:t>30</a:t>
             </a:fld>
             <a:endParaRPr lang="en-US"/>
           </a:p>
@@ -804,7 +813,7 @@
           <a:p>
             <a:fld id="{A2BA52DA-B0BC-A24E-B717-007855D4CE0B}" type="slidenum">
               <a:rPr lang="en-US" smtClean="0"/>
-              <a:t>22</a:t>
+              <a:t>31</a:t>
             </a:fld>
             <a:endParaRPr lang="en-US"/>
           </a:p>
@@ -888,7 +897,7 @@
           <a:p>
             <a:fld id="{A2BA52DA-B0BC-A24E-B717-007855D4CE0B}" type="slidenum">
               <a:rPr lang="en-US" smtClean="0"/>
-              <a:t>23</a:t>
+              <a:t>32</a:t>
             </a:fld>
             <a:endParaRPr lang="en-US"/>
           </a:p>
@@ -1038,7 +1047,7 @@
           <a:p>
             <a:fld id="{AB24BD30-CF79-6742-90BF-1953A7F126BB}" type="datetimeFigureOut">
               <a:rPr lang="en-US" smtClean="0"/>
-              <a:t>9/26/17</a:t>
+              <a:t>10/10/17</a:t>
             </a:fld>
             <a:endParaRPr lang="en-US"/>
           </a:p>
@@ -1208,7 +1217,7 @@
           <a:p>
             <a:fld id="{AB24BD30-CF79-6742-90BF-1953A7F126BB}" type="datetimeFigureOut">
               <a:rPr lang="en-US" smtClean="0"/>
-              <a:t>9/26/17</a:t>
+              <a:t>10/10/17</a:t>
             </a:fld>
             <a:endParaRPr lang="en-US"/>
           </a:p>
@@ -1388,7 +1397,7 @@
           <a:p>
             <a:fld id="{AB24BD30-CF79-6742-90BF-1953A7F126BB}" type="datetimeFigureOut">
               <a:rPr lang="en-US" smtClean="0"/>
-              <a:t>9/26/17</a:t>
+              <a:t>10/10/17</a:t>
             </a:fld>
             <a:endParaRPr lang="en-US"/>
           </a:p>
@@ -1558,7 +1567,7 @@
           <a:p>
             <a:fld id="{AB24BD30-CF79-6742-90BF-1953A7F126BB}" type="datetimeFigureOut">
               <a:rPr lang="en-US" smtClean="0"/>
-              <a:t>9/26/17</a:t>
+              <a:t>10/10/17</a:t>
             </a:fld>
             <a:endParaRPr lang="en-US"/>
           </a:p>
@@ -1804,7 +1813,7 @@
           <a:p>
             <a:fld id="{AB24BD30-CF79-6742-90BF-1953A7F126BB}" type="datetimeFigureOut">
               <a:rPr lang="en-US" smtClean="0"/>
-              <a:t>9/26/17</a:t>
+              <a:t>10/10/17</a:t>
             </a:fld>
             <a:endParaRPr lang="en-US"/>
           </a:p>
@@ -2036,7 +2045,7 @@
           <a:p>
             <a:fld id="{AB24BD30-CF79-6742-90BF-1953A7F126BB}" type="datetimeFigureOut">
               <a:rPr lang="en-US" smtClean="0"/>
-              <a:t>9/26/17</a:t>
+              <a:t>10/10/17</a:t>
             </a:fld>
             <a:endParaRPr lang="en-US"/>
           </a:p>
@@ -2403,7 +2412,7 @@
           <a:p>
             <a:fld id="{AB24BD30-CF79-6742-90BF-1953A7F126BB}" type="datetimeFigureOut">
               <a:rPr lang="en-US" smtClean="0"/>
-              <a:t>9/26/17</a:t>
+              <a:t>10/10/17</a:t>
             </a:fld>
             <a:endParaRPr lang="en-US"/>
           </a:p>
@@ -2521,7 +2530,7 @@
           <a:p>
             <a:fld id="{AB24BD30-CF79-6742-90BF-1953A7F126BB}" type="datetimeFigureOut">
               <a:rPr lang="en-US" smtClean="0"/>
-              <a:t>9/26/17</a:t>
+              <a:t>10/10/17</a:t>
             </a:fld>
             <a:endParaRPr lang="en-US"/>
           </a:p>
@@ -2616,7 +2625,7 @@
           <a:p>
             <a:fld id="{AB24BD30-CF79-6742-90BF-1953A7F126BB}" type="datetimeFigureOut">
               <a:rPr lang="en-US" smtClean="0"/>
-              <a:t>9/26/17</a:t>
+              <a:t>10/10/17</a:t>
             </a:fld>
             <a:endParaRPr lang="en-US"/>
           </a:p>
@@ -2893,7 +2902,7 @@
           <a:p>
             <a:fld id="{AB24BD30-CF79-6742-90BF-1953A7F126BB}" type="datetimeFigureOut">
               <a:rPr lang="en-US" smtClean="0"/>
-              <a:t>9/26/17</a:t>
+              <a:t>10/10/17</a:t>
             </a:fld>
             <a:endParaRPr lang="en-US"/>
           </a:p>
@@ -3146,7 +3155,7 @@
           <a:p>
             <a:fld id="{AB24BD30-CF79-6742-90BF-1953A7F126BB}" type="datetimeFigureOut">
               <a:rPr lang="en-US" smtClean="0"/>
-              <a:t>9/26/17</a:t>
+              <a:t>10/10/17</a:t>
             </a:fld>
             <a:endParaRPr lang="en-US"/>
           </a:p>
@@ -3359,7 +3368,7 @@
           <a:p>
             <a:fld id="{AB24BD30-CF79-6742-90BF-1953A7F126BB}" type="datetimeFigureOut">
               <a:rPr lang="en-US" smtClean="0"/>
-              <a:t>9/26/17</a:t>
+              <a:t>10/10/17</a:t>
             </a:fld>
             <a:endParaRPr lang="en-US"/>
           </a:p>
@@ -5944,6 +5953,13 @@
   <p:clrMapOvr>
     <a:masterClrMapping/>
   </p:clrMapOvr>
+  <p:timing>
+    <p:tnLst>
+      <p:par>
+        <p:cTn id="1" dur="indefinite" restart="never" nodeType="tmRoot"/>
+      </p:par>
+    </p:tnLst>
+  </p:timing>
 </p:sld>
 </file>
 
@@ -6121,6 +6137,13 @@
   <p:clrMapOvr>
     <a:masterClrMapping/>
   </p:clrMapOvr>
+  <p:timing>
+    <p:tnLst>
+      <p:par>
+        <p:cTn id="1" dur="indefinite" restart="never" nodeType="tmRoot"/>
+      </p:par>
+    </p:tnLst>
+  </p:timing>
 </p:sld>
 </file>
 
@@ -6301,6 +6324,13 @@
   <p:clrMapOvr>
     <a:masterClrMapping/>
   </p:clrMapOvr>
+  <p:timing>
+    <p:tnLst>
+      <p:par>
+        <p:cTn id="1" dur="indefinite" restart="never" nodeType="tmRoot"/>
+      </p:par>
+    </p:tnLst>
+  </p:timing>
 </p:sld>
 </file>
 
@@ -6406,6 +6436,13 @@
   <p:clrMapOvr>
     <a:masterClrMapping/>
   </p:clrMapOvr>
+  <p:timing>
+    <p:tnLst>
+      <p:par>
+        <p:cTn id="1" dur="indefinite" restart="never" nodeType="tmRoot"/>
+      </p:par>
+    </p:tnLst>
+  </p:timing>
 </p:sld>
 </file>
 
@@ -6426,16 +6463,271 @@
           <a:chExt cx="0" cy="0"/>
         </a:xfrm>
       </p:grpSpPr>
+      <p:sp>
+        <p:nvSpPr>
+          <p:cNvPr id="2" name="TextBox 1"/>
+          <p:cNvSpPr txBox="1"/>
+          <p:nvPr/>
+        </p:nvSpPr>
+        <p:spPr>
+          <a:xfrm>
+            <a:off x="0" y="0"/>
+            <a:ext cx="12005953" cy="3508653"/>
+          </a:xfrm>
+          <a:prstGeom prst="rect">
+            <a:avLst/>
+          </a:prstGeom>
+          <a:noFill/>
+        </p:spPr>
+        <p:txBody>
+          <a:bodyPr wrap="square" rtlCol="0">
+            <a:spAutoFit/>
+          </a:bodyPr>
+          <a:lstStyle/>
+          <a:p>
+            <a:r>
+              <a:rPr lang="en-US" sz="2000" b="1" dirty="0" smtClean="0">
+                <a:latin typeface="Arial" charset="0"/>
+                <a:ea typeface="Arial" charset="0"/>
+                <a:cs typeface="Arial" charset="0"/>
+              </a:rPr>
+              <a:t>Model fits to real data</a:t>
+            </a:r>
+          </a:p>
+          <a:p>
+            <a:endParaRPr lang="en-US" sz="2000" b="1" dirty="0">
+              <a:latin typeface="Arial" charset="0"/>
+              <a:ea typeface="Arial" charset="0"/>
+              <a:cs typeface="Arial" charset="0"/>
+            </a:endParaRPr>
+          </a:p>
+          <a:p>
+            <a:r>
+              <a:rPr lang="en-US" sz="1600" dirty="0" smtClean="0">
+                <a:latin typeface="Arial" charset="0"/>
+                <a:ea typeface="Arial" charset="0"/>
+                <a:cs typeface="Arial" charset="0"/>
+              </a:rPr>
+              <a:t>I fit each model to the behavioral data of three different datasets and assessed the goodness of fit by comparing the BIC of each model, across subjects, separately for predator and for prey. As can be seen from figures #, in each dataset model 3 yields the lowest BIC for predators (red bars), indicating a better fit to the data, while model 4 yields the lowest BIC for prey (blue bars). This means that predator behavior is better explained by a learning model with 1 learning rate, and prey behavior is better explained by a learning model with 2 learning rates. Furthermore, while there is no significant difference between models 1 and 3 for predators nor models 2 and 4 for prey, based on the simulated model identifiability test visualized in the confusion matrices in figure #, in which these models are likewise similar in terms of BIC, we should not expect a significant difference between these models even if subjects were using them perfectly to generate their behavior. </a:t>
+            </a:r>
+            <a:endParaRPr lang="en-US" sz="2000" b="1" dirty="0" smtClean="0">
+              <a:latin typeface="Arial" charset="0"/>
+              <a:ea typeface="Arial" charset="0"/>
+              <a:cs typeface="Arial" charset="0"/>
+            </a:endParaRPr>
+          </a:p>
+          <a:p>
+            <a:endParaRPr lang="en-US" sz="2000" b="1" dirty="0">
+              <a:latin typeface="Arial" charset="0"/>
+              <a:ea typeface="Arial" charset="0"/>
+              <a:cs typeface="Arial" charset="0"/>
+            </a:endParaRPr>
+          </a:p>
+          <a:p>
+            <a:endParaRPr lang="en-US" dirty="0" smtClean="0"/>
+          </a:p>
+          <a:p>
+            <a:endParaRPr lang="en-US" sz="1600" dirty="0"/>
+          </a:p>
+        </p:txBody>
+      </p:sp>
+      <p:sp>
+        <p:nvSpPr>
+          <p:cNvPr id="6" name="TextBox 5"/>
+          <p:cNvSpPr txBox="1"/>
+          <p:nvPr/>
+        </p:nvSpPr>
+        <p:spPr>
+          <a:xfrm>
+            <a:off x="458223" y="6439559"/>
+            <a:ext cx="2666114" cy="369332"/>
+          </a:xfrm>
+          <a:prstGeom prst="rect">
+            <a:avLst/>
+          </a:prstGeom>
+          <a:noFill/>
+        </p:spPr>
+        <p:txBody>
+          <a:bodyPr wrap="none" rtlCol="0">
+            <a:spAutoFit/>
+          </a:bodyPr>
+          <a:lstStyle/>
+          <a:p>
+            <a:r>
+              <a:rPr lang="en-US" dirty="0" smtClean="0"/>
+              <a:t>N = 166, b/w sub design</a:t>
+            </a:r>
+            <a:endParaRPr lang="en-US" dirty="0"/>
+          </a:p>
+        </p:txBody>
+      </p:sp>
+      <p:sp>
+        <p:nvSpPr>
+          <p:cNvPr id="7" name="TextBox 6"/>
+          <p:cNvSpPr txBox="1"/>
+          <p:nvPr/>
+        </p:nvSpPr>
+        <p:spPr>
+          <a:xfrm>
+            <a:off x="4752867" y="6439559"/>
+            <a:ext cx="2537874" cy="369332"/>
+          </a:xfrm>
+          <a:prstGeom prst="rect">
+            <a:avLst/>
+          </a:prstGeom>
+          <a:noFill/>
+        </p:spPr>
+        <p:txBody>
+          <a:bodyPr wrap="none" rtlCol="0">
+            <a:spAutoFit/>
+          </a:bodyPr>
+          <a:lstStyle/>
+          <a:p>
+            <a:r>
+              <a:rPr lang="en-US" smtClean="0"/>
+              <a:t>N = 50, b/w sub design</a:t>
+            </a:r>
+            <a:endParaRPr lang="en-US"/>
+          </a:p>
+        </p:txBody>
+      </p:sp>
+      <p:sp>
+        <p:nvSpPr>
+          <p:cNvPr id="8" name="TextBox 7"/>
+          <p:cNvSpPr txBox="1"/>
+          <p:nvPr/>
+        </p:nvSpPr>
+        <p:spPr>
+          <a:xfrm>
+            <a:off x="8766908" y="6439559"/>
+            <a:ext cx="2589170" cy="369332"/>
+          </a:xfrm>
+          <a:prstGeom prst="rect">
+            <a:avLst/>
+          </a:prstGeom>
+          <a:noFill/>
+        </p:spPr>
+        <p:txBody>
+          <a:bodyPr wrap="none" rtlCol="0">
+            <a:spAutoFit/>
+          </a:bodyPr>
+          <a:lstStyle/>
+          <a:p>
+            <a:r>
+              <a:rPr lang="en-US" dirty="0" smtClean="0"/>
+              <a:t>N = 24, w/in sub design</a:t>
+            </a:r>
+            <a:endParaRPr lang="en-US" dirty="0"/>
+          </a:p>
+        </p:txBody>
+      </p:sp>
+      <p:pic>
+        <p:nvPicPr>
+          <p:cNvPr id="9" name="Picture 8"/>
+          <p:cNvPicPr>
+            <a:picLocks noChangeAspect="1"/>
+          </p:cNvPicPr>
+          <p:nvPr/>
+        </p:nvPicPr>
+        <p:blipFill>
+          <a:blip r:embed="rId2">
+            <a:extLst>
+              <a:ext uri="{28A0092B-C50C-407E-A947-70E740481C1C}">
+                <a14:useLocalDpi xmlns:a14="http://schemas.microsoft.com/office/drawing/2010/main" val="0"/>
+              </a:ext>
+            </a:extLst>
+          </a:blip>
+          <a:stretch>
+            <a:fillRect/>
+          </a:stretch>
+        </p:blipFill>
+        <p:spPr>
+          <a:xfrm>
+            <a:off x="17566" y="3236780"/>
+            <a:ext cx="4061742" cy="3202528"/>
+          </a:xfrm>
+          <a:prstGeom prst="rect">
+            <a:avLst/>
+          </a:prstGeom>
+        </p:spPr>
+      </p:pic>
+      <p:pic>
+        <p:nvPicPr>
+          <p:cNvPr id="10" name="Picture 9"/>
+          <p:cNvPicPr>
+            <a:picLocks noChangeAspect="1"/>
+          </p:cNvPicPr>
+          <p:nvPr/>
+        </p:nvPicPr>
+        <p:blipFill>
+          <a:blip r:embed="rId3">
+            <a:extLst>
+              <a:ext uri="{28A0092B-C50C-407E-A947-70E740481C1C}">
+                <a14:useLocalDpi xmlns:a14="http://schemas.microsoft.com/office/drawing/2010/main" val="0"/>
+              </a:ext>
+            </a:extLst>
+          </a:blip>
+          <a:stretch>
+            <a:fillRect/>
+          </a:stretch>
+        </p:blipFill>
+        <p:spPr>
+          <a:xfrm>
+            <a:off x="3919437" y="3236780"/>
+            <a:ext cx="4061742" cy="3202528"/>
+          </a:xfrm>
+          <a:prstGeom prst="rect">
+            <a:avLst/>
+          </a:prstGeom>
+        </p:spPr>
+      </p:pic>
+      <p:pic>
+        <p:nvPicPr>
+          <p:cNvPr id="11" name="Picture 10"/>
+          <p:cNvPicPr>
+            <a:picLocks noChangeAspect="1"/>
+          </p:cNvPicPr>
+          <p:nvPr/>
+        </p:nvPicPr>
+        <p:blipFill>
+          <a:blip r:embed="rId4">
+            <a:extLst>
+              <a:ext uri="{28A0092B-C50C-407E-A947-70E740481C1C}">
+                <a14:useLocalDpi xmlns:a14="http://schemas.microsoft.com/office/drawing/2010/main" val="0"/>
+              </a:ext>
+            </a:extLst>
+          </a:blip>
+          <a:stretch>
+            <a:fillRect/>
+          </a:stretch>
+        </p:blipFill>
+        <p:spPr>
+          <a:xfrm>
+            <a:off x="7944211" y="3236780"/>
+            <a:ext cx="4061742" cy="3202528"/>
+          </a:xfrm>
+          <a:prstGeom prst="rect">
+            <a:avLst/>
+          </a:prstGeom>
+        </p:spPr>
+      </p:pic>
     </p:spTree>
     <p:extLst>
       <p:ext uri="{BB962C8B-B14F-4D97-AF65-F5344CB8AC3E}">
-        <p14:creationId xmlns:p14="http://schemas.microsoft.com/office/powerpoint/2010/main" val="748664869"/>
+        <p14:creationId xmlns:p14="http://schemas.microsoft.com/office/powerpoint/2010/main" val="1605330672"/>
       </p:ext>
     </p:extLst>
   </p:cSld>
   <p:clrMapOvr>
     <a:masterClrMapping/>
   </p:clrMapOvr>
+  <p:timing>
+    <p:tnLst>
+      <p:par>
+        <p:cTn id="1" dur="indefinite" restart="never" nodeType="tmRoot"/>
+      </p:par>
+    </p:tnLst>
+  </p:timing>
 </p:sld>
 </file>
 
@@ -6614,6 +6906,2639 @@
       </p:grpSpPr>
       <p:sp>
         <p:nvSpPr>
+          <p:cNvPr id="2" name="TextBox 1"/>
+          <p:cNvSpPr txBox="1"/>
+          <p:nvPr/>
+        </p:nvSpPr>
+        <p:spPr>
+          <a:xfrm>
+            <a:off x="0" y="0"/>
+            <a:ext cx="12005953" cy="2523768"/>
+          </a:xfrm>
+          <a:prstGeom prst="rect">
+            <a:avLst/>
+          </a:prstGeom>
+          <a:noFill/>
+        </p:spPr>
+        <p:txBody>
+          <a:bodyPr wrap="square" rtlCol="0">
+            <a:spAutoFit/>
+          </a:bodyPr>
+          <a:lstStyle/>
+          <a:p>
+            <a:r>
+              <a:rPr lang="en-US" sz="2000" b="1" dirty="0" smtClean="0">
+                <a:latin typeface="Arial" charset="0"/>
+                <a:ea typeface="Arial" charset="0"/>
+                <a:cs typeface="Arial" charset="0"/>
+              </a:rPr>
+              <a:t>Model fits to real data</a:t>
+            </a:r>
+          </a:p>
+          <a:p>
+            <a:endParaRPr lang="en-US" sz="2000" b="1" dirty="0">
+              <a:latin typeface="Arial" charset="0"/>
+              <a:ea typeface="Arial" charset="0"/>
+              <a:cs typeface="Arial" charset="0"/>
+            </a:endParaRPr>
+          </a:p>
+          <a:p>
+            <a:r>
+              <a:rPr lang="en-US" sz="1600" dirty="0" smtClean="0">
+                <a:latin typeface="Arial" charset="0"/>
+                <a:ea typeface="Arial" charset="0"/>
+                <a:cs typeface="Arial" charset="0"/>
+              </a:rPr>
+              <a:t>When examining the model parameters of the most parsimonious models, we see that prey in fact exhibit a large difference in terms of learning rate, but only for two out of the three datasets (results of paired t-tests). This </a:t>
+            </a:r>
+            <a:r>
+              <a:rPr lang="en-US" sz="1600" dirty="0">
+                <a:latin typeface="Arial" charset="0"/>
+                <a:ea typeface="Arial" charset="0"/>
+                <a:cs typeface="Arial" charset="0"/>
+              </a:rPr>
+              <a:t>means that </a:t>
+            </a:r>
+            <a:r>
+              <a:rPr lang="en-US" sz="1600" dirty="0" smtClean="0">
+                <a:latin typeface="Arial" charset="0"/>
+                <a:ea typeface="Arial" charset="0"/>
+                <a:cs typeface="Arial" charset="0"/>
+              </a:rPr>
+              <a:t>prey their </a:t>
+            </a:r>
+            <a:r>
+              <a:rPr lang="en-US" sz="1600" dirty="0">
+                <a:latin typeface="Arial" charset="0"/>
+                <a:ea typeface="Arial" charset="0"/>
+                <a:cs typeface="Arial" charset="0"/>
+              </a:rPr>
+              <a:t>behavior much stronger to a positive prediction error than to a negative prediction </a:t>
+            </a:r>
+            <a:r>
+              <a:rPr lang="en-US" sz="1600" dirty="0" smtClean="0">
+                <a:latin typeface="Arial" charset="0"/>
+                <a:ea typeface="Arial" charset="0"/>
+                <a:cs typeface="Arial" charset="0"/>
+              </a:rPr>
+              <a:t>error, and in effect indicates that they behave in risk-seeking rather than risk-avoiding manner.</a:t>
+            </a:r>
+            <a:endParaRPr lang="en-US" sz="2000" b="1" dirty="0" smtClean="0">
+              <a:latin typeface="Arial" charset="0"/>
+              <a:ea typeface="Arial" charset="0"/>
+              <a:cs typeface="Arial" charset="0"/>
+            </a:endParaRPr>
+          </a:p>
+          <a:p>
+            <a:endParaRPr lang="en-US" sz="2000" b="1" dirty="0">
+              <a:latin typeface="Arial" charset="0"/>
+              <a:ea typeface="Arial" charset="0"/>
+              <a:cs typeface="Arial" charset="0"/>
+            </a:endParaRPr>
+          </a:p>
+          <a:p>
+            <a:endParaRPr lang="en-US" dirty="0" smtClean="0"/>
+          </a:p>
+          <a:p>
+            <a:endParaRPr lang="en-US" sz="1600" dirty="0"/>
+          </a:p>
+        </p:txBody>
+      </p:sp>
+      <p:sp>
+        <p:nvSpPr>
+          <p:cNvPr id="4" name="TextBox 3"/>
+          <p:cNvSpPr txBox="1"/>
+          <p:nvPr/>
+        </p:nvSpPr>
+        <p:spPr>
+          <a:xfrm>
+            <a:off x="463137" y="5718338"/>
+            <a:ext cx="2595582" cy="369332"/>
+          </a:xfrm>
+          <a:prstGeom prst="rect">
+            <a:avLst/>
+          </a:prstGeom>
+          <a:noFill/>
+        </p:spPr>
+        <p:txBody>
+          <a:bodyPr wrap="none" rtlCol="0">
+            <a:spAutoFit/>
+          </a:bodyPr>
+          <a:lstStyle/>
+          <a:p>
+            <a:r>
+              <a:rPr lang="en-US" i="1">
+                <a:latin typeface="Arial" charset="0"/>
+                <a:ea typeface="Arial" charset="0"/>
+                <a:cs typeface="Arial" charset="0"/>
+              </a:rPr>
+              <a:t>t</a:t>
+            </a:r>
+            <a:r>
+              <a:rPr lang="en-US">
+                <a:latin typeface="Arial" charset="0"/>
+                <a:ea typeface="Arial" charset="0"/>
+                <a:cs typeface="Arial" charset="0"/>
+              </a:rPr>
+              <a:t>(1, 80)=5.26, </a:t>
+            </a:r>
+            <a:r>
+              <a:rPr lang="en-US" i="1">
+                <a:latin typeface="Arial" charset="0"/>
+                <a:ea typeface="Arial" charset="0"/>
+                <a:cs typeface="Arial" charset="0"/>
+              </a:rPr>
+              <a:t>p</a:t>
+            </a:r>
+            <a:r>
+              <a:rPr lang="en-US">
+                <a:latin typeface="Arial" charset="0"/>
+                <a:ea typeface="Arial" charset="0"/>
+                <a:cs typeface="Arial" charset="0"/>
+              </a:rPr>
+              <a:t>&lt;0.0001</a:t>
+            </a:r>
+            <a:endParaRPr lang="en-US"/>
+          </a:p>
+        </p:txBody>
+      </p:sp>
+      <p:pic>
+        <p:nvPicPr>
+          <p:cNvPr id="5" name="Picture 4"/>
+          <p:cNvPicPr>
+            <a:picLocks noChangeAspect="1"/>
+          </p:cNvPicPr>
+          <p:nvPr/>
+        </p:nvPicPr>
+        <p:blipFill>
+          <a:blip r:embed="rId2">
+            <a:extLst>
+              <a:ext uri="{28A0092B-C50C-407E-A947-70E740481C1C}">
+                <a14:useLocalDpi xmlns:a14="http://schemas.microsoft.com/office/drawing/2010/main" val="0"/>
+              </a:ext>
+            </a:extLst>
+          </a:blip>
+          <a:stretch>
+            <a:fillRect/>
+          </a:stretch>
+        </p:blipFill>
+        <p:spPr>
+          <a:xfrm>
+            <a:off x="4289096" y="2581961"/>
+            <a:ext cx="3746582" cy="2954036"/>
+          </a:xfrm>
+          <a:prstGeom prst="rect">
+            <a:avLst/>
+          </a:prstGeom>
+        </p:spPr>
+      </p:pic>
+      <p:pic>
+        <p:nvPicPr>
+          <p:cNvPr id="12" name="Picture 11"/>
+          <p:cNvPicPr>
+            <a:picLocks noChangeAspect="1"/>
+          </p:cNvPicPr>
+          <p:nvPr/>
+        </p:nvPicPr>
+        <p:blipFill>
+          <a:blip r:embed="rId3">
+            <a:extLst>
+              <a:ext uri="{28A0092B-C50C-407E-A947-70E740481C1C}">
+                <a14:useLocalDpi xmlns:a14="http://schemas.microsoft.com/office/drawing/2010/main" val="0"/>
+              </a:ext>
+            </a:extLst>
+          </a:blip>
+          <a:stretch>
+            <a:fillRect/>
+          </a:stretch>
+        </p:blipFill>
+        <p:spPr>
+          <a:xfrm>
+            <a:off x="8445418" y="2581961"/>
+            <a:ext cx="3746582" cy="2954036"/>
+          </a:xfrm>
+          <a:prstGeom prst="rect">
+            <a:avLst/>
+          </a:prstGeom>
+        </p:spPr>
+      </p:pic>
+      <p:pic>
+        <p:nvPicPr>
+          <p:cNvPr id="13" name="Picture 12"/>
+          <p:cNvPicPr>
+            <a:picLocks noChangeAspect="1"/>
+          </p:cNvPicPr>
+          <p:nvPr/>
+        </p:nvPicPr>
+        <p:blipFill>
+          <a:blip r:embed="rId4">
+            <a:extLst>
+              <a:ext uri="{28A0092B-C50C-407E-A947-70E740481C1C}">
+                <a14:useLocalDpi xmlns:a14="http://schemas.microsoft.com/office/drawing/2010/main" val="0"/>
+              </a:ext>
+            </a:extLst>
+          </a:blip>
+          <a:stretch>
+            <a:fillRect/>
+          </a:stretch>
+        </p:blipFill>
+        <p:spPr>
+          <a:xfrm>
+            <a:off x="132774" y="2523768"/>
+            <a:ext cx="3746582" cy="2954036"/>
+          </a:xfrm>
+          <a:prstGeom prst="rect">
+            <a:avLst/>
+          </a:prstGeom>
+        </p:spPr>
+      </p:pic>
+      <p:sp>
+        <p:nvSpPr>
+          <p:cNvPr id="14" name="TextBox 13"/>
+          <p:cNvSpPr txBox="1"/>
+          <p:nvPr/>
+        </p:nvSpPr>
+        <p:spPr>
+          <a:xfrm>
+            <a:off x="4833425" y="5718338"/>
+            <a:ext cx="2339102" cy="369332"/>
+          </a:xfrm>
+          <a:prstGeom prst="rect">
+            <a:avLst/>
+          </a:prstGeom>
+          <a:noFill/>
+        </p:spPr>
+        <p:txBody>
+          <a:bodyPr wrap="none" rtlCol="0">
+            <a:spAutoFit/>
+          </a:bodyPr>
+          <a:lstStyle/>
+          <a:p>
+            <a:r>
+              <a:rPr lang="en-US" i="1" smtClean="0"/>
+              <a:t>t</a:t>
+            </a:r>
+            <a:r>
+              <a:rPr lang="en-US" smtClean="0"/>
+              <a:t>(1, 24)=0.81, </a:t>
+            </a:r>
+            <a:r>
+              <a:rPr lang="en-US" i="1" smtClean="0"/>
+              <a:t>p</a:t>
+            </a:r>
+            <a:r>
+              <a:rPr lang="en-US" smtClean="0"/>
+              <a:t>=0.43</a:t>
+            </a:r>
+            <a:endParaRPr lang="en-US" i="1"/>
+          </a:p>
+        </p:txBody>
+      </p:sp>
+      <p:sp>
+        <p:nvSpPr>
+          <p:cNvPr id="15" name="TextBox 14"/>
+          <p:cNvSpPr txBox="1"/>
+          <p:nvPr/>
+        </p:nvSpPr>
+        <p:spPr>
+          <a:xfrm>
+            <a:off x="8726552" y="5718338"/>
+            <a:ext cx="2595582" cy="369332"/>
+          </a:xfrm>
+          <a:prstGeom prst="rect">
+            <a:avLst/>
+          </a:prstGeom>
+          <a:noFill/>
+        </p:spPr>
+        <p:txBody>
+          <a:bodyPr wrap="none" rtlCol="0">
+            <a:spAutoFit/>
+          </a:bodyPr>
+          <a:lstStyle/>
+          <a:p>
+            <a:r>
+              <a:rPr lang="en-US" i="1" dirty="0" smtClean="0"/>
+              <a:t>t</a:t>
+            </a:r>
+            <a:r>
+              <a:rPr lang="en-US" dirty="0" smtClean="0"/>
+              <a:t>(1, 23)=3.22, </a:t>
+            </a:r>
+            <a:r>
+              <a:rPr lang="en-US" i="1" dirty="0" smtClean="0"/>
+              <a:t>p</a:t>
+            </a:r>
+            <a:r>
+              <a:rPr lang="en-US" dirty="0" smtClean="0"/>
+              <a:t>=0.0038</a:t>
+            </a:r>
+            <a:endParaRPr lang="en-US" i="1" dirty="0"/>
+          </a:p>
+        </p:txBody>
+      </p:sp>
+    </p:spTree>
+    <p:extLst>
+      <p:ext uri="{BB962C8B-B14F-4D97-AF65-F5344CB8AC3E}">
+        <p14:creationId xmlns:p14="http://schemas.microsoft.com/office/powerpoint/2010/main" val="540780543"/>
+      </p:ext>
+    </p:extLst>
+  </p:cSld>
+  <p:clrMapOvr>
+    <a:masterClrMapping/>
+  </p:clrMapOvr>
+  <p:timing>
+    <p:tnLst>
+      <p:par>
+        <p:cTn id="1" dur="indefinite" restart="never" nodeType="tmRoot"/>
+      </p:par>
+    </p:tnLst>
+  </p:timing>
+</p:sld>
+</file>
+
+<file path=ppt/slides/slide21.xml><?xml version="1.0" encoding="utf-8"?>
+<p:sld xmlns:a="http://schemas.openxmlformats.org/drawingml/2006/main" xmlns:r="http://schemas.openxmlformats.org/officeDocument/2006/relationships" xmlns:p="http://schemas.openxmlformats.org/presentationml/2006/main">
+  <p:cSld>
+    <p:spTree>
+      <p:nvGrpSpPr>
+        <p:cNvPr id="1" name=""/>
+        <p:cNvGrpSpPr/>
+        <p:nvPr/>
+      </p:nvGrpSpPr>
+      <p:grpSpPr>
+        <a:xfrm>
+          <a:off x="0" y="0"/>
+          <a:ext cx="0" cy="0"/>
+          <a:chOff x="0" y="0"/>
+          <a:chExt cx="0" cy="0"/>
+        </a:xfrm>
+      </p:grpSpPr>
+      <p:sp>
+        <p:nvSpPr>
+          <p:cNvPr id="2" name="TextBox 1"/>
+          <p:cNvSpPr txBox="1"/>
+          <p:nvPr/>
+        </p:nvSpPr>
+        <p:spPr>
+          <a:xfrm>
+            <a:off x="0" y="0"/>
+            <a:ext cx="12005953" cy="2769989"/>
+          </a:xfrm>
+          <a:prstGeom prst="rect">
+            <a:avLst/>
+          </a:prstGeom>
+          <a:noFill/>
+        </p:spPr>
+        <p:txBody>
+          <a:bodyPr wrap="square" rtlCol="0">
+            <a:spAutoFit/>
+          </a:bodyPr>
+          <a:lstStyle/>
+          <a:p>
+            <a:r>
+              <a:rPr lang="en-US" sz="2000" b="1" dirty="0" smtClean="0">
+                <a:latin typeface="Arial" charset="0"/>
+                <a:ea typeface="Arial" charset="0"/>
+                <a:cs typeface="Arial" charset="0"/>
+              </a:rPr>
+              <a:t>Model fits to real data</a:t>
+            </a:r>
+          </a:p>
+          <a:p>
+            <a:endParaRPr lang="en-US" sz="2000" b="1" dirty="0">
+              <a:latin typeface="Arial" charset="0"/>
+              <a:ea typeface="Arial" charset="0"/>
+              <a:cs typeface="Arial" charset="0"/>
+            </a:endParaRPr>
+          </a:p>
+          <a:p>
+            <a:r>
+              <a:rPr lang="en-US" sz="1600" dirty="0" smtClean="0">
+                <a:latin typeface="Arial" charset="0"/>
+                <a:ea typeface="Arial" charset="0"/>
+                <a:cs typeface="Arial" charset="0"/>
+              </a:rPr>
+              <a:t>When examining the parameters of the most parsimonious model in predators (model 3, reward learning with a single learning rate), we used multiple linear regression with cortisol, testosterone, gender, and the interactions between all three as independent variables, and learning rate as the dependent variable, with BMI included as a </a:t>
+            </a:r>
+            <a:r>
+              <a:rPr lang="en-US" sz="1600" dirty="0" smtClean="0">
+                <a:latin typeface="Arial" charset="0"/>
+                <a:ea typeface="Arial" charset="0"/>
+                <a:cs typeface="Arial" charset="0"/>
+              </a:rPr>
+              <a:t>covariate (largest VIF = 5.22). </a:t>
+            </a:r>
+            <a:r>
+              <a:rPr lang="en-US" sz="1600" dirty="0" smtClean="0">
+                <a:latin typeface="Arial" charset="0"/>
+                <a:ea typeface="Arial" charset="0"/>
+                <a:cs typeface="Arial" charset="0"/>
+              </a:rPr>
+              <a:t>We have a significant interaction between testosterone and cortisol, and a marginally significant 3-way interaction between testosterone, cortisol, and gender.</a:t>
+            </a:r>
+            <a:endParaRPr lang="en-US" sz="2000" b="1" dirty="0" smtClean="0">
+              <a:latin typeface="Arial" charset="0"/>
+              <a:ea typeface="Arial" charset="0"/>
+              <a:cs typeface="Arial" charset="0"/>
+            </a:endParaRPr>
+          </a:p>
+          <a:p>
+            <a:endParaRPr lang="en-US" sz="2000" b="1" dirty="0">
+              <a:latin typeface="Arial" charset="0"/>
+              <a:ea typeface="Arial" charset="0"/>
+              <a:cs typeface="Arial" charset="0"/>
+            </a:endParaRPr>
+          </a:p>
+          <a:p>
+            <a:endParaRPr lang="en-US" dirty="0" smtClean="0"/>
+          </a:p>
+          <a:p>
+            <a:endParaRPr lang="en-US" sz="1600" dirty="0"/>
+          </a:p>
+        </p:txBody>
+      </p:sp>
+      <p:pic>
+        <p:nvPicPr>
+          <p:cNvPr id="3" name="Picture 2"/>
+          <p:cNvPicPr>
+            <a:picLocks noChangeAspect="1"/>
+          </p:cNvPicPr>
+          <p:nvPr/>
+        </p:nvPicPr>
+        <p:blipFill>
+          <a:blip r:embed="rId2">
+            <a:extLst>
+              <a:ext uri="{28A0092B-C50C-407E-A947-70E740481C1C}">
+                <a14:useLocalDpi xmlns:a14="http://schemas.microsoft.com/office/drawing/2010/main" val="0"/>
+              </a:ext>
+            </a:extLst>
+          </a:blip>
+          <a:stretch>
+            <a:fillRect/>
+          </a:stretch>
+        </p:blipFill>
+        <p:spPr>
+          <a:xfrm>
+            <a:off x="6002976" y="1710045"/>
+            <a:ext cx="4698476" cy="4249057"/>
+          </a:xfrm>
+          <a:prstGeom prst="rect">
+            <a:avLst/>
+          </a:prstGeom>
+        </p:spPr>
+      </p:pic>
+      <p:pic>
+        <p:nvPicPr>
+          <p:cNvPr id="6" name="Picture 5"/>
+          <p:cNvPicPr>
+            <a:picLocks noChangeAspect="1"/>
+          </p:cNvPicPr>
+          <p:nvPr/>
+        </p:nvPicPr>
+        <p:blipFill>
+          <a:blip r:embed="rId3">
+            <a:extLst>
+              <a:ext uri="{28A0092B-C50C-407E-A947-70E740481C1C}">
+                <a14:useLocalDpi xmlns:a14="http://schemas.microsoft.com/office/drawing/2010/main" val="0"/>
+              </a:ext>
+            </a:extLst>
+          </a:blip>
+          <a:stretch>
+            <a:fillRect/>
+          </a:stretch>
+        </p:blipFill>
+        <p:spPr>
+          <a:xfrm>
+            <a:off x="1304500" y="1710045"/>
+            <a:ext cx="4698476" cy="4249057"/>
+          </a:xfrm>
+          <a:prstGeom prst="rect">
+            <a:avLst/>
+          </a:prstGeom>
+        </p:spPr>
+      </p:pic>
+      <p:sp>
+        <p:nvSpPr>
+          <p:cNvPr id="7" name="TextBox 6"/>
+          <p:cNvSpPr txBox="1"/>
+          <p:nvPr/>
+        </p:nvSpPr>
+        <p:spPr>
+          <a:xfrm>
+            <a:off x="1543791" y="5885539"/>
+            <a:ext cx="3724096" cy="369332"/>
+          </a:xfrm>
+          <a:prstGeom prst="rect">
+            <a:avLst/>
+          </a:prstGeom>
+          <a:noFill/>
+        </p:spPr>
+        <p:txBody>
+          <a:bodyPr wrap="none" rtlCol="0">
+            <a:spAutoFit/>
+          </a:bodyPr>
+          <a:lstStyle/>
+          <a:p>
+            <a:r>
+              <a:rPr lang="en-US" dirty="0" smtClean="0"/>
+              <a:t>TXC interaction: </a:t>
+            </a:r>
+            <a:r>
+              <a:rPr lang="en-US" i="1" dirty="0" smtClean="0"/>
+              <a:t>t</a:t>
+            </a:r>
+            <a:r>
+              <a:rPr lang="en-US" dirty="0" smtClean="0"/>
+              <a:t>=-2.80, </a:t>
+            </a:r>
+            <a:r>
+              <a:rPr lang="en-US" i="1" dirty="0" smtClean="0"/>
+              <a:t>p</a:t>
+            </a:r>
+            <a:r>
+              <a:rPr lang="en-US" dirty="0" smtClean="0"/>
+              <a:t>=0.0065</a:t>
+            </a:r>
+            <a:endParaRPr lang="en-US" dirty="0"/>
+          </a:p>
+        </p:txBody>
+      </p:sp>
+      <p:sp>
+        <p:nvSpPr>
+          <p:cNvPr id="16" name="TextBox 15"/>
+          <p:cNvSpPr txBox="1"/>
+          <p:nvPr/>
+        </p:nvSpPr>
+        <p:spPr>
+          <a:xfrm>
+            <a:off x="6156741" y="5885539"/>
+            <a:ext cx="4390946" cy="646331"/>
+          </a:xfrm>
+          <a:prstGeom prst="rect">
+            <a:avLst/>
+          </a:prstGeom>
+          <a:noFill/>
+        </p:spPr>
+        <p:txBody>
+          <a:bodyPr wrap="none" rtlCol="0">
+            <a:spAutoFit/>
+          </a:bodyPr>
+          <a:lstStyle/>
+          <a:p>
+            <a:r>
+              <a:rPr lang="en-US" dirty="0" err="1" smtClean="0"/>
+              <a:t>TXCXgender</a:t>
+            </a:r>
+            <a:r>
+              <a:rPr lang="en-US" dirty="0" smtClean="0"/>
+              <a:t> interaction: </a:t>
+            </a:r>
+            <a:r>
+              <a:rPr lang="en-US" i="1" dirty="0" smtClean="0"/>
+              <a:t>t</a:t>
+            </a:r>
+            <a:r>
+              <a:rPr lang="en-US" dirty="0" smtClean="0"/>
+              <a:t>=1.87, </a:t>
+            </a:r>
+            <a:r>
+              <a:rPr lang="en-US" i="1" dirty="0" smtClean="0"/>
+              <a:t>p</a:t>
+            </a:r>
+            <a:r>
+              <a:rPr lang="en-US" dirty="0" smtClean="0"/>
+              <a:t>=0.066</a:t>
+            </a:r>
+          </a:p>
+          <a:p>
+            <a:r>
+              <a:rPr lang="en-US" dirty="0" err="1" smtClean="0"/>
+              <a:t>Cxgender</a:t>
+            </a:r>
+            <a:r>
+              <a:rPr lang="en-US" dirty="0" smtClean="0"/>
+              <a:t> interaction: </a:t>
+            </a:r>
+            <a:r>
+              <a:rPr lang="en-US" i="1" dirty="0" smtClean="0"/>
+              <a:t>t</a:t>
+            </a:r>
+            <a:r>
+              <a:rPr lang="en-US" dirty="0" smtClean="0"/>
+              <a:t>=-2.192, </a:t>
+            </a:r>
+            <a:r>
+              <a:rPr lang="en-US" i="1" dirty="0" smtClean="0"/>
+              <a:t>p</a:t>
+            </a:r>
+            <a:r>
+              <a:rPr lang="en-US" dirty="0" smtClean="0"/>
+              <a:t>=0.031</a:t>
+            </a:r>
+            <a:endParaRPr lang="en-US" dirty="0"/>
+          </a:p>
+        </p:txBody>
+      </p:sp>
+      <p:sp>
+        <p:nvSpPr>
+          <p:cNvPr id="8" name="TextBox 7"/>
+          <p:cNvSpPr txBox="1"/>
+          <p:nvPr/>
+        </p:nvSpPr>
+        <p:spPr>
+          <a:xfrm>
+            <a:off x="3993451" y="6488668"/>
+            <a:ext cx="4019049" cy="369332"/>
+          </a:xfrm>
+          <a:prstGeom prst="rect">
+            <a:avLst/>
+          </a:prstGeom>
+          <a:noFill/>
+        </p:spPr>
+        <p:txBody>
+          <a:bodyPr wrap="none" rtlCol="0">
+            <a:spAutoFit/>
+          </a:bodyPr>
+          <a:lstStyle/>
+          <a:p>
+            <a:r>
+              <a:rPr lang="en-US" smtClean="0"/>
+              <a:t>Whole model: </a:t>
+            </a:r>
+            <a:r>
+              <a:rPr lang="en-US" i="1" smtClean="0"/>
+              <a:t>F</a:t>
+            </a:r>
+            <a:r>
+              <a:rPr lang="en-US" smtClean="0"/>
+              <a:t>(8, 76)=2.28, </a:t>
+            </a:r>
+            <a:r>
+              <a:rPr lang="en-US" i="1" smtClean="0"/>
+              <a:t>p</a:t>
+            </a:r>
+            <a:r>
+              <a:rPr lang="en-US" smtClean="0"/>
+              <a:t>=0.031</a:t>
+            </a:r>
+            <a:endParaRPr lang="en-US"/>
+          </a:p>
+        </p:txBody>
+      </p:sp>
+    </p:spTree>
+    <p:extLst>
+      <p:ext uri="{BB962C8B-B14F-4D97-AF65-F5344CB8AC3E}">
+        <p14:creationId xmlns:p14="http://schemas.microsoft.com/office/powerpoint/2010/main" val="1755058344"/>
+      </p:ext>
+    </p:extLst>
+  </p:cSld>
+  <p:clrMapOvr>
+    <a:masterClrMapping/>
+  </p:clrMapOvr>
+  <p:timing>
+    <p:tnLst>
+      <p:par>
+        <p:cTn id="1" dur="indefinite" restart="never" nodeType="tmRoot"/>
+      </p:par>
+    </p:tnLst>
+  </p:timing>
+</p:sld>
+</file>
+
+<file path=ppt/slides/slide22.xml><?xml version="1.0" encoding="utf-8"?>
+<p:sld xmlns:a="http://schemas.openxmlformats.org/drawingml/2006/main" xmlns:r="http://schemas.openxmlformats.org/officeDocument/2006/relationships" xmlns:p="http://schemas.openxmlformats.org/presentationml/2006/main">
+  <p:cSld>
+    <p:spTree>
+      <p:nvGrpSpPr>
+        <p:cNvPr id="1" name=""/>
+        <p:cNvGrpSpPr/>
+        <p:nvPr/>
+      </p:nvGrpSpPr>
+      <p:grpSpPr>
+        <a:xfrm>
+          <a:off x="0" y="0"/>
+          <a:ext cx="0" cy="0"/>
+          <a:chOff x="0" y="0"/>
+          <a:chExt cx="0" cy="0"/>
+        </a:xfrm>
+      </p:grpSpPr>
+      <p:sp>
+        <p:nvSpPr>
+          <p:cNvPr id="2" name="TextBox 1"/>
+          <p:cNvSpPr txBox="1"/>
+          <p:nvPr/>
+        </p:nvSpPr>
+        <p:spPr>
+          <a:xfrm>
+            <a:off x="0" y="0"/>
+            <a:ext cx="12005953" cy="4924425"/>
+          </a:xfrm>
+          <a:prstGeom prst="rect">
+            <a:avLst/>
+          </a:prstGeom>
+          <a:noFill/>
+        </p:spPr>
+        <p:txBody>
+          <a:bodyPr wrap="square" rtlCol="0">
+            <a:spAutoFit/>
+          </a:bodyPr>
+          <a:lstStyle/>
+          <a:p>
+            <a:r>
+              <a:rPr lang="en-US" sz="2000" b="1" dirty="0" smtClean="0">
+                <a:latin typeface="Arial" charset="0"/>
+                <a:ea typeface="Arial" charset="0"/>
+                <a:cs typeface="Arial" charset="0"/>
+              </a:rPr>
+              <a:t>Model fits to real data</a:t>
+            </a:r>
+          </a:p>
+          <a:p>
+            <a:endParaRPr lang="en-US" sz="2000" b="1" dirty="0">
+              <a:latin typeface="Arial" charset="0"/>
+              <a:ea typeface="Arial" charset="0"/>
+              <a:cs typeface="Arial" charset="0"/>
+            </a:endParaRPr>
+          </a:p>
+          <a:p>
+            <a:r>
+              <a:rPr lang="en-US" sz="1600" dirty="0" smtClean="0">
+                <a:latin typeface="Arial" charset="0"/>
+                <a:ea typeface="Arial" charset="0"/>
+                <a:cs typeface="Arial" charset="0"/>
+              </a:rPr>
+              <a:t>Because in our within subject design, subjects played over two sessions, starting either as predator or as prey, we feel that looking for a between subject effect is confounded. </a:t>
+            </a:r>
+          </a:p>
+          <a:p>
+            <a:endParaRPr lang="en-US" sz="1600" dirty="0">
+              <a:latin typeface="Arial" charset="0"/>
+              <a:ea typeface="Arial" charset="0"/>
+              <a:cs typeface="Arial" charset="0"/>
+            </a:endParaRPr>
+          </a:p>
+          <a:p>
+            <a:r>
+              <a:rPr lang="en-US" sz="1600" dirty="0" smtClean="0">
+                <a:latin typeface="Arial" charset="0"/>
+                <a:ea typeface="Arial" charset="0"/>
+                <a:cs typeface="Arial" charset="0"/>
+              </a:rPr>
+              <a:t>For example, a multiple regression with testosterone, cortisol, and distribution included as independent variables and learning rate as the response variable, with BMI and session as covariates, the variance inflation factor reaches </a:t>
+            </a:r>
+            <a:r>
+              <a:rPr lang="en-US" sz="1600" dirty="0" err="1" smtClean="0">
+                <a:latin typeface="Arial" charset="0"/>
+                <a:ea typeface="Arial" charset="0"/>
+                <a:cs typeface="Arial" charset="0"/>
+              </a:rPr>
+              <a:t>unacceptible</a:t>
+            </a:r>
+            <a:r>
+              <a:rPr lang="en-US" sz="1600" dirty="0" smtClean="0">
+                <a:latin typeface="Arial" charset="0"/>
+                <a:ea typeface="Arial" charset="0"/>
+                <a:cs typeface="Arial" charset="0"/>
+              </a:rPr>
+              <a:t> levels, VIF=15.08 for </a:t>
+            </a:r>
+            <a:r>
+              <a:rPr lang="en-US" sz="1600" dirty="0" err="1" smtClean="0">
+                <a:latin typeface="Arial" charset="0"/>
+                <a:ea typeface="Arial" charset="0"/>
+                <a:cs typeface="Arial" charset="0"/>
+              </a:rPr>
+              <a:t>TXCXdistribution</a:t>
+            </a:r>
+            <a:r>
+              <a:rPr lang="en-US" sz="1600" dirty="0" smtClean="0">
+                <a:latin typeface="Arial" charset="0"/>
+                <a:ea typeface="Arial" charset="0"/>
+                <a:cs typeface="Arial" charset="0"/>
+              </a:rPr>
+              <a:t>, and a VIF=15.57 for TXC. With distribution included only as an additive term, VIF’s all &lt;2. However, this analysis reveals a marginally significant effect of session, </a:t>
+            </a:r>
+            <a:r>
+              <a:rPr lang="en-US" sz="1600" i="1" dirty="0" smtClean="0">
+                <a:latin typeface="Arial" charset="0"/>
+                <a:ea typeface="Arial" charset="0"/>
+                <a:cs typeface="Arial" charset="0"/>
+              </a:rPr>
+              <a:t>t</a:t>
+            </a:r>
+            <a:r>
+              <a:rPr lang="en-US" sz="1600" dirty="0" smtClean="0">
+                <a:latin typeface="Arial" charset="0"/>
+                <a:ea typeface="Arial" charset="0"/>
+                <a:cs typeface="Arial" charset="0"/>
+              </a:rPr>
+              <a:t>=-2.01, </a:t>
+            </a:r>
+            <a:r>
+              <a:rPr lang="en-US" sz="1600" i="1" dirty="0" smtClean="0">
+                <a:latin typeface="Arial" charset="0"/>
+                <a:ea typeface="Arial" charset="0"/>
+                <a:cs typeface="Arial" charset="0"/>
+              </a:rPr>
+              <a:t>p</a:t>
+            </a:r>
+            <a:r>
+              <a:rPr lang="en-US" sz="1600" dirty="0" smtClean="0">
+                <a:latin typeface="Arial" charset="0"/>
+                <a:ea typeface="Arial" charset="0"/>
+                <a:cs typeface="Arial" charset="0"/>
+              </a:rPr>
+              <a:t>=0.061. </a:t>
+            </a:r>
+          </a:p>
+          <a:p>
+            <a:endParaRPr lang="en-US" sz="1600" dirty="0">
+              <a:latin typeface="Arial" charset="0"/>
+              <a:ea typeface="Arial" charset="0"/>
+              <a:cs typeface="Arial" charset="0"/>
+            </a:endParaRPr>
+          </a:p>
+          <a:p>
+            <a:r>
+              <a:rPr lang="en-US" sz="1600" dirty="0" smtClean="0">
+                <a:latin typeface="Arial" charset="0"/>
+                <a:ea typeface="Arial" charset="0"/>
+                <a:cs typeface="Arial" charset="0"/>
+              </a:rPr>
+              <a:t>Nevertheless, I’ve included the plot here with testosterone, cortisol, and their interaction, as well as distribution (as an additive term) as independent variables, and BMI and session as covariates (both marginally significant, session: </a:t>
+            </a:r>
+            <a:r>
+              <a:rPr lang="en-US" sz="1600" i="1" dirty="0">
+                <a:latin typeface="Arial" charset="0"/>
+                <a:ea typeface="Arial" charset="0"/>
+                <a:cs typeface="Arial" charset="0"/>
+              </a:rPr>
+              <a:t>t</a:t>
+            </a:r>
+            <a:r>
+              <a:rPr lang="en-US" sz="1600" dirty="0">
+                <a:latin typeface="Arial" charset="0"/>
+                <a:ea typeface="Arial" charset="0"/>
+                <a:cs typeface="Arial" charset="0"/>
+              </a:rPr>
+              <a:t>=-2.01, </a:t>
+            </a:r>
+            <a:r>
+              <a:rPr lang="en-US" sz="1600" i="1" dirty="0" smtClean="0">
+                <a:latin typeface="Arial" charset="0"/>
+                <a:ea typeface="Arial" charset="0"/>
+                <a:cs typeface="Arial" charset="0"/>
+              </a:rPr>
+              <a:t>p</a:t>
+            </a:r>
+            <a:r>
+              <a:rPr lang="en-US" sz="1600" dirty="0" smtClean="0">
+                <a:latin typeface="Arial" charset="0"/>
+                <a:ea typeface="Arial" charset="0"/>
+                <a:cs typeface="Arial" charset="0"/>
+              </a:rPr>
+              <a:t>=0.061, BMI: </a:t>
+            </a:r>
+            <a:r>
+              <a:rPr lang="en-US" sz="1600" i="1" dirty="0" smtClean="0">
+                <a:latin typeface="Arial" charset="0"/>
+                <a:ea typeface="Arial" charset="0"/>
+                <a:cs typeface="Arial" charset="0"/>
+              </a:rPr>
+              <a:t>t</a:t>
+            </a:r>
+            <a:r>
+              <a:rPr lang="en-US" sz="1600" dirty="0" smtClean="0">
+                <a:latin typeface="Arial" charset="0"/>
+                <a:ea typeface="Arial" charset="0"/>
+                <a:cs typeface="Arial" charset="0"/>
+              </a:rPr>
+              <a:t>=1.77, </a:t>
+            </a:r>
+            <a:r>
+              <a:rPr lang="en-US" sz="1600" i="1" dirty="0" smtClean="0">
+                <a:latin typeface="Arial" charset="0"/>
+                <a:ea typeface="Arial" charset="0"/>
+                <a:cs typeface="Arial" charset="0"/>
+              </a:rPr>
+              <a:t>p</a:t>
+            </a:r>
+            <a:r>
+              <a:rPr lang="en-US" sz="1600" dirty="0" smtClean="0">
+                <a:latin typeface="Arial" charset="0"/>
+                <a:ea typeface="Arial" charset="0"/>
+                <a:cs typeface="Arial" charset="0"/>
+              </a:rPr>
+              <a:t>=0.094).</a:t>
+            </a:r>
+          </a:p>
+          <a:p>
+            <a:endParaRPr lang="en-US" sz="1600" dirty="0">
+              <a:latin typeface="Arial" charset="0"/>
+              <a:ea typeface="Arial" charset="0"/>
+              <a:cs typeface="Arial" charset="0"/>
+            </a:endParaRPr>
+          </a:p>
+          <a:p>
+            <a:r>
+              <a:rPr lang="en-US" sz="1600" dirty="0" smtClean="0">
+                <a:latin typeface="Arial" charset="0"/>
+                <a:ea typeface="Arial" charset="0"/>
+                <a:cs typeface="Arial" charset="0"/>
+              </a:rPr>
+              <a:t>For the between subject dataset with 50 participants, the VIF for distribution is also high</a:t>
+            </a:r>
+            <a:r>
+              <a:rPr lang="en-US" sz="1600" dirty="0">
+                <a:latin typeface="Arial" charset="0"/>
+                <a:ea typeface="Arial" charset="0"/>
+                <a:cs typeface="Arial" charset="0"/>
+              </a:rPr>
+              <a:t>: </a:t>
+            </a:r>
+            <a:r>
+              <a:rPr lang="en-US" sz="1600" dirty="0" smtClean="0">
+                <a:latin typeface="Arial" charset="0"/>
+                <a:ea typeface="Arial" charset="0"/>
+                <a:cs typeface="Arial" charset="0"/>
+              </a:rPr>
+              <a:t>VIF=9.90 for </a:t>
+            </a:r>
+            <a:r>
+              <a:rPr lang="en-US" sz="1600" dirty="0" err="1">
+                <a:latin typeface="Arial" charset="0"/>
+                <a:ea typeface="Arial" charset="0"/>
+                <a:cs typeface="Arial" charset="0"/>
+              </a:rPr>
+              <a:t>TXCXdistribution</a:t>
+            </a:r>
+            <a:r>
+              <a:rPr lang="en-US" sz="1600" dirty="0">
+                <a:latin typeface="Arial" charset="0"/>
+                <a:ea typeface="Arial" charset="0"/>
+                <a:cs typeface="Arial" charset="0"/>
+              </a:rPr>
+              <a:t>, and a </a:t>
+            </a:r>
+            <a:r>
+              <a:rPr lang="en-US" sz="1600" dirty="0" smtClean="0">
+                <a:latin typeface="Arial" charset="0"/>
+                <a:ea typeface="Arial" charset="0"/>
+                <a:cs typeface="Arial" charset="0"/>
+              </a:rPr>
+              <a:t>VIF=9.48 </a:t>
+            </a:r>
+            <a:r>
+              <a:rPr lang="en-US" sz="1600" dirty="0">
+                <a:latin typeface="Arial" charset="0"/>
+                <a:ea typeface="Arial" charset="0"/>
+                <a:cs typeface="Arial" charset="0"/>
+              </a:rPr>
+              <a:t>for </a:t>
+            </a:r>
+            <a:r>
+              <a:rPr lang="en-US" sz="1600" dirty="0" smtClean="0">
+                <a:latin typeface="Arial" charset="0"/>
+                <a:ea typeface="Arial" charset="0"/>
+                <a:cs typeface="Arial" charset="0"/>
+              </a:rPr>
+              <a:t>TXC. Nevertheless, I have included it here with the same model as that stipulated for the within subject design mentioned in the previous comment. </a:t>
+            </a:r>
+            <a:endParaRPr lang="en-US" sz="2000" b="1" dirty="0">
+              <a:latin typeface="Arial" charset="0"/>
+              <a:ea typeface="Arial" charset="0"/>
+              <a:cs typeface="Arial" charset="0"/>
+            </a:endParaRPr>
+          </a:p>
+          <a:p>
+            <a:endParaRPr lang="en-US" dirty="0" smtClean="0"/>
+          </a:p>
+          <a:p>
+            <a:endParaRPr lang="en-US" sz="1600" dirty="0"/>
+          </a:p>
+        </p:txBody>
+      </p:sp>
+    </p:spTree>
+    <p:extLst>
+      <p:ext uri="{BB962C8B-B14F-4D97-AF65-F5344CB8AC3E}">
+        <p14:creationId xmlns:p14="http://schemas.microsoft.com/office/powerpoint/2010/main" val="95456575"/>
+      </p:ext>
+    </p:extLst>
+  </p:cSld>
+  <p:clrMapOvr>
+    <a:masterClrMapping/>
+  </p:clrMapOvr>
+  <p:timing>
+    <p:tnLst>
+      <p:par>
+        <p:cTn id="1" dur="indefinite" restart="never" nodeType="tmRoot"/>
+      </p:par>
+    </p:tnLst>
+  </p:timing>
+</p:sld>
+</file>
+
+<file path=ppt/slides/slide23.xml><?xml version="1.0" encoding="utf-8"?>
+<p:sld xmlns:a="http://schemas.openxmlformats.org/drawingml/2006/main" xmlns:r="http://schemas.openxmlformats.org/officeDocument/2006/relationships" xmlns:p="http://schemas.openxmlformats.org/presentationml/2006/main">
+  <p:cSld>
+    <p:spTree>
+      <p:nvGrpSpPr>
+        <p:cNvPr id="1" name=""/>
+        <p:cNvGrpSpPr/>
+        <p:nvPr/>
+      </p:nvGrpSpPr>
+      <p:grpSpPr>
+        <a:xfrm>
+          <a:off x="0" y="0"/>
+          <a:ext cx="0" cy="0"/>
+          <a:chOff x="0" y="0"/>
+          <a:chExt cx="0" cy="0"/>
+        </a:xfrm>
+      </p:grpSpPr>
+      <p:sp>
+        <p:nvSpPr>
+          <p:cNvPr id="2" name="TextBox 1"/>
+          <p:cNvSpPr txBox="1"/>
+          <p:nvPr/>
+        </p:nvSpPr>
+        <p:spPr>
+          <a:xfrm>
+            <a:off x="0" y="0"/>
+            <a:ext cx="12005953" cy="1538883"/>
+          </a:xfrm>
+          <a:prstGeom prst="rect">
+            <a:avLst/>
+          </a:prstGeom>
+          <a:noFill/>
+        </p:spPr>
+        <p:txBody>
+          <a:bodyPr wrap="square" rtlCol="0">
+            <a:spAutoFit/>
+          </a:bodyPr>
+          <a:lstStyle/>
+          <a:p>
+            <a:r>
+              <a:rPr lang="en-US" sz="2000" b="1" dirty="0" smtClean="0">
+                <a:latin typeface="Arial" charset="0"/>
+                <a:ea typeface="Arial" charset="0"/>
+                <a:cs typeface="Arial" charset="0"/>
+              </a:rPr>
+              <a:t>Model fits to real data</a:t>
+            </a:r>
+          </a:p>
+          <a:p>
+            <a:endParaRPr lang="en-US" sz="2000" b="1" dirty="0">
+              <a:latin typeface="Arial" charset="0"/>
+              <a:ea typeface="Arial" charset="0"/>
+              <a:cs typeface="Arial" charset="0"/>
+            </a:endParaRPr>
+          </a:p>
+          <a:p>
+            <a:endParaRPr lang="en-US" sz="2000" b="1" dirty="0">
+              <a:latin typeface="Arial" charset="0"/>
+              <a:ea typeface="Arial" charset="0"/>
+              <a:cs typeface="Arial" charset="0"/>
+            </a:endParaRPr>
+          </a:p>
+          <a:p>
+            <a:endParaRPr lang="en-US" dirty="0" smtClean="0"/>
+          </a:p>
+          <a:p>
+            <a:endParaRPr lang="en-US" sz="1600" dirty="0"/>
+          </a:p>
+        </p:txBody>
+      </p:sp>
+      <p:pic>
+        <p:nvPicPr>
+          <p:cNvPr id="6" name="Picture 5"/>
+          <p:cNvPicPr>
+            <a:picLocks noChangeAspect="1"/>
+          </p:cNvPicPr>
+          <p:nvPr/>
+        </p:nvPicPr>
+        <p:blipFill>
+          <a:blip r:embed="rId2">
+            <a:extLst>
+              <a:ext uri="{28A0092B-C50C-407E-A947-70E740481C1C}">
+                <a14:useLocalDpi xmlns:a14="http://schemas.microsoft.com/office/drawing/2010/main" val="0"/>
+              </a:ext>
+            </a:extLst>
+          </a:blip>
+          <a:stretch>
+            <a:fillRect/>
+          </a:stretch>
+        </p:blipFill>
+        <p:spPr>
+          <a:xfrm>
+            <a:off x="6754783" y="780144"/>
+            <a:ext cx="4698476" cy="4249056"/>
+          </a:xfrm>
+          <a:prstGeom prst="rect">
+            <a:avLst/>
+          </a:prstGeom>
+        </p:spPr>
+      </p:pic>
+      <p:pic>
+        <p:nvPicPr>
+          <p:cNvPr id="7" name="Picture 6"/>
+          <p:cNvPicPr>
+            <a:picLocks noChangeAspect="1"/>
+          </p:cNvPicPr>
+          <p:nvPr/>
+        </p:nvPicPr>
+        <p:blipFill>
+          <a:blip r:embed="rId3">
+            <a:extLst>
+              <a:ext uri="{28A0092B-C50C-407E-A947-70E740481C1C}">
+                <a14:useLocalDpi xmlns:a14="http://schemas.microsoft.com/office/drawing/2010/main" val="0"/>
+              </a:ext>
+            </a:extLst>
+          </a:blip>
+          <a:stretch>
+            <a:fillRect/>
+          </a:stretch>
+        </p:blipFill>
+        <p:spPr>
+          <a:xfrm>
+            <a:off x="1185747" y="780144"/>
+            <a:ext cx="4698476" cy="4249056"/>
+          </a:xfrm>
+          <a:prstGeom prst="rect">
+            <a:avLst/>
+          </a:prstGeom>
+        </p:spPr>
+      </p:pic>
+      <p:sp>
+        <p:nvSpPr>
+          <p:cNvPr id="4" name="TextBox 3"/>
+          <p:cNvSpPr txBox="1"/>
+          <p:nvPr/>
+        </p:nvSpPr>
+        <p:spPr>
+          <a:xfrm>
+            <a:off x="2220686" y="5029200"/>
+            <a:ext cx="1672253" cy="369332"/>
+          </a:xfrm>
+          <a:prstGeom prst="rect">
+            <a:avLst/>
+          </a:prstGeom>
+          <a:noFill/>
+        </p:spPr>
+        <p:txBody>
+          <a:bodyPr wrap="none" rtlCol="0">
+            <a:spAutoFit/>
+          </a:bodyPr>
+          <a:lstStyle/>
+          <a:p>
+            <a:r>
+              <a:rPr lang="en-US" i="1" smtClean="0"/>
+              <a:t>t</a:t>
+            </a:r>
+            <a:r>
+              <a:rPr lang="en-US" smtClean="0"/>
+              <a:t>=0.80, </a:t>
+            </a:r>
+            <a:r>
+              <a:rPr lang="en-US" i="1" smtClean="0"/>
+              <a:t>p</a:t>
+            </a:r>
+            <a:r>
+              <a:rPr lang="en-US" smtClean="0"/>
+              <a:t>=0.44</a:t>
+            </a:r>
+            <a:endParaRPr lang="en-US" i="1"/>
+          </a:p>
+        </p:txBody>
+      </p:sp>
+      <p:sp>
+        <p:nvSpPr>
+          <p:cNvPr id="9" name="TextBox 8"/>
+          <p:cNvSpPr txBox="1"/>
+          <p:nvPr/>
+        </p:nvSpPr>
+        <p:spPr>
+          <a:xfrm>
+            <a:off x="7716983" y="5029200"/>
+            <a:ext cx="3172663" cy="923330"/>
+          </a:xfrm>
+          <a:prstGeom prst="rect">
+            <a:avLst/>
+          </a:prstGeom>
+          <a:noFill/>
+        </p:spPr>
+        <p:txBody>
+          <a:bodyPr wrap="none" rtlCol="0">
+            <a:spAutoFit/>
+          </a:bodyPr>
+          <a:lstStyle/>
+          <a:p>
+            <a:r>
+              <a:rPr lang="en-US" dirty="0" err="1" smtClean="0"/>
+              <a:t>TXCXdistrib</a:t>
+            </a:r>
+            <a:r>
+              <a:rPr lang="en-US" dirty="0" smtClean="0"/>
+              <a:t>: </a:t>
+            </a:r>
+            <a:r>
+              <a:rPr lang="en-US" i="1" dirty="0" smtClean="0"/>
+              <a:t>t</a:t>
+            </a:r>
+            <a:r>
+              <a:rPr lang="en-US" dirty="0" smtClean="0"/>
+              <a:t>=-2.47 </a:t>
+            </a:r>
+            <a:r>
+              <a:rPr lang="en-US" i="1" dirty="0" smtClean="0"/>
+              <a:t>p</a:t>
+            </a:r>
+            <a:r>
+              <a:rPr lang="en-US" dirty="0" smtClean="0"/>
+              <a:t>=0.025</a:t>
+            </a:r>
+          </a:p>
+          <a:p>
+            <a:r>
+              <a:rPr lang="en-US" dirty="0" smtClean="0"/>
+              <a:t>TXC</a:t>
+            </a:r>
+            <a:r>
+              <a:rPr lang="en-US" dirty="0"/>
+              <a:t>: </a:t>
+            </a:r>
+            <a:r>
+              <a:rPr lang="en-US" i="1" dirty="0" smtClean="0"/>
+              <a:t>t</a:t>
+            </a:r>
+            <a:r>
+              <a:rPr lang="en-US" dirty="0" smtClean="0"/>
+              <a:t>=3.05, </a:t>
+            </a:r>
+            <a:r>
+              <a:rPr lang="en-US" i="1" dirty="0" smtClean="0"/>
+              <a:t>p</a:t>
+            </a:r>
+            <a:r>
+              <a:rPr lang="en-US" dirty="0" smtClean="0"/>
+              <a:t>=0.0076</a:t>
+            </a:r>
+            <a:endParaRPr lang="en-US" dirty="0"/>
+          </a:p>
+          <a:p>
+            <a:endParaRPr lang="en-US" dirty="0"/>
+          </a:p>
+        </p:txBody>
+      </p:sp>
+      <p:sp>
+        <p:nvSpPr>
+          <p:cNvPr id="5" name="TextBox 4"/>
+          <p:cNvSpPr txBox="1"/>
+          <p:nvPr/>
+        </p:nvSpPr>
+        <p:spPr>
+          <a:xfrm>
+            <a:off x="403761" y="6377049"/>
+            <a:ext cx="10559301" cy="369332"/>
+          </a:xfrm>
+          <a:prstGeom prst="rect">
+            <a:avLst/>
+          </a:prstGeom>
+          <a:noFill/>
+        </p:spPr>
+        <p:txBody>
+          <a:bodyPr wrap="none" rtlCol="0">
+            <a:spAutoFit/>
+          </a:bodyPr>
+          <a:lstStyle/>
+          <a:p>
+            <a:r>
+              <a:rPr lang="en-US" dirty="0" smtClean="0"/>
+              <a:t>When distribution is removed as an interaction term in the </a:t>
+            </a:r>
+            <a:r>
+              <a:rPr lang="en-US" dirty="0" err="1" smtClean="0"/>
+              <a:t>ital</a:t>
+            </a:r>
+            <a:r>
+              <a:rPr lang="en-US" dirty="0" smtClean="0"/>
+              <a:t> dataset (right plot), nothing is significant</a:t>
+            </a:r>
+            <a:endParaRPr lang="en-US" dirty="0"/>
+          </a:p>
+        </p:txBody>
+      </p:sp>
+    </p:spTree>
+    <p:extLst>
+      <p:ext uri="{BB962C8B-B14F-4D97-AF65-F5344CB8AC3E}">
+        <p14:creationId xmlns:p14="http://schemas.microsoft.com/office/powerpoint/2010/main" val="794910567"/>
+      </p:ext>
+    </p:extLst>
+  </p:cSld>
+  <p:clrMapOvr>
+    <a:masterClrMapping/>
+  </p:clrMapOvr>
+  <p:timing>
+    <p:tnLst>
+      <p:par>
+        <p:cTn id="1" dur="indefinite" restart="never" nodeType="tmRoot"/>
+      </p:par>
+    </p:tnLst>
+  </p:timing>
+</p:sld>
+</file>
+
+<file path=ppt/slides/slide24.xml><?xml version="1.0" encoding="utf-8"?>
+<p:sld xmlns:a="http://schemas.openxmlformats.org/drawingml/2006/main" xmlns:r="http://schemas.openxmlformats.org/officeDocument/2006/relationships" xmlns:p="http://schemas.openxmlformats.org/presentationml/2006/main">
+  <p:cSld>
+    <p:spTree>
+      <p:nvGrpSpPr>
+        <p:cNvPr id="1" name=""/>
+        <p:cNvGrpSpPr/>
+        <p:nvPr/>
+      </p:nvGrpSpPr>
+      <p:grpSpPr>
+        <a:xfrm>
+          <a:off x="0" y="0"/>
+          <a:ext cx="0" cy="0"/>
+          <a:chOff x="0" y="0"/>
+          <a:chExt cx="0" cy="0"/>
+        </a:xfrm>
+      </p:grpSpPr>
+      <p:sp>
+        <p:nvSpPr>
+          <p:cNvPr id="2" name="TextBox 1"/>
+          <p:cNvSpPr txBox="1"/>
+          <p:nvPr/>
+        </p:nvSpPr>
+        <p:spPr>
+          <a:xfrm>
+            <a:off x="0" y="0"/>
+            <a:ext cx="12005953" cy="1538883"/>
+          </a:xfrm>
+          <a:prstGeom prst="rect">
+            <a:avLst/>
+          </a:prstGeom>
+          <a:noFill/>
+        </p:spPr>
+        <p:txBody>
+          <a:bodyPr wrap="square" rtlCol="0">
+            <a:spAutoFit/>
+          </a:bodyPr>
+          <a:lstStyle/>
+          <a:p>
+            <a:r>
+              <a:rPr lang="en-US" sz="2000" b="1" dirty="0" smtClean="0">
+                <a:latin typeface="Arial" charset="0"/>
+                <a:ea typeface="Arial" charset="0"/>
+                <a:cs typeface="Arial" charset="0"/>
+              </a:rPr>
+              <a:t>Model fits to real data</a:t>
+            </a:r>
+          </a:p>
+          <a:p>
+            <a:endParaRPr lang="en-US" sz="2000" b="1" dirty="0">
+              <a:latin typeface="Arial" charset="0"/>
+              <a:ea typeface="Arial" charset="0"/>
+              <a:cs typeface="Arial" charset="0"/>
+            </a:endParaRPr>
+          </a:p>
+          <a:p>
+            <a:endParaRPr lang="en-US" sz="2000" b="1" dirty="0">
+              <a:latin typeface="Arial" charset="0"/>
+              <a:ea typeface="Arial" charset="0"/>
+              <a:cs typeface="Arial" charset="0"/>
+            </a:endParaRPr>
+          </a:p>
+          <a:p>
+            <a:endParaRPr lang="en-US" dirty="0" smtClean="0"/>
+          </a:p>
+          <a:p>
+            <a:endParaRPr lang="en-US" sz="1600" dirty="0"/>
+          </a:p>
+        </p:txBody>
+      </p:sp>
+      <p:pic>
+        <p:nvPicPr>
+          <p:cNvPr id="7" name="Picture 6"/>
+          <p:cNvPicPr>
+            <a:picLocks noChangeAspect="1"/>
+          </p:cNvPicPr>
+          <p:nvPr/>
+        </p:nvPicPr>
+        <p:blipFill>
+          <a:blip r:embed="rId2">
+            <a:extLst>
+              <a:ext uri="{28A0092B-C50C-407E-A947-70E740481C1C}">
+                <a14:useLocalDpi xmlns:a14="http://schemas.microsoft.com/office/drawing/2010/main" val="0"/>
+              </a:ext>
+            </a:extLst>
+          </a:blip>
+          <a:stretch>
+            <a:fillRect/>
+          </a:stretch>
+        </p:blipFill>
+        <p:spPr>
+          <a:xfrm>
+            <a:off x="1185747" y="780144"/>
+            <a:ext cx="4698476" cy="4249056"/>
+          </a:xfrm>
+          <a:prstGeom prst="rect">
+            <a:avLst/>
+          </a:prstGeom>
+        </p:spPr>
+      </p:pic>
+      <p:sp>
+        <p:nvSpPr>
+          <p:cNvPr id="4" name="TextBox 3"/>
+          <p:cNvSpPr txBox="1"/>
+          <p:nvPr/>
+        </p:nvSpPr>
+        <p:spPr>
+          <a:xfrm>
+            <a:off x="2529444" y="5029200"/>
+            <a:ext cx="2467342" cy="923330"/>
+          </a:xfrm>
+          <a:prstGeom prst="rect">
+            <a:avLst/>
+          </a:prstGeom>
+          <a:noFill/>
+        </p:spPr>
+        <p:txBody>
+          <a:bodyPr wrap="none" rtlCol="0">
+            <a:spAutoFit/>
+          </a:bodyPr>
+          <a:lstStyle/>
+          <a:p>
+            <a:r>
+              <a:rPr lang="en-US" i="1" dirty="0" smtClean="0"/>
+              <a:t>t</a:t>
+            </a:r>
+            <a:r>
+              <a:rPr lang="en-US" dirty="0" smtClean="0"/>
+              <a:t>=0.80, </a:t>
+            </a:r>
+            <a:r>
+              <a:rPr lang="en-US" i="1" dirty="0" smtClean="0"/>
+              <a:t>p</a:t>
+            </a:r>
+            <a:r>
+              <a:rPr lang="en-US" dirty="0" smtClean="0"/>
+              <a:t>=0.44</a:t>
+            </a:r>
+          </a:p>
+          <a:p>
+            <a:r>
+              <a:rPr lang="en-US" dirty="0"/>
+              <a:t>(</a:t>
+            </a:r>
+            <a:r>
+              <a:rPr lang="en-US" dirty="0" err="1"/>
+              <a:t>cort</a:t>
+            </a:r>
+            <a:r>
+              <a:rPr lang="en-US" dirty="0"/>
+              <a:t>: </a:t>
+            </a:r>
+            <a:r>
+              <a:rPr lang="en-US" i="1" dirty="0" smtClean="0"/>
+              <a:t>t</a:t>
+            </a:r>
+            <a:r>
+              <a:rPr lang="en-US" dirty="0" smtClean="0"/>
+              <a:t>=2.05, </a:t>
+            </a:r>
+            <a:r>
+              <a:rPr lang="en-US" i="1" dirty="0" smtClean="0"/>
+              <a:t>p</a:t>
+            </a:r>
+            <a:r>
+              <a:rPr lang="en-US" dirty="0" smtClean="0"/>
+              <a:t>=0.056)</a:t>
+            </a:r>
+            <a:endParaRPr lang="en-US" dirty="0"/>
+          </a:p>
+          <a:p>
+            <a:endParaRPr lang="en-US" i="1" dirty="0"/>
+          </a:p>
+        </p:txBody>
+      </p:sp>
+      <p:sp>
+        <p:nvSpPr>
+          <p:cNvPr id="9" name="TextBox 8"/>
+          <p:cNvSpPr txBox="1"/>
+          <p:nvPr/>
+        </p:nvSpPr>
+        <p:spPr>
+          <a:xfrm>
+            <a:off x="7513477" y="5029200"/>
+            <a:ext cx="2863220" cy="923330"/>
+          </a:xfrm>
+          <a:prstGeom prst="rect">
+            <a:avLst/>
+          </a:prstGeom>
+          <a:noFill/>
+        </p:spPr>
+        <p:txBody>
+          <a:bodyPr wrap="none" rtlCol="0">
+            <a:spAutoFit/>
+          </a:bodyPr>
+          <a:lstStyle/>
+          <a:p>
+            <a:r>
+              <a:rPr lang="en-US" dirty="0" smtClean="0"/>
+              <a:t>T, C, and TXC all </a:t>
+            </a:r>
+            <a:r>
+              <a:rPr lang="en-US" i="1" dirty="0" smtClean="0"/>
+              <a:t>p</a:t>
+            </a:r>
+            <a:r>
+              <a:rPr lang="en-US" dirty="0" smtClean="0"/>
+              <a:t>’s&gt;0.19</a:t>
+            </a:r>
+          </a:p>
+          <a:p>
+            <a:r>
+              <a:rPr lang="en-US" dirty="0" smtClean="0"/>
+              <a:t>(</a:t>
+            </a:r>
+            <a:r>
+              <a:rPr lang="en-US" dirty="0" err="1" smtClean="0"/>
+              <a:t>cort</a:t>
+            </a:r>
+            <a:r>
+              <a:rPr lang="en-US" dirty="0" smtClean="0"/>
+              <a:t>: </a:t>
+            </a:r>
+            <a:r>
+              <a:rPr lang="en-US" i="1" dirty="0" smtClean="0"/>
+              <a:t>t</a:t>
+            </a:r>
+            <a:r>
+              <a:rPr lang="en-US" dirty="0" smtClean="0"/>
+              <a:t>=-1.3, </a:t>
+            </a:r>
+            <a:r>
+              <a:rPr lang="en-US" i="1" dirty="0" smtClean="0"/>
+              <a:t>p</a:t>
+            </a:r>
+            <a:r>
+              <a:rPr lang="en-US" dirty="0" smtClean="0"/>
+              <a:t>=0.19)</a:t>
+            </a:r>
+            <a:endParaRPr lang="en-US" dirty="0"/>
+          </a:p>
+          <a:p>
+            <a:endParaRPr lang="en-US" dirty="0"/>
+          </a:p>
+        </p:txBody>
+      </p:sp>
+      <p:sp>
+        <p:nvSpPr>
+          <p:cNvPr id="5" name="TextBox 4"/>
+          <p:cNvSpPr txBox="1"/>
+          <p:nvPr/>
+        </p:nvSpPr>
+        <p:spPr>
+          <a:xfrm>
+            <a:off x="403761" y="6377049"/>
+            <a:ext cx="10559301" cy="369332"/>
+          </a:xfrm>
+          <a:prstGeom prst="rect">
+            <a:avLst/>
+          </a:prstGeom>
+          <a:noFill/>
+        </p:spPr>
+        <p:txBody>
+          <a:bodyPr wrap="none" rtlCol="0">
+            <a:spAutoFit/>
+          </a:bodyPr>
+          <a:lstStyle/>
+          <a:p>
+            <a:r>
+              <a:rPr lang="en-US" dirty="0" smtClean="0"/>
+              <a:t>When distribution is removed as an interaction term in the </a:t>
+            </a:r>
+            <a:r>
+              <a:rPr lang="en-US" dirty="0" err="1" smtClean="0"/>
+              <a:t>ital</a:t>
+            </a:r>
+            <a:r>
+              <a:rPr lang="en-US" dirty="0" smtClean="0"/>
+              <a:t> dataset (right plot), nothing is significant</a:t>
+            </a:r>
+            <a:endParaRPr lang="en-US" dirty="0"/>
+          </a:p>
+        </p:txBody>
+      </p:sp>
+      <p:pic>
+        <p:nvPicPr>
+          <p:cNvPr id="10" name="Picture 9"/>
+          <p:cNvPicPr>
+            <a:picLocks noChangeAspect="1"/>
+          </p:cNvPicPr>
+          <p:nvPr/>
+        </p:nvPicPr>
+        <p:blipFill>
+          <a:blip r:embed="rId3">
+            <a:extLst>
+              <a:ext uri="{28A0092B-C50C-407E-A947-70E740481C1C}">
+                <a14:useLocalDpi xmlns:a14="http://schemas.microsoft.com/office/drawing/2010/main" val="0"/>
+              </a:ext>
+            </a:extLst>
+          </a:blip>
+          <a:stretch>
+            <a:fillRect/>
+          </a:stretch>
+        </p:blipFill>
+        <p:spPr>
+          <a:xfrm>
+            <a:off x="6581816" y="780144"/>
+            <a:ext cx="4726543" cy="4274438"/>
+          </a:xfrm>
+          <a:prstGeom prst="rect">
+            <a:avLst/>
+          </a:prstGeom>
+        </p:spPr>
+      </p:pic>
+    </p:spTree>
+    <p:extLst>
+      <p:ext uri="{BB962C8B-B14F-4D97-AF65-F5344CB8AC3E}">
+        <p14:creationId xmlns:p14="http://schemas.microsoft.com/office/powerpoint/2010/main" val="745968140"/>
+      </p:ext>
+    </p:extLst>
+  </p:cSld>
+  <p:clrMapOvr>
+    <a:masterClrMapping/>
+  </p:clrMapOvr>
+  <p:timing>
+    <p:tnLst>
+      <p:par>
+        <p:cTn id="1" dur="indefinite" restart="never" nodeType="tmRoot"/>
+      </p:par>
+    </p:tnLst>
+  </p:timing>
+</p:sld>
+</file>
+
+<file path=ppt/slides/slide25.xml><?xml version="1.0" encoding="utf-8"?>
+<p:sld xmlns:a="http://schemas.openxmlformats.org/drawingml/2006/main" xmlns:r="http://schemas.openxmlformats.org/officeDocument/2006/relationships" xmlns:p="http://schemas.openxmlformats.org/presentationml/2006/main">
+  <p:cSld>
+    <p:spTree>
+      <p:nvGrpSpPr>
+        <p:cNvPr id="1" name=""/>
+        <p:cNvGrpSpPr/>
+        <p:nvPr/>
+      </p:nvGrpSpPr>
+      <p:grpSpPr>
+        <a:xfrm>
+          <a:off x="0" y="0"/>
+          <a:ext cx="0" cy="0"/>
+          <a:chOff x="0" y="0"/>
+          <a:chExt cx="0" cy="0"/>
+        </a:xfrm>
+      </p:grpSpPr>
+      <p:sp>
+        <p:nvSpPr>
+          <p:cNvPr id="2" name="TextBox 1"/>
+          <p:cNvSpPr txBox="1"/>
+          <p:nvPr/>
+        </p:nvSpPr>
+        <p:spPr>
+          <a:xfrm>
+            <a:off x="0" y="0"/>
+            <a:ext cx="12005953" cy="1538883"/>
+          </a:xfrm>
+          <a:prstGeom prst="rect">
+            <a:avLst/>
+          </a:prstGeom>
+          <a:noFill/>
+        </p:spPr>
+        <p:txBody>
+          <a:bodyPr wrap="square" rtlCol="0">
+            <a:spAutoFit/>
+          </a:bodyPr>
+          <a:lstStyle/>
+          <a:p>
+            <a:r>
+              <a:rPr lang="en-US" sz="2000" b="1" dirty="0" smtClean="0">
+                <a:latin typeface="Arial" charset="0"/>
+                <a:ea typeface="Arial" charset="0"/>
+                <a:cs typeface="Arial" charset="0"/>
+              </a:rPr>
+              <a:t>Model fits to real data</a:t>
+            </a:r>
+          </a:p>
+          <a:p>
+            <a:endParaRPr lang="en-US" sz="2000" b="1" dirty="0">
+              <a:latin typeface="Arial" charset="0"/>
+              <a:ea typeface="Arial" charset="0"/>
+              <a:cs typeface="Arial" charset="0"/>
+            </a:endParaRPr>
+          </a:p>
+          <a:p>
+            <a:endParaRPr lang="en-US" sz="2000" b="1" dirty="0">
+              <a:latin typeface="Arial" charset="0"/>
+              <a:ea typeface="Arial" charset="0"/>
+              <a:cs typeface="Arial" charset="0"/>
+            </a:endParaRPr>
+          </a:p>
+          <a:p>
+            <a:endParaRPr lang="en-US" dirty="0" smtClean="0"/>
+          </a:p>
+          <a:p>
+            <a:endParaRPr lang="en-US" sz="1600" dirty="0"/>
+          </a:p>
+        </p:txBody>
+      </p:sp>
+      <p:pic>
+        <p:nvPicPr>
+          <p:cNvPr id="6" name="Picture 5"/>
+          <p:cNvPicPr>
+            <a:picLocks noChangeAspect="1"/>
+          </p:cNvPicPr>
+          <p:nvPr/>
+        </p:nvPicPr>
+        <p:blipFill>
+          <a:blip r:embed="rId2">
+            <a:extLst>
+              <a:ext uri="{28A0092B-C50C-407E-A947-70E740481C1C}">
+                <a14:useLocalDpi xmlns:a14="http://schemas.microsoft.com/office/drawing/2010/main" val="0"/>
+              </a:ext>
+            </a:extLst>
+          </a:blip>
+          <a:stretch>
+            <a:fillRect/>
+          </a:stretch>
+        </p:blipFill>
+        <p:spPr>
+          <a:xfrm>
+            <a:off x="6754783" y="780144"/>
+            <a:ext cx="4698476" cy="4249056"/>
+          </a:xfrm>
+          <a:prstGeom prst="rect">
+            <a:avLst/>
+          </a:prstGeom>
+        </p:spPr>
+      </p:pic>
+      <p:sp>
+        <p:nvSpPr>
+          <p:cNvPr id="9" name="TextBox 8"/>
+          <p:cNvSpPr txBox="1"/>
+          <p:nvPr/>
+        </p:nvSpPr>
+        <p:spPr>
+          <a:xfrm>
+            <a:off x="7716983" y="5029200"/>
+            <a:ext cx="3172663" cy="923330"/>
+          </a:xfrm>
+          <a:prstGeom prst="rect">
+            <a:avLst/>
+          </a:prstGeom>
+          <a:noFill/>
+        </p:spPr>
+        <p:txBody>
+          <a:bodyPr wrap="none" rtlCol="0">
+            <a:spAutoFit/>
+          </a:bodyPr>
+          <a:lstStyle/>
+          <a:p>
+            <a:r>
+              <a:rPr lang="en-US" dirty="0" err="1" smtClean="0"/>
+              <a:t>TXCXdistrib</a:t>
+            </a:r>
+            <a:r>
+              <a:rPr lang="en-US" dirty="0" smtClean="0"/>
+              <a:t>: </a:t>
+            </a:r>
+            <a:r>
+              <a:rPr lang="en-US" i="1" dirty="0" smtClean="0"/>
+              <a:t>t</a:t>
+            </a:r>
+            <a:r>
+              <a:rPr lang="en-US" dirty="0" smtClean="0"/>
+              <a:t>=-2.47 </a:t>
+            </a:r>
+            <a:r>
+              <a:rPr lang="en-US" i="1" dirty="0" smtClean="0"/>
+              <a:t>p</a:t>
+            </a:r>
+            <a:r>
+              <a:rPr lang="en-US" dirty="0" smtClean="0"/>
+              <a:t>=0.025</a:t>
+            </a:r>
+          </a:p>
+          <a:p>
+            <a:r>
+              <a:rPr lang="en-US" dirty="0" smtClean="0"/>
+              <a:t>TXC</a:t>
+            </a:r>
+            <a:r>
+              <a:rPr lang="en-US" dirty="0"/>
+              <a:t>: </a:t>
+            </a:r>
+            <a:r>
+              <a:rPr lang="en-US" i="1" dirty="0" smtClean="0"/>
+              <a:t>t</a:t>
+            </a:r>
+            <a:r>
+              <a:rPr lang="en-US" dirty="0" smtClean="0"/>
+              <a:t>=3.05, </a:t>
+            </a:r>
+            <a:r>
+              <a:rPr lang="en-US" i="1" dirty="0" smtClean="0"/>
+              <a:t>p</a:t>
+            </a:r>
+            <a:r>
+              <a:rPr lang="en-US" dirty="0" smtClean="0"/>
+              <a:t>=0.0076</a:t>
+            </a:r>
+            <a:endParaRPr lang="en-US" dirty="0"/>
+          </a:p>
+          <a:p>
+            <a:endParaRPr lang="en-US" dirty="0"/>
+          </a:p>
+        </p:txBody>
+      </p:sp>
+      <p:sp>
+        <p:nvSpPr>
+          <p:cNvPr id="5" name="TextBox 4"/>
+          <p:cNvSpPr txBox="1"/>
+          <p:nvPr/>
+        </p:nvSpPr>
+        <p:spPr>
+          <a:xfrm>
+            <a:off x="403761" y="6377049"/>
+            <a:ext cx="10559301" cy="369332"/>
+          </a:xfrm>
+          <a:prstGeom prst="rect">
+            <a:avLst/>
+          </a:prstGeom>
+          <a:noFill/>
+        </p:spPr>
+        <p:txBody>
+          <a:bodyPr wrap="none" rtlCol="0">
+            <a:spAutoFit/>
+          </a:bodyPr>
+          <a:lstStyle/>
+          <a:p>
+            <a:r>
+              <a:rPr lang="en-US" dirty="0" smtClean="0"/>
+              <a:t>When distribution is removed as an interaction term in the </a:t>
+            </a:r>
+            <a:r>
+              <a:rPr lang="en-US" dirty="0" err="1" smtClean="0"/>
+              <a:t>ital</a:t>
+            </a:r>
+            <a:r>
+              <a:rPr lang="en-US" dirty="0" smtClean="0"/>
+              <a:t> dataset (right plot), nothing is significant</a:t>
+            </a:r>
+            <a:endParaRPr lang="en-US" dirty="0"/>
+          </a:p>
+        </p:txBody>
+      </p:sp>
+      <p:pic>
+        <p:nvPicPr>
+          <p:cNvPr id="8" name="Picture 7"/>
+          <p:cNvPicPr>
+            <a:picLocks noChangeAspect="1"/>
+          </p:cNvPicPr>
+          <p:nvPr/>
+        </p:nvPicPr>
+        <p:blipFill>
+          <a:blip r:embed="rId3">
+            <a:extLst>
+              <a:ext uri="{28A0092B-C50C-407E-A947-70E740481C1C}">
+                <a14:useLocalDpi xmlns:a14="http://schemas.microsoft.com/office/drawing/2010/main" val="0"/>
+              </a:ext>
+            </a:extLst>
+          </a:blip>
+          <a:stretch>
+            <a:fillRect/>
+          </a:stretch>
+        </p:blipFill>
+        <p:spPr>
+          <a:xfrm>
+            <a:off x="1395350" y="762203"/>
+            <a:ext cx="4698476" cy="4249057"/>
+          </a:xfrm>
+          <a:prstGeom prst="rect">
+            <a:avLst/>
+          </a:prstGeom>
+        </p:spPr>
+      </p:pic>
+      <p:sp>
+        <p:nvSpPr>
+          <p:cNvPr id="10" name="TextBox 9"/>
+          <p:cNvSpPr txBox="1"/>
+          <p:nvPr/>
+        </p:nvSpPr>
+        <p:spPr>
+          <a:xfrm>
+            <a:off x="1549115" y="4937697"/>
+            <a:ext cx="4390946" cy="646331"/>
+          </a:xfrm>
+          <a:prstGeom prst="rect">
+            <a:avLst/>
+          </a:prstGeom>
+          <a:noFill/>
+        </p:spPr>
+        <p:txBody>
+          <a:bodyPr wrap="none" rtlCol="0">
+            <a:spAutoFit/>
+          </a:bodyPr>
+          <a:lstStyle/>
+          <a:p>
+            <a:r>
+              <a:rPr lang="en-US" dirty="0" err="1" smtClean="0"/>
+              <a:t>TXCXgender</a:t>
+            </a:r>
+            <a:r>
+              <a:rPr lang="en-US" dirty="0" smtClean="0"/>
+              <a:t> interaction: </a:t>
+            </a:r>
+            <a:r>
+              <a:rPr lang="en-US" i="1" dirty="0" smtClean="0"/>
+              <a:t>t</a:t>
+            </a:r>
+            <a:r>
+              <a:rPr lang="en-US" dirty="0" smtClean="0"/>
+              <a:t>=1.87, </a:t>
+            </a:r>
+            <a:r>
+              <a:rPr lang="en-US" i="1" dirty="0" smtClean="0"/>
+              <a:t>p</a:t>
+            </a:r>
+            <a:r>
+              <a:rPr lang="en-US" dirty="0" smtClean="0"/>
+              <a:t>=0.066</a:t>
+            </a:r>
+          </a:p>
+          <a:p>
+            <a:r>
+              <a:rPr lang="en-US" dirty="0" err="1" smtClean="0"/>
+              <a:t>Cxgender</a:t>
+            </a:r>
+            <a:r>
+              <a:rPr lang="en-US" dirty="0" smtClean="0"/>
+              <a:t> interaction: </a:t>
+            </a:r>
+            <a:r>
+              <a:rPr lang="en-US" i="1" dirty="0" smtClean="0"/>
+              <a:t>t</a:t>
+            </a:r>
+            <a:r>
+              <a:rPr lang="en-US" dirty="0" smtClean="0"/>
+              <a:t>=-2.192, </a:t>
+            </a:r>
+            <a:r>
+              <a:rPr lang="en-US" i="1" dirty="0" smtClean="0"/>
+              <a:t>p</a:t>
+            </a:r>
+            <a:r>
+              <a:rPr lang="en-US" dirty="0" smtClean="0"/>
+              <a:t>=0.031</a:t>
+            </a:r>
+            <a:endParaRPr lang="en-US" dirty="0"/>
+          </a:p>
+        </p:txBody>
+      </p:sp>
+      <p:sp>
+        <p:nvSpPr>
+          <p:cNvPr id="11" name="TextBox 10"/>
+          <p:cNvSpPr txBox="1"/>
+          <p:nvPr/>
+        </p:nvSpPr>
+        <p:spPr>
+          <a:xfrm>
+            <a:off x="1664362" y="5595350"/>
+            <a:ext cx="4019049" cy="369332"/>
+          </a:xfrm>
+          <a:prstGeom prst="rect">
+            <a:avLst/>
+          </a:prstGeom>
+          <a:noFill/>
+        </p:spPr>
+        <p:txBody>
+          <a:bodyPr wrap="none" rtlCol="0">
+            <a:spAutoFit/>
+          </a:bodyPr>
+          <a:lstStyle/>
+          <a:p>
+            <a:r>
+              <a:rPr lang="en-US" smtClean="0"/>
+              <a:t>Whole model: </a:t>
+            </a:r>
+            <a:r>
+              <a:rPr lang="en-US" i="1" smtClean="0"/>
+              <a:t>F</a:t>
+            </a:r>
+            <a:r>
+              <a:rPr lang="en-US" smtClean="0"/>
+              <a:t>(8, 76)=2.28, </a:t>
+            </a:r>
+            <a:r>
+              <a:rPr lang="en-US" i="1" smtClean="0"/>
+              <a:t>p</a:t>
+            </a:r>
+            <a:r>
+              <a:rPr lang="en-US" smtClean="0"/>
+              <a:t>=0.031</a:t>
+            </a:r>
+            <a:endParaRPr lang="en-US"/>
+          </a:p>
+        </p:txBody>
+      </p:sp>
+      <p:sp>
+        <p:nvSpPr>
+          <p:cNvPr id="3" name="TextBox 2"/>
+          <p:cNvSpPr txBox="1"/>
+          <p:nvPr/>
+        </p:nvSpPr>
+        <p:spPr>
+          <a:xfrm>
+            <a:off x="3550722" y="646825"/>
+            <a:ext cx="1377300" cy="369332"/>
+          </a:xfrm>
+          <a:prstGeom prst="rect">
+            <a:avLst/>
+          </a:prstGeom>
+          <a:noFill/>
+        </p:spPr>
+        <p:txBody>
+          <a:bodyPr wrap="none" rtlCol="0">
+            <a:spAutoFit/>
+          </a:bodyPr>
+          <a:lstStyle/>
+          <a:p>
+            <a:r>
+              <a:rPr lang="en-US" dirty="0" err="1" smtClean="0"/>
+              <a:t>Hor</a:t>
+            </a:r>
+            <a:r>
+              <a:rPr lang="en-US" dirty="0" smtClean="0"/>
+              <a:t> dataset</a:t>
+            </a:r>
+            <a:endParaRPr lang="en-US" dirty="0"/>
+          </a:p>
+        </p:txBody>
+      </p:sp>
+      <p:sp>
+        <p:nvSpPr>
+          <p:cNvPr id="12" name="TextBox 11"/>
+          <p:cNvSpPr txBox="1"/>
+          <p:nvPr/>
+        </p:nvSpPr>
+        <p:spPr>
+          <a:xfrm>
+            <a:off x="8614664" y="646825"/>
+            <a:ext cx="1313180" cy="369332"/>
+          </a:xfrm>
+          <a:prstGeom prst="rect">
+            <a:avLst/>
+          </a:prstGeom>
+          <a:noFill/>
+        </p:spPr>
+        <p:txBody>
+          <a:bodyPr wrap="none" rtlCol="0">
+            <a:spAutoFit/>
+          </a:bodyPr>
+          <a:lstStyle/>
+          <a:p>
+            <a:r>
+              <a:rPr lang="en-US" smtClean="0"/>
+              <a:t>Ital dataset</a:t>
+            </a:r>
+            <a:endParaRPr lang="en-US" dirty="0"/>
+          </a:p>
+        </p:txBody>
+      </p:sp>
+    </p:spTree>
+    <p:extLst>
+      <p:ext uri="{BB962C8B-B14F-4D97-AF65-F5344CB8AC3E}">
+        <p14:creationId xmlns:p14="http://schemas.microsoft.com/office/powerpoint/2010/main" val="2146273219"/>
+      </p:ext>
+    </p:extLst>
+  </p:cSld>
+  <p:clrMapOvr>
+    <a:masterClrMapping/>
+  </p:clrMapOvr>
+  <p:timing>
+    <p:tnLst>
+      <p:par>
+        <p:cTn id="1" dur="indefinite" restart="never" nodeType="tmRoot"/>
+      </p:par>
+    </p:tnLst>
+  </p:timing>
+</p:sld>
+</file>
+
+<file path=ppt/slides/slide26.xml><?xml version="1.0" encoding="utf-8"?>
+<p:sld xmlns:a="http://schemas.openxmlformats.org/drawingml/2006/main" xmlns:r="http://schemas.openxmlformats.org/officeDocument/2006/relationships" xmlns:p="http://schemas.openxmlformats.org/presentationml/2006/main">
+  <p:cSld>
+    <p:spTree>
+      <p:nvGrpSpPr>
+        <p:cNvPr id="1" name=""/>
+        <p:cNvGrpSpPr/>
+        <p:nvPr/>
+      </p:nvGrpSpPr>
+      <p:grpSpPr>
+        <a:xfrm>
+          <a:off x="0" y="0"/>
+          <a:ext cx="0" cy="0"/>
+          <a:chOff x="0" y="0"/>
+          <a:chExt cx="0" cy="0"/>
+        </a:xfrm>
+      </p:grpSpPr>
+      <p:sp>
+        <p:nvSpPr>
+          <p:cNvPr id="2" name="TextBox 1"/>
+          <p:cNvSpPr txBox="1"/>
+          <p:nvPr/>
+        </p:nvSpPr>
+        <p:spPr>
+          <a:xfrm>
+            <a:off x="0" y="0"/>
+            <a:ext cx="12005953" cy="2769989"/>
+          </a:xfrm>
+          <a:prstGeom prst="rect">
+            <a:avLst/>
+          </a:prstGeom>
+          <a:noFill/>
+        </p:spPr>
+        <p:txBody>
+          <a:bodyPr wrap="square" rtlCol="0">
+            <a:spAutoFit/>
+          </a:bodyPr>
+          <a:lstStyle/>
+          <a:p>
+            <a:r>
+              <a:rPr lang="en-US" sz="2000" b="1" dirty="0" smtClean="0">
+                <a:latin typeface="Arial" charset="0"/>
+                <a:ea typeface="Arial" charset="0"/>
+                <a:cs typeface="Arial" charset="0"/>
+              </a:rPr>
+              <a:t>Model fits to real data</a:t>
+            </a:r>
+          </a:p>
+          <a:p>
+            <a:endParaRPr lang="en-US" sz="2000" b="1" dirty="0">
+              <a:latin typeface="Arial" charset="0"/>
+              <a:ea typeface="Arial" charset="0"/>
+              <a:cs typeface="Arial" charset="0"/>
+            </a:endParaRPr>
+          </a:p>
+          <a:p>
+            <a:r>
+              <a:rPr lang="en-US" sz="1600" dirty="0" smtClean="0">
+                <a:latin typeface="Arial" charset="0"/>
+                <a:ea typeface="Arial" charset="0"/>
+                <a:cs typeface="Arial" charset="0"/>
+              </a:rPr>
+              <a:t>What appears to be the case here, is that females do indeed exhibit a significant relationship between hormones and learning rate, while men do not. Men do exhibit other relations to hormones, such as investments (show plots), but investments are in fact an omnibus measure of a second by second constantly fluctuating state, for which hormones are not the best measure. What is a better measure of this is neural activity. So, this leads quite obviously to the question </a:t>
+            </a:r>
+            <a:r>
+              <a:rPr lang="mr-IN" sz="1600" dirty="0" smtClean="0">
+                <a:latin typeface="Arial" charset="0"/>
+                <a:ea typeface="Arial" charset="0"/>
+                <a:cs typeface="Arial" charset="0"/>
+              </a:rPr>
+              <a:t>–</a:t>
+            </a:r>
+            <a:r>
+              <a:rPr lang="en-US" sz="1600" dirty="0" smtClean="0">
+                <a:latin typeface="Arial" charset="0"/>
+                <a:ea typeface="Arial" charset="0"/>
+                <a:cs typeface="Arial" charset="0"/>
+              </a:rPr>
+              <a:t> what is happen to the male brain in relation to </a:t>
+            </a:r>
+            <a:r>
+              <a:rPr lang="en-US" sz="1600" smtClean="0">
+                <a:latin typeface="Arial" charset="0"/>
+                <a:ea typeface="Arial" charset="0"/>
+                <a:cs typeface="Arial" charset="0"/>
+              </a:rPr>
+              <a:t>the latent parameters </a:t>
+            </a:r>
+            <a:r>
+              <a:rPr lang="en-US" sz="1600" dirty="0" smtClean="0">
+                <a:latin typeface="Arial" charset="0"/>
+                <a:ea typeface="Arial" charset="0"/>
+                <a:cs typeface="Arial" charset="0"/>
+              </a:rPr>
+              <a:t>of our model?</a:t>
+            </a:r>
+            <a:endParaRPr lang="en-US" sz="2000" b="1" dirty="0" smtClean="0">
+              <a:latin typeface="Arial" charset="0"/>
+              <a:ea typeface="Arial" charset="0"/>
+              <a:cs typeface="Arial" charset="0"/>
+            </a:endParaRPr>
+          </a:p>
+          <a:p>
+            <a:endParaRPr lang="en-US" sz="2000" b="1" dirty="0">
+              <a:latin typeface="Arial" charset="0"/>
+              <a:ea typeface="Arial" charset="0"/>
+              <a:cs typeface="Arial" charset="0"/>
+            </a:endParaRPr>
+          </a:p>
+          <a:p>
+            <a:endParaRPr lang="en-US" dirty="0" smtClean="0"/>
+          </a:p>
+          <a:p>
+            <a:endParaRPr lang="en-US" sz="1600" dirty="0"/>
+          </a:p>
+        </p:txBody>
+      </p:sp>
+    </p:spTree>
+    <p:extLst>
+      <p:ext uri="{BB962C8B-B14F-4D97-AF65-F5344CB8AC3E}">
+        <p14:creationId xmlns:p14="http://schemas.microsoft.com/office/powerpoint/2010/main" val="1690316101"/>
+      </p:ext>
+    </p:extLst>
+  </p:cSld>
+  <p:clrMapOvr>
+    <a:masterClrMapping/>
+  </p:clrMapOvr>
+  <p:timing>
+    <p:tnLst>
+      <p:par>
+        <p:cTn id="1" dur="indefinite" restart="never" nodeType="tmRoot"/>
+      </p:par>
+    </p:tnLst>
+  </p:timing>
+</p:sld>
+</file>
+
+<file path=ppt/slides/slide27.xml><?xml version="1.0" encoding="utf-8"?>
+<p:sld xmlns:a="http://schemas.openxmlformats.org/drawingml/2006/main" xmlns:r="http://schemas.openxmlformats.org/officeDocument/2006/relationships" xmlns:p="http://schemas.openxmlformats.org/presentationml/2006/main">
+  <p:cSld>
+    <p:spTree>
+      <p:nvGrpSpPr>
+        <p:cNvPr id="1" name=""/>
+        <p:cNvGrpSpPr/>
+        <p:nvPr/>
+      </p:nvGrpSpPr>
+      <p:grpSpPr>
+        <a:xfrm>
+          <a:off x="0" y="0"/>
+          <a:ext cx="0" cy="0"/>
+          <a:chOff x="0" y="0"/>
+          <a:chExt cx="0" cy="0"/>
+        </a:xfrm>
+      </p:grpSpPr>
+      <p:sp>
+        <p:nvSpPr>
+          <p:cNvPr id="2" name="TextBox 1"/>
+          <p:cNvSpPr txBox="1"/>
+          <p:nvPr/>
+        </p:nvSpPr>
+        <p:spPr>
+          <a:xfrm>
+            <a:off x="0" y="0"/>
+            <a:ext cx="12005953" cy="6524863"/>
+          </a:xfrm>
+          <a:prstGeom prst="rect">
+            <a:avLst/>
+          </a:prstGeom>
+          <a:noFill/>
+        </p:spPr>
+        <p:txBody>
+          <a:bodyPr wrap="square" rtlCol="0">
+            <a:spAutoFit/>
+          </a:bodyPr>
+          <a:lstStyle/>
+          <a:p>
+            <a:r>
+              <a:rPr lang="en-US" sz="2000" b="1" dirty="0" smtClean="0">
+                <a:latin typeface="Arial" charset="0"/>
+                <a:ea typeface="Arial" charset="0"/>
+                <a:cs typeface="Arial" charset="0"/>
+              </a:rPr>
+              <a:t>Model fits to real data</a:t>
+            </a:r>
+          </a:p>
+          <a:p>
+            <a:endParaRPr lang="en-US" sz="2000" b="1" dirty="0">
+              <a:latin typeface="Arial" charset="0"/>
+              <a:ea typeface="Arial" charset="0"/>
+              <a:cs typeface="Arial" charset="0"/>
+            </a:endParaRPr>
+          </a:p>
+          <a:p>
+            <a:r>
+              <a:rPr lang="en-US" sz="1600" dirty="0" smtClean="0">
+                <a:latin typeface="Arial" charset="0"/>
+                <a:ea typeface="Arial" charset="0"/>
+                <a:cs typeface="Arial" charset="0"/>
+              </a:rPr>
+              <a:t>I fit the model to actual data, each model, and assessed the goodness of fit by comparing the BIC of each model, across subjects, separately for predator and for prey. I found that predator’s have their data best explained by model 3, and prey by model 4. This suggests that prey employ two separate learning rates, and predators only one. This further suggests that prey are behaving much more risk averse, since their model is essentially the same as the risk-sensitive model used by </a:t>
+            </a:r>
+            <a:r>
+              <a:rPr lang="en-US" sz="1600" dirty="0" err="1" smtClean="0">
+                <a:latin typeface="Arial" charset="0"/>
+                <a:ea typeface="Arial" charset="0"/>
+                <a:cs typeface="Arial" charset="0"/>
+              </a:rPr>
+              <a:t>Niv</a:t>
+            </a:r>
+            <a:r>
+              <a:rPr lang="en-US" sz="1600" dirty="0" smtClean="0">
+                <a:latin typeface="Arial" charset="0"/>
+                <a:ea typeface="Arial" charset="0"/>
+                <a:cs typeface="Arial" charset="0"/>
+              </a:rPr>
+              <a:t> et al. 2012. </a:t>
+            </a:r>
+          </a:p>
+          <a:p>
+            <a:endParaRPr lang="en-US" sz="1600" dirty="0">
+              <a:latin typeface="Arial" charset="0"/>
+              <a:ea typeface="Arial" charset="0"/>
+              <a:cs typeface="Arial" charset="0"/>
+            </a:endParaRPr>
+          </a:p>
+          <a:p>
+            <a:r>
+              <a:rPr lang="en-US" sz="1600" dirty="0" smtClean="0">
+                <a:latin typeface="Arial" charset="0"/>
+                <a:ea typeface="Arial" charset="0"/>
+                <a:cs typeface="Arial" charset="0"/>
+              </a:rPr>
+              <a:t>Furthermore, I found a significant CXT interaction with learning rate in both predators and prey, although the effect was just barely below the significant threshold in prey. Furthermore, this relationship in prey was only present in one learning rate, that learning from negative prediction errors. Finally, when using BIC as a DV, I find a significant </a:t>
+            </a:r>
+            <a:r>
+              <a:rPr lang="en-US" sz="1600" dirty="0" err="1" smtClean="0">
+                <a:latin typeface="Arial" charset="0"/>
+                <a:ea typeface="Arial" charset="0"/>
+                <a:cs typeface="Arial" charset="0"/>
+              </a:rPr>
+              <a:t>cortXgender</a:t>
+            </a:r>
+            <a:r>
+              <a:rPr lang="en-US" sz="1600" dirty="0" smtClean="0">
+                <a:latin typeface="Arial" charset="0"/>
+                <a:ea typeface="Arial" charset="0"/>
+                <a:cs typeface="Arial" charset="0"/>
+              </a:rPr>
+              <a:t> effect in predators.</a:t>
+            </a:r>
+          </a:p>
+          <a:p>
+            <a:endParaRPr lang="en-US" sz="1600" dirty="0">
+              <a:latin typeface="Arial" charset="0"/>
+              <a:ea typeface="Arial" charset="0"/>
+              <a:cs typeface="Arial" charset="0"/>
+            </a:endParaRPr>
+          </a:p>
+          <a:p>
+            <a:r>
+              <a:rPr lang="en-US" sz="1600" dirty="0" smtClean="0">
+                <a:latin typeface="Arial" charset="0"/>
+                <a:ea typeface="Arial" charset="0"/>
+                <a:cs typeface="Arial" charset="0"/>
+              </a:rPr>
+              <a:t>For prey, alpha1 is higher than alpha2, which means learning from positive predictions errors is stronger than learning from negative, which means our prey are actually risk seeking. </a:t>
+            </a:r>
+          </a:p>
+          <a:p>
+            <a:endParaRPr lang="en-US" sz="1600" dirty="0">
+              <a:latin typeface="Arial" charset="0"/>
+              <a:ea typeface="Arial" charset="0"/>
+              <a:cs typeface="Arial" charset="0"/>
+            </a:endParaRPr>
+          </a:p>
+          <a:p>
+            <a:r>
+              <a:rPr lang="en-US" sz="1600" dirty="0" smtClean="0">
+                <a:latin typeface="Arial" charset="0"/>
+                <a:ea typeface="Arial" charset="0"/>
+                <a:cs typeface="Arial" charset="0"/>
+              </a:rPr>
+              <a:t>For the </a:t>
+            </a:r>
+            <a:r>
+              <a:rPr lang="en-US" sz="1600" dirty="0" err="1" smtClean="0">
+                <a:latin typeface="Arial" charset="0"/>
+                <a:ea typeface="Arial" charset="0"/>
+                <a:cs typeface="Arial" charset="0"/>
+              </a:rPr>
+              <a:t>old_hor</a:t>
+            </a:r>
+            <a:r>
+              <a:rPr lang="en-US" sz="1600" dirty="0" smtClean="0">
+                <a:latin typeface="Arial" charset="0"/>
+                <a:ea typeface="Arial" charset="0"/>
+                <a:cs typeface="Arial" charset="0"/>
+              </a:rPr>
+              <a:t> and </a:t>
+            </a:r>
+            <a:r>
+              <a:rPr lang="en-US" sz="1600" dirty="0" err="1" smtClean="0">
+                <a:latin typeface="Arial" charset="0"/>
+                <a:ea typeface="Arial" charset="0"/>
+                <a:cs typeface="Arial" charset="0"/>
+              </a:rPr>
+              <a:t>ital</a:t>
+            </a:r>
+            <a:r>
+              <a:rPr lang="en-US" sz="1600" dirty="0" smtClean="0">
+                <a:latin typeface="Arial" charset="0"/>
+                <a:ea typeface="Arial" charset="0"/>
+                <a:cs typeface="Arial" charset="0"/>
+              </a:rPr>
+              <a:t> datasets, the same models best explain the data for predator and prey, but there is really no other relationship to model parameters. It seems the females are entirely driving the effect in the </a:t>
+            </a:r>
+            <a:r>
+              <a:rPr lang="en-US" sz="1600" dirty="0" err="1" smtClean="0">
+                <a:latin typeface="Arial" charset="0"/>
+                <a:ea typeface="Arial" charset="0"/>
+                <a:cs typeface="Arial" charset="0"/>
+              </a:rPr>
+              <a:t>hor</a:t>
+            </a:r>
+            <a:r>
+              <a:rPr lang="en-US" sz="1600" dirty="0" smtClean="0">
+                <a:latin typeface="Arial" charset="0"/>
+                <a:ea typeface="Arial" charset="0"/>
+                <a:cs typeface="Arial" charset="0"/>
+              </a:rPr>
+              <a:t> dataset. Females also appear to have a nonsignificant higher learning rate than males.</a:t>
+            </a:r>
+          </a:p>
+          <a:p>
+            <a:endParaRPr lang="en-US" sz="1600" b="1" dirty="0" smtClean="0">
+              <a:latin typeface="Arial" charset="0"/>
+              <a:ea typeface="Arial" charset="0"/>
+              <a:cs typeface="Arial" charset="0"/>
+            </a:endParaRPr>
+          </a:p>
+          <a:p>
+            <a:r>
+              <a:rPr lang="en-US" sz="1600" b="1" dirty="0" smtClean="0">
+                <a:latin typeface="Arial" charset="0"/>
+                <a:ea typeface="Arial" charset="0"/>
+                <a:cs typeface="Arial" charset="0"/>
+              </a:rPr>
+              <a:t>However, when I include distribution as an interaction term in the </a:t>
+            </a:r>
+            <a:r>
+              <a:rPr lang="en-US" sz="1600" b="1" dirty="0" err="1" smtClean="0">
+                <a:latin typeface="Arial" charset="0"/>
+                <a:ea typeface="Arial" charset="0"/>
+                <a:cs typeface="Arial" charset="0"/>
+              </a:rPr>
+              <a:t>ital</a:t>
+            </a:r>
+            <a:r>
+              <a:rPr lang="en-US" sz="1600" b="1" dirty="0" smtClean="0">
+                <a:latin typeface="Arial" charset="0"/>
+                <a:ea typeface="Arial" charset="0"/>
+                <a:cs typeface="Arial" charset="0"/>
+              </a:rPr>
+              <a:t> dataset, I get a </a:t>
+            </a:r>
+            <a:r>
+              <a:rPr lang="en-US" sz="1600" b="1" dirty="0" err="1" smtClean="0">
+                <a:latin typeface="Arial" charset="0"/>
+                <a:ea typeface="Arial" charset="0"/>
+                <a:cs typeface="Arial" charset="0"/>
+              </a:rPr>
+              <a:t>singificantl</a:t>
+            </a:r>
+            <a:r>
+              <a:rPr lang="en-US" sz="1600" b="1" dirty="0" smtClean="0">
+                <a:latin typeface="Arial" charset="0"/>
+                <a:ea typeface="Arial" charset="0"/>
+                <a:cs typeface="Arial" charset="0"/>
+              </a:rPr>
+              <a:t> 3-way interaction with testosterone, cortisol, and distribution, as well as a significant </a:t>
+            </a:r>
+            <a:r>
+              <a:rPr lang="en-US" sz="1600" b="1" dirty="0" err="1" smtClean="0">
+                <a:latin typeface="Arial" charset="0"/>
+                <a:ea typeface="Arial" charset="0"/>
+                <a:cs typeface="Arial" charset="0"/>
+              </a:rPr>
+              <a:t>tXC</a:t>
+            </a:r>
+            <a:r>
+              <a:rPr lang="en-US" sz="1600" b="1" dirty="0" smtClean="0">
+                <a:latin typeface="Arial" charset="0"/>
+                <a:ea typeface="Arial" charset="0"/>
+                <a:cs typeface="Arial" charset="0"/>
+              </a:rPr>
+              <a:t> interaction going in the opposite direction as with the </a:t>
+            </a:r>
+            <a:r>
+              <a:rPr lang="en-US" sz="1600" b="1" dirty="0" err="1" smtClean="0">
+                <a:latin typeface="Arial" charset="0"/>
+                <a:ea typeface="Arial" charset="0"/>
+                <a:cs typeface="Arial" charset="0"/>
+              </a:rPr>
+              <a:t>hor</a:t>
+            </a:r>
+            <a:r>
+              <a:rPr lang="en-US" sz="1600" b="1" dirty="0" smtClean="0">
+                <a:latin typeface="Arial" charset="0"/>
+                <a:ea typeface="Arial" charset="0"/>
+                <a:cs typeface="Arial" charset="0"/>
+              </a:rPr>
+              <a:t> dataset, which I need to explore further.</a:t>
+            </a:r>
+          </a:p>
+          <a:p>
+            <a:endParaRPr lang="en-US" sz="2000" b="1" dirty="0" smtClean="0">
+              <a:latin typeface="Arial" charset="0"/>
+              <a:ea typeface="Arial" charset="0"/>
+              <a:cs typeface="Arial" charset="0"/>
+            </a:endParaRPr>
+          </a:p>
+          <a:p>
+            <a:endParaRPr lang="en-US" sz="2000" b="1" dirty="0">
+              <a:latin typeface="Arial" charset="0"/>
+              <a:ea typeface="Arial" charset="0"/>
+              <a:cs typeface="Arial" charset="0"/>
+            </a:endParaRPr>
+          </a:p>
+          <a:p>
+            <a:endParaRPr lang="en-US" dirty="0" smtClean="0"/>
+          </a:p>
+          <a:p>
+            <a:endParaRPr lang="en-US" sz="1600" dirty="0"/>
+          </a:p>
+        </p:txBody>
+      </p:sp>
+    </p:spTree>
+    <p:extLst>
+      <p:ext uri="{BB962C8B-B14F-4D97-AF65-F5344CB8AC3E}">
+        <p14:creationId xmlns:p14="http://schemas.microsoft.com/office/powerpoint/2010/main" val="1223062693"/>
+      </p:ext>
+    </p:extLst>
+  </p:cSld>
+  <p:clrMapOvr>
+    <a:masterClrMapping/>
+  </p:clrMapOvr>
+  <p:timing>
+    <p:tnLst>
+      <p:par>
+        <p:cTn id="1" dur="indefinite" restart="never" nodeType="tmRoot"/>
+      </p:par>
+    </p:tnLst>
+  </p:timing>
+</p:sld>
+</file>
+
+<file path=ppt/slides/slide28.xml><?xml version="1.0" encoding="utf-8"?>
+<p:sld xmlns:a="http://schemas.openxmlformats.org/drawingml/2006/main" xmlns:r="http://schemas.openxmlformats.org/officeDocument/2006/relationships" xmlns:p="http://schemas.openxmlformats.org/presentationml/2006/main">
+  <p:cSld>
+    <p:spTree>
+      <p:nvGrpSpPr>
+        <p:cNvPr id="1" name=""/>
+        <p:cNvGrpSpPr/>
+        <p:nvPr/>
+      </p:nvGrpSpPr>
+      <p:grpSpPr>
+        <a:xfrm>
+          <a:off x="0" y="0"/>
+          <a:ext cx="0" cy="0"/>
+          <a:chOff x="0" y="0"/>
+          <a:chExt cx="0" cy="0"/>
+        </a:xfrm>
+      </p:grpSpPr>
+    </p:spTree>
+    <p:extLst>
+      <p:ext uri="{BB962C8B-B14F-4D97-AF65-F5344CB8AC3E}">
+        <p14:creationId xmlns:p14="http://schemas.microsoft.com/office/powerpoint/2010/main" val="748664869"/>
+      </p:ext>
+    </p:extLst>
+  </p:cSld>
+  <p:clrMapOvr>
+    <a:masterClrMapping/>
+  </p:clrMapOvr>
+</p:sld>
+</file>
+
+<file path=ppt/slides/slide29.xml><?xml version="1.0" encoding="utf-8"?>
+<p:sld xmlns:a="http://schemas.openxmlformats.org/drawingml/2006/main" xmlns:r="http://schemas.openxmlformats.org/officeDocument/2006/relationships" xmlns:p="http://schemas.openxmlformats.org/presentationml/2006/main">
+  <p:cSld>
+    <p:spTree>
+      <p:nvGrpSpPr>
+        <p:cNvPr id="1" name=""/>
+        <p:cNvGrpSpPr/>
+        <p:nvPr/>
+      </p:nvGrpSpPr>
+      <p:grpSpPr>
+        <a:xfrm>
+          <a:off x="0" y="0"/>
+          <a:ext cx="0" cy="0"/>
+          <a:chOff x="0" y="0"/>
+          <a:chExt cx="0" cy="0"/>
+        </a:xfrm>
+      </p:grpSpPr>
+      <p:sp>
+        <p:nvSpPr>
           <p:cNvPr id="4" name="Rectangle 3"/>
           <p:cNvSpPr/>
           <p:nvPr/>
@@ -7604,7 +10529,498 @@
 </p:sld>
 </file>
 
-<file path=ppt/slides/slide21.xml><?xml version="1.0" encoding="utf-8"?>
+<file path=ppt/slides/slide3.xml><?xml version="1.0" encoding="utf-8"?>
+<p:sld xmlns:a="http://schemas.openxmlformats.org/drawingml/2006/main" xmlns:r="http://schemas.openxmlformats.org/officeDocument/2006/relationships" xmlns:p="http://schemas.openxmlformats.org/presentationml/2006/main">
+  <p:cSld>
+    <p:spTree>
+      <p:nvGrpSpPr>
+        <p:cNvPr id="1" name=""/>
+        <p:cNvGrpSpPr/>
+        <p:nvPr/>
+      </p:nvGrpSpPr>
+      <p:grpSpPr>
+        <a:xfrm>
+          <a:off x="0" y="0"/>
+          <a:ext cx="0" cy="0"/>
+          <a:chOff x="0" y="0"/>
+          <a:chExt cx="0" cy="0"/>
+        </a:xfrm>
+      </p:grpSpPr>
+      <p:sp>
+        <p:nvSpPr>
+          <p:cNvPr id="2" name="TextBox 1"/>
+          <p:cNvSpPr txBox="1"/>
+          <p:nvPr/>
+        </p:nvSpPr>
+        <p:spPr>
+          <a:xfrm>
+            <a:off x="4698124" y="609600"/>
+            <a:ext cx="2481449" cy="369332"/>
+          </a:xfrm>
+          <a:prstGeom prst="rect">
+            <a:avLst/>
+          </a:prstGeom>
+          <a:noFill/>
+        </p:spPr>
+        <p:txBody>
+          <a:bodyPr wrap="none" rtlCol="0">
+            <a:spAutoFit/>
+          </a:bodyPr>
+          <a:lstStyle/>
+          <a:p>
+            <a:r>
+              <a:rPr lang="en-US" dirty="0" smtClean="0"/>
+              <a:t>The Predator Prey Game</a:t>
+            </a:r>
+            <a:endParaRPr lang="en-US" dirty="0"/>
+          </a:p>
+        </p:txBody>
+      </p:sp>
+      <p:sp>
+        <p:nvSpPr>
+          <p:cNvPr id="5" name="TextBox 4"/>
+          <p:cNvSpPr txBox="1"/>
+          <p:nvPr/>
+        </p:nvSpPr>
+        <p:spPr>
+          <a:xfrm>
+            <a:off x="529021" y="1091906"/>
+            <a:ext cx="7721599" cy="2308324"/>
+          </a:xfrm>
+          <a:prstGeom prst="rect">
+            <a:avLst/>
+          </a:prstGeom>
+          <a:noFill/>
+        </p:spPr>
+        <p:txBody>
+          <a:bodyPr wrap="square" rtlCol="0">
+            <a:spAutoFit/>
+          </a:bodyPr>
+          <a:lstStyle/>
+          <a:p>
+            <a:r>
+              <a:rPr lang="en-US" dirty="0" smtClean="0"/>
+              <a:t>Two-player, one-shot design</a:t>
+            </a:r>
+          </a:p>
+          <a:p>
+            <a:r>
+              <a:rPr lang="en-US" dirty="0" smtClean="0"/>
+              <a:t>Rules</a:t>
+            </a:r>
+            <a:endParaRPr lang="en-US" dirty="0"/>
+          </a:p>
+          <a:p>
+            <a:pPr marL="285750" indent="-285750">
+              <a:buFont typeface="Arial" charset="0"/>
+              <a:buChar char="•"/>
+            </a:pPr>
+            <a:r>
+              <a:rPr lang="en-US" dirty="0"/>
+              <a:t>Each player starts with €</a:t>
+            </a:r>
+            <a:r>
+              <a:rPr lang="en-US" dirty="0" smtClean="0"/>
+              <a:t>10</a:t>
+            </a:r>
+            <a:endParaRPr lang="en-US" dirty="0"/>
+          </a:p>
+          <a:p>
+            <a:pPr marL="285750" indent="-285750">
+              <a:buFont typeface="Arial" charset="0"/>
+              <a:buChar char="•"/>
+            </a:pPr>
+            <a:r>
+              <a:rPr lang="en-US" dirty="0"/>
+              <a:t>If the prey invests as much or more than the predator, both keep their remaining </a:t>
+            </a:r>
+            <a:r>
+              <a:rPr lang="en-US" dirty="0" smtClean="0"/>
+              <a:t>endowment</a:t>
+            </a:r>
+            <a:endParaRPr lang="en-US" dirty="0"/>
+          </a:p>
+          <a:p>
+            <a:pPr marL="285750" indent="-285750">
+              <a:buFont typeface="Arial" charset="0"/>
+              <a:buChar char="•"/>
+            </a:pPr>
+            <a:r>
+              <a:rPr lang="en-US" dirty="0"/>
+              <a:t>If the predator invests more than the prey, predator adds preys remainder to his own remainder.</a:t>
+            </a:r>
+          </a:p>
+          <a:p>
+            <a:endParaRPr lang="en-US" dirty="0"/>
+          </a:p>
+        </p:txBody>
+      </p:sp>
+      <p:sp>
+        <p:nvSpPr>
+          <p:cNvPr id="6" name="TextBox 5"/>
+          <p:cNvSpPr txBox="1"/>
+          <p:nvPr/>
+        </p:nvSpPr>
+        <p:spPr>
+          <a:xfrm>
+            <a:off x="1319549" y="3752310"/>
+            <a:ext cx="1894832" cy="2862323"/>
+          </a:xfrm>
+          <a:prstGeom prst="rect">
+            <a:avLst/>
+          </a:prstGeom>
+          <a:noFill/>
+          <a:ln>
+            <a:solidFill>
+              <a:srgbClr val="000000"/>
+            </a:solidFill>
+          </a:ln>
+        </p:spPr>
+        <p:txBody>
+          <a:bodyPr wrap="none" rtlCol="0">
+            <a:spAutoFit/>
+          </a:bodyPr>
+          <a:lstStyle/>
+          <a:p>
+            <a:r>
+              <a:rPr lang="en-US" b="1" dirty="0"/>
+              <a:t>Predator</a:t>
+            </a:r>
+          </a:p>
+          <a:p>
+            <a:endParaRPr lang="en-US" dirty="0"/>
+          </a:p>
+          <a:p>
+            <a:r>
+              <a:rPr lang="en-US" dirty="0"/>
+              <a:t>Endowment = €10</a:t>
+            </a:r>
+          </a:p>
+          <a:p>
+            <a:endParaRPr lang="en-US" dirty="0"/>
+          </a:p>
+          <a:p>
+            <a:endParaRPr lang="en-US" dirty="0"/>
+          </a:p>
+          <a:p>
+            <a:r>
+              <a:rPr lang="en-US" dirty="0"/>
+              <a:t>Investment = €3</a:t>
+            </a:r>
+          </a:p>
+          <a:p>
+            <a:endParaRPr lang="en-US" dirty="0"/>
+          </a:p>
+          <a:p>
+            <a:endParaRPr lang="en-US" dirty="0"/>
+          </a:p>
+          <a:p>
+            <a:r>
+              <a:rPr lang="en-US" u="sng" dirty="0"/>
+              <a:t>Payout </a:t>
+            </a:r>
+          </a:p>
+          <a:p>
+            <a:r>
+              <a:rPr lang="en-US" dirty="0"/>
+              <a:t>10-3 = €7</a:t>
+            </a:r>
+          </a:p>
+        </p:txBody>
+      </p:sp>
+      <p:sp>
+        <p:nvSpPr>
+          <p:cNvPr id="7" name="TextBox 6"/>
+          <p:cNvSpPr txBox="1"/>
+          <p:nvPr/>
+        </p:nvSpPr>
+        <p:spPr>
+          <a:xfrm>
+            <a:off x="3671023" y="3752310"/>
+            <a:ext cx="1894832" cy="2862323"/>
+          </a:xfrm>
+          <a:prstGeom prst="rect">
+            <a:avLst/>
+          </a:prstGeom>
+          <a:noFill/>
+          <a:ln>
+            <a:solidFill>
+              <a:srgbClr val="000000"/>
+            </a:solidFill>
+          </a:ln>
+        </p:spPr>
+        <p:txBody>
+          <a:bodyPr wrap="none" rtlCol="0">
+            <a:spAutoFit/>
+          </a:bodyPr>
+          <a:lstStyle/>
+          <a:p>
+            <a:r>
+              <a:rPr lang="en-US" b="1" dirty="0"/>
+              <a:t>Prey</a:t>
+            </a:r>
+          </a:p>
+          <a:p>
+            <a:endParaRPr lang="en-US" dirty="0"/>
+          </a:p>
+          <a:p>
+            <a:r>
+              <a:rPr lang="en-US" dirty="0"/>
+              <a:t>Endowment = €10</a:t>
+            </a:r>
+          </a:p>
+          <a:p>
+            <a:endParaRPr lang="en-US" dirty="0"/>
+          </a:p>
+          <a:p>
+            <a:endParaRPr lang="en-US" dirty="0"/>
+          </a:p>
+          <a:p>
+            <a:r>
+              <a:rPr lang="en-US" dirty="0"/>
+              <a:t>Investment = €4</a:t>
+            </a:r>
+          </a:p>
+          <a:p>
+            <a:endParaRPr lang="en-US" dirty="0"/>
+          </a:p>
+          <a:p>
+            <a:endParaRPr lang="en-US" dirty="0"/>
+          </a:p>
+          <a:p>
+            <a:r>
+              <a:rPr lang="en-US" u="sng" dirty="0"/>
+              <a:t>Payout </a:t>
+            </a:r>
+          </a:p>
+          <a:p>
+            <a:r>
+              <a:rPr lang="en-US" dirty="0"/>
+              <a:t>10-4 = €6</a:t>
+            </a:r>
+          </a:p>
+        </p:txBody>
+      </p:sp>
+      <p:sp>
+        <p:nvSpPr>
+          <p:cNvPr id="3" name="TextBox 2"/>
+          <p:cNvSpPr txBox="1"/>
+          <p:nvPr/>
+        </p:nvSpPr>
+        <p:spPr>
+          <a:xfrm>
+            <a:off x="2861206" y="3382978"/>
+            <a:ext cx="1409745" cy="369332"/>
+          </a:xfrm>
+          <a:prstGeom prst="rect">
+            <a:avLst/>
+          </a:prstGeom>
+          <a:noFill/>
+        </p:spPr>
+        <p:txBody>
+          <a:bodyPr wrap="none" rtlCol="0">
+            <a:spAutoFit/>
+          </a:bodyPr>
+          <a:lstStyle/>
+          <a:p>
+            <a:r>
+              <a:rPr lang="en-US" dirty="0" smtClean="0"/>
+              <a:t>Prey survives</a:t>
+            </a:r>
+            <a:endParaRPr lang="en-US" dirty="0"/>
+          </a:p>
+        </p:txBody>
+      </p:sp>
+      <p:sp>
+        <p:nvSpPr>
+          <p:cNvPr id="8" name="TextBox 7"/>
+          <p:cNvSpPr txBox="1"/>
+          <p:nvPr/>
+        </p:nvSpPr>
+        <p:spPr>
+          <a:xfrm>
+            <a:off x="7823695" y="3382978"/>
+            <a:ext cx="1408655" cy="369332"/>
+          </a:xfrm>
+          <a:prstGeom prst="rect">
+            <a:avLst/>
+          </a:prstGeom>
+          <a:noFill/>
+        </p:spPr>
+        <p:txBody>
+          <a:bodyPr wrap="none" rtlCol="0">
+            <a:spAutoFit/>
+          </a:bodyPr>
+          <a:lstStyle/>
+          <a:p>
+            <a:r>
+              <a:rPr lang="en-US" dirty="0" smtClean="0"/>
+              <a:t>Predator kills</a:t>
+            </a:r>
+            <a:endParaRPr lang="en-US" dirty="0"/>
+          </a:p>
+        </p:txBody>
+      </p:sp>
+      <p:sp>
+        <p:nvSpPr>
+          <p:cNvPr id="9" name="TextBox 8"/>
+          <p:cNvSpPr txBox="1"/>
+          <p:nvPr/>
+        </p:nvSpPr>
+        <p:spPr>
+          <a:xfrm>
+            <a:off x="6303831" y="3752310"/>
+            <a:ext cx="1894832" cy="2862323"/>
+          </a:xfrm>
+          <a:prstGeom prst="rect">
+            <a:avLst/>
+          </a:prstGeom>
+          <a:noFill/>
+          <a:ln>
+            <a:solidFill>
+              <a:srgbClr val="000000"/>
+            </a:solidFill>
+          </a:ln>
+        </p:spPr>
+        <p:txBody>
+          <a:bodyPr wrap="none" rtlCol="0">
+            <a:spAutoFit/>
+          </a:bodyPr>
+          <a:lstStyle/>
+          <a:p>
+            <a:r>
+              <a:rPr lang="en-US" b="1" dirty="0"/>
+              <a:t>Predator</a:t>
+            </a:r>
+          </a:p>
+          <a:p>
+            <a:endParaRPr lang="en-US" dirty="0"/>
+          </a:p>
+          <a:p>
+            <a:r>
+              <a:rPr lang="en-US" dirty="0"/>
+              <a:t>Endowment = €10</a:t>
+            </a:r>
+          </a:p>
+          <a:p>
+            <a:endParaRPr lang="en-US" dirty="0"/>
+          </a:p>
+          <a:p>
+            <a:endParaRPr lang="en-US" dirty="0"/>
+          </a:p>
+          <a:p>
+            <a:r>
+              <a:rPr lang="en-US" dirty="0"/>
+              <a:t>Investment = €5</a:t>
+            </a:r>
+          </a:p>
+          <a:p>
+            <a:endParaRPr lang="en-US" dirty="0"/>
+          </a:p>
+          <a:p>
+            <a:endParaRPr lang="en-US" dirty="0"/>
+          </a:p>
+          <a:p>
+            <a:r>
+              <a:rPr lang="en-US" u="sng" dirty="0"/>
+              <a:t>Payout </a:t>
+            </a:r>
+          </a:p>
+          <a:p>
+            <a:r>
+              <a:rPr lang="en-US" dirty="0"/>
+              <a:t>10-5+(10-4) = €11</a:t>
+            </a:r>
+          </a:p>
+        </p:txBody>
+      </p:sp>
+      <p:sp>
+        <p:nvSpPr>
+          <p:cNvPr id="10" name="TextBox 9"/>
+          <p:cNvSpPr txBox="1"/>
+          <p:nvPr/>
+        </p:nvSpPr>
+        <p:spPr>
+          <a:xfrm>
+            <a:off x="8652860" y="3752310"/>
+            <a:ext cx="1894832" cy="2862323"/>
+          </a:xfrm>
+          <a:prstGeom prst="rect">
+            <a:avLst/>
+          </a:prstGeom>
+          <a:noFill/>
+          <a:ln>
+            <a:solidFill>
+              <a:srgbClr val="000000"/>
+            </a:solidFill>
+          </a:ln>
+        </p:spPr>
+        <p:txBody>
+          <a:bodyPr wrap="none" rtlCol="0">
+            <a:spAutoFit/>
+          </a:bodyPr>
+          <a:lstStyle/>
+          <a:p>
+            <a:r>
+              <a:rPr lang="en-US" b="1" dirty="0"/>
+              <a:t>Prey</a:t>
+            </a:r>
+          </a:p>
+          <a:p>
+            <a:endParaRPr lang="en-US" dirty="0"/>
+          </a:p>
+          <a:p>
+            <a:r>
+              <a:rPr lang="en-US" dirty="0"/>
+              <a:t>Endowment = €10</a:t>
+            </a:r>
+          </a:p>
+          <a:p>
+            <a:endParaRPr lang="en-US" dirty="0"/>
+          </a:p>
+          <a:p>
+            <a:endParaRPr lang="en-US" dirty="0"/>
+          </a:p>
+          <a:p>
+            <a:r>
+              <a:rPr lang="en-US" dirty="0"/>
+              <a:t>Investment = €4</a:t>
+            </a:r>
+          </a:p>
+          <a:p>
+            <a:endParaRPr lang="en-US" dirty="0"/>
+          </a:p>
+          <a:p>
+            <a:endParaRPr lang="en-US" dirty="0"/>
+          </a:p>
+          <a:p>
+            <a:r>
+              <a:rPr lang="en-US" u="sng" dirty="0"/>
+              <a:t>Payout </a:t>
+            </a:r>
+          </a:p>
+          <a:p>
+            <a:r>
+              <a:rPr lang="en-US" dirty="0"/>
+              <a:t>€0</a:t>
+            </a:r>
+          </a:p>
+        </p:txBody>
+      </p:sp>
+    </p:spTree>
+    <p:extLst>
+      <p:ext uri="{BB962C8B-B14F-4D97-AF65-F5344CB8AC3E}">
+        <p14:creationId xmlns:p14="http://schemas.microsoft.com/office/powerpoint/2010/main" val="1334033000"/>
+      </p:ext>
+    </p:extLst>
+  </p:cSld>
+  <p:clrMapOvr>
+    <a:masterClrMapping/>
+  </p:clrMapOvr>
+</p:sld>
+</file>
+
+<file path=ppt/slides/slide30.xml><?xml version="1.0" encoding="utf-8"?>
 <p:sld xmlns:a="http://schemas.openxmlformats.org/drawingml/2006/main" xmlns:r="http://schemas.openxmlformats.org/officeDocument/2006/relationships" xmlns:p="http://schemas.openxmlformats.org/presentationml/2006/main">
   <p:cSld>
     <p:spTree>
@@ -8470,7 +11886,7 @@
 </p:sld>
 </file>
 
-<file path=ppt/slides/slide22.xml><?xml version="1.0" encoding="utf-8"?>
+<file path=ppt/slides/slide31.xml><?xml version="1.0" encoding="utf-8"?>
 <p:sld xmlns:a="http://schemas.openxmlformats.org/drawingml/2006/main" xmlns:r="http://schemas.openxmlformats.org/officeDocument/2006/relationships" xmlns:p="http://schemas.openxmlformats.org/presentationml/2006/main">
   <p:cSld>
     <p:spTree>
@@ -9153,7 +12569,7 @@
 </p:sld>
 </file>
 
-<file path=ppt/slides/slide23.xml><?xml version="1.0" encoding="utf-8"?>
+<file path=ppt/slides/slide32.xml><?xml version="1.0" encoding="utf-8"?>
 <p:sld xmlns:a="http://schemas.openxmlformats.org/drawingml/2006/main" xmlns:r="http://schemas.openxmlformats.org/officeDocument/2006/relationships" xmlns:p="http://schemas.openxmlformats.org/presentationml/2006/main">
   <p:cSld>
     <p:spTree>
@@ -10279,501 +13695,6 @@
     <p:extLst>
       <p:ext uri="{BB962C8B-B14F-4D97-AF65-F5344CB8AC3E}">
         <p14:creationId xmlns:p14="http://schemas.microsoft.com/office/powerpoint/2010/main" val="1598760859"/>
-      </p:ext>
-    </p:extLst>
-  </p:cSld>
-  <p:clrMapOvr>
-    <a:masterClrMapping/>
-  </p:clrMapOvr>
-</p:sld>
-</file>
-
-<file path=ppt/slides/slide3.xml><?xml version="1.0" encoding="utf-8"?>
-<p:sld xmlns:a="http://schemas.openxmlformats.org/drawingml/2006/main" xmlns:r="http://schemas.openxmlformats.org/officeDocument/2006/relationships" xmlns:p="http://schemas.openxmlformats.org/presentationml/2006/main">
-  <p:cSld>
-    <p:spTree>
-      <p:nvGrpSpPr>
-        <p:cNvPr id="1" name=""/>
-        <p:cNvGrpSpPr/>
-        <p:nvPr/>
-      </p:nvGrpSpPr>
-      <p:grpSpPr>
-        <a:xfrm>
-          <a:off x="0" y="0"/>
-          <a:ext cx="0" cy="0"/>
-          <a:chOff x="0" y="0"/>
-          <a:chExt cx="0" cy="0"/>
-        </a:xfrm>
-      </p:grpSpPr>
-      <p:sp>
-        <p:nvSpPr>
-          <p:cNvPr id="2" name="TextBox 1"/>
-          <p:cNvSpPr txBox="1"/>
-          <p:nvPr/>
-        </p:nvSpPr>
-        <p:spPr>
-          <a:xfrm>
-            <a:off x="4698124" y="609600"/>
-            <a:ext cx="2481449" cy="369332"/>
-          </a:xfrm>
-          <a:prstGeom prst="rect">
-            <a:avLst/>
-          </a:prstGeom>
-          <a:noFill/>
-        </p:spPr>
-        <p:txBody>
-          <a:bodyPr wrap="none" rtlCol="0">
-            <a:spAutoFit/>
-          </a:bodyPr>
-          <a:lstStyle/>
-          <a:p>
-            <a:r>
-              <a:rPr lang="en-US" dirty="0" smtClean="0"/>
-              <a:t>The Predator Prey Game</a:t>
-            </a:r>
-            <a:endParaRPr lang="en-US" dirty="0"/>
-          </a:p>
-        </p:txBody>
-      </p:sp>
-      <p:sp>
-        <p:nvSpPr>
-          <p:cNvPr id="5" name="TextBox 4"/>
-          <p:cNvSpPr txBox="1"/>
-          <p:nvPr/>
-        </p:nvSpPr>
-        <p:spPr>
-          <a:xfrm>
-            <a:off x="529021" y="1091906"/>
-            <a:ext cx="7721599" cy="2308324"/>
-          </a:xfrm>
-          <a:prstGeom prst="rect">
-            <a:avLst/>
-          </a:prstGeom>
-          <a:noFill/>
-        </p:spPr>
-        <p:txBody>
-          <a:bodyPr wrap="square" rtlCol="0">
-            <a:spAutoFit/>
-          </a:bodyPr>
-          <a:lstStyle/>
-          <a:p>
-            <a:r>
-              <a:rPr lang="en-US" dirty="0" smtClean="0"/>
-              <a:t>Two-player, one-shot design</a:t>
-            </a:r>
-          </a:p>
-          <a:p>
-            <a:r>
-              <a:rPr lang="en-US" dirty="0" smtClean="0"/>
-              <a:t>Rules</a:t>
-            </a:r>
-            <a:endParaRPr lang="en-US" dirty="0"/>
-          </a:p>
-          <a:p>
-            <a:pPr marL="285750" indent="-285750">
-              <a:buFont typeface="Arial" charset="0"/>
-              <a:buChar char="•"/>
-            </a:pPr>
-            <a:r>
-              <a:rPr lang="en-US" dirty="0"/>
-              <a:t>Each player starts with €</a:t>
-            </a:r>
-            <a:r>
-              <a:rPr lang="en-US" dirty="0" smtClean="0"/>
-              <a:t>10</a:t>
-            </a:r>
-            <a:endParaRPr lang="en-US" dirty="0"/>
-          </a:p>
-          <a:p>
-            <a:pPr marL="285750" indent="-285750">
-              <a:buFont typeface="Arial" charset="0"/>
-              <a:buChar char="•"/>
-            </a:pPr>
-            <a:r>
-              <a:rPr lang="en-US" dirty="0"/>
-              <a:t>If the prey invests as much or more than the predator, both keep their remaining </a:t>
-            </a:r>
-            <a:r>
-              <a:rPr lang="en-US" dirty="0" smtClean="0"/>
-              <a:t>endowment</a:t>
-            </a:r>
-            <a:endParaRPr lang="en-US" dirty="0"/>
-          </a:p>
-          <a:p>
-            <a:pPr marL="285750" indent="-285750">
-              <a:buFont typeface="Arial" charset="0"/>
-              <a:buChar char="•"/>
-            </a:pPr>
-            <a:r>
-              <a:rPr lang="en-US" dirty="0"/>
-              <a:t>If the predator invests more than the prey, predator adds preys remainder to his own remainder.</a:t>
-            </a:r>
-          </a:p>
-          <a:p>
-            <a:endParaRPr lang="en-US" dirty="0"/>
-          </a:p>
-        </p:txBody>
-      </p:sp>
-      <p:sp>
-        <p:nvSpPr>
-          <p:cNvPr id="6" name="TextBox 5"/>
-          <p:cNvSpPr txBox="1"/>
-          <p:nvPr/>
-        </p:nvSpPr>
-        <p:spPr>
-          <a:xfrm>
-            <a:off x="1319549" y="3752310"/>
-            <a:ext cx="1894832" cy="2862323"/>
-          </a:xfrm>
-          <a:prstGeom prst="rect">
-            <a:avLst/>
-          </a:prstGeom>
-          <a:noFill/>
-          <a:ln>
-            <a:solidFill>
-              <a:srgbClr val="000000"/>
-            </a:solidFill>
-          </a:ln>
-        </p:spPr>
-        <p:txBody>
-          <a:bodyPr wrap="none" rtlCol="0">
-            <a:spAutoFit/>
-          </a:bodyPr>
-          <a:lstStyle/>
-          <a:p>
-            <a:r>
-              <a:rPr lang="en-US" b="1" dirty="0"/>
-              <a:t>Predator</a:t>
-            </a:r>
-          </a:p>
-          <a:p>
-            <a:endParaRPr lang="en-US" dirty="0"/>
-          </a:p>
-          <a:p>
-            <a:r>
-              <a:rPr lang="en-US" dirty="0"/>
-              <a:t>Endowment = €10</a:t>
-            </a:r>
-          </a:p>
-          <a:p>
-            <a:endParaRPr lang="en-US" dirty="0"/>
-          </a:p>
-          <a:p>
-            <a:endParaRPr lang="en-US" dirty="0"/>
-          </a:p>
-          <a:p>
-            <a:r>
-              <a:rPr lang="en-US" dirty="0"/>
-              <a:t>Investment = €3</a:t>
-            </a:r>
-          </a:p>
-          <a:p>
-            <a:endParaRPr lang="en-US" dirty="0"/>
-          </a:p>
-          <a:p>
-            <a:endParaRPr lang="en-US" dirty="0"/>
-          </a:p>
-          <a:p>
-            <a:r>
-              <a:rPr lang="en-US" u="sng" dirty="0"/>
-              <a:t>Payout </a:t>
-            </a:r>
-          </a:p>
-          <a:p>
-            <a:r>
-              <a:rPr lang="en-US" dirty="0"/>
-              <a:t>10-3 = €7</a:t>
-            </a:r>
-            <a:endParaRPr lang="en-US" dirty="0"/>
-          </a:p>
-        </p:txBody>
-      </p:sp>
-      <p:sp>
-        <p:nvSpPr>
-          <p:cNvPr id="7" name="TextBox 6"/>
-          <p:cNvSpPr txBox="1"/>
-          <p:nvPr/>
-        </p:nvSpPr>
-        <p:spPr>
-          <a:xfrm>
-            <a:off x="3671023" y="3752310"/>
-            <a:ext cx="1894832" cy="2862323"/>
-          </a:xfrm>
-          <a:prstGeom prst="rect">
-            <a:avLst/>
-          </a:prstGeom>
-          <a:noFill/>
-          <a:ln>
-            <a:solidFill>
-              <a:srgbClr val="000000"/>
-            </a:solidFill>
-          </a:ln>
-        </p:spPr>
-        <p:txBody>
-          <a:bodyPr wrap="none" rtlCol="0">
-            <a:spAutoFit/>
-          </a:bodyPr>
-          <a:lstStyle/>
-          <a:p>
-            <a:r>
-              <a:rPr lang="en-US" b="1" dirty="0"/>
-              <a:t>Prey</a:t>
-            </a:r>
-          </a:p>
-          <a:p>
-            <a:endParaRPr lang="en-US" dirty="0"/>
-          </a:p>
-          <a:p>
-            <a:r>
-              <a:rPr lang="en-US" dirty="0"/>
-              <a:t>Endowment = €10</a:t>
-            </a:r>
-          </a:p>
-          <a:p>
-            <a:endParaRPr lang="en-US" dirty="0"/>
-          </a:p>
-          <a:p>
-            <a:endParaRPr lang="en-US" dirty="0"/>
-          </a:p>
-          <a:p>
-            <a:r>
-              <a:rPr lang="en-US" dirty="0"/>
-              <a:t>Investment = €4</a:t>
-            </a:r>
-          </a:p>
-          <a:p>
-            <a:endParaRPr lang="en-US" dirty="0"/>
-          </a:p>
-          <a:p>
-            <a:endParaRPr lang="en-US" dirty="0"/>
-          </a:p>
-          <a:p>
-            <a:r>
-              <a:rPr lang="en-US" u="sng" dirty="0"/>
-              <a:t>Payout </a:t>
-            </a:r>
-          </a:p>
-          <a:p>
-            <a:r>
-              <a:rPr lang="en-US" dirty="0"/>
-              <a:t>10-4 = €6</a:t>
-            </a:r>
-            <a:endParaRPr lang="en-US" dirty="0"/>
-          </a:p>
-        </p:txBody>
-      </p:sp>
-      <p:sp>
-        <p:nvSpPr>
-          <p:cNvPr id="3" name="TextBox 2"/>
-          <p:cNvSpPr txBox="1"/>
-          <p:nvPr/>
-        </p:nvSpPr>
-        <p:spPr>
-          <a:xfrm>
-            <a:off x="2861206" y="3382978"/>
-            <a:ext cx="1409745" cy="369332"/>
-          </a:xfrm>
-          <a:prstGeom prst="rect">
-            <a:avLst/>
-          </a:prstGeom>
-          <a:noFill/>
-        </p:spPr>
-        <p:txBody>
-          <a:bodyPr wrap="none" rtlCol="0">
-            <a:spAutoFit/>
-          </a:bodyPr>
-          <a:lstStyle/>
-          <a:p>
-            <a:r>
-              <a:rPr lang="en-US" dirty="0" smtClean="0"/>
-              <a:t>Prey survives</a:t>
-            </a:r>
-            <a:endParaRPr lang="en-US" dirty="0"/>
-          </a:p>
-        </p:txBody>
-      </p:sp>
-      <p:sp>
-        <p:nvSpPr>
-          <p:cNvPr id="8" name="TextBox 7"/>
-          <p:cNvSpPr txBox="1"/>
-          <p:nvPr/>
-        </p:nvSpPr>
-        <p:spPr>
-          <a:xfrm>
-            <a:off x="7823695" y="3382978"/>
-            <a:ext cx="1408655" cy="369332"/>
-          </a:xfrm>
-          <a:prstGeom prst="rect">
-            <a:avLst/>
-          </a:prstGeom>
-          <a:noFill/>
-        </p:spPr>
-        <p:txBody>
-          <a:bodyPr wrap="none" rtlCol="0">
-            <a:spAutoFit/>
-          </a:bodyPr>
-          <a:lstStyle/>
-          <a:p>
-            <a:r>
-              <a:rPr lang="en-US" dirty="0" smtClean="0"/>
-              <a:t>Predator kills</a:t>
-            </a:r>
-            <a:endParaRPr lang="en-US" dirty="0"/>
-          </a:p>
-        </p:txBody>
-      </p:sp>
-      <p:sp>
-        <p:nvSpPr>
-          <p:cNvPr id="9" name="TextBox 8"/>
-          <p:cNvSpPr txBox="1"/>
-          <p:nvPr/>
-        </p:nvSpPr>
-        <p:spPr>
-          <a:xfrm>
-            <a:off x="6303831" y="3752310"/>
-            <a:ext cx="1894832" cy="2862323"/>
-          </a:xfrm>
-          <a:prstGeom prst="rect">
-            <a:avLst/>
-          </a:prstGeom>
-          <a:noFill/>
-          <a:ln>
-            <a:solidFill>
-              <a:srgbClr val="000000"/>
-            </a:solidFill>
-          </a:ln>
-        </p:spPr>
-        <p:txBody>
-          <a:bodyPr wrap="none" rtlCol="0">
-            <a:spAutoFit/>
-          </a:bodyPr>
-          <a:lstStyle/>
-          <a:p>
-            <a:r>
-              <a:rPr lang="en-US" b="1" dirty="0"/>
-              <a:t>Predator</a:t>
-            </a:r>
-          </a:p>
-          <a:p>
-            <a:endParaRPr lang="en-US" dirty="0"/>
-          </a:p>
-          <a:p>
-            <a:r>
-              <a:rPr lang="en-US" dirty="0"/>
-              <a:t>Endowment = €10</a:t>
-            </a:r>
-          </a:p>
-          <a:p>
-            <a:endParaRPr lang="en-US" dirty="0"/>
-          </a:p>
-          <a:p>
-            <a:endParaRPr lang="en-US" dirty="0"/>
-          </a:p>
-          <a:p>
-            <a:r>
-              <a:rPr lang="en-US" dirty="0"/>
-              <a:t>Investment = €5</a:t>
-            </a:r>
-          </a:p>
-          <a:p>
-            <a:endParaRPr lang="en-US" dirty="0"/>
-          </a:p>
-          <a:p>
-            <a:endParaRPr lang="en-US" dirty="0"/>
-          </a:p>
-          <a:p>
-            <a:r>
-              <a:rPr lang="en-US" u="sng" dirty="0"/>
-              <a:t>Payout </a:t>
-            </a:r>
-          </a:p>
-          <a:p>
-            <a:r>
-              <a:rPr lang="en-US" dirty="0"/>
-              <a:t>10-5+(10-4) = €11</a:t>
-            </a:r>
-            <a:endParaRPr lang="en-US" dirty="0"/>
-          </a:p>
-        </p:txBody>
-      </p:sp>
-      <p:sp>
-        <p:nvSpPr>
-          <p:cNvPr id="10" name="TextBox 9"/>
-          <p:cNvSpPr txBox="1"/>
-          <p:nvPr/>
-        </p:nvSpPr>
-        <p:spPr>
-          <a:xfrm>
-            <a:off x="8652860" y="3752310"/>
-            <a:ext cx="1894832" cy="2862323"/>
-          </a:xfrm>
-          <a:prstGeom prst="rect">
-            <a:avLst/>
-          </a:prstGeom>
-          <a:noFill/>
-          <a:ln>
-            <a:solidFill>
-              <a:srgbClr val="000000"/>
-            </a:solidFill>
-          </a:ln>
-        </p:spPr>
-        <p:txBody>
-          <a:bodyPr wrap="none" rtlCol="0">
-            <a:spAutoFit/>
-          </a:bodyPr>
-          <a:lstStyle/>
-          <a:p>
-            <a:r>
-              <a:rPr lang="en-US" b="1" dirty="0"/>
-              <a:t>Prey</a:t>
-            </a:r>
-          </a:p>
-          <a:p>
-            <a:endParaRPr lang="en-US" dirty="0"/>
-          </a:p>
-          <a:p>
-            <a:r>
-              <a:rPr lang="en-US" dirty="0"/>
-              <a:t>Endowment = €10</a:t>
-            </a:r>
-          </a:p>
-          <a:p>
-            <a:endParaRPr lang="en-US" dirty="0"/>
-          </a:p>
-          <a:p>
-            <a:endParaRPr lang="en-US" dirty="0"/>
-          </a:p>
-          <a:p>
-            <a:r>
-              <a:rPr lang="en-US" dirty="0"/>
-              <a:t>Investment = €4</a:t>
-            </a:r>
-          </a:p>
-          <a:p>
-            <a:endParaRPr lang="en-US" dirty="0"/>
-          </a:p>
-          <a:p>
-            <a:endParaRPr lang="en-US" dirty="0"/>
-          </a:p>
-          <a:p>
-            <a:r>
-              <a:rPr lang="en-US" u="sng" dirty="0"/>
-              <a:t>Payout </a:t>
-            </a:r>
-          </a:p>
-          <a:p>
-            <a:r>
-              <a:rPr lang="en-US" dirty="0"/>
-              <a:t>€0</a:t>
-            </a:r>
-            <a:endParaRPr lang="en-US" dirty="0"/>
-          </a:p>
-        </p:txBody>
-      </p:sp>
-    </p:spTree>
-    <p:extLst>
-      <p:ext uri="{BB962C8B-B14F-4D97-AF65-F5344CB8AC3E}">
-        <p14:creationId xmlns:p14="http://schemas.microsoft.com/office/powerpoint/2010/main" val="1334033000"/>
       </p:ext>
     </p:extLst>
   </p:cSld>
@@ -11612,7 +14533,135 @@
                 <a:ea typeface="Arial" charset="0"/>
                 <a:cs typeface="Arial" charset="0"/>
               </a:rPr>
-              <a:t>. This expected payoff depends on his/her estimate of how likely it is that </a:t>
+              <a:t>. This expected payoff depends on his/her estimate of how likely it is that 𝑨</a:t>
+            </a:r>
+            <a:r>
+              <a:rPr lang="en-US" sz="1600" baseline="-25000" dirty="0">
+                <a:latin typeface="Arial" charset="0"/>
+                <a:ea typeface="Arial" charset="0"/>
+                <a:cs typeface="Arial" charset="0"/>
+              </a:rPr>
+              <a:t>𝒕 </a:t>
+            </a:r>
+            <a:r>
+              <a:rPr lang="en-US" sz="1600" dirty="0">
+                <a:latin typeface="Arial" charset="0"/>
+                <a:ea typeface="Arial" charset="0"/>
+                <a:cs typeface="Arial" charset="0"/>
+              </a:rPr>
+              <a:t> </a:t>
+            </a:r>
+            <a:r>
+              <a:rPr lang="en-US" sz="1600" dirty="0" smtClean="0">
+                <a:latin typeface="Arial" charset="0"/>
+                <a:ea typeface="Arial" charset="0"/>
+                <a:cs typeface="Arial" charset="0"/>
+              </a:rPr>
+              <a:t>will result in a victory: </a:t>
+            </a:r>
+            <a:r>
+              <a:rPr lang="en-US" sz="1600" dirty="0">
+                <a:latin typeface="Arial" charset="0"/>
+                <a:ea typeface="Arial" charset="0"/>
+                <a:cs typeface="Arial" charset="0"/>
+              </a:rPr>
+              <a:t>𝑷</a:t>
+            </a:r>
+            <a:r>
+              <a:rPr lang="en-US" sz="1600" baseline="-25000" dirty="0">
+                <a:latin typeface="Arial" charset="0"/>
+                <a:ea typeface="Arial" charset="0"/>
+                <a:cs typeface="Arial" charset="0"/>
+              </a:rPr>
+              <a:t>𝑹,𝒕</a:t>
+            </a:r>
+            <a:r>
+              <a:rPr lang="en-US" sz="1600" dirty="0">
+                <a:latin typeface="Arial" charset="0"/>
+                <a:ea typeface="Arial" charset="0"/>
+                <a:cs typeface="Arial" charset="0"/>
+              </a:rPr>
+              <a:t> (𝑫</a:t>
+            </a:r>
+            <a:r>
+              <a:rPr lang="en-US" sz="1600" baseline="-25000" dirty="0">
+                <a:latin typeface="Arial" charset="0"/>
+                <a:ea typeface="Arial" charset="0"/>
+                <a:cs typeface="Arial" charset="0"/>
+              </a:rPr>
+              <a:t>𝒕</a:t>
+            </a:r>
+            <a:r>
+              <a:rPr lang="en-US" sz="1600" dirty="0">
+                <a:latin typeface="Arial" charset="0"/>
+                <a:ea typeface="Arial" charset="0"/>
+                <a:cs typeface="Arial" charset="0"/>
+              </a:rPr>
+              <a:t> = 𝟏|𝑨</a:t>
+            </a:r>
+            <a:r>
+              <a:rPr lang="en-US" sz="1600" baseline="-25000" dirty="0">
+                <a:latin typeface="Arial" charset="0"/>
+                <a:ea typeface="Arial" charset="0"/>
+                <a:cs typeface="Arial" charset="0"/>
+              </a:rPr>
+              <a:t>𝒕</a:t>
+            </a:r>
+            <a:r>
+              <a:rPr lang="en-US" sz="1600" dirty="0">
+                <a:latin typeface="Arial" charset="0"/>
+                <a:ea typeface="Arial" charset="0"/>
+                <a:cs typeface="Arial" charset="0"/>
+              </a:rPr>
+              <a:t>).</a:t>
+            </a:r>
+            <a:r>
+              <a:rPr lang="en-US" sz="1600" dirty="0" smtClean="0">
+                <a:latin typeface="Arial" charset="0"/>
+                <a:ea typeface="Arial" charset="0"/>
+                <a:cs typeface="Arial" charset="0"/>
+              </a:rPr>
+              <a:t> This will occur if </a:t>
+            </a:r>
+            <a:r>
+              <a:rPr lang="en-US" sz="1600" b="1" i="1" dirty="0" smtClean="0">
+                <a:latin typeface="Arial" charset="0"/>
+                <a:ea typeface="Arial" charset="0"/>
+                <a:cs typeface="Arial" charset="0"/>
+              </a:rPr>
+              <a:t>R</a:t>
+            </a:r>
+            <a:r>
+              <a:rPr lang="en-US" sz="1600" dirty="0" smtClean="0">
+                <a:latin typeface="Arial" charset="0"/>
+                <a:ea typeface="Arial" charset="0"/>
+                <a:cs typeface="Arial" charset="0"/>
+              </a:rPr>
+              <a:t>’s investment </a:t>
+            </a:r>
+            <a:r>
+              <a:rPr lang="en-US" sz="1600" b="1" i="1" dirty="0" smtClean="0">
+                <a:latin typeface="Arial" charset="0"/>
+                <a:ea typeface="Arial" charset="0"/>
+                <a:cs typeface="Arial" charset="0"/>
+              </a:rPr>
+              <a:t>I</a:t>
+            </a:r>
+            <a:r>
+              <a:rPr lang="en-US" sz="1600" b="1" i="1" baseline="-25000" dirty="0" smtClean="0">
+                <a:latin typeface="Arial" charset="0"/>
+                <a:ea typeface="Arial" charset="0"/>
+                <a:cs typeface="Arial" charset="0"/>
+              </a:rPr>
+              <a:t>t</a:t>
+            </a:r>
+            <a:r>
+              <a:rPr lang="en-US" sz="1600" dirty="0" smtClean="0">
+                <a:latin typeface="Arial" charset="0"/>
+                <a:ea typeface="Arial" charset="0"/>
+                <a:cs typeface="Arial" charset="0"/>
+              </a:rPr>
+              <a:t> is lower than </a:t>
             </a:r>
             <a:r>
               <a:rPr lang="en-US" sz="1600" dirty="0">
@@ -11631,28 +14680,36 @@
               <a:t>𝒕 </a:t>
             </a:r>
             <a:r>
-              <a:rPr lang="en-US" sz="1600" dirty="0">
-                <a:latin typeface="Arial" charset="0"/>
-                <a:ea typeface="Arial" charset="0"/>
-                <a:cs typeface="Arial" charset="0"/>
-              </a:rPr>
-              <a:t> </a:t>
-            </a:r>
-            <a:r>
-              <a:rPr lang="en-US" sz="1600" dirty="0" smtClean="0">
-                <a:latin typeface="Arial" charset="0"/>
-                <a:ea typeface="Arial" charset="0"/>
-                <a:cs typeface="Arial" charset="0"/>
-              </a:rPr>
-              <a:t>will result in a victory: </a:t>
-            </a:r>
-            <a:r>
-              <a:rPr lang="en-US" sz="1600" dirty="0">
-                <a:latin typeface="Arial" charset="0"/>
-                <a:ea typeface="Arial" charset="0"/>
-                <a:cs typeface="Arial" charset="0"/>
-              </a:rPr>
-              <a:t>𝑷</a:t>
+              <a:rPr lang="en-US" sz="1600" dirty="0" smtClean="0">
+                <a:latin typeface="Arial" charset="0"/>
+                <a:ea typeface="Arial" charset="0"/>
+                <a:cs typeface="Arial" charset="0"/>
+              </a:rPr>
+              <a:t>in the case of predators and lower than or equal to 𝑨</a:t>
+            </a:r>
+            <a:r>
+              <a:rPr lang="en-US" sz="1600" baseline="-25000" dirty="0" smtClean="0">
+                <a:latin typeface="Arial" charset="0"/>
+                <a:ea typeface="Arial" charset="0"/>
+                <a:cs typeface="Arial" charset="0"/>
+              </a:rPr>
+              <a:t>𝒕</a:t>
+            </a:r>
+            <a:r>
+              <a:rPr lang="en-US" sz="1600" dirty="0" smtClean="0">
+                <a:latin typeface="Arial" charset="0"/>
+                <a:ea typeface="Arial" charset="0"/>
+                <a:cs typeface="Arial" charset="0"/>
+              </a:rPr>
+              <a:t> in the case of prey. For </a:t>
+            </a:r>
+            <a:r>
+              <a:rPr lang="en-US" sz="1600" dirty="0">
+                <a:latin typeface="Arial" charset="0"/>
+                <a:ea typeface="Arial" charset="0"/>
+                <a:cs typeface="Arial" charset="0"/>
+              </a:rPr>
+              <a:t>simplicity, this will be referred to as 𝑷</a:t>
             </a:r>
             <a:r>
               <a:rPr lang="en-US" sz="1600" baseline="-25000" dirty="0">
@@ -11668,7 +14725,31 @@
                 <a:ea typeface="Arial" charset="0"/>
                 <a:cs typeface="Arial" charset="0"/>
               </a:rPr>
-              <a:t> (𝑫</a:t>
+              <a:t>(</a:t>
+            </a:r>
+            <a:r>
+              <a:rPr lang="en-US" sz="1600" dirty="0" smtClean="0">
+                <a:latin typeface="Arial" charset="0"/>
+                <a:ea typeface="Arial" charset="0"/>
+                <a:cs typeface="Arial" charset="0"/>
+              </a:rPr>
+              <a:t>𝑨</a:t>
+            </a:r>
+            <a:r>
+              <a:rPr lang="en-US" sz="1600" baseline="-25000" dirty="0" smtClean="0">
+                <a:latin typeface="Arial" charset="0"/>
+                <a:ea typeface="Arial" charset="0"/>
+                <a:cs typeface="Arial" charset="0"/>
+              </a:rPr>
+              <a:t>𝒕</a:t>
+            </a:r>
+            <a:r>
+              <a:rPr lang="en-US" sz="1600" dirty="0">
+                <a:latin typeface="Arial" charset="0"/>
+                <a:ea typeface="Arial" charset="0"/>
+                <a:cs typeface="Arial" charset="0"/>
+              </a:rPr>
+              <a:t>). 𝑷’s expected payoff 𝑽</a:t>
             </a:r>
             <a:r>
               <a:rPr lang="en-US" sz="1600" baseline="-25000" dirty="0">
@@ -11684,7 +14765,7 @@
                 <a:ea typeface="Arial" charset="0"/>
                 <a:cs typeface="Arial" charset="0"/>
               </a:rPr>
-              <a:t> = 𝟏|𝑨</a:t>
+              <a:t> for the offer 𝑨</a:t>
             </a:r>
             <a:r>
               <a:rPr lang="en-US" sz="1600" baseline="-25000" dirty="0">
@@ -11700,183 +14781,7 @@
                 <a:ea typeface="Arial" charset="0"/>
                 <a:cs typeface="Arial" charset="0"/>
               </a:rPr>
-              <a:t>).</a:t>
-            </a:r>
-            <a:r>
-              <a:rPr lang="en-US" sz="1600" dirty="0" smtClean="0">
-                <a:latin typeface="Arial" charset="0"/>
-                <a:ea typeface="Arial" charset="0"/>
-                <a:cs typeface="Arial" charset="0"/>
-              </a:rPr>
-              <a:t> This will occur if </a:t>
-            </a:r>
-            <a:r>
-              <a:rPr lang="en-US" sz="1600" b="1" i="1" dirty="0" smtClean="0">
-                <a:latin typeface="Arial" charset="0"/>
-                <a:ea typeface="Arial" charset="0"/>
-                <a:cs typeface="Arial" charset="0"/>
-              </a:rPr>
-              <a:t>R</a:t>
-            </a:r>
-            <a:r>
-              <a:rPr lang="en-US" sz="1600" dirty="0" smtClean="0">
-                <a:latin typeface="Arial" charset="0"/>
-                <a:ea typeface="Arial" charset="0"/>
-                <a:cs typeface="Arial" charset="0"/>
-              </a:rPr>
-              <a:t>’s investment </a:t>
-            </a:r>
-            <a:r>
-              <a:rPr lang="en-US" sz="1600" b="1" i="1" dirty="0" smtClean="0">
-                <a:latin typeface="Arial" charset="0"/>
-                <a:ea typeface="Arial" charset="0"/>
-                <a:cs typeface="Arial" charset="0"/>
-              </a:rPr>
-              <a:t>I</a:t>
-            </a:r>
-            <a:r>
-              <a:rPr lang="en-US" sz="1600" b="1" i="1" baseline="-25000" dirty="0" smtClean="0">
-                <a:latin typeface="Arial" charset="0"/>
-                <a:ea typeface="Arial" charset="0"/>
-                <a:cs typeface="Arial" charset="0"/>
-              </a:rPr>
-              <a:t>t</a:t>
-            </a:r>
-            <a:r>
-              <a:rPr lang="en-US" sz="1600" dirty="0" smtClean="0">
-                <a:latin typeface="Arial" charset="0"/>
-                <a:ea typeface="Arial" charset="0"/>
-                <a:cs typeface="Arial" charset="0"/>
-              </a:rPr>
-              <a:t> is lower than </a:t>
-            </a:r>
-            <a:r>
-              <a:rPr lang="en-US" sz="1600" dirty="0">
-                <a:latin typeface="Arial" charset="0"/>
-                <a:ea typeface="Arial" charset="0"/>
-                <a:cs typeface="Arial" charset="0"/>
-              </a:rPr>
-              <a:t>𝑨</a:t>
-            </a:r>
-            <a:r>
-              <a:rPr lang="en-US" sz="1600" baseline="-25000" dirty="0">
-                <a:latin typeface="Arial" charset="0"/>
-                <a:ea typeface="Arial" charset="0"/>
-                <a:cs typeface="Arial" charset="0"/>
-              </a:rPr>
-              <a:t>𝒕 </a:t>
-            </a:r>
-            <a:r>
-              <a:rPr lang="en-US" sz="1600" dirty="0" smtClean="0">
-                <a:latin typeface="Arial" charset="0"/>
-                <a:ea typeface="Arial" charset="0"/>
-                <a:cs typeface="Arial" charset="0"/>
-              </a:rPr>
-              <a:t>in the case of predators and lower than or equal to 𝑨</a:t>
-            </a:r>
-            <a:r>
-              <a:rPr lang="en-US" sz="1600" baseline="-25000" dirty="0" smtClean="0">
-                <a:latin typeface="Arial" charset="0"/>
-                <a:ea typeface="Arial" charset="0"/>
-                <a:cs typeface="Arial" charset="0"/>
-              </a:rPr>
-              <a:t>𝒕</a:t>
-            </a:r>
-            <a:r>
-              <a:rPr lang="en-US" sz="1600" dirty="0" smtClean="0">
-                <a:latin typeface="Arial" charset="0"/>
-                <a:ea typeface="Arial" charset="0"/>
-                <a:cs typeface="Arial" charset="0"/>
-              </a:rPr>
-              <a:t> in the case of prey. For </a:t>
-            </a:r>
-            <a:r>
-              <a:rPr lang="en-US" sz="1600" dirty="0">
-                <a:latin typeface="Arial" charset="0"/>
-                <a:ea typeface="Arial" charset="0"/>
-                <a:cs typeface="Arial" charset="0"/>
-              </a:rPr>
-              <a:t>simplicity, this will be referred to as 𝑷</a:t>
-            </a:r>
-            <a:r>
-              <a:rPr lang="en-US" sz="1600" baseline="-25000" dirty="0">
-                <a:latin typeface="Arial" charset="0"/>
-                <a:ea typeface="Arial" charset="0"/>
-                <a:cs typeface="Arial" charset="0"/>
-              </a:rPr>
-              <a:t>𝑹,𝒕</a:t>
-            </a:r>
-            <a:r>
-              <a:rPr lang="en-US" sz="1600" dirty="0">
-                <a:latin typeface="Arial" charset="0"/>
-                <a:ea typeface="Arial" charset="0"/>
-                <a:cs typeface="Arial" charset="0"/>
-              </a:rPr>
-              <a:t>(</a:t>
-            </a:r>
-            <a:r>
-              <a:rPr lang="en-US" sz="1600" dirty="0" smtClean="0">
-                <a:latin typeface="Arial" charset="0"/>
-                <a:ea typeface="Arial" charset="0"/>
-                <a:cs typeface="Arial" charset="0"/>
-              </a:rPr>
-              <a:t>𝑨</a:t>
-            </a:r>
-            <a:r>
-              <a:rPr lang="en-US" sz="1600" baseline="-25000" dirty="0" smtClean="0">
-                <a:latin typeface="Arial" charset="0"/>
-                <a:ea typeface="Arial" charset="0"/>
-                <a:cs typeface="Arial" charset="0"/>
-              </a:rPr>
-              <a:t>𝒕</a:t>
-            </a:r>
-            <a:r>
-              <a:rPr lang="en-US" sz="1600" dirty="0">
-                <a:latin typeface="Arial" charset="0"/>
-                <a:ea typeface="Arial" charset="0"/>
-                <a:cs typeface="Arial" charset="0"/>
-              </a:rPr>
-              <a:t>). 𝑷’s expected payoff 𝑽</a:t>
-            </a:r>
-            <a:r>
-              <a:rPr lang="en-US" sz="1600" baseline="-25000" dirty="0">
-                <a:latin typeface="Arial" charset="0"/>
-                <a:ea typeface="Arial" charset="0"/>
-                <a:cs typeface="Arial" charset="0"/>
-              </a:rPr>
-              <a:t>𝒕</a:t>
-            </a:r>
-            <a:r>
-              <a:rPr lang="en-US" sz="1600" dirty="0">
-                <a:latin typeface="Arial" charset="0"/>
-                <a:ea typeface="Arial" charset="0"/>
-                <a:cs typeface="Arial" charset="0"/>
-              </a:rPr>
-              <a:t> for the offer 𝑨</a:t>
-            </a:r>
-            <a:r>
-              <a:rPr lang="en-US" sz="1600" baseline="-25000" dirty="0">
-                <a:latin typeface="Arial" charset="0"/>
-                <a:ea typeface="Arial" charset="0"/>
-                <a:cs typeface="Arial" charset="0"/>
-              </a:rPr>
-              <a:t>𝒕</a:t>
-            </a:r>
-            <a:r>
-              <a:rPr lang="en-US" sz="1600" dirty="0">
-                <a:latin typeface="Arial" charset="0"/>
-                <a:ea typeface="Arial" charset="0"/>
-                <a:cs typeface="Arial" charset="0"/>
-              </a:rPr>
-              <a:t> is:</a:t>
-            </a:r>
-            <a:r>
-              <a:rPr lang="en-US" sz="1600" dirty="0">
-                <a:latin typeface="Arial" charset="0"/>
-                <a:ea typeface="Arial" charset="0"/>
-                <a:cs typeface="Arial" charset="0"/>
-              </a:rPr>
-              <a:t>  </a:t>
+              <a:t> is:  </a:t>
             </a:r>
           </a:p>
           <a:p>
@@ -12899,8 +15804,8 @@
           <a:chExt cx="0" cy="0"/>
         </a:xfrm>
       </p:grpSpPr>
-      <mc:AlternateContent xmlns:mc="http://schemas.openxmlformats.org/markup-compatibility/2006">
-        <mc:Choice xmlns:a14="http://schemas.microsoft.com/office/drawing/2010/main" Requires="a14">
+      <mc:AlternateContent xmlns:mc="http://schemas.openxmlformats.org/markup-compatibility/2006" xmlns:a14="http://schemas.microsoft.com/office/drawing/2010/main">
+        <mc:Choice Requires="a14">
           <p:sp>
             <p:nvSpPr>
               <p:cNvPr id="4" name="Rectangle 3"/>
@@ -13056,7 +15961,7 @@
                       <m:fPr>
                         <m:ctrlPr>
                           <a:rPr lang="en-US" b="1" i="1">
-                            <a:latin typeface="Arial" charset="0"/>
+                            <a:latin typeface="Cambria Math" charset="0"/>
                             <a:ea typeface="Arial" charset="0"/>
                             <a:cs typeface="Arial" charset="0"/>
                           </a:rPr>
@@ -13065,7 +15970,7 @@
                       <m:num>
                         <m:r>
                           <a:rPr lang="en-US" b="1" i="1">
-                            <a:latin typeface="Arial" charset="0"/>
+                            <a:latin typeface="Cambria Math" charset="0"/>
                             <a:ea typeface="Arial" charset="0"/>
                             <a:cs typeface="Arial" charset="0"/>
                           </a:rPr>
@@ -13073,7 +15978,7 @@
                         </m:r>
                         <m:r>
                           <a:rPr lang="en-US" b="1" i="1" smtClean="0">
-                            <a:latin typeface="Arial" charset="0"/>
+                            <a:latin typeface="Cambria Math" charset="0"/>
                             <a:ea typeface="Arial" charset="0"/>
                             <a:cs typeface="Arial" charset="0"/>
                           </a:rPr>
@@ -13081,7 +15986,7 @@
                         </m:r>
                         <m:r>
                           <a:rPr lang="en-US" b="1" i="1">
-                            <a:latin typeface="Arial" charset="0"/>
+                            <a:latin typeface="Cambria Math" charset="0"/>
                             <a:ea typeface="Arial" charset="0"/>
                             <a:cs typeface="Arial" charset="0"/>
                           </a:rPr>
@@ -13091,7 +15996,7 @@
                           <m:sSubPr>
                             <m:ctrlPr>
                               <a:rPr lang="en-US" b="1" i="1">
-                                <a:latin typeface="Arial" charset="0"/>
+                                <a:latin typeface="Cambria Math" charset="0"/>
                                 <a:ea typeface="Arial" charset="0"/>
                                 <a:cs typeface="Arial" charset="0"/>
                               </a:rPr>
@@ -13100,7 +16005,7 @@
                           <m:e>
                             <m:r>
                               <a:rPr lang="en-US" b="1" i="1">
-                                <a:latin typeface="Arial" charset="0"/>
+                                <a:latin typeface="Cambria Math" charset="0"/>
                                 <a:ea typeface="Arial" charset="0"/>
                                 <a:cs typeface="Arial" charset="0"/>
                               </a:rPr>
@@ -13126,7 +16031,7 @@
                             <m:limLoc m:val="subSup"/>
                             <m:ctrlPr>
                               <a:rPr lang="en-US" b="1" i="1">
-                                <a:latin typeface="Arial" charset="0"/>
+                                <a:latin typeface="Cambria Math" charset="0"/>
                                 <a:ea typeface="Arial" charset="0"/>
                                 <a:cs typeface="Arial" charset="0"/>
                               </a:rPr>
@@ -13135,7 +16040,7 @@
                           <m:sub>
                             <m:r>
                               <a:rPr lang="en-US" b="1" i="1">
-                                <a:latin typeface="Arial" charset="0"/>
+                                <a:latin typeface="Cambria Math" charset="0"/>
                                 <a:ea typeface="Arial" charset="0"/>
                                 <a:cs typeface="Arial" charset="0"/>
                               </a:rPr>
@@ -13143,7 +16048,7 @@
                             </m:r>
                             <m:r>
                               <a:rPr lang="en-US" b="1" i="1">
-                                <a:latin typeface="Arial" charset="0"/>
+                                <a:latin typeface="Cambria Math" charset="0"/>
                                 <a:ea typeface="Arial" charset="0"/>
                                 <a:cs typeface="Arial" charset="0"/>
                               </a:rPr>
@@ -13151,7 +16056,7 @@
                             </m:r>
                             <m:r>
                               <a:rPr lang="en-US" b="1" i="1">
-                                <a:latin typeface="Arial" charset="0"/>
+                                <a:latin typeface="Cambria Math" charset="0"/>
                                 <a:ea typeface="Arial" charset="0"/>
                                 <a:cs typeface="Arial" charset="0"/>
                               </a:rPr>
@@ -13161,7 +16066,7 @@
                           <m:sup>
                             <m:r>
                               <a:rPr lang="en-US" b="1" i="1">
-                                <a:latin typeface="Arial" charset="0"/>
+                                <a:latin typeface="Cambria Math" charset="0"/>
                                 <a:ea typeface="Arial" charset="0"/>
                                 <a:cs typeface="Arial" charset="0"/>
                               </a:rPr>
@@ -13171,7 +16076,7 @@
                           <m:e>
                             <m:r>
                               <a:rPr lang="en-US" b="1" i="1" smtClean="0">
-                                <a:latin typeface="Arial" charset="0"/>
+                                <a:latin typeface="Cambria Math" charset="0"/>
                                 <a:ea typeface="Arial" charset="0"/>
                                 <a:cs typeface="Arial" charset="0"/>
                               </a:rPr>
@@ -13179,7 +16084,7 @@
                             </m:r>
                             <m:r>
                               <a:rPr lang="en-US" b="1" i="1">
-                                <a:latin typeface="Arial" charset="0"/>
+                                <a:latin typeface="Cambria Math" charset="0"/>
                                 <a:ea typeface="Arial" charset="0"/>
                                 <a:cs typeface="Arial" charset="0"/>
                               </a:rPr>
@@ -13189,7 +16094,7 @@
                               <m:sSubPr>
                                 <m:ctrlPr>
                                   <a:rPr lang="en-US" b="1" i="1" smtClean="0">
-                                    <a:latin typeface="Arial" charset="0"/>
+                                    <a:latin typeface="Cambria Math" charset="0"/>
                                     <a:ea typeface="Arial" charset="0"/>
                                     <a:cs typeface="Arial" charset="0"/>
                                   </a:rPr>
@@ -13198,7 +16103,7 @@
                               <m:e>
                                 <m:r>
                                   <a:rPr lang="en-US" b="1" i="1">
-                                    <a:latin typeface="Arial" charset="0"/>
+                                    <a:latin typeface="Cambria Math" charset="0"/>
                                     <a:ea typeface="Arial" charset="0"/>
                                     <a:cs typeface="Arial" charset="0"/>
                                   </a:rPr>
@@ -13546,7 +16451,7 @@
             </p:txBody>
           </p:sp>
         </mc:Choice>
-        <mc:Fallback>
+        <mc:Fallback xmlns="">
           <p:sp>
             <p:nvSpPr>
               <p:cNvPr id="4" name="Rectangle 3"/>

</xml_diff>

<commit_message>
made fitting apply to mulptiple sessions
</commit_message>
<xml_diff>
--- a/PPG/reports/PPG progress report 2017_09_26.pptx
+++ b/PPG/reports/PPG progress report 2017_09_26.pptx
@@ -5,7 +5,7 @@
     <p:sldMasterId id="2147483648" r:id="rId1"/>
   </p:sldMasterIdLst>
   <p:notesMasterIdLst>
-    <p:notesMasterId r:id="rId36"/>
+    <p:notesMasterId r:id="rId38"/>
   </p:notesMasterIdLst>
   <p:sldIdLst>
     <p:sldId id="256" r:id="rId2"/>
@@ -38,10 +38,12 @@
     <p:sldId id="303" r:id="rId29"/>
     <p:sldId id="301" r:id="rId30"/>
     <p:sldId id="286" r:id="rId31"/>
-    <p:sldId id="274" r:id="rId32"/>
-    <p:sldId id="275" r:id="rId33"/>
-    <p:sldId id="276" r:id="rId34"/>
-    <p:sldId id="288" r:id="rId35"/>
+    <p:sldId id="305" r:id="rId32"/>
+    <p:sldId id="306" r:id="rId33"/>
+    <p:sldId id="274" r:id="rId34"/>
+    <p:sldId id="275" r:id="rId35"/>
+    <p:sldId id="276" r:id="rId36"/>
+    <p:sldId id="288" r:id="rId37"/>
   </p:sldIdLst>
   <p:sldSz cx="12192000" cy="6858000"/>
   <p:notesSz cx="6858000" cy="9144000"/>
@@ -230,7 +232,7 @@
           <a:p>
             <a:fld id="{93497C26-5219-954A-A522-4F368E7A7ADA}" type="datetimeFigureOut">
               <a:rPr lang="en-US" smtClean="0"/>
-              <a:t>10/12/17</a:t>
+              <a:t>10/15/17</a:t>
             </a:fld>
             <a:endParaRPr lang="en-US"/>
           </a:p>
@@ -899,7 +901,7 @@
           <a:p>
             <a:fld id="{A2BA52DA-B0BC-A24E-B717-007855D4CE0B}" type="slidenum">
               <a:rPr lang="en-US" smtClean="0"/>
-              <a:t>32</a:t>
+              <a:t>34</a:t>
             </a:fld>
             <a:endParaRPr lang="en-US"/>
           </a:p>
@@ -983,7 +985,7 @@
           <a:p>
             <a:fld id="{A2BA52DA-B0BC-A24E-B717-007855D4CE0B}" type="slidenum">
               <a:rPr lang="en-US" smtClean="0"/>
-              <a:t>33</a:t>
+              <a:t>35</a:t>
             </a:fld>
             <a:endParaRPr lang="en-US"/>
           </a:p>
@@ -1067,7 +1069,7 @@
           <a:p>
             <a:fld id="{A2BA52DA-B0BC-A24E-B717-007855D4CE0B}" type="slidenum">
               <a:rPr lang="en-US" smtClean="0"/>
-              <a:t>34</a:t>
+              <a:t>36</a:t>
             </a:fld>
             <a:endParaRPr lang="en-US"/>
           </a:p>
@@ -1217,7 +1219,7 @@
           <a:p>
             <a:fld id="{AB24BD30-CF79-6742-90BF-1953A7F126BB}" type="datetimeFigureOut">
               <a:rPr lang="en-US" smtClean="0"/>
-              <a:t>10/12/17</a:t>
+              <a:t>10/15/17</a:t>
             </a:fld>
             <a:endParaRPr lang="en-US"/>
           </a:p>
@@ -1387,7 +1389,7 @@
           <a:p>
             <a:fld id="{AB24BD30-CF79-6742-90BF-1953A7F126BB}" type="datetimeFigureOut">
               <a:rPr lang="en-US" smtClean="0"/>
-              <a:t>10/12/17</a:t>
+              <a:t>10/15/17</a:t>
             </a:fld>
             <a:endParaRPr lang="en-US"/>
           </a:p>
@@ -1567,7 +1569,7 @@
           <a:p>
             <a:fld id="{AB24BD30-CF79-6742-90BF-1953A7F126BB}" type="datetimeFigureOut">
               <a:rPr lang="en-US" smtClean="0"/>
-              <a:t>10/12/17</a:t>
+              <a:t>10/15/17</a:t>
             </a:fld>
             <a:endParaRPr lang="en-US"/>
           </a:p>
@@ -1737,7 +1739,7 @@
           <a:p>
             <a:fld id="{AB24BD30-CF79-6742-90BF-1953A7F126BB}" type="datetimeFigureOut">
               <a:rPr lang="en-US" smtClean="0"/>
-              <a:t>10/12/17</a:t>
+              <a:t>10/15/17</a:t>
             </a:fld>
             <a:endParaRPr lang="en-US"/>
           </a:p>
@@ -1983,7 +1985,7 @@
           <a:p>
             <a:fld id="{AB24BD30-CF79-6742-90BF-1953A7F126BB}" type="datetimeFigureOut">
               <a:rPr lang="en-US" smtClean="0"/>
-              <a:t>10/12/17</a:t>
+              <a:t>10/15/17</a:t>
             </a:fld>
             <a:endParaRPr lang="en-US"/>
           </a:p>
@@ -2215,7 +2217,7 @@
           <a:p>
             <a:fld id="{AB24BD30-CF79-6742-90BF-1953A7F126BB}" type="datetimeFigureOut">
               <a:rPr lang="en-US" smtClean="0"/>
-              <a:t>10/12/17</a:t>
+              <a:t>10/15/17</a:t>
             </a:fld>
             <a:endParaRPr lang="en-US"/>
           </a:p>
@@ -2582,7 +2584,7 @@
           <a:p>
             <a:fld id="{AB24BD30-CF79-6742-90BF-1953A7F126BB}" type="datetimeFigureOut">
               <a:rPr lang="en-US" smtClean="0"/>
-              <a:t>10/12/17</a:t>
+              <a:t>10/15/17</a:t>
             </a:fld>
             <a:endParaRPr lang="en-US"/>
           </a:p>
@@ -2700,7 +2702,7 @@
           <a:p>
             <a:fld id="{AB24BD30-CF79-6742-90BF-1953A7F126BB}" type="datetimeFigureOut">
               <a:rPr lang="en-US" smtClean="0"/>
-              <a:t>10/12/17</a:t>
+              <a:t>10/15/17</a:t>
             </a:fld>
             <a:endParaRPr lang="en-US"/>
           </a:p>
@@ -2795,7 +2797,7 @@
           <a:p>
             <a:fld id="{AB24BD30-CF79-6742-90BF-1953A7F126BB}" type="datetimeFigureOut">
               <a:rPr lang="en-US" smtClean="0"/>
-              <a:t>10/12/17</a:t>
+              <a:t>10/15/17</a:t>
             </a:fld>
             <a:endParaRPr lang="en-US"/>
           </a:p>
@@ -3072,7 +3074,7 @@
           <a:p>
             <a:fld id="{AB24BD30-CF79-6742-90BF-1953A7F126BB}" type="datetimeFigureOut">
               <a:rPr lang="en-US" smtClean="0"/>
-              <a:t>10/12/17</a:t>
+              <a:t>10/15/17</a:t>
             </a:fld>
             <a:endParaRPr lang="en-US"/>
           </a:p>
@@ -3325,7 +3327,7 @@
           <a:p>
             <a:fld id="{AB24BD30-CF79-6742-90BF-1953A7F126BB}" type="datetimeFigureOut">
               <a:rPr lang="en-US" smtClean="0"/>
-              <a:t>10/12/17</a:t>
+              <a:t>10/15/17</a:t>
             </a:fld>
             <a:endParaRPr lang="en-US"/>
           </a:p>
@@ -3538,7 +3540,7 @@
           <a:p>
             <a:fld id="{AB24BD30-CF79-6742-90BF-1953A7F126BB}" type="datetimeFigureOut">
               <a:rPr lang="en-US" smtClean="0"/>
-              <a:t>10/12/17</a:t>
+              <a:t>10/15/17</a:t>
             </a:fld>
             <a:endParaRPr lang="en-US"/>
           </a:p>
@@ -3995,23 +3997,7 @@
             </a:r>
             <a:r>
               <a:rPr lang="en-US" dirty="0" smtClean="0"/>
-              <a:t> et al., </a:t>
-            </a:r>
-            <a:r>
-              <a:rPr lang="en-US" dirty="0" smtClean="0"/>
-              <a:t>2012; Lefebvre et al., 2017 </a:t>
-            </a:r>
-            <a:r>
-              <a:rPr lang="en-US" dirty="0" smtClean="0"/>
-              <a:t>for </a:t>
-            </a:r>
-            <a:r>
-              <a:rPr lang="en-US" dirty="0" smtClean="0"/>
-              <a:t>2 learning rate (risk sensitive) temporal difference </a:t>
-            </a:r>
-            <a:r>
-              <a:rPr lang="en-US" dirty="0" smtClean="0"/>
-              <a:t>learning </a:t>
+              <a:t> et al., 2012; Lefebvre et al., 2017 for 2 learning rate (risk sensitive) temporal difference learning </a:t>
             </a:r>
           </a:p>
           <a:p>
@@ -6202,7 +6188,6 @@
               <a:rPr lang="en-US" sz="1600" dirty="0" smtClean="0"/>
               <a:t>Confusion matrices. Each row represents the model that was used to simulate the data (cases 1-4), and each column represents the model that was used to fit the data. Lower Bayesian information criterion (BIC) indicates a better fit of the model to the data. Therefore, for optimal model identifiability, we would hope for a dark diagonal, and white everywhere else. While this is not the case with these models, in almost every case, the model used the generate the data does yield the lowest BIC when used to fit the data. In other words, while the models do appear to be identifiable, we should interpret BIC’s near one another with caution. </a:t>
             </a:r>
-            <a:endParaRPr lang="en-US" sz="1600" dirty="0" smtClean="0"/>
           </a:p>
           <a:p>
             <a:r>
@@ -6497,23 +6482,7 @@
                 <a:ea typeface="Arial" charset="0"/>
                 <a:cs typeface="Arial" charset="0"/>
               </a:rPr>
-              <a:t>Experiment 1: within subject design; 27 subjects played both roles in blocks of 20 trials for 1 session, total of </a:t>
-            </a:r>
-            <a:r>
-              <a:rPr lang="en-US" sz="1600" dirty="0" smtClean="0">
-                <a:latin typeface="Arial" charset="0"/>
-                <a:ea typeface="Arial" charset="0"/>
-                <a:cs typeface="Arial" charset="0"/>
-              </a:rPr>
-              <a:t>120 trials </a:t>
-            </a:r>
-            <a:r>
-              <a:rPr lang="en-US" sz="1600" dirty="0" smtClean="0">
-                <a:latin typeface="Arial" charset="0"/>
-                <a:ea typeface="Arial" charset="0"/>
-                <a:cs typeface="Arial" charset="0"/>
-              </a:rPr>
-              <a:t>in fMRI machine.</a:t>
+              <a:t>Experiment 1: within subject design; 27 subjects played both roles in blocks of 20 trials for 1 session, total of 120 trials in fMRI machine.</a:t>
             </a:r>
           </a:p>
           <a:p>
@@ -8381,21 +8350,8 @@
                 <a:ea typeface="Arial" charset="0"/>
                 <a:cs typeface="Arial" charset="0"/>
               </a:rPr>
-              <a:t>Model fits to real </a:t>
-            </a:r>
-            <a:r>
-              <a:rPr lang="en-US" sz="2000" b="1" dirty="0" smtClean="0">
-                <a:latin typeface="Arial" charset="0"/>
-                <a:ea typeface="Arial" charset="0"/>
-                <a:cs typeface="Arial" charset="0"/>
-              </a:rPr>
-              <a:t>data experiment 4</a:t>
-            </a:r>
-            <a:endParaRPr lang="en-US" sz="2000" b="1" dirty="0" smtClean="0">
-              <a:latin typeface="Arial" charset="0"/>
-              <a:ea typeface="Arial" charset="0"/>
-              <a:cs typeface="Arial" charset="0"/>
-            </a:endParaRPr>
+              <a:t>Model fits to real data experiment 4</a:t>
+            </a:r>
           </a:p>
           <a:p>
             <a:endParaRPr lang="en-US" sz="2000" b="1" dirty="0">
@@ -10392,7 +10348,7 @@
       </p:sp>
       <p:pic>
         <p:nvPicPr>
-          <p:cNvPr id="3" name="Picture 2"/>
+          <p:cNvPr id="4" name="Picture 3"/>
           <p:cNvPicPr>
             <a:picLocks noChangeAspect="1"/>
           </p:cNvPicPr>
@@ -10412,8 +10368,8 @@
         </p:blipFill>
         <p:spPr>
           <a:xfrm>
-            <a:off x="3202135" y="1851548"/>
-            <a:ext cx="6117349" cy="4823294"/>
+            <a:off x="3178408" y="2078016"/>
+            <a:ext cx="5920988" cy="4668471"/>
           </a:xfrm>
           <a:prstGeom prst="rect">
             <a:avLst/>
@@ -11563,6 +11519,110 @@
           <a:chExt cx="0" cy="0"/>
         </a:xfrm>
       </p:grpSpPr>
+      <p:sp>
+        <p:nvSpPr>
+          <p:cNvPr id="2" name="TextBox 1"/>
+          <p:cNvSpPr txBox="1"/>
+          <p:nvPr/>
+        </p:nvSpPr>
+        <p:spPr>
+          <a:xfrm>
+            <a:off x="524107" y="100362"/>
+            <a:ext cx="2621230" cy="369332"/>
+          </a:xfrm>
+          <a:prstGeom prst="rect">
+            <a:avLst/>
+          </a:prstGeom>
+          <a:noFill/>
+        </p:spPr>
+        <p:txBody>
+          <a:bodyPr wrap="none" rtlCol="0">
+            <a:spAutoFit/>
+          </a:bodyPr>
+          <a:lstStyle/>
+          <a:p>
+            <a:r>
+              <a:rPr lang="en-US" dirty="0" smtClean="0"/>
+              <a:t>Model 3 Predator select</a:t>
+            </a:r>
+            <a:endParaRPr lang="en-US" dirty="0"/>
+          </a:p>
+        </p:txBody>
+      </p:sp>
+      <p:pic>
+        <p:nvPicPr>
+          <p:cNvPr id="3" name="Picture 2"/>
+          <p:cNvPicPr>
+            <a:picLocks noChangeAspect="1"/>
+          </p:cNvPicPr>
+          <p:nvPr/>
+        </p:nvPicPr>
+        <p:blipFill>
+          <a:blip r:embed="rId2">
+            <a:clrChange>
+              <a:clrFrom>
+                <a:srgbClr val="000000"/>
+              </a:clrFrom>
+              <a:clrTo>
+                <a:srgbClr val="000000">
+                  <a:alpha val="0"/>
+                </a:srgbClr>
+              </a:clrTo>
+            </a:clrChange>
+            <a:extLst>
+              <a:ext uri="{28A0092B-C50C-407E-A947-70E740481C1C}">
+                <a14:useLocalDpi xmlns:a14="http://schemas.microsoft.com/office/drawing/2010/main" val="0"/>
+              </a:ext>
+            </a:extLst>
+          </a:blip>
+          <a:stretch>
+            <a:fillRect/>
+          </a:stretch>
+        </p:blipFill>
+        <p:spPr>
+          <a:xfrm>
+            <a:off x="836342" y="752708"/>
+            <a:ext cx="10058400" cy="4510869"/>
+          </a:xfrm>
+          <a:prstGeom prst="rect">
+            <a:avLst/>
+          </a:prstGeom>
+        </p:spPr>
+      </p:pic>
+      <p:sp>
+        <p:nvSpPr>
+          <p:cNvPr id="4" name="TextBox 3"/>
+          <p:cNvSpPr txBox="1"/>
+          <p:nvPr/>
+        </p:nvSpPr>
+        <p:spPr>
+          <a:xfrm>
+            <a:off x="4248615" y="1126273"/>
+            <a:ext cx="2621230" cy="369332"/>
+          </a:xfrm>
+          <a:prstGeom prst="rect">
+            <a:avLst/>
+          </a:prstGeom>
+          <a:noFill/>
+        </p:spPr>
+        <p:txBody>
+          <a:bodyPr wrap="none" rtlCol="0">
+            <a:spAutoFit/>
+          </a:bodyPr>
+          <a:lstStyle/>
+          <a:p>
+            <a:r>
+              <a:rPr lang="en-US" dirty="0" smtClean="0"/>
+              <a:t>Negative </a:t>
+            </a:r>
+            <a:r>
+              <a:rPr lang="en-US" smtClean="0"/>
+              <a:t>VS activation </a:t>
+            </a:r>
+            <a:endParaRPr lang="en-US"/>
+          </a:p>
+        </p:txBody>
+      </p:sp>
     </p:spTree>
     <p:extLst>
       <p:ext uri="{BB962C8B-B14F-4D97-AF65-F5344CB8AC3E}">
@@ -11577,6 +11637,314 @@
 </file>
 
 <file path=ppt/slides/slide31.xml><?xml version="1.0" encoding="utf-8"?>
+<p:sld xmlns:a="http://schemas.openxmlformats.org/drawingml/2006/main" xmlns:r="http://schemas.openxmlformats.org/officeDocument/2006/relationships" xmlns:p="http://schemas.openxmlformats.org/presentationml/2006/main">
+  <p:cSld>
+    <p:spTree>
+      <p:nvGrpSpPr>
+        <p:cNvPr id="1" name=""/>
+        <p:cNvGrpSpPr/>
+        <p:nvPr/>
+      </p:nvGrpSpPr>
+      <p:grpSpPr>
+        <a:xfrm>
+          <a:off x="0" y="0"/>
+          <a:ext cx="0" cy="0"/>
+          <a:chOff x="0" y="0"/>
+          <a:chExt cx="0" cy="0"/>
+        </a:xfrm>
+      </p:grpSpPr>
+      <p:sp>
+        <p:nvSpPr>
+          <p:cNvPr id="2" name="TextBox 1"/>
+          <p:cNvSpPr txBox="1"/>
+          <p:nvPr/>
+        </p:nvSpPr>
+        <p:spPr>
+          <a:xfrm>
+            <a:off x="535258" y="100362"/>
+            <a:ext cx="2582758" cy="369332"/>
+          </a:xfrm>
+          <a:prstGeom prst="rect">
+            <a:avLst/>
+          </a:prstGeom>
+          <a:noFill/>
+        </p:spPr>
+        <p:txBody>
+          <a:bodyPr wrap="none" rtlCol="0">
+            <a:spAutoFit/>
+          </a:bodyPr>
+          <a:lstStyle/>
+          <a:p>
+            <a:r>
+              <a:rPr lang="en-US" dirty="0" smtClean="0"/>
+              <a:t>Model 3 prey </a:t>
+            </a:r>
+            <a:r>
+              <a:rPr lang="en-US" b="1" dirty="0" smtClean="0"/>
+              <a:t>feedback</a:t>
+            </a:r>
+            <a:endParaRPr lang="en-US" b="1" dirty="0"/>
+          </a:p>
+        </p:txBody>
+      </p:sp>
+      <p:pic>
+        <p:nvPicPr>
+          <p:cNvPr id="5" name="Picture 4"/>
+          <p:cNvPicPr>
+            <a:picLocks noChangeAspect="1"/>
+          </p:cNvPicPr>
+          <p:nvPr/>
+        </p:nvPicPr>
+        <p:blipFill>
+          <a:blip r:embed="rId2">
+            <a:clrChange>
+              <a:clrFrom>
+                <a:srgbClr val="000000"/>
+              </a:clrFrom>
+              <a:clrTo>
+                <a:srgbClr val="000000">
+                  <a:alpha val="0"/>
+                </a:srgbClr>
+              </a:clrTo>
+            </a:clrChange>
+            <a:extLst>
+              <a:ext uri="{28A0092B-C50C-407E-A947-70E740481C1C}">
+                <a14:useLocalDpi xmlns:a14="http://schemas.microsoft.com/office/drawing/2010/main" val="0"/>
+              </a:ext>
+            </a:extLst>
+          </a:blip>
+          <a:stretch>
+            <a:fillRect/>
+          </a:stretch>
+        </p:blipFill>
+        <p:spPr>
+          <a:xfrm>
+            <a:off x="791735" y="-154775"/>
+            <a:ext cx="10058400" cy="4510869"/>
+          </a:xfrm>
+          <a:prstGeom prst="rect">
+            <a:avLst/>
+          </a:prstGeom>
+        </p:spPr>
+      </p:pic>
+      <p:pic>
+        <p:nvPicPr>
+          <p:cNvPr id="6" name="Picture 5"/>
+          <p:cNvPicPr>
+            <a:picLocks noChangeAspect="1"/>
+          </p:cNvPicPr>
+          <p:nvPr/>
+        </p:nvPicPr>
+        <p:blipFill>
+          <a:blip r:embed="rId3">
+            <a:clrChange>
+              <a:clrFrom>
+                <a:srgbClr val="000000"/>
+              </a:clrFrom>
+              <a:clrTo>
+                <a:srgbClr val="000000">
+                  <a:alpha val="0"/>
+                </a:srgbClr>
+              </a:clrTo>
+            </a:clrChange>
+            <a:extLst>
+              <a:ext uri="{28A0092B-C50C-407E-A947-70E740481C1C}">
+                <a14:useLocalDpi xmlns:a14="http://schemas.microsoft.com/office/drawing/2010/main" val="0"/>
+              </a:ext>
+            </a:extLst>
+          </a:blip>
+          <a:stretch>
+            <a:fillRect/>
+          </a:stretch>
+        </p:blipFill>
+        <p:spPr>
+          <a:xfrm>
+            <a:off x="791735" y="2872105"/>
+            <a:ext cx="10058400" cy="4325742"/>
+          </a:xfrm>
+          <a:prstGeom prst="rect">
+            <a:avLst/>
+          </a:prstGeom>
+        </p:spPr>
+      </p:pic>
+      <p:sp>
+        <p:nvSpPr>
+          <p:cNvPr id="7" name="TextBox 6"/>
+          <p:cNvSpPr txBox="1"/>
+          <p:nvPr/>
+        </p:nvSpPr>
+        <p:spPr>
+          <a:xfrm>
+            <a:off x="4382429" y="100362"/>
+            <a:ext cx="3531736" cy="369332"/>
+          </a:xfrm>
+          <a:prstGeom prst="rect">
+            <a:avLst/>
+          </a:prstGeom>
+          <a:noFill/>
+        </p:spPr>
+        <p:txBody>
+          <a:bodyPr wrap="none" rtlCol="0">
+            <a:spAutoFit/>
+          </a:bodyPr>
+          <a:lstStyle/>
+          <a:p>
+            <a:r>
+              <a:rPr lang="en-US" dirty="0" smtClean="0"/>
+              <a:t>Negative amygdala, negative VS</a:t>
+            </a:r>
+            <a:endParaRPr lang="en-US" dirty="0"/>
+          </a:p>
+        </p:txBody>
+      </p:sp>
+    </p:spTree>
+    <p:extLst>
+      <p:ext uri="{BB962C8B-B14F-4D97-AF65-F5344CB8AC3E}">
+        <p14:creationId xmlns:p14="http://schemas.microsoft.com/office/powerpoint/2010/main" val="1757900210"/>
+      </p:ext>
+    </p:extLst>
+  </p:cSld>
+  <p:clrMapOvr>
+    <a:masterClrMapping/>
+  </p:clrMapOvr>
+</p:sld>
+</file>
+
+<file path=ppt/slides/slide32.xml><?xml version="1.0" encoding="utf-8"?>
+<p:sld xmlns:a="http://schemas.openxmlformats.org/drawingml/2006/main" xmlns:r="http://schemas.openxmlformats.org/officeDocument/2006/relationships" xmlns:p="http://schemas.openxmlformats.org/presentationml/2006/main">
+  <p:cSld>
+    <p:spTree>
+      <p:nvGrpSpPr>
+        <p:cNvPr id="1" name=""/>
+        <p:cNvGrpSpPr/>
+        <p:nvPr/>
+      </p:nvGrpSpPr>
+      <p:grpSpPr>
+        <a:xfrm>
+          <a:off x="0" y="0"/>
+          <a:ext cx="0" cy="0"/>
+          <a:chOff x="0" y="0"/>
+          <a:chExt cx="0" cy="0"/>
+        </a:xfrm>
+      </p:grpSpPr>
+      <p:sp>
+        <p:nvSpPr>
+          <p:cNvPr id="2" name="TextBox 1"/>
+          <p:cNvSpPr txBox="1"/>
+          <p:nvPr/>
+        </p:nvSpPr>
+        <p:spPr>
+          <a:xfrm>
+            <a:off x="535258" y="100362"/>
+            <a:ext cx="2582758" cy="369332"/>
+          </a:xfrm>
+          <a:prstGeom prst="rect">
+            <a:avLst/>
+          </a:prstGeom>
+          <a:noFill/>
+        </p:spPr>
+        <p:txBody>
+          <a:bodyPr wrap="none" rtlCol="0">
+            <a:spAutoFit/>
+          </a:bodyPr>
+          <a:lstStyle/>
+          <a:p>
+            <a:r>
+              <a:rPr lang="en-US" dirty="0" smtClean="0"/>
+              <a:t>Model 3 prey </a:t>
+            </a:r>
+            <a:r>
+              <a:rPr lang="en-US" b="1" dirty="0" smtClean="0"/>
+              <a:t>feedback</a:t>
+            </a:r>
+            <a:endParaRPr lang="en-US" b="1" dirty="0"/>
+          </a:p>
+        </p:txBody>
+      </p:sp>
+      <p:sp>
+        <p:nvSpPr>
+          <p:cNvPr id="7" name="TextBox 6"/>
+          <p:cNvSpPr txBox="1"/>
+          <p:nvPr/>
+        </p:nvSpPr>
+        <p:spPr>
+          <a:xfrm>
+            <a:off x="4382429" y="100362"/>
+            <a:ext cx="1864613" cy="369332"/>
+          </a:xfrm>
+          <a:prstGeom prst="rect">
+            <a:avLst/>
+          </a:prstGeom>
+          <a:noFill/>
+        </p:spPr>
+        <p:txBody>
+          <a:bodyPr wrap="none" rtlCol="0">
+            <a:spAutoFit/>
+          </a:bodyPr>
+          <a:lstStyle/>
+          <a:p>
+            <a:r>
+              <a:rPr lang="en-US" dirty="0" smtClean="0"/>
+              <a:t>Positive VMPFC</a:t>
+            </a:r>
+            <a:endParaRPr lang="en-US" dirty="0"/>
+          </a:p>
+        </p:txBody>
+      </p:sp>
+      <p:pic>
+        <p:nvPicPr>
+          <p:cNvPr id="3" name="Picture 2"/>
+          <p:cNvPicPr>
+            <a:picLocks noChangeAspect="1"/>
+          </p:cNvPicPr>
+          <p:nvPr/>
+        </p:nvPicPr>
+        <p:blipFill>
+          <a:blip r:embed="rId2">
+            <a:clrChange>
+              <a:clrFrom>
+                <a:srgbClr val="000000"/>
+              </a:clrFrom>
+              <a:clrTo>
+                <a:srgbClr val="000000">
+                  <a:alpha val="0"/>
+                </a:srgbClr>
+              </a:clrTo>
+            </a:clrChange>
+            <a:extLst>
+              <a:ext uri="{28A0092B-C50C-407E-A947-70E740481C1C}">
+                <a14:useLocalDpi xmlns:a14="http://schemas.microsoft.com/office/drawing/2010/main" val="0"/>
+              </a:ext>
+            </a:extLst>
+          </a:blip>
+          <a:stretch>
+            <a:fillRect/>
+          </a:stretch>
+        </p:blipFill>
+        <p:spPr>
+          <a:xfrm>
+            <a:off x="858644" y="1591836"/>
+            <a:ext cx="10058400" cy="4325742"/>
+          </a:xfrm>
+          <a:prstGeom prst="rect">
+            <a:avLst/>
+          </a:prstGeom>
+        </p:spPr>
+      </p:pic>
+    </p:spTree>
+    <p:extLst>
+      <p:ext uri="{BB962C8B-B14F-4D97-AF65-F5344CB8AC3E}">
+        <p14:creationId xmlns:p14="http://schemas.microsoft.com/office/powerpoint/2010/main" val="1581030105"/>
+      </p:ext>
+    </p:extLst>
+  </p:cSld>
+  <p:clrMapOvr>
+    <a:masterClrMapping/>
+  </p:clrMapOvr>
+</p:sld>
+</file>
+
+<file path=ppt/slides/slide33.xml><?xml version="1.0" encoding="utf-8"?>
 <p:sld xmlns:a="http://schemas.openxmlformats.org/drawingml/2006/main" xmlns:r="http://schemas.openxmlformats.org/officeDocument/2006/relationships" xmlns:p="http://schemas.openxmlformats.org/presentationml/2006/main">
   <p:cSld>
     <p:spTree>
@@ -12585,7 +12953,7 @@
 </p:sld>
 </file>
 
-<file path=ppt/slides/slide32.xml><?xml version="1.0" encoding="utf-8"?>
+<file path=ppt/slides/slide34.xml><?xml version="1.0" encoding="utf-8"?>
 <p:sld xmlns:a="http://schemas.openxmlformats.org/drawingml/2006/main" xmlns:r="http://schemas.openxmlformats.org/officeDocument/2006/relationships" xmlns:p="http://schemas.openxmlformats.org/presentationml/2006/main">
   <p:cSld>
     <p:spTree>
@@ -13451,7 +13819,7 @@
 </p:sld>
 </file>
 
-<file path=ppt/slides/slide33.xml><?xml version="1.0" encoding="utf-8"?>
+<file path=ppt/slides/slide35.xml><?xml version="1.0" encoding="utf-8"?>
 <p:sld xmlns:a="http://schemas.openxmlformats.org/drawingml/2006/main" xmlns:r="http://schemas.openxmlformats.org/officeDocument/2006/relationships" xmlns:p="http://schemas.openxmlformats.org/presentationml/2006/main">
   <p:cSld>
     <p:spTree>
@@ -14134,7 +14502,7 @@
 </p:sld>
 </file>
 
-<file path=ppt/slides/slide34.xml><?xml version="1.0" encoding="utf-8"?>
+<file path=ppt/slides/slide36.xml><?xml version="1.0" encoding="utf-8"?>
 <p:sld xmlns:a="http://schemas.openxmlformats.org/drawingml/2006/main" xmlns:r="http://schemas.openxmlformats.org/officeDocument/2006/relationships" xmlns:p="http://schemas.openxmlformats.org/presentationml/2006/main">
   <p:cSld>
     <p:spTree>
@@ -16314,15 +16682,7 @@
                 <a:ea typeface="Arial" charset="0"/>
                 <a:cs typeface="Arial" charset="0"/>
               </a:rPr>
-              <a:t>0). </a:t>
-            </a:r>
-            <a:r>
-              <a:rPr lang="en-US" sz="1600" dirty="0" smtClean="0">
-                <a:latin typeface="Arial" charset="0"/>
-                <a:ea typeface="Arial" charset="0"/>
-                <a:cs typeface="Arial" charset="0"/>
-              </a:rPr>
-              <a:t>This will occur if </a:t>
+              <a:t>0). This will occur if </a:t>
             </a:r>
             <a:r>
               <a:rPr lang="en-US" sz="1600" b="1" i="1" dirty="0" smtClean="0">
@@ -17505,8 +17865,8 @@
           <a:chExt cx="0" cy="0"/>
         </a:xfrm>
       </p:grpSpPr>
-      <mc:AlternateContent xmlns:mc="http://schemas.openxmlformats.org/markup-compatibility/2006">
-        <mc:Choice xmlns:a14="http://schemas.microsoft.com/office/drawing/2010/main" Requires="a14">
+      <mc:AlternateContent xmlns:mc="http://schemas.openxmlformats.org/markup-compatibility/2006" xmlns:a14="http://schemas.microsoft.com/office/drawing/2010/main">
+        <mc:Choice Requires="a14">
           <p:sp>
             <p:nvSpPr>
               <p:cNvPr id="4" name="Rectangle 3"/>
@@ -18152,7 +18512,7 @@
             </p:txBody>
           </p:sp>
         </mc:Choice>
-        <mc:Fallback>
+        <mc:Fallback xmlns="">
           <p:sp>
             <p:nvSpPr>
               <p:cNvPr id="4" name="Rectangle 3"/>
@@ -18488,15 +18848,7 @@
                 <a:ea typeface="Arial" charset="0"/>
                 <a:cs typeface="Arial" charset="0"/>
               </a:rPr>
-              <a:t>is </a:t>
-            </a:r>
-            <a:r>
-              <a:rPr lang="en-US" sz="1600" dirty="0" smtClean="0">
-                <a:latin typeface="Arial" charset="0"/>
-                <a:ea typeface="Arial" charset="0"/>
-                <a:cs typeface="Arial" charset="0"/>
-              </a:rPr>
-              <a:t>positive, </a:t>
+              <a:t>is positive, </a:t>
             </a:r>
             <a:r>
               <a:rPr lang="en-US" sz="1600" b="1" i="1" dirty="0" smtClean="0">

</xml_diff>

<commit_message>
after fixing predator EV, with lots of commented out mistakes
</commit_message>
<xml_diff>
--- a/PPG/reports/PPG progress report 2017_09_26.pptx
+++ b/PPG/reports/PPG progress report 2017_09_26.pptx
@@ -232,7 +232,7 @@
           <a:p>
             <a:fld id="{93497C26-5219-954A-A522-4F368E7A7ADA}" type="datetimeFigureOut">
               <a:rPr lang="en-US" smtClean="0"/>
-              <a:t>10/15/17</a:t>
+              <a:t>10/19/17</a:t>
             </a:fld>
             <a:endParaRPr lang="en-US"/>
           </a:p>
@@ -1219,7 +1219,7 @@
           <a:p>
             <a:fld id="{AB24BD30-CF79-6742-90BF-1953A7F126BB}" type="datetimeFigureOut">
               <a:rPr lang="en-US" smtClean="0"/>
-              <a:t>10/15/17</a:t>
+              <a:t>10/19/17</a:t>
             </a:fld>
             <a:endParaRPr lang="en-US"/>
           </a:p>
@@ -1389,7 +1389,7 @@
           <a:p>
             <a:fld id="{AB24BD30-CF79-6742-90BF-1953A7F126BB}" type="datetimeFigureOut">
               <a:rPr lang="en-US" smtClean="0"/>
-              <a:t>10/15/17</a:t>
+              <a:t>10/19/17</a:t>
             </a:fld>
             <a:endParaRPr lang="en-US"/>
           </a:p>
@@ -1569,7 +1569,7 @@
           <a:p>
             <a:fld id="{AB24BD30-CF79-6742-90BF-1953A7F126BB}" type="datetimeFigureOut">
               <a:rPr lang="en-US" smtClean="0"/>
-              <a:t>10/15/17</a:t>
+              <a:t>10/19/17</a:t>
             </a:fld>
             <a:endParaRPr lang="en-US"/>
           </a:p>
@@ -1739,7 +1739,7 @@
           <a:p>
             <a:fld id="{AB24BD30-CF79-6742-90BF-1953A7F126BB}" type="datetimeFigureOut">
               <a:rPr lang="en-US" smtClean="0"/>
-              <a:t>10/15/17</a:t>
+              <a:t>10/19/17</a:t>
             </a:fld>
             <a:endParaRPr lang="en-US"/>
           </a:p>
@@ -1985,7 +1985,7 @@
           <a:p>
             <a:fld id="{AB24BD30-CF79-6742-90BF-1953A7F126BB}" type="datetimeFigureOut">
               <a:rPr lang="en-US" smtClean="0"/>
-              <a:t>10/15/17</a:t>
+              <a:t>10/19/17</a:t>
             </a:fld>
             <a:endParaRPr lang="en-US"/>
           </a:p>
@@ -2217,7 +2217,7 @@
           <a:p>
             <a:fld id="{AB24BD30-CF79-6742-90BF-1953A7F126BB}" type="datetimeFigureOut">
               <a:rPr lang="en-US" smtClean="0"/>
-              <a:t>10/15/17</a:t>
+              <a:t>10/19/17</a:t>
             </a:fld>
             <a:endParaRPr lang="en-US"/>
           </a:p>
@@ -2584,7 +2584,7 @@
           <a:p>
             <a:fld id="{AB24BD30-CF79-6742-90BF-1953A7F126BB}" type="datetimeFigureOut">
               <a:rPr lang="en-US" smtClean="0"/>
-              <a:t>10/15/17</a:t>
+              <a:t>10/19/17</a:t>
             </a:fld>
             <a:endParaRPr lang="en-US"/>
           </a:p>
@@ -2702,7 +2702,7 @@
           <a:p>
             <a:fld id="{AB24BD30-CF79-6742-90BF-1953A7F126BB}" type="datetimeFigureOut">
               <a:rPr lang="en-US" smtClean="0"/>
-              <a:t>10/15/17</a:t>
+              <a:t>10/19/17</a:t>
             </a:fld>
             <a:endParaRPr lang="en-US"/>
           </a:p>
@@ -2797,7 +2797,7 @@
           <a:p>
             <a:fld id="{AB24BD30-CF79-6742-90BF-1953A7F126BB}" type="datetimeFigureOut">
               <a:rPr lang="en-US" smtClean="0"/>
-              <a:t>10/15/17</a:t>
+              <a:t>10/19/17</a:t>
             </a:fld>
             <a:endParaRPr lang="en-US"/>
           </a:p>
@@ -3074,7 +3074,7 @@
           <a:p>
             <a:fld id="{AB24BD30-CF79-6742-90BF-1953A7F126BB}" type="datetimeFigureOut">
               <a:rPr lang="en-US" smtClean="0"/>
-              <a:t>10/15/17</a:t>
+              <a:t>10/19/17</a:t>
             </a:fld>
             <a:endParaRPr lang="en-US"/>
           </a:p>
@@ -3327,7 +3327,7 @@
           <a:p>
             <a:fld id="{AB24BD30-CF79-6742-90BF-1953A7F126BB}" type="datetimeFigureOut">
               <a:rPr lang="en-US" smtClean="0"/>
-              <a:t>10/15/17</a:t>
+              <a:t>10/19/17</a:t>
             </a:fld>
             <a:endParaRPr lang="en-US"/>
           </a:p>
@@ -3540,7 +3540,7 @@
           <a:p>
             <a:fld id="{AB24BD30-CF79-6742-90BF-1953A7F126BB}" type="datetimeFigureOut">
               <a:rPr lang="en-US" smtClean="0"/>
-              <a:t>10/15/17</a:t>
+              <a:t>10/19/17</a:t>
             </a:fld>
             <a:endParaRPr lang="en-US"/>
           </a:p>
@@ -4858,6 +4858,13 @@
   <p:clrMapOvr>
     <a:masterClrMapping/>
   </p:clrMapOvr>
+  <p:timing>
+    <p:tnLst>
+      <p:par>
+        <p:cTn id="1" dur="indefinite" restart="never" nodeType="tmRoot"/>
+      </p:par>
+    </p:tnLst>
+  </p:timing>
 </p:sld>
 </file>
 
@@ -5336,6 +5343,13 @@
   <p:clrMapOvr>
     <a:masterClrMapping/>
   </p:clrMapOvr>
+  <p:timing>
+    <p:tnLst>
+      <p:par>
+        <p:cTn id="1" dur="indefinite" restart="never" nodeType="tmRoot"/>
+      </p:par>
+    </p:tnLst>
+  </p:timing>
 </p:sld>
 </file>
 
@@ -5536,6 +5550,13 @@
   <p:clrMapOvr>
     <a:masterClrMapping/>
   </p:clrMapOvr>
+  <p:timing>
+    <p:tnLst>
+      <p:par>
+        <p:cTn id="1" dur="indefinite" restart="never" nodeType="tmRoot"/>
+      </p:par>
+    </p:tnLst>
+  </p:timing>
 </p:sld>
 </file>
 
@@ -7843,6 +7864,13 @@
   <p:clrMapOvr>
     <a:masterClrMapping/>
   </p:clrMapOvr>
+  <p:timing>
+    <p:tnLst>
+      <p:par>
+        <p:cTn id="1" dur="indefinite" restart="never" nodeType="tmRoot"/>
+      </p:par>
+    </p:tnLst>
+  </p:timing>
 </p:sld>
 </file>
 
@@ -11499,6 +11527,13 @@
   <p:clrMapOvr>
     <a:masterClrMapping/>
   </p:clrMapOvr>
+  <p:timing>
+    <p:tnLst>
+      <p:par>
+        <p:cTn id="1" dur="indefinite" restart="never" nodeType="tmRoot"/>
+      </p:par>
+    </p:tnLst>
+  </p:timing>
 </p:sld>
 </file>
 
@@ -15769,6 +15804,13 @@
   <p:clrMapOvr>
     <a:masterClrMapping/>
   </p:clrMapOvr>
+  <p:timing>
+    <p:tnLst>
+      <p:par>
+        <p:cTn id="1" dur="indefinite" restart="never" nodeType="tmRoot"/>
+      </p:par>
+    </p:tnLst>
+  </p:timing>
 </p:sld>
 </file>
 
@@ -16342,6 +16384,13 @@
   <p:clrMapOvr>
     <a:masterClrMapping/>
   </p:clrMapOvr>
+  <p:timing>
+    <p:tnLst>
+      <p:par>
+        <p:cTn id="1" dur="indefinite" restart="never" nodeType="tmRoot"/>
+      </p:par>
+    </p:tnLst>
+  </p:timing>
 </p:sld>
 </file>
 
@@ -16650,7 +16699,23 @@
                 <a:ea typeface="Arial" charset="0"/>
                 <a:cs typeface="Arial" charset="0"/>
               </a:rPr>
-              <a:t>𝟏) or a feat </a:t>
+              <a:t>𝟏) or </a:t>
+            </a:r>
+            <a:r>
+              <a:rPr lang="en-US" sz="1600" smtClean="0">
+                <a:latin typeface="Arial" charset="0"/>
+                <a:ea typeface="Arial" charset="0"/>
+                <a:cs typeface="Arial" charset="0"/>
+              </a:rPr>
+              <a:t>a </a:t>
+            </a:r>
+            <a:r>
+              <a:rPr lang="en-US" sz="1600" smtClean="0">
+                <a:latin typeface="Arial" charset="0"/>
+                <a:ea typeface="Arial" charset="0"/>
+                <a:cs typeface="Arial" charset="0"/>
+              </a:rPr>
+              <a:t>defeat </a:t>
             </a:r>
             <a:r>
               <a:rPr lang="en-US" sz="1600" dirty="0">
@@ -17845,6 +17910,13 @@
   <p:clrMapOvr>
     <a:masterClrMapping/>
   </p:clrMapOvr>
+  <p:timing>
+    <p:tnLst>
+      <p:par>
+        <p:cTn id="1" dur="indefinite" restart="never" nodeType="tmRoot"/>
+      </p:par>
+    </p:tnLst>
+  </p:timing>
 </p:sld>
 </file>
 
@@ -18561,6 +18633,13 @@
   <p:clrMapOvr>
     <a:masterClrMapping/>
   </p:clrMapOvr>
+  <p:timing>
+    <p:tnLst>
+      <p:par>
+        <p:cTn id="1" dur="indefinite" restart="never" nodeType="tmRoot"/>
+      </p:par>
+    </p:tnLst>
+  </p:timing>
 </p:sld>
 </file>
 
@@ -19178,6 +19257,13 @@
   <p:clrMapOvr>
     <a:masterClrMapping/>
   </p:clrMapOvr>
+  <p:timing>
+    <p:tnLst>
+      <p:par>
+        <p:cTn id="1" dur="indefinite" restart="never" nodeType="tmRoot"/>
+      </p:par>
+    </p:tnLst>
+  </p:timing>
 </p:sld>
 </file>
 
@@ -20133,6 +20219,13 @@
   <p:clrMapOvr>
     <a:masterClrMapping/>
   </p:clrMapOvr>
+  <p:timing>
+    <p:tnLst>
+      <p:par>
+        <p:cTn id="1" dur="indefinite" restart="never" nodeType="tmRoot"/>
+      </p:par>
+    </p:tnLst>
+  </p:timing>
 </p:sld>
 </file>
 

</xml_diff>

<commit_message>
after beginning of UG responder fitting
</commit_message>
<xml_diff>
--- a/PPG/reports/PPG progress report 2017_09_26.pptx
+++ b/PPG/reports/PPG progress report 2017_09_26.pptx
@@ -5275,7 +5275,7 @@
       </p:sp>
       <p:pic>
         <p:nvPicPr>
-          <p:cNvPr id="5" name="Picture 4"/>
+          <p:cNvPr id="7" name="Picture 6"/>
           <p:cNvPicPr>
             <a:picLocks noChangeAspect="1"/>
           </p:cNvPicPr>
@@ -5295,8 +5295,8 @@
         </p:blipFill>
         <p:spPr>
           <a:xfrm>
-            <a:off x="762000" y="2386940"/>
-            <a:ext cx="5027221" cy="3770416"/>
+            <a:off x="1075240" y="2497872"/>
+            <a:ext cx="4797502" cy="3598127"/>
           </a:xfrm>
           <a:prstGeom prst="rect">
             <a:avLst/>
@@ -5305,7 +5305,7 @@
       </p:pic>
       <p:pic>
         <p:nvPicPr>
-          <p:cNvPr id="6" name="Picture 5"/>
+          <p:cNvPr id="8" name="Picture 7"/>
           <p:cNvPicPr>
             <a:picLocks noChangeAspect="1"/>
           </p:cNvPicPr>
@@ -5325,8 +5325,8 @@
         </p:blipFill>
         <p:spPr>
           <a:xfrm>
-            <a:off x="6096000" y="2386940"/>
-            <a:ext cx="5027221" cy="3770416"/>
+            <a:off x="5937662" y="2497872"/>
+            <a:ext cx="4797502" cy="3598127"/>
           </a:xfrm>
           <a:prstGeom prst="rect">
             <a:avLst/>
@@ -5734,6 +5734,13 @@
   <p:clrMapOvr>
     <a:masterClrMapping/>
   </p:clrMapOvr>
+  <p:timing>
+    <p:tnLst>
+      <p:par>
+        <p:cTn id="1" dur="indefinite" restart="never" nodeType="tmRoot"/>
+      </p:par>
+    </p:tnLst>
+  </p:timing>
 </p:sld>
 </file>
 
@@ -6596,6 +6603,13 @@
   <p:clrMapOvr>
     <a:masterClrMapping/>
   </p:clrMapOvr>
+  <p:timing>
+    <p:tnLst>
+      <p:par>
+        <p:cTn id="1" dur="indefinite" restart="never" nodeType="tmRoot"/>
+      </p:par>
+    </p:tnLst>
+  </p:timing>
 </p:sld>
 </file>
 
@@ -11668,6 +11682,13 @@
   <p:clrMapOvr>
     <a:masterClrMapping/>
   </p:clrMapOvr>
+  <p:timing>
+    <p:tnLst>
+      <p:par>
+        <p:cTn id="1" dur="indefinite" restart="never" nodeType="tmRoot"/>
+      </p:par>
+    </p:tnLst>
+  </p:timing>
 </p:sld>
 </file>
 
@@ -11842,6 +11863,13 @@
   <p:clrMapOvr>
     <a:masterClrMapping/>
   </p:clrMapOvr>
+  <p:timing>
+    <p:tnLst>
+      <p:par>
+        <p:cTn id="1" dur="indefinite" restart="never" nodeType="tmRoot"/>
+      </p:par>
+    </p:tnLst>
+  </p:timing>
 </p:sld>
 </file>
 
@@ -11976,6 +12004,13 @@
   <p:clrMapOvr>
     <a:masterClrMapping/>
   </p:clrMapOvr>
+  <p:timing>
+    <p:tnLst>
+      <p:par>
+        <p:cTn id="1" dur="indefinite" restart="never" nodeType="tmRoot"/>
+      </p:par>
+    </p:tnLst>
+  </p:timing>
 </p:sld>
 </file>
 
@@ -12985,6 +13020,13 @@
   <p:clrMapOvr>
     <a:masterClrMapping/>
   </p:clrMapOvr>
+  <p:timing>
+    <p:tnLst>
+      <p:par>
+        <p:cTn id="1" dur="indefinite" restart="never" nodeType="tmRoot"/>
+      </p:par>
+    </p:tnLst>
+  </p:timing>
 </p:sld>
 </file>
 
@@ -13851,6 +13893,13 @@
   <p:clrMapOvr>
     <a:masterClrMapping/>
   </p:clrMapOvr>
+  <p:timing>
+    <p:tnLst>
+      <p:par>
+        <p:cTn id="1" dur="indefinite" restart="never" nodeType="tmRoot"/>
+      </p:par>
+    </p:tnLst>
+  </p:timing>
 </p:sld>
 </file>
 
@@ -14534,6 +14583,13 @@
   <p:clrMapOvr>
     <a:masterClrMapping/>
   </p:clrMapOvr>
+  <p:timing>
+    <p:tnLst>
+      <p:par>
+        <p:cTn id="1" dur="indefinite" restart="never" nodeType="tmRoot"/>
+      </p:par>
+    </p:tnLst>
+  </p:timing>
 </p:sld>
 </file>
 
@@ -15669,6 +15725,13 @@
   <p:clrMapOvr>
     <a:masterClrMapping/>
   </p:clrMapOvr>
+  <p:timing>
+    <p:tnLst>
+      <p:par>
+        <p:cTn id="1" dur="indefinite" restart="never" nodeType="tmRoot"/>
+      </p:par>
+    </p:tnLst>
+  </p:timing>
 </p:sld>
 </file>
 
@@ -16699,18 +16762,10 @@
                 <a:ea typeface="Arial" charset="0"/>
                 <a:cs typeface="Arial" charset="0"/>
               </a:rPr>
-              <a:t>𝟏) or </a:t>
-            </a:r>
-            <a:r>
-              <a:rPr lang="en-US" sz="1600" smtClean="0">
-                <a:latin typeface="Arial" charset="0"/>
-                <a:ea typeface="Arial" charset="0"/>
-                <a:cs typeface="Arial" charset="0"/>
-              </a:rPr>
-              <a:t>a </a:t>
-            </a:r>
-            <a:r>
-              <a:rPr lang="en-US" sz="1600" smtClean="0">
+              <a:t>𝟏) or a </a:t>
+            </a:r>
+            <a:r>
+              <a:rPr lang="en-US" sz="1600" dirty="0" smtClean="0">
                 <a:latin typeface="Arial" charset="0"/>
                 <a:ea typeface="Arial" charset="0"/>
                 <a:cs typeface="Arial" charset="0"/>

</xml_diff>

<commit_message>
working on powerpoint for UG
</commit_message>
<xml_diff>
--- a/PPG/reports/PPG progress report 2017_09_26.pptx
+++ b/PPG/reports/PPG progress report 2017_09_26.pptx
@@ -11914,11 +11914,15 @@
           <a:p>
             <a:r>
               <a:rPr lang="en-US" dirty="0" smtClean="0"/>
-              <a:t>Model 3 prey </a:t>
-            </a:r>
-            <a:r>
-              <a:rPr lang="en-US" b="1" dirty="0" smtClean="0"/>
-              <a:t>feedback</a:t>
+              <a:t>Model 3 </a:t>
+            </a:r>
+            <a:r>
+              <a:rPr lang="en-US" smtClean="0"/>
+              <a:t>prey </a:t>
+            </a:r>
+            <a:r>
+              <a:rPr lang="en-US" b="1" smtClean="0"/>
+              <a:t>selection</a:t>
             </a:r>
             <a:endParaRPr lang="en-US" b="1" dirty="0"/>
           </a:p>

</xml_diff>

<commit_message>
fixing bugs with predator learning rate
</commit_message>
<xml_diff>
--- a/PPG/reports/PPG progress report 2017_09_26.pptx
+++ b/PPG/reports/PPG progress report 2017_09_26.pptx
@@ -232,7 +232,7 @@
           <a:p>
             <a:fld id="{93497C26-5219-954A-A522-4F368E7A7ADA}" type="datetimeFigureOut">
               <a:rPr lang="en-US" smtClean="0"/>
-              <a:t>10/19/17</a:t>
+              <a:t>10/31/17</a:t>
             </a:fld>
             <a:endParaRPr lang="en-US"/>
           </a:p>
@@ -1219,7 +1219,7 @@
           <a:p>
             <a:fld id="{AB24BD30-CF79-6742-90BF-1953A7F126BB}" type="datetimeFigureOut">
               <a:rPr lang="en-US" smtClean="0"/>
-              <a:t>10/19/17</a:t>
+              <a:t>10/31/17</a:t>
             </a:fld>
             <a:endParaRPr lang="en-US"/>
           </a:p>
@@ -1389,7 +1389,7 @@
           <a:p>
             <a:fld id="{AB24BD30-CF79-6742-90BF-1953A7F126BB}" type="datetimeFigureOut">
               <a:rPr lang="en-US" smtClean="0"/>
-              <a:t>10/19/17</a:t>
+              <a:t>10/31/17</a:t>
             </a:fld>
             <a:endParaRPr lang="en-US"/>
           </a:p>
@@ -1569,7 +1569,7 @@
           <a:p>
             <a:fld id="{AB24BD30-CF79-6742-90BF-1953A7F126BB}" type="datetimeFigureOut">
               <a:rPr lang="en-US" smtClean="0"/>
-              <a:t>10/19/17</a:t>
+              <a:t>10/31/17</a:t>
             </a:fld>
             <a:endParaRPr lang="en-US"/>
           </a:p>
@@ -1739,7 +1739,7 @@
           <a:p>
             <a:fld id="{AB24BD30-CF79-6742-90BF-1953A7F126BB}" type="datetimeFigureOut">
               <a:rPr lang="en-US" smtClean="0"/>
-              <a:t>10/19/17</a:t>
+              <a:t>10/31/17</a:t>
             </a:fld>
             <a:endParaRPr lang="en-US"/>
           </a:p>
@@ -1985,7 +1985,7 @@
           <a:p>
             <a:fld id="{AB24BD30-CF79-6742-90BF-1953A7F126BB}" type="datetimeFigureOut">
               <a:rPr lang="en-US" smtClean="0"/>
-              <a:t>10/19/17</a:t>
+              <a:t>10/31/17</a:t>
             </a:fld>
             <a:endParaRPr lang="en-US"/>
           </a:p>
@@ -2217,7 +2217,7 @@
           <a:p>
             <a:fld id="{AB24BD30-CF79-6742-90BF-1953A7F126BB}" type="datetimeFigureOut">
               <a:rPr lang="en-US" smtClean="0"/>
-              <a:t>10/19/17</a:t>
+              <a:t>10/31/17</a:t>
             </a:fld>
             <a:endParaRPr lang="en-US"/>
           </a:p>
@@ -2584,7 +2584,7 @@
           <a:p>
             <a:fld id="{AB24BD30-CF79-6742-90BF-1953A7F126BB}" type="datetimeFigureOut">
               <a:rPr lang="en-US" smtClean="0"/>
-              <a:t>10/19/17</a:t>
+              <a:t>10/31/17</a:t>
             </a:fld>
             <a:endParaRPr lang="en-US"/>
           </a:p>
@@ -2702,7 +2702,7 @@
           <a:p>
             <a:fld id="{AB24BD30-CF79-6742-90BF-1953A7F126BB}" type="datetimeFigureOut">
               <a:rPr lang="en-US" smtClean="0"/>
-              <a:t>10/19/17</a:t>
+              <a:t>10/31/17</a:t>
             </a:fld>
             <a:endParaRPr lang="en-US"/>
           </a:p>
@@ -2797,7 +2797,7 @@
           <a:p>
             <a:fld id="{AB24BD30-CF79-6742-90BF-1953A7F126BB}" type="datetimeFigureOut">
               <a:rPr lang="en-US" smtClean="0"/>
-              <a:t>10/19/17</a:t>
+              <a:t>10/31/17</a:t>
             </a:fld>
             <a:endParaRPr lang="en-US"/>
           </a:p>
@@ -3074,7 +3074,7 @@
           <a:p>
             <a:fld id="{AB24BD30-CF79-6742-90BF-1953A7F126BB}" type="datetimeFigureOut">
               <a:rPr lang="en-US" smtClean="0"/>
-              <a:t>10/19/17</a:t>
+              <a:t>10/31/17</a:t>
             </a:fld>
             <a:endParaRPr lang="en-US"/>
           </a:p>
@@ -3327,7 +3327,7 @@
           <a:p>
             <a:fld id="{AB24BD30-CF79-6742-90BF-1953A7F126BB}" type="datetimeFigureOut">
               <a:rPr lang="en-US" smtClean="0"/>
-              <a:t>10/19/17</a:t>
+              <a:t>10/31/17</a:t>
             </a:fld>
             <a:endParaRPr lang="en-US"/>
           </a:p>
@@ -3540,7 +3540,7 @@
           <a:p>
             <a:fld id="{AB24BD30-CF79-6742-90BF-1953A7F126BB}" type="datetimeFigureOut">
               <a:rPr lang="en-US" smtClean="0"/>
-              <a:t>10/19/17</a:t>
+              <a:t>10/31/17</a:t>
             </a:fld>
             <a:endParaRPr lang="en-US"/>
           </a:p>
@@ -16766,15 +16766,7 @@
                 <a:ea typeface="Arial" charset="0"/>
                 <a:cs typeface="Arial" charset="0"/>
               </a:rPr>
-              <a:t>𝟏) or a </a:t>
-            </a:r>
-            <a:r>
-              <a:rPr lang="en-US" sz="1600" dirty="0" smtClean="0">
-                <a:latin typeface="Arial" charset="0"/>
-                <a:ea typeface="Arial" charset="0"/>
-                <a:cs typeface="Arial" charset="0"/>
-              </a:rPr>
-              <a:t>defeat </a:t>
+              <a:t>𝟏) or a defeat </a:t>
             </a:r>
             <a:r>
               <a:rPr lang="en-US" sz="1600" dirty="0">
@@ -17996,8 +17988,8 @@
           <a:chExt cx="0" cy="0"/>
         </a:xfrm>
       </p:grpSpPr>
-      <mc:AlternateContent xmlns:mc="http://schemas.openxmlformats.org/markup-compatibility/2006" xmlns:a14="http://schemas.microsoft.com/office/drawing/2010/main">
-        <mc:Choice Requires="a14">
+      <mc:AlternateContent xmlns:mc="http://schemas.openxmlformats.org/markup-compatibility/2006">
+        <mc:Choice xmlns:a14="http://schemas.microsoft.com/office/drawing/2010/main" Requires="a14">
           <p:sp>
             <p:nvSpPr>
               <p:cNvPr id="4" name="Rectangle 3"/>
@@ -18007,7 +17999,7 @@
             <p:spPr>
               <a:xfrm>
                 <a:off x="190005" y="233663"/>
-                <a:ext cx="11827824" cy="5000984"/>
+                <a:ext cx="11827824" cy="5143972"/>
               </a:xfrm>
               <a:prstGeom prst="rect">
                 <a:avLst/>
@@ -18160,40 +18152,16 @@
                         </m:ctrlPr>
                       </m:fPr>
                       <m:num>
-                        <m:r>
-                          <a:rPr lang="en-US" b="1" i="1">
-                            <a:latin typeface="Cambria Math" charset="0"/>
-                            <a:ea typeface="Arial" charset="0"/>
-                            <a:cs typeface="Arial" charset="0"/>
-                          </a:rPr>
-                          <m:t>𝒆</m:t>
-                        </m:r>
-                        <m:r>
-                          <a:rPr lang="en-US" b="1" i="1" smtClean="0">
-                            <a:latin typeface="Cambria Math" charset="0"/>
-                            <a:ea typeface="Arial" charset="0"/>
-                            <a:cs typeface="Arial" charset="0"/>
-                          </a:rPr>
-                          <m:t>𝜷</m:t>
-                        </m:r>
-                        <m:r>
-                          <a:rPr lang="en-US" b="1" i="1">
-                            <a:latin typeface="Cambria Math" charset="0"/>
-                            <a:ea typeface="Arial" charset="0"/>
-                            <a:cs typeface="Arial" charset="0"/>
-                          </a:rPr>
-                          <m:t>×</m:t>
-                        </m:r>
-                        <m:sSub>
-                          <m:sSubPr>
+                        <m:sSup>
+                          <m:sSupPr>
                             <m:ctrlPr>
-                              <a:rPr lang="en-US" b="1" i="1">
+                              <a:rPr lang="en-US" b="1" i="1" smtClean="0">
                                 <a:latin typeface="Cambria Math" charset="0"/>
                                 <a:ea typeface="Arial" charset="0"/>
                                 <a:cs typeface="Arial" charset="0"/>
                               </a:rPr>
                             </m:ctrlPr>
-                          </m:sSubPr>
+                          </m:sSupPr>
                           <m:e>
                             <m:r>
                               <a:rPr lang="en-US" b="1" i="1">
@@ -18201,20 +18169,59 @@
                                 <a:ea typeface="Arial" charset="0"/>
                                 <a:cs typeface="Arial" charset="0"/>
                               </a:rPr>
-                              <m:t>𝑽</m:t>
+                              <m:t>𝒆</m:t>
                             </m:r>
                           </m:e>
-                          <m:sub>
+                          <m:sup>
                             <m:r>
-                              <a:rPr lang="en-US" b="1" i="1" smtClean="0">
+                              <a:rPr lang="en-US" b="1" i="1">
                                 <a:latin typeface="Cambria Math" charset="0"/>
                                 <a:ea typeface="Arial" charset="0"/>
                                 <a:cs typeface="Arial" charset="0"/>
                               </a:rPr>
-                              <m:t>𝒊</m:t>
+                              <m:t>𝜷</m:t>
                             </m:r>
-                          </m:sub>
-                        </m:sSub>
+                            <m:r>
+                              <a:rPr lang="en-US" b="1" i="1">
+                                <a:latin typeface="Cambria Math" charset="0"/>
+                                <a:ea typeface="Arial" charset="0"/>
+                                <a:cs typeface="Arial" charset="0"/>
+                              </a:rPr>
+                              <m:t>×</m:t>
+                            </m:r>
+                            <m:sSub>
+                              <m:sSubPr>
+                                <m:ctrlPr>
+                                  <a:rPr lang="en-US" b="1" i="1">
+                                    <a:latin typeface="Cambria Math" charset="0"/>
+                                    <a:ea typeface="Arial" charset="0"/>
+                                    <a:cs typeface="Arial" charset="0"/>
+                                  </a:rPr>
+                                </m:ctrlPr>
+                              </m:sSubPr>
+                              <m:e>
+                                <m:r>
+                                  <a:rPr lang="en-US" b="1" i="1">
+                                    <a:latin typeface="Cambria Math" charset="0"/>
+                                    <a:ea typeface="Arial" charset="0"/>
+                                    <a:cs typeface="Arial" charset="0"/>
+                                  </a:rPr>
+                                  <m:t>𝑽</m:t>
+                                </m:r>
+                              </m:e>
+                              <m:sub>
+                                <m:r>
+                                  <a:rPr lang="en-US" b="1" i="1">
+                                    <a:latin typeface="Cambria Math" charset="0"/>
+                                    <a:ea typeface="Arial" charset="0"/>
+                                    <a:cs typeface="Arial" charset="0"/>
+                                  </a:rPr>
+                                  <m:t>𝒊</m:t>
+                                </m:r>
+                              </m:sub>
+                            </m:sSub>
+                          </m:sup>
+                        </m:sSup>
                       </m:num>
                       <m:den>
                         <m:nary>
@@ -18643,7 +18650,7 @@
             </p:txBody>
           </p:sp>
         </mc:Choice>
-        <mc:Fallback xmlns="">
+        <mc:Fallback>
           <p:sp>
             <p:nvSpPr>
               <p:cNvPr id="4" name="Rectangle 3"/>
@@ -18655,7 +18662,7 @@
             <p:spPr>
               <a:xfrm>
                 <a:off x="190005" y="233663"/>
-                <a:ext cx="11827824" cy="5000984"/>
+                <a:ext cx="11827824" cy="5143972"/>
               </a:xfrm>
               <a:prstGeom prst="rect">
                 <a:avLst/>

</xml_diff>